<commit_message>
adds pictures and update presentation
</commit_message>
<xml_diff>
--- a/Abschlussvortrag.pptx
+++ b/Abschlussvortrag.pptx
@@ -5,7 +5,7 @@
     <p:sldMasterId id="2147483648" r:id="rId1"/>
   </p:sldMasterIdLst>
   <p:notesMasterIdLst>
-    <p:notesMasterId r:id="rId17"/>
+    <p:notesMasterId r:id="rId21"/>
   </p:notesMasterIdLst>
   <p:sldIdLst>
     <p:sldId id="256" r:id="rId4"/>
@@ -21,6 +21,10 @@
     <p:sldId id="266" r:id="rId14"/>
     <p:sldId id="267" r:id="rId15"/>
     <p:sldId id="268" r:id="rId16"/>
+    <p:sldId id="269" r:id="rId17"/>
+    <p:sldId id="270" r:id="rId18"/>
+    <p:sldId id="271" r:id="rId19"/>
+    <p:sldId id="272" r:id="rId20"/>
   </p:sldIdLst>
   <p:sldSz cx="12192000" cy="6858000"/>
   <p:notesSz cx="12192000" cy="6858000"/>
@@ -1074,7 +1078,7 @@
             </a:pPr>
             <a:r>
               <a:rPr/>
-              <a:t>In dieser Arbeit werden die Vorteile der Entwicklung mit DSL genutzt, um eine Lösung f</a:t>
+              <a:t>In dieser Arbeit werden die Vorteile der Entwicklung mit Domain-spezifische Sprachen genutzt, um eine Lösung f</a:t>
             </a:r>
             <a:r>
               <a:rPr lang="en-US" sz="1200" b="0" i="0" u="none" strike="noStrike" cap="none" spc="0">
@@ -1087,14 +1091,48 @@
               </a:rPr>
               <a:t>ür die Integration des Designs der Endbenutzerdokumentation in den Anwendungsentwicklungsprozess vorzuschlagen.</a:t>
             </a:r>
+            <a:endParaRPr/>
+          </a:p>
+          <a:p>
+            <a:pPr>
+              <a:defRPr/>
+            </a:pPr>
+            <a:endParaRPr/>
+          </a:p>
+          <a:p>
+            <a:pPr>
+              <a:defRPr/>
+            </a:pPr>
             <a:r>
               <a:rPr/>
-              <a:t> Das heißt, unser Ziel ist es, ein Werkzeug zu entwicklen, das eine benutzerfreundliche Facade anzubieten, die auch von Nicht-programmierern verwendet werden kann</a:t>
+              <a:t>Vorteile der model-basierte (DSL-) Lösung: schnelles Entwerfen von Systemmodellen, Modelle abstrahieren und vereinfachen</a:t>
+            </a:r>
+            <a:endParaRPr/>
+          </a:p>
+          <a:p>
+            <a:pPr>
+              <a:defRPr/>
+            </a:pPr>
+            <a:endParaRPr/>
+          </a:p>
+          <a:p>
+            <a:pPr>
+              <a:defRPr/>
+            </a:pPr>
+            <a:r>
+              <a:rPr/>
+              <a:t>Das heißt, unser Ziel ist es, ein Werkzeug zu entwicklen, das eine benutzerfreundliche Umbegung anbietet, die auch von Nicht-programmierern verwendet werden kann</a:t>
             </a:r>
             <a:r>
               <a:rPr/>
               <a:t>, um die Dokumentation als Model zu entwerfen und dann zu generieren. Dieses Konzept stammt von der Cinco Meta Tooling Framework.</a:t>
             </a:r>
+            <a:endParaRPr/>
+          </a:p>
+          <a:p>
+            <a:pPr>
+              <a:defRPr/>
+            </a:pPr>
             <a:endParaRPr lang="en-US" sz="1200" b="0" i="0" u="none" strike="noStrike" cap="none" spc="0">
               <a:solidFill>
                 <a:schemeClr val="tx1"/>
@@ -1108,45 +1146,6 @@
             <a:pPr>
               <a:defRPr/>
             </a:pPr>
-            <a:endParaRPr/>
-          </a:p>
-          <a:p>
-            <a:pPr>
-              <a:defRPr/>
-            </a:pPr>
-            <a:r>
-              <a:rPr lang="en-US" sz="1200" b="0" i="0" u="none" strike="noStrike" cap="none" spc="0">
-                <a:solidFill>
-                  <a:schemeClr val="tx1"/>
-                </a:solidFill>
-                <a:latin typeface="Palatino Linotype"/>
-                <a:ea typeface="Palatino Linotype"/>
-                <a:cs typeface="Palatino Linotype"/>
-              </a:rPr>
-              <a:t>Die Framework Cinco SCCE Meta Tooling suite liefert die Basis unserer Arbeit, indem Metasprachen für unsere </a:t>
-            </a:r>
-            <a:r>
-              <a:rPr lang="en-US" sz="1200" b="0" i="0" u="none" strike="noStrike" cap="none" spc="0">
-                <a:solidFill>
-                  <a:schemeClr val="tx1"/>
-                </a:solidFill>
-                <a:latin typeface="Palatino Linotype"/>
-                <a:ea typeface="Palatino Linotype"/>
-                <a:cs typeface="Palatino Linotype"/>
-              </a:rPr>
-              <a:t>Entwicklung unserer graphischen DSL zu Verfügung gestellt werden.</a:t>
-            </a:r>
-            <a:r>
-              <a:rPr lang="en-US" sz="1200" b="0" i="0" u="none" strike="noStrike" cap="none" spc="0">
-                <a:solidFill>
-                  <a:schemeClr val="tx1"/>
-                </a:solidFill>
-                <a:latin typeface="Palatino Linotype"/>
-                <a:ea typeface="Palatino Linotype"/>
-                <a:cs typeface="Palatino Linotype"/>
-              </a:rPr>
-              <a:t> Wir benutzen diese Metasprachen um die Spezifikationen unserer Endsprachen zu entwerfen, um dann eine Entwicklungsumgebung zu generien, die einen Entwurf der Dokumentation anhand von graphischen Bausteinen ermöglicht.</a:t>
-            </a:r>
             <a:endParaRPr lang="en-US" sz="1200" b="0" i="0" u="none" strike="noStrike" cap="none" spc="0">
               <a:solidFill>
                 <a:schemeClr val="tx1"/>
@@ -1216,7 +1215,7 @@
       </p:grpSpPr>
       <p:sp>
         <p:nvSpPr>
-          <p:cNvPr id="988641185" name="Slide Image Placeholder 1" hidden="0"/>
+          <p:cNvPr id="611909490" name="Slide Image Placeholder 1" hidden="0"/>
           <p:cNvSpPr>
             <a:spLocks noChangeAspect="1" noGrp="1" noRot="1"/>
           </p:cNvSpPr>
@@ -1228,7 +1227,7 @@
       </p:sp>
       <p:sp>
         <p:nvSpPr>
-          <p:cNvPr id="655319745" name="Notes Placeholder 2" hidden="0"/>
+          <p:cNvPr id="1558813346" name="Notes Placeholder 2" hidden="0"/>
           <p:cNvSpPr>
             <a:spLocks noGrp="1"/>
           </p:cNvSpPr>
@@ -1244,25 +1243,6 @@
             <a:pPr>
               <a:defRPr/>
             </a:pPr>
-            <a:r>
-              <a:rPr/>
-              <a:t>In dieser Arbeit werden die Vorteile der Entwicklung mit DSL genutzt, um eine Lösung f</a:t>
-            </a:r>
-            <a:r>
-              <a:rPr lang="en-US" sz="1200" b="0" i="0" u="none" strike="noStrike" cap="none" spc="0">
-                <a:solidFill>
-                  <a:schemeClr val="tx1"/>
-                </a:solidFill>
-                <a:latin typeface="Palatino Linotype"/>
-                <a:ea typeface="Palatino Linotype"/>
-                <a:cs typeface="Palatino Linotype"/>
-              </a:rPr>
-              <a:t>ür die Integration des Designs der Endbenutzerdokumentation in den Anwendungsentwicklungsprozess vorzuschlagen.</a:t>
-            </a:r>
-            <a:r>
-              <a:rPr/>
-              <a:t> Das heißt, unser Ziel ist es, ein Werkzeug zu entwicklen, das die Abstraktion des automatischen Generierungsprozesses versteckt, um eine benutzerfreundliche Facade anzubieten, die auch von Nicht-programmierern verwendet werden kann. Dieses Konzept stammt von der Cinco Meta Tooling Framework.</a:t>
-            </a:r>
             <a:endParaRPr lang="en-US" sz="1200" b="0" i="0" u="none" strike="noStrike" cap="none" spc="0">
               <a:solidFill>
                 <a:schemeClr val="tx1"/>
@@ -1276,45 +1256,6 @@
             <a:pPr>
               <a:defRPr/>
             </a:pPr>
-            <a:endParaRPr/>
-          </a:p>
-          <a:p>
-            <a:pPr>
-              <a:defRPr/>
-            </a:pPr>
-            <a:r>
-              <a:rPr lang="en-US" sz="1200" b="0" i="0" u="none" strike="noStrike" cap="none" spc="0">
-                <a:solidFill>
-                  <a:schemeClr val="tx1"/>
-                </a:solidFill>
-                <a:latin typeface="Palatino Linotype"/>
-                <a:ea typeface="Palatino Linotype"/>
-                <a:cs typeface="Palatino Linotype"/>
-              </a:rPr>
-              <a:t>Die Framework Cinco SCCE Meta Tooling suite liefert die Basis unserer Arbeit, indem Metasprachen für unsere </a:t>
-            </a:r>
-            <a:r>
-              <a:rPr lang="en-US" sz="1200" b="0" i="0" u="none" strike="noStrike" cap="none" spc="0">
-                <a:solidFill>
-                  <a:schemeClr val="tx1"/>
-                </a:solidFill>
-                <a:latin typeface="Palatino Linotype"/>
-                <a:ea typeface="Palatino Linotype"/>
-                <a:cs typeface="Palatino Linotype"/>
-              </a:rPr>
-              <a:t>Entwicklung unserer graphischen DSL zu Verfügung gestellt werden.</a:t>
-            </a:r>
-            <a:r>
-              <a:rPr lang="en-US" sz="1200" b="0" i="0" u="none" strike="noStrike" cap="none" spc="0">
-                <a:solidFill>
-                  <a:schemeClr val="tx1"/>
-                </a:solidFill>
-                <a:latin typeface="Palatino Linotype"/>
-                <a:ea typeface="Palatino Linotype"/>
-                <a:cs typeface="Palatino Linotype"/>
-              </a:rPr>
-              <a:t> Wir benutzen diese Metasprachen um die Spezifikationen unserer Endsprachen zu entwerfen, um dann eine Entwicklungsumgebung zu generien, die einen Entwurf der Dokumentation anhand von graphischen Bausteinen ermöglicht.</a:t>
-            </a:r>
             <a:endParaRPr lang="en-US" sz="1200" b="0" i="0" u="none" strike="noStrike" cap="none" spc="0">
               <a:solidFill>
                 <a:schemeClr val="tx1"/>
@@ -1340,7 +1281,125 @@
       </p:sp>
       <p:sp>
         <p:nvSpPr>
-          <p:cNvPr id="554592255" name="Slide Number Placeholder 3" hidden="0"/>
+          <p:cNvPr id="1083974254" name="Slide Number Placeholder 3" hidden="0"/>
+          <p:cNvSpPr>
+            <a:spLocks noGrp="1"/>
+          </p:cNvSpPr>
+          <p:nvPr isPhoto="0" userDrawn="0">
+            <p:ph type="sldNum" sz="quarter" idx="10" hasCustomPrompt="0"/>
+          </p:nvPr>
+        </p:nvSpPr>
+        <p:spPr bwMode="auto"/>
+        <p:txBody>
+          <a:bodyPr/>
+          <a:lstStyle/>
+          <a:p>
+            <a:pPr>
+              <a:defRPr/>
+            </a:pPr>
+            <a:endParaRPr/>
+          </a:p>
+        </p:txBody>
+      </p:sp>
+    </p:spTree>
+  </p:cSld>
+</p:notes>
+</file>
+
+<file path=ppt/notesSlides/notesSlide7.xml><?xml version="1.0" encoding="utf-8"?>
+<p:notes xmlns:a="http://schemas.openxmlformats.org/drawingml/2006/main" xmlns:r="http://schemas.openxmlformats.org/officeDocument/2006/relationships" xmlns:p="http://schemas.openxmlformats.org/presentationml/2006/main" xmlns:m="http://schemas.openxmlformats.org/officeDocument/2006/math" xmlns:w="http://schemas.openxmlformats.org/wordprocessingml/2006/main">
+  <p:cSld name="">
+    <p:spTree>
+      <p:nvGrpSpPr>
+        <p:cNvPr id="1" name="" hidden="0"/>
+        <p:cNvGrpSpPr/>
+        <p:nvPr isPhoto="0" userDrawn="0"/>
+      </p:nvGrpSpPr>
+      <p:grpSpPr bwMode="auto">
+        <a:xfrm>
+          <a:off x="0" y="0"/>
+          <a:ext cx="0" cy="0"/>
+          <a:chOff x="0" y="0"/>
+          <a:chExt cx="0" cy="0"/>
+        </a:xfrm>
+      </p:grpSpPr>
+      <p:sp>
+        <p:nvSpPr>
+          <p:cNvPr id="2" name="Slide Image Placeholder 1" hidden="0"/>
+          <p:cNvSpPr>
+            <a:spLocks noChangeAspect="1" noGrp="1" noRot="1"/>
+          </p:cNvSpPr>
+          <p:nvPr isPhoto="0" userDrawn="0">
+            <p:ph type="sldImg" hasCustomPrompt="0"/>
+          </p:nvPr>
+        </p:nvSpPr>
+        <p:spPr bwMode="auto"/>
+      </p:sp>
+      <p:sp>
+        <p:nvSpPr>
+          <p:cNvPr id="3" name="Notes Placeholder 2" hidden="0"/>
+          <p:cNvSpPr>
+            <a:spLocks noGrp="1"/>
+          </p:cNvSpPr>
+          <p:nvPr isPhoto="0" userDrawn="0">
+            <p:ph type="body" idx="1" hasCustomPrompt="0"/>
+          </p:nvPr>
+        </p:nvSpPr>
+        <p:spPr bwMode="auto"/>
+        <p:txBody>
+          <a:bodyPr/>
+          <a:lstStyle/>
+          <a:p>
+            <a:pPr>
+              <a:defRPr/>
+            </a:pPr>
+            <a:r>
+              <a:rPr lang="en-US" sz="1200" b="0" i="0" u="none" strike="noStrike" cap="none" spc="0">
+                <a:solidFill>
+                  <a:schemeClr val="tx1"/>
+                </a:solidFill>
+                <a:latin typeface="Palatino Linotype"/>
+                <a:ea typeface="Palatino Linotype"/>
+                <a:cs typeface="Palatino Linotype"/>
+              </a:rPr>
+              <a:t>Die Framework Cinco SCCE Meta Tooling suite liefert die Basis unserer Arbeit, indem Metasprachen für unsere </a:t>
+            </a:r>
+            <a:r>
+              <a:rPr lang="en-US" sz="1200" b="0" i="0" u="none" strike="noStrike" cap="none" spc="0">
+                <a:solidFill>
+                  <a:schemeClr val="tx1"/>
+                </a:solidFill>
+                <a:latin typeface="Palatino Linotype"/>
+                <a:ea typeface="Palatino Linotype"/>
+                <a:cs typeface="Palatino Linotype"/>
+              </a:rPr>
+              <a:t>Entwicklung unserer graphischen DSL zu Verfügung gestellt werden.</a:t>
+            </a:r>
+            <a:r>
+              <a:rPr lang="en-US" sz="1200" b="0" i="0" u="none" strike="noStrike" cap="none" spc="0">
+                <a:solidFill>
+                  <a:schemeClr val="tx1"/>
+                </a:solidFill>
+                <a:latin typeface="Palatino Linotype"/>
+                <a:ea typeface="Palatino Linotype"/>
+                <a:cs typeface="Palatino Linotype"/>
+              </a:rPr>
+              <a:t> Wir benutzen diese Metasprachen um die Spezifikationen unserer Endsprachen zu entwerfen, um dann eine Entwicklungsumgebung zu generien, die einen Entwurf der Dokumentation anhand von graphischen Bausteinen ermöglicht.</a:t>
+            </a:r>
+            <a:endParaRPr sz="1200" b="0" i="0" u="none" strike="noStrike" cap="none" spc="0">
+              <a:solidFill>
+                <a:schemeClr val="tx1"/>
+              </a:solidFill>
+              <a:latin typeface="Palatino Linotype"/>
+              <a:ea typeface="Palatino Linotype"/>
+              <a:cs typeface="Palatino Linotype"/>
+            </a:endParaRPr>
+          </a:p>
+        </p:txBody>
+      </p:sp>
+      <p:sp>
+        <p:nvSpPr>
+          <p:cNvPr id="4" name="Slide Number Placeholder 3" hidden="0"/>
           <p:cNvSpPr>
             <a:spLocks noGrp="1"/>
           </p:cNvSpPr>
@@ -7652,7 +7711,7 @@
       </p:grpSpPr>
       <p:sp>
         <p:nvSpPr>
-          <p:cNvPr id="1417253658" name="Título 1" hidden="0"/>
+          <p:cNvPr id="53415977" name="Título 1" hidden="0"/>
           <p:cNvSpPr>
             <a:spLocks noGrp="1"/>
           </p:cNvSpPr>
@@ -7670,48 +7729,55 @@
             </a:pPr>
             <a:r>
               <a:rPr lang="de-DE"/>
-              <a:t>Demo</a:t>
+              <a:t>Methodologie</a:t>
             </a:r>
             <a:br>
               <a:rPr lang="de-DE"/>
             </a:br>
             <a:r>
-              <a:rPr lang="de-DE" sz="1600" b="0" i="1" u="none" strike="noStrike" cap="none" spc="0">
-                <a:solidFill>
-                  <a:schemeClr val="tx1"/>
-                </a:solidFill>
-                <a:latin typeface="+mj-lt"/>
-                <a:ea typeface="+mj-ea"/>
-                <a:cs typeface="+mj-cs"/>
+              <a:rPr lang="de-DE" sz="1600" i="1"/>
+              <a:t>graphische DSL aus </a:t>
+            </a:r>
+            <a:r>
+              <a:rPr lang="de-DE" sz="1600" i="1">
+                <a:latin typeface="URW Bookman"/>
+                <a:ea typeface="URW Bookman"/>
+                <a:cs typeface="URW Bookman"/>
               </a:rPr>
-              <a:t>WebDoc - Web Application Documentor</a:t>
-            </a:r>
-            <a:endParaRPr/>
-          </a:p>
-        </p:txBody>
-      </p:sp>
-      <p:sp>
-        <p:nvSpPr>
-          <p:cNvPr id="514216593" name="Marcador de contenido 2" hidden="0"/>
-          <p:cNvSpPr>
-            <a:spLocks noGrp="1"/>
-          </p:cNvSpPr>
+              <a:t>Cinco</a:t>
+            </a:r>
+            <a:r>
+              <a:rPr lang="de-DE" sz="1600" i="1"/>
+              <a:t> Metasprachen</a:t>
+            </a:r>
+            <a:endParaRPr/>
+          </a:p>
+        </p:txBody>
+      </p:sp>
+      <p:pic>
+        <p:nvPicPr>
+          <p:cNvPr id="998142041" name="" hidden="0"/>
+          <p:cNvPicPr>
+            <a:picLocks noChangeAspect="1"/>
+          </p:cNvPicPr>
           <p:nvPr isPhoto="0" userDrawn="0">
             <p:ph idx="1" hasCustomPrompt="0"/>
           </p:nvPr>
-        </p:nvSpPr>
-        <p:spPr bwMode="auto"/>
-        <p:txBody>
-          <a:bodyPr/>
-          <a:lstStyle/>
-          <a:p>
-            <a:pPr>
-              <a:defRPr/>
-            </a:pPr>
-            <a:endParaRPr/>
-          </a:p>
-        </p:txBody>
-      </p:sp>
+        </p:nvPicPr>
+        <p:blipFill>
+          <a:blip r:embed="rId2"/>
+          <a:stretch/>
+        </p:blipFill>
+        <p:spPr bwMode="auto">
+          <a:xfrm rot="0">
+            <a:off x="1534695" y="1968145"/>
+            <a:ext cx="7353299" cy="1371600"/>
+          </a:xfrm>
+          <a:prstGeom prst="rect">
+            <a:avLst/>
+          </a:prstGeom>
+        </p:spPr>
+      </p:pic>
     </p:spTree>
   </p:cSld>
   <p:clrMapOvr>
@@ -7747,7 +7813,7 @@
       </p:grpSpPr>
       <p:sp>
         <p:nvSpPr>
-          <p:cNvPr id="157058720" name="Título 1" hidden="0"/>
+          <p:cNvPr id="737948483" name="Título 1" hidden="0"/>
           <p:cNvSpPr>
             <a:spLocks noGrp="1"/>
           </p:cNvSpPr>
@@ -7765,18 +7831,22 @@
             </a:pPr>
             <a:r>
               <a:rPr lang="de-DE"/>
-              <a:t>Fazit</a:t>
+              <a:t>Ergebnisse</a:t>
             </a:r>
             <a:br>
               <a:rPr lang="de-DE"/>
             </a:br>
-            <a:endParaRPr sz="1600"/>
-          </a:p>
-        </p:txBody>
-      </p:sp>
-      <p:sp>
-        <p:nvSpPr>
-          <p:cNvPr id="1934508904" name="Marcador de contenido 2" hidden="0"/>
+            <a:r>
+              <a:rPr lang="de-DE" sz="1600" i="1"/>
+              <a:t>WebDoc - Web Application Documentor</a:t>
+            </a:r>
+            <a:endParaRPr/>
+          </a:p>
+        </p:txBody>
+      </p:sp>
+      <p:sp>
+        <p:nvSpPr>
+          <p:cNvPr id="1419255848" name="Marcador de contenido 2" hidden="0"/>
           <p:cNvSpPr>
             <a:spLocks noGrp="1"/>
           </p:cNvSpPr>
@@ -7831,7 +7901,7 @@
       </p:grpSpPr>
       <p:sp>
         <p:nvSpPr>
-          <p:cNvPr id="491240005" name="Título 1" hidden="0"/>
+          <p:cNvPr id="2066127232" name="Título 1" hidden="0"/>
           <p:cNvSpPr>
             <a:spLocks noGrp="1"/>
           </p:cNvSpPr>
@@ -7849,18 +7919,22 @@
             </a:pPr>
             <a:r>
               <a:rPr lang="de-DE"/>
-              <a:t>Referenzen</a:t>
+              <a:t>Ergebnisse</a:t>
             </a:r>
             <a:br>
               <a:rPr lang="de-DE"/>
             </a:br>
-            <a:endParaRPr sz="1800"/>
-          </a:p>
-        </p:txBody>
-      </p:sp>
-      <p:sp>
-        <p:nvSpPr>
-          <p:cNvPr id="835041238" name="Marcador de contenido 2" hidden="0"/>
+            <a:r>
+              <a:rPr lang="de-DE" sz="1600" i="1"/>
+              <a:t>WebDoc - Web Application Documentor</a:t>
+            </a:r>
+            <a:endParaRPr/>
+          </a:p>
+        </p:txBody>
+      </p:sp>
+      <p:sp>
+        <p:nvSpPr>
+          <p:cNvPr id="1550064571" name="Marcador de contenido 2" hidden="0"/>
           <p:cNvSpPr>
             <a:spLocks noGrp="1"/>
           </p:cNvSpPr>
@@ -7876,21 +7950,6 @@
             <a:pPr>
               <a:defRPr/>
             </a:pPr>
-            <a:r>
-              <a:rPr/>
-              <a:t>Icons, Gifs, Cliparts aus </a:t>
-            </a:r>
-            <a:r>
-              <a:rPr lang="en-US" sz="2000" b="0" i="0" u="none" strike="noStrike" cap="none" spc="0">
-                <a:solidFill>
-                  <a:schemeClr val="tx1"/>
-                </a:solidFill>
-                <a:latin typeface="Palatino Linotype"/>
-                <a:ea typeface="Palatino Linotype"/>
-                <a:cs typeface="Palatino Linotype"/>
-              </a:rPr>
-              <a:t>https://www.flaticon.com/</a:t>
-            </a:r>
             <a:endParaRPr/>
           </a:p>
         </p:txBody>
@@ -7912,6 +7971,372 @@
 </file>
 
 <file path=ppt/slides/slide13.xml><?xml version="1.0" encoding="utf-8"?>
+<p:sld xmlns:a="http://schemas.openxmlformats.org/drawingml/2006/main" xmlns:r="http://schemas.openxmlformats.org/officeDocument/2006/relationships" xmlns:p="http://schemas.openxmlformats.org/presentationml/2006/main" xmlns:m="http://schemas.openxmlformats.org/officeDocument/2006/math" xmlns:w="http://schemas.openxmlformats.org/wordprocessingml/2006/main" showMasterPhAnim="0" show="1">
+  <p:cSld name="">
+    <p:spTree>
+      <p:nvGrpSpPr>
+        <p:cNvPr id="1" name="" hidden="0"/>
+        <p:cNvGrpSpPr/>
+        <p:nvPr isPhoto="0" userDrawn="0"/>
+      </p:nvGrpSpPr>
+      <p:grpSpPr bwMode="auto">
+        <a:xfrm>
+          <a:off x="0" y="0"/>
+          <a:ext cx="0" cy="0"/>
+          <a:chOff x="0" y="0"/>
+          <a:chExt cx="0" cy="0"/>
+        </a:xfrm>
+      </p:grpSpPr>
+      <p:sp>
+        <p:nvSpPr>
+          <p:cNvPr id="313569025" name="Título 1" hidden="0"/>
+          <p:cNvSpPr>
+            <a:spLocks noGrp="1"/>
+          </p:cNvSpPr>
+          <p:nvPr isPhoto="0" userDrawn="0">
+            <p:ph type="title" hasCustomPrompt="0"/>
+          </p:nvPr>
+        </p:nvSpPr>
+        <p:spPr bwMode="auto"/>
+        <p:txBody>
+          <a:bodyPr/>
+          <a:lstStyle/>
+          <a:p>
+            <a:pPr>
+              <a:defRPr/>
+            </a:pPr>
+            <a:r>
+              <a:rPr lang="de-DE"/>
+              <a:t>Ergebnisse</a:t>
+            </a:r>
+            <a:br>
+              <a:rPr lang="de-DE"/>
+            </a:br>
+            <a:r>
+              <a:rPr lang="de-DE" sz="1600" i="1"/>
+              <a:t>WebDoc - Web Application Documentor</a:t>
+            </a:r>
+            <a:endParaRPr/>
+          </a:p>
+        </p:txBody>
+      </p:sp>
+      <p:sp>
+        <p:nvSpPr>
+          <p:cNvPr id="985876979" name="Marcador de contenido 2" hidden="0"/>
+          <p:cNvSpPr>
+            <a:spLocks noGrp="1"/>
+          </p:cNvSpPr>
+          <p:nvPr isPhoto="0" userDrawn="0">
+            <p:ph idx="1" hasCustomPrompt="0"/>
+          </p:nvPr>
+        </p:nvSpPr>
+        <p:spPr bwMode="auto"/>
+        <p:txBody>
+          <a:bodyPr/>
+          <a:lstStyle/>
+          <a:p>
+            <a:pPr>
+              <a:defRPr/>
+            </a:pPr>
+            <a:endParaRPr/>
+          </a:p>
+        </p:txBody>
+      </p:sp>
+    </p:spTree>
+  </p:cSld>
+  <p:clrMapOvr>
+    <a:masterClrMapping/>
+  </p:clrMapOvr>
+  <mc:AlternateContent xmlns:mc="http://schemas.openxmlformats.org/markup-compatibility/2006">
+    <mc:Choice xmlns:p14="http://schemas.microsoft.com/office/powerpoint/2010/main" Requires="p14">
+      <p:transition p14:dur="2000" advClick="1"/>
+    </mc:Choice>
+    <mc:Fallback>
+      <p:transition advClick="1"/>
+    </mc:Fallback>
+  </mc:AlternateContent>
+</p:sld>
+</file>
+
+<file path=ppt/slides/slide14.xml><?xml version="1.0" encoding="utf-8"?>
+<p:sld xmlns:a="http://schemas.openxmlformats.org/drawingml/2006/main" xmlns:r="http://schemas.openxmlformats.org/officeDocument/2006/relationships" xmlns:p="http://schemas.openxmlformats.org/presentationml/2006/main" xmlns:m="http://schemas.openxmlformats.org/officeDocument/2006/math" xmlns:w="http://schemas.openxmlformats.org/wordprocessingml/2006/main" showMasterPhAnim="0" show="1">
+  <p:cSld name="">
+    <p:spTree>
+      <p:nvGrpSpPr>
+        <p:cNvPr id="1" name="" hidden="0"/>
+        <p:cNvGrpSpPr/>
+        <p:nvPr isPhoto="0" userDrawn="0"/>
+      </p:nvGrpSpPr>
+      <p:grpSpPr bwMode="auto">
+        <a:xfrm>
+          <a:off x="0" y="0"/>
+          <a:ext cx="0" cy="0"/>
+          <a:chOff x="0" y="0"/>
+          <a:chExt cx="0" cy="0"/>
+        </a:xfrm>
+      </p:grpSpPr>
+      <p:sp>
+        <p:nvSpPr>
+          <p:cNvPr id="1417253658" name="Título 1" hidden="0"/>
+          <p:cNvSpPr>
+            <a:spLocks noGrp="1"/>
+          </p:cNvSpPr>
+          <p:nvPr isPhoto="0" userDrawn="0">
+            <p:ph type="title" hasCustomPrompt="0"/>
+          </p:nvPr>
+        </p:nvSpPr>
+        <p:spPr bwMode="auto"/>
+        <p:txBody>
+          <a:bodyPr/>
+          <a:lstStyle/>
+          <a:p>
+            <a:pPr>
+              <a:defRPr/>
+            </a:pPr>
+            <a:r>
+              <a:rPr lang="de-DE"/>
+              <a:t>Demo</a:t>
+            </a:r>
+            <a:br>
+              <a:rPr lang="de-DE"/>
+            </a:br>
+            <a:r>
+              <a:rPr lang="de-DE" sz="1600" b="0" i="1" u="none" strike="noStrike" cap="none" spc="0">
+                <a:solidFill>
+                  <a:schemeClr val="tx1"/>
+                </a:solidFill>
+                <a:latin typeface="+mj-lt"/>
+                <a:ea typeface="+mj-ea"/>
+                <a:cs typeface="+mj-cs"/>
+              </a:rPr>
+              <a:t>WebDoc - Web Application Documentor</a:t>
+            </a:r>
+            <a:endParaRPr/>
+          </a:p>
+        </p:txBody>
+      </p:sp>
+      <p:sp>
+        <p:nvSpPr>
+          <p:cNvPr id="514216593" name="Marcador de contenido 2" hidden="0"/>
+          <p:cNvSpPr>
+            <a:spLocks noGrp="1"/>
+          </p:cNvSpPr>
+          <p:nvPr isPhoto="0" userDrawn="0">
+            <p:ph idx="1" hasCustomPrompt="0"/>
+          </p:nvPr>
+        </p:nvSpPr>
+        <p:spPr bwMode="auto"/>
+        <p:txBody>
+          <a:bodyPr/>
+          <a:lstStyle/>
+          <a:p>
+            <a:pPr>
+              <a:defRPr/>
+            </a:pPr>
+            <a:endParaRPr/>
+          </a:p>
+        </p:txBody>
+      </p:sp>
+    </p:spTree>
+  </p:cSld>
+  <p:clrMapOvr>
+    <a:masterClrMapping/>
+  </p:clrMapOvr>
+  <mc:AlternateContent xmlns:mc="http://schemas.openxmlformats.org/markup-compatibility/2006">
+    <mc:Choice xmlns:p14="http://schemas.microsoft.com/office/powerpoint/2010/main" Requires="p14">
+      <p:transition p14:dur="2000" advClick="1"/>
+    </mc:Choice>
+    <mc:Fallback>
+      <p:transition advClick="1"/>
+    </mc:Fallback>
+  </mc:AlternateContent>
+</p:sld>
+</file>
+
+<file path=ppt/slides/slide15.xml><?xml version="1.0" encoding="utf-8"?>
+<p:sld xmlns:a="http://schemas.openxmlformats.org/drawingml/2006/main" xmlns:r="http://schemas.openxmlformats.org/officeDocument/2006/relationships" xmlns:p="http://schemas.openxmlformats.org/presentationml/2006/main" xmlns:m="http://schemas.openxmlformats.org/officeDocument/2006/math" xmlns:w="http://schemas.openxmlformats.org/wordprocessingml/2006/main" showMasterPhAnim="0" show="1">
+  <p:cSld name="">
+    <p:spTree>
+      <p:nvGrpSpPr>
+        <p:cNvPr id="1" name="" hidden="0"/>
+        <p:cNvGrpSpPr/>
+        <p:nvPr isPhoto="0" userDrawn="0"/>
+      </p:nvGrpSpPr>
+      <p:grpSpPr bwMode="auto">
+        <a:xfrm>
+          <a:off x="0" y="0"/>
+          <a:ext cx="0" cy="0"/>
+          <a:chOff x="0" y="0"/>
+          <a:chExt cx="0" cy="0"/>
+        </a:xfrm>
+      </p:grpSpPr>
+      <p:sp>
+        <p:nvSpPr>
+          <p:cNvPr id="157058720" name="Título 1" hidden="0"/>
+          <p:cNvSpPr>
+            <a:spLocks noGrp="1"/>
+          </p:cNvSpPr>
+          <p:nvPr isPhoto="0" userDrawn="0">
+            <p:ph type="title" hasCustomPrompt="0"/>
+          </p:nvPr>
+        </p:nvSpPr>
+        <p:spPr bwMode="auto"/>
+        <p:txBody>
+          <a:bodyPr/>
+          <a:lstStyle/>
+          <a:p>
+            <a:pPr>
+              <a:defRPr/>
+            </a:pPr>
+            <a:r>
+              <a:rPr lang="de-DE"/>
+              <a:t>Fazit</a:t>
+            </a:r>
+            <a:br>
+              <a:rPr lang="de-DE"/>
+            </a:br>
+            <a:endParaRPr sz="1600"/>
+          </a:p>
+        </p:txBody>
+      </p:sp>
+      <p:sp>
+        <p:nvSpPr>
+          <p:cNvPr id="1934508904" name="Marcador de contenido 2" hidden="0"/>
+          <p:cNvSpPr>
+            <a:spLocks noGrp="1"/>
+          </p:cNvSpPr>
+          <p:nvPr isPhoto="0" userDrawn="0">
+            <p:ph idx="1" hasCustomPrompt="0"/>
+          </p:nvPr>
+        </p:nvSpPr>
+        <p:spPr bwMode="auto"/>
+        <p:txBody>
+          <a:bodyPr/>
+          <a:lstStyle/>
+          <a:p>
+            <a:pPr>
+              <a:defRPr/>
+            </a:pPr>
+            <a:endParaRPr/>
+          </a:p>
+        </p:txBody>
+      </p:sp>
+    </p:spTree>
+  </p:cSld>
+  <p:clrMapOvr>
+    <a:masterClrMapping/>
+  </p:clrMapOvr>
+  <mc:AlternateContent xmlns:mc="http://schemas.openxmlformats.org/markup-compatibility/2006">
+    <mc:Choice xmlns:p14="http://schemas.microsoft.com/office/powerpoint/2010/main" Requires="p14">
+      <p:transition p14:dur="2000" advClick="1"/>
+    </mc:Choice>
+    <mc:Fallback>
+      <p:transition advClick="1"/>
+    </mc:Fallback>
+  </mc:AlternateContent>
+</p:sld>
+</file>
+
+<file path=ppt/slides/slide16.xml><?xml version="1.0" encoding="utf-8"?>
+<p:sld xmlns:a="http://schemas.openxmlformats.org/drawingml/2006/main" xmlns:r="http://schemas.openxmlformats.org/officeDocument/2006/relationships" xmlns:p="http://schemas.openxmlformats.org/presentationml/2006/main" xmlns:m="http://schemas.openxmlformats.org/officeDocument/2006/math" xmlns:w="http://schemas.openxmlformats.org/wordprocessingml/2006/main" showMasterPhAnim="0" show="1">
+  <p:cSld name="">
+    <p:spTree>
+      <p:nvGrpSpPr>
+        <p:cNvPr id="1" name="" hidden="0"/>
+        <p:cNvGrpSpPr/>
+        <p:nvPr isPhoto="0" userDrawn="0"/>
+      </p:nvGrpSpPr>
+      <p:grpSpPr bwMode="auto">
+        <a:xfrm>
+          <a:off x="0" y="0"/>
+          <a:ext cx="0" cy="0"/>
+          <a:chOff x="0" y="0"/>
+          <a:chExt cx="0" cy="0"/>
+        </a:xfrm>
+      </p:grpSpPr>
+      <p:sp>
+        <p:nvSpPr>
+          <p:cNvPr id="491240005" name="Título 1" hidden="0"/>
+          <p:cNvSpPr>
+            <a:spLocks noGrp="1"/>
+          </p:cNvSpPr>
+          <p:nvPr isPhoto="0" userDrawn="0">
+            <p:ph type="title" hasCustomPrompt="0"/>
+          </p:nvPr>
+        </p:nvSpPr>
+        <p:spPr bwMode="auto"/>
+        <p:txBody>
+          <a:bodyPr/>
+          <a:lstStyle/>
+          <a:p>
+            <a:pPr>
+              <a:defRPr/>
+            </a:pPr>
+            <a:r>
+              <a:rPr lang="de-DE"/>
+              <a:t>Referenzen</a:t>
+            </a:r>
+            <a:br>
+              <a:rPr lang="de-DE"/>
+            </a:br>
+            <a:endParaRPr sz="1800"/>
+          </a:p>
+        </p:txBody>
+      </p:sp>
+      <p:sp>
+        <p:nvSpPr>
+          <p:cNvPr id="835041238" name="Marcador de contenido 2" hidden="0"/>
+          <p:cNvSpPr>
+            <a:spLocks noGrp="1"/>
+          </p:cNvSpPr>
+          <p:nvPr isPhoto="0" userDrawn="0">
+            <p:ph idx="1" hasCustomPrompt="0"/>
+          </p:nvPr>
+        </p:nvSpPr>
+        <p:spPr bwMode="auto"/>
+        <p:txBody>
+          <a:bodyPr/>
+          <a:lstStyle/>
+          <a:p>
+            <a:pPr>
+              <a:defRPr/>
+            </a:pPr>
+            <a:r>
+              <a:rPr/>
+              <a:t>Icons, Gifs, Cliparts aus </a:t>
+            </a:r>
+            <a:r>
+              <a:rPr lang="en-US" sz="2000" b="0" i="0" u="none" strike="noStrike" cap="none" spc="0">
+                <a:solidFill>
+                  <a:schemeClr val="tx1"/>
+                </a:solidFill>
+                <a:latin typeface="Palatino Linotype"/>
+                <a:ea typeface="Palatino Linotype"/>
+                <a:cs typeface="Palatino Linotype"/>
+              </a:rPr>
+              <a:t>https://www.flaticon.com/</a:t>
+            </a:r>
+            <a:endParaRPr/>
+          </a:p>
+        </p:txBody>
+      </p:sp>
+    </p:spTree>
+  </p:cSld>
+  <p:clrMapOvr>
+    <a:masterClrMapping/>
+  </p:clrMapOvr>
+  <mc:AlternateContent xmlns:mc="http://schemas.openxmlformats.org/markup-compatibility/2006">
+    <mc:Choice xmlns:p14="http://schemas.microsoft.com/office/powerpoint/2010/main" Requires="p14">
+      <p:transition p14:dur="2000" advClick="1"/>
+    </mc:Choice>
+    <mc:Fallback>
+      <p:transition advClick="1"/>
+    </mc:Fallback>
+  </mc:AlternateContent>
+</p:sld>
+</file>
+
+<file path=ppt/slides/slide17.xml><?xml version="1.0" encoding="utf-8"?>
 <p:sld xmlns:a="http://schemas.openxmlformats.org/drawingml/2006/main" xmlns:r="http://schemas.openxmlformats.org/officeDocument/2006/relationships" xmlns:p="http://schemas.openxmlformats.org/presentationml/2006/main" xmlns:m="http://schemas.openxmlformats.org/officeDocument/2006/math" xmlns:w="http://schemas.openxmlformats.org/wordprocessingml/2006/main" showMasterPhAnim="0" show="1">
   <p:cSld name="">
     <p:spTree>
@@ -9372,7 +9797,7 @@
         <p:spPr bwMode="auto">
           <a:xfrm flipH="0" flipV="0">
             <a:off x="1534695" y="2015731"/>
-            <a:ext cx="9520157" cy="1721795"/>
+            <a:ext cx="9520157" cy="3418402"/>
           </a:xfrm>
         </p:spPr>
         <p:txBody>
@@ -9386,7 +9811,7 @@
             </a:pPr>
             <a:r>
               <a:rPr/>
-              <a:t>Model-basierte Lösung vorschlagen, die die Vorteile der Entwicklung mit DSL ausnutzt, um Endbenutzerdokumentation automatisch zu generieren </a:t>
+              <a:t>Model-basierte Lösung vorschlagen, die die Vorteile der Entwicklung mit DSL ausnutzt, um Endbenutzerdokumentation für Webanwendungen automatisch zu generieren</a:t>
             </a:r>
             <a:endParaRPr/>
           </a:p>
@@ -9396,270 +9821,33 @@
             </a:pPr>
             <a:r>
               <a:rPr/>
-              <a:t>Den Grundstein liefert die Cinco Entwicklungsumgebung samt der Modelierungssprachen </a:t>
-            </a:r>
+              <a:t>DSLs erlauben eine Repräsentation des Problems (des Systems) zunächst als Model, um dann daraus eine Lösung zu generieren</a:t>
+            </a:r>
+            <a:endParaRPr/>
+          </a:p>
+          <a:p>
+            <a:pPr>
+              <a:defRPr/>
+            </a:pPr>
             <a:r>
               <a:rPr/>
-              <a:t>(MGL, MSL, CPD)</a:t>
-            </a:r>
-            <a:endParaRPr/>
-          </a:p>
-        </p:txBody>
-      </p:sp>
-      <p:pic>
-        <p:nvPicPr>
-          <p:cNvPr id="57513757" name="" hidden="0"/>
-          <p:cNvPicPr>
-            <a:picLocks noChangeAspect="1"/>
-          </p:cNvPicPr>
-          <p:nvPr isPhoto="0" userDrawn="0"/>
-        </p:nvPicPr>
-        <p:blipFill>
-          <a:blip r:embed="rId3"/>
-          <a:stretch/>
-        </p:blipFill>
-        <p:spPr bwMode="auto">
-          <a:xfrm flipH="0" flipV="0">
-            <a:off x="8247961" y="3364809"/>
-            <a:ext cx="3365022" cy="2370896"/>
-          </a:xfrm>
-          <a:prstGeom prst="rect">
-            <a:avLst/>
-          </a:prstGeom>
-        </p:spPr>
-      </p:pic>
-      <p:sp>
-        <p:nvSpPr>
-          <p:cNvPr id="80208309" name="Marcador de contenido 2" hidden="0"/>
-          <p:cNvSpPr>
-            <a:spLocks noGrp="1"/>
-          </p:cNvSpPr>
-          <p:nvPr isPhoto="0" userDrawn="0"/>
-        </p:nvSpPr>
-        <p:spPr bwMode="auto">
-          <a:xfrm flipH="0" flipV="0">
-            <a:off x="1482928" y="3737526"/>
-            <a:ext cx="6765033" cy="1998179"/>
-          </a:xfrm>
-        </p:spPr>
-        <p:txBody>
-          <a:bodyPr vertOverflow="overflow" horzOverflow="clip" vert="horz" wrap="square" lIns="91440" tIns="45720" rIns="91440" bIns="45720" numCol="1" spcCol="0" rtlCol="0" fromWordArt="0" anchor="t" anchorCtr="0" forceAA="0" upright="0" compatLnSpc="0">
-            <a:normAutofit/>
-          </a:bodyPr>
-          <a:lstStyle>
-            <a:lvl1pPr marL="228600" indent="-228600" algn="l" defTabSz="914400">
-              <a:lnSpc>
-                <a:spcPct val="120000"/>
-              </a:lnSpc>
-              <a:spcBef>
-                <a:spcPts val="999"/>
-              </a:spcBef>
-              <a:buClr>
-                <a:schemeClr val="accent1"/>
-              </a:buClr>
-              <a:buSzPct val="100000"/>
-              <a:buFont typeface="Arial"/>
-              <a:buChar char="•"/>
-              <a:defRPr sz="2000">
-                <a:solidFill>
-                  <a:schemeClr val="tx1"/>
-                </a:solidFill>
-                <a:latin typeface="+mn-lt"/>
-                <a:ea typeface="+mn-ea"/>
-                <a:cs typeface="+mn-cs"/>
-              </a:defRPr>
-            </a:lvl1pPr>
-            <a:lvl2pPr marL="685800" indent="-228600" algn="l" defTabSz="914400">
-              <a:lnSpc>
-                <a:spcPct val="120000"/>
-              </a:lnSpc>
-              <a:spcBef>
-                <a:spcPts val="499"/>
-              </a:spcBef>
-              <a:buClr>
-                <a:schemeClr val="accent1"/>
-              </a:buClr>
-              <a:buSzPct val="100000"/>
-              <a:buFont typeface="Arial"/>
-              <a:buChar char="•"/>
-              <a:defRPr sz="1800" cap="none">
-                <a:solidFill>
-                  <a:schemeClr val="tx1"/>
-                </a:solidFill>
-                <a:latin typeface="+mn-lt"/>
-                <a:ea typeface="+mn-ea"/>
-                <a:cs typeface="+mn-cs"/>
-              </a:defRPr>
-            </a:lvl2pPr>
-            <a:lvl3pPr marL="1143000" indent="-228600" algn="l" defTabSz="914400">
-              <a:lnSpc>
-                <a:spcPct val="120000"/>
-              </a:lnSpc>
-              <a:spcBef>
-                <a:spcPts val="499"/>
-              </a:spcBef>
-              <a:buClr>
-                <a:schemeClr val="accent1"/>
-              </a:buClr>
-              <a:buSzPct val="100000"/>
-              <a:buFont typeface="Arial"/>
-              <a:buChar char="•"/>
-              <a:defRPr sz="1600">
-                <a:solidFill>
-                  <a:schemeClr val="tx1"/>
-                </a:solidFill>
-                <a:latin typeface="+mn-lt"/>
-                <a:ea typeface="+mn-ea"/>
-                <a:cs typeface="+mn-cs"/>
-              </a:defRPr>
-            </a:lvl3pPr>
-            <a:lvl4pPr marL="1600200" indent="-228600" algn="l" defTabSz="914400">
-              <a:lnSpc>
-                <a:spcPct val="120000"/>
-              </a:lnSpc>
-              <a:spcBef>
-                <a:spcPts val="499"/>
-              </a:spcBef>
-              <a:buClr>
-                <a:schemeClr val="accent1"/>
-              </a:buClr>
-              <a:buSzPct val="100000"/>
-              <a:buFont typeface="Arial"/>
-              <a:buChar char="•"/>
-              <a:defRPr sz="1400" cap="none">
-                <a:solidFill>
-                  <a:schemeClr val="tx1"/>
-                </a:solidFill>
-                <a:latin typeface="+mn-lt"/>
-                <a:ea typeface="+mn-ea"/>
-                <a:cs typeface="+mn-cs"/>
-              </a:defRPr>
-            </a:lvl4pPr>
-            <a:lvl5pPr marL="2057400" indent="-228600" algn="l" defTabSz="914400">
-              <a:lnSpc>
-                <a:spcPct val="120000"/>
-              </a:lnSpc>
-              <a:spcBef>
-                <a:spcPts val="499"/>
-              </a:spcBef>
-              <a:buClr>
-                <a:schemeClr val="accent1"/>
-              </a:buClr>
-              <a:buSzPct val="100000"/>
-              <a:buFont typeface="Arial"/>
-              <a:buChar char="•"/>
-              <a:defRPr sz="1200">
-                <a:solidFill>
-                  <a:schemeClr val="tx1"/>
-                </a:solidFill>
-                <a:latin typeface="+mn-lt"/>
-                <a:ea typeface="+mn-ea"/>
-                <a:cs typeface="+mn-cs"/>
-              </a:defRPr>
-            </a:lvl5pPr>
-            <a:lvl6pPr marL="2514599" indent="-228600" algn="l" defTabSz="914400">
-              <a:lnSpc>
-                <a:spcPct val="120000"/>
-              </a:lnSpc>
-              <a:spcBef>
-                <a:spcPts val="499"/>
-              </a:spcBef>
-              <a:buClr>
-                <a:schemeClr val="accent1"/>
-              </a:buClr>
-              <a:buSzPct val="100000"/>
-              <a:buFont typeface="Arial"/>
-              <a:buChar char="•"/>
-              <a:defRPr sz="1200">
-                <a:solidFill>
-                  <a:schemeClr val="tx1"/>
-                </a:solidFill>
-                <a:latin typeface="+mn-lt"/>
-                <a:ea typeface="+mn-ea"/>
-                <a:cs typeface="+mn-cs"/>
-              </a:defRPr>
-            </a:lvl6pPr>
-            <a:lvl7pPr marL="2971800" indent="-228600" algn="l" defTabSz="914400">
-              <a:lnSpc>
-                <a:spcPct val="120000"/>
-              </a:lnSpc>
-              <a:spcBef>
-                <a:spcPts val="499"/>
-              </a:spcBef>
-              <a:buClr>
-                <a:schemeClr val="accent1"/>
-              </a:buClr>
-              <a:buSzPct val="100000"/>
-              <a:buFont typeface="Arial"/>
-              <a:buChar char="•"/>
-              <a:defRPr sz="1200">
-                <a:solidFill>
-                  <a:schemeClr val="tx1"/>
-                </a:solidFill>
-                <a:latin typeface="+mn-lt"/>
-                <a:ea typeface="+mn-ea"/>
-                <a:cs typeface="+mn-cs"/>
-              </a:defRPr>
-            </a:lvl7pPr>
-            <a:lvl8pPr marL="3429000" indent="-228600" algn="l" defTabSz="914400">
-              <a:lnSpc>
-                <a:spcPct val="120000"/>
-              </a:lnSpc>
-              <a:spcBef>
-                <a:spcPts val="499"/>
-              </a:spcBef>
-              <a:buClr>
-                <a:schemeClr val="accent1"/>
-              </a:buClr>
-              <a:buSzPct val="100000"/>
-              <a:buFont typeface="Arial"/>
-              <a:buChar char="•"/>
-              <a:defRPr sz="1200">
-                <a:solidFill>
-                  <a:schemeClr val="tx1"/>
-                </a:solidFill>
-                <a:latin typeface="+mn-lt"/>
-                <a:ea typeface="+mn-ea"/>
-                <a:cs typeface="+mn-cs"/>
-              </a:defRPr>
-            </a:lvl8pPr>
-            <a:lvl9pPr marL="3886200" indent="-228600" algn="l" defTabSz="914400">
-              <a:lnSpc>
-                <a:spcPct val="120000"/>
-              </a:lnSpc>
-              <a:spcBef>
-                <a:spcPts val="499"/>
-              </a:spcBef>
-              <a:buClr>
-                <a:schemeClr val="accent1"/>
-              </a:buClr>
-              <a:buSzPct val="100000"/>
-              <a:buFont typeface="Arial"/>
-              <a:buChar char="•"/>
-              <a:defRPr sz="1200">
-                <a:solidFill>
-                  <a:schemeClr val="tx1"/>
-                </a:solidFill>
-                <a:latin typeface="+mn-lt"/>
-                <a:ea typeface="+mn-ea"/>
-                <a:cs typeface="+mn-cs"/>
-              </a:defRPr>
-            </a:lvl9pPr>
-          </a:lstStyle>
-          <a:p>
-            <a:pPr>
-              <a:defRPr/>
-            </a:pPr>
-            <a:r>
-              <a:rPr lang="en-US" sz="2000" b="0" i="0" u="none" strike="noStrike" cap="none" spc="0">
-                <a:solidFill>
-                  <a:schemeClr val="tx1"/>
-                </a:solidFill>
-                <a:latin typeface="Palatino Linotype"/>
-                <a:ea typeface="Arial"/>
-                <a:cs typeface="Arial"/>
-              </a:rPr>
-              <a:t>Diese Modelierungssprachen fundieren als Metamodelierungssprachen zur graphischen Sprache mit der Dokumentationsmodele entworfen werden</a:t>
+              <a:t>Modelle</a:t>
+            </a:r>
+            <a:r>
+              <a:rPr/>
+              <a:t> der Dokumentation zum aktuellen Stand der Anwendung </a:t>
+            </a:r>
+            <a:r>
+              <a:rPr/>
+              <a:t>können a</a:t>
+            </a:r>
+            <a:r>
+              <a:rPr/>
+              <a:t>uch Nicht-Programmierer</a:t>
+            </a:r>
+            <a:r>
+              <a:rPr/>
+              <a:t> erstellen</a:t>
             </a:r>
             <a:endParaRPr/>
           </a:p>
@@ -9700,7 +9888,7 @@
       </p:grpSpPr>
       <p:sp>
         <p:nvSpPr>
-          <p:cNvPr id="1136142833" name="Título 1" hidden="0"/>
+          <p:cNvPr id="133665040" name="Título 1" hidden="0"/>
           <p:cNvSpPr>
             <a:spLocks noGrp="1"/>
           </p:cNvSpPr>
@@ -9718,22 +9906,22 @@
             </a:pPr>
             <a:r>
               <a:rPr lang="de-DE"/>
-              <a:t>Gegenstand der Arbeit</a:t>
+              <a:t>Verwandte Arbeit</a:t>
             </a:r>
             <a:br>
               <a:rPr lang="de-DE"/>
             </a:br>
             <a:r>
               <a:rPr lang="de-DE" sz="1600" i="1"/>
-              <a:t>Eine DSL zur automatischen Generation der Nutzerdokumentation </a:t>
-            </a:r>
-            <a:endParaRPr/>
-          </a:p>
-        </p:txBody>
-      </p:sp>
-      <p:sp>
-        <p:nvSpPr>
-          <p:cNvPr id="49066044" name="Marcador de contenido 2" hidden="0"/>
+              <a:t>Modellierung von Eclipse-basierte Anwendungen</a:t>
+            </a:r>
+            <a:endParaRPr/>
+          </a:p>
+        </p:txBody>
+      </p:sp>
+      <p:sp>
+        <p:nvSpPr>
+          <p:cNvPr id="410487499" name="Marcador de contenido 2" hidden="0"/>
           <p:cNvSpPr>
             <a:spLocks noGrp="1"/>
           </p:cNvSpPr>
@@ -9744,7 +9932,7 @@
         <p:spPr bwMode="auto">
           <a:xfrm flipH="0" flipV="0">
             <a:off x="1534695" y="2015731"/>
-            <a:ext cx="9520157" cy="1680382"/>
+            <a:ext cx="6410784" cy="3564941"/>
           </a:xfrm>
         </p:spPr>
         <p:txBody>
@@ -9758,240 +9946,100 @@
             </a:pPr>
             <a:r>
               <a:rPr/>
-              <a:t>Die graphische Sprache - bestehend aus Browser UI Elemente - wird zum Entwerfen des Dokumentationsmodels verwendet</a:t>
-            </a:r>
-            <a:endParaRPr/>
-          </a:p>
-          <a:p>
-            <a:pPr>
-              <a:defRPr/>
-            </a:pPr>
-            <a:r>
-              <a:rPr/>
-              <a:t>Das Endresultat ist eine Dokumentation in Textformat (Markdown) mit Screenshot</a:t>
-            </a:r>
-            <a:endParaRPr/>
-          </a:p>
-        </p:txBody>
-      </p:sp>
-      <p:sp>
-        <p:nvSpPr>
-          <p:cNvPr id="1925263076" name="Marcador de contenido 2" hidden="0"/>
-          <p:cNvSpPr>
-            <a:spLocks noGrp="1"/>
-          </p:cNvSpPr>
-          <p:nvPr isPhoto="0" userDrawn="0"/>
-        </p:nvSpPr>
-        <p:spPr bwMode="auto">
-          <a:xfrm flipH="0" flipV="0">
-            <a:off x="1534694" y="4396980"/>
-            <a:ext cx="9520157" cy="810709"/>
-          </a:xfrm>
-        </p:spPr>
-        <p:txBody>
-          <a:bodyPr vertOverflow="overflow" horzOverflow="clip" vert="horz" wrap="square" lIns="91440" tIns="45720" rIns="91440" bIns="45720" numCol="1" spcCol="0" rtlCol="0" fromWordArt="0" anchor="t" anchorCtr="0" forceAA="0" upright="0" compatLnSpc="0">
-            <a:normAutofit/>
-          </a:bodyPr>
-          <a:lstStyle>
-            <a:lvl1pPr marL="228600" indent="-228600" algn="l" defTabSz="914400">
-              <a:lnSpc>
-                <a:spcPct val="120000"/>
-              </a:lnSpc>
-              <a:spcBef>
-                <a:spcPts val="999"/>
-              </a:spcBef>
-              <a:buClr>
-                <a:schemeClr val="accent1"/>
-              </a:buClr>
-              <a:buSzPct val="100000"/>
-              <a:buFont typeface="Arial"/>
-              <a:buChar char="•"/>
-              <a:defRPr sz="2000">
-                <a:solidFill>
-                  <a:schemeClr val="tx1"/>
-                </a:solidFill>
-                <a:latin typeface="+mn-lt"/>
-                <a:ea typeface="+mn-ea"/>
-                <a:cs typeface="+mn-cs"/>
-              </a:defRPr>
-            </a:lvl1pPr>
-            <a:lvl2pPr marL="685800" indent="-228600" algn="l" defTabSz="914400">
-              <a:lnSpc>
-                <a:spcPct val="120000"/>
-              </a:lnSpc>
-              <a:spcBef>
-                <a:spcPts val="499"/>
-              </a:spcBef>
-              <a:buClr>
-                <a:schemeClr val="accent1"/>
-              </a:buClr>
-              <a:buSzPct val="100000"/>
-              <a:buFont typeface="Arial"/>
-              <a:buChar char="•"/>
-              <a:defRPr sz="1800" cap="none">
-                <a:solidFill>
-                  <a:schemeClr val="tx1"/>
-                </a:solidFill>
-                <a:latin typeface="+mn-lt"/>
-                <a:ea typeface="+mn-ea"/>
-                <a:cs typeface="+mn-cs"/>
-              </a:defRPr>
-            </a:lvl2pPr>
-            <a:lvl3pPr marL="1143000" indent="-228600" algn="l" defTabSz="914400">
-              <a:lnSpc>
-                <a:spcPct val="120000"/>
-              </a:lnSpc>
-              <a:spcBef>
-                <a:spcPts val="499"/>
-              </a:spcBef>
-              <a:buClr>
-                <a:schemeClr val="accent1"/>
-              </a:buClr>
-              <a:buSzPct val="100000"/>
-              <a:buFont typeface="Arial"/>
-              <a:buChar char="•"/>
-              <a:defRPr sz="1600">
-                <a:solidFill>
-                  <a:schemeClr val="tx1"/>
-                </a:solidFill>
-                <a:latin typeface="+mn-lt"/>
-                <a:ea typeface="+mn-ea"/>
-                <a:cs typeface="+mn-cs"/>
-              </a:defRPr>
-            </a:lvl3pPr>
-            <a:lvl4pPr marL="1600200" indent="-228600" algn="l" defTabSz="914400">
-              <a:lnSpc>
-                <a:spcPct val="120000"/>
-              </a:lnSpc>
-              <a:spcBef>
-                <a:spcPts val="499"/>
-              </a:spcBef>
-              <a:buClr>
-                <a:schemeClr val="accent1"/>
-              </a:buClr>
-              <a:buSzPct val="100000"/>
-              <a:buFont typeface="Arial"/>
-              <a:buChar char="•"/>
-              <a:defRPr sz="1400" cap="none">
-                <a:solidFill>
-                  <a:schemeClr val="tx1"/>
-                </a:solidFill>
-                <a:latin typeface="+mn-lt"/>
-                <a:ea typeface="+mn-ea"/>
-                <a:cs typeface="+mn-cs"/>
-              </a:defRPr>
-            </a:lvl4pPr>
-            <a:lvl5pPr marL="2057400" indent="-228600" algn="l" defTabSz="914400">
-              <a:lnSpc>
-                <a:spcPct val="120000"/>
-              </a:lnSpc>
-              <a:spcBef>
-                <a:spcPts val="499"/>
-              </a:spcBef>
-              <a:buClr>
-                <a:schemeClr val="accent1"/>
-              </a:buClr>
-              <a:buSzPct val="100000"/>
-              <a:buFont typeface="Arial"/>
-              <a:buChar char="•"/>
-              <a:defRPr sz="1200">
-                <a:solidFill>
-                  <a:schemeClr val="tx1"/>
-                </a:solidFill>
-                <a:latin typeface="+mn-lt"/>
-                <a:ea typeface="+mn-ea"/>
-                <a:cs typeface="+mn-cs"/>
-              </a:defRPr>
-            </a:lvl5pPr>
-            <a:lvl6pPr marL="2514599" indent="-228600" algn="l" defTabSz="914400">
-              <a:lnSpc>
-                <a:spcPct val="120000"/>
-              </a:lnSpc>
-              <a:spcBef>
-                <a:spcPts val="499"/>
-              </a:spcBef>
-              <a:buClr>
-                <a:schemeClr val="accent1"/>
-              </a:buClr>
-              <a:buSzPct val="100000"/>
-              <a:buFont typeface="Arial"/>
-              <a:buChar char="•"/>
-              <a:defRPr sz="1200">
-                <a:solidFill>
-                  <a:schemeClr val="tx1"/>
-                </a:solidFill>
-                <a:latin typeface="+mn-lt"/>
-                <a:ea typeface="+mn-ea"/>
-                <a:cs typeface="+mn-cs"/>
-              </a:defRPr>
-            </a:lvl6pPr>
-            <a:lvl7pPr marL="2971800" indent="-228600" algn="l" defTabSz="914400">
-              <a:lnSpc>
-                <a:spcPct val="120000"/>
-              </a:lnSpc>
-              <a:spcBef>
-                <a:spcPts val="499"/>
-              </a:spcBef>
-              <a:buClr>
-                <a:schemeClr val="accent1"/>
-              </a:buClr>
-              <a:buSzPct val="100000"/>
-              <a:buFont typeface="Arial"/>
-              <a:buChar char="•"/>
-              <a:defRPr sz="1200">
-                <a:solidFill>
-                  <a:schemeClr val="tx1"/>
-                </a:solidFill>
-                <a:latin typeface="+mn-lt"/>
-                <a:ea typeface="+mn-ea"/>
-                <a:cs typeface="+mn-cs"/>
-              </a:defRPr>
-            </a:lvl7pPr>
-            <a:lvl8pPr marL="3429000" indent="-228600" algn="l" defTabSz="914400">
-              <a:lnSpc>
-                <a:spcPct val="120000"/>
-              </a:lnSpc>
-              <a:spcBef>
-                <a:spcPts val="499"/>
-              </a:spcBef>
-              <a:buClr>
-                <a:schemeClr val="accent1"/>
-              </a:buClr>
-              <a:buSzPct val="100000"/>
-              <a:buFont typeface="Arial"/>
-              <a:buChar char="•"/>
-              <a:defRPr sz="1200">
-                <a:solidFill>
-                  <a:schemeClr val="tx1"/>
-                </a:solidFill>
-                <a:latin typeface="+mn-lt"/>
-                <a:ea typeface="+mn-ea"/>
-                <a:cs typeface="+mn-cs"/>
-              </a:defRPr>
-            </a:lvl8pPr>
-            <a:lvl9pPr marL="3886200" indent="-228600" algn="l" defTabSz="914400">
-              <a:lnSpc>
-                <a:spcPct val="120000"/>
-              </a:lnSpc>
-              <a:spcBef>
-                <a:spcPts val="499"/>
-              </a:spcBef>
-              <a:buClr>
-                <a:schemeClr val="accent1"/>
-              </a:buClr>
-              <a:buSzPct val="100000"/>
-              <a:buFont typeface="Arial"/>
-              <a:buChar char="•"/>
-              <a:defRPr sz="1200">
-                <a:solidFill>
-                  <a:schemeClr val="tx1"/>
-                </a:solidFill>
-                <a:latin typeface="+mn-lt"/>
-                <a:ea typeface="+mn-ea"/>
-                <a:cs typeface="+mn-cs"/>
-              </a:defRPr>
-            </a:lvl9pPr>
-          </a:lstStyle>
+              <a:t>Das Écrit Toolkit von Marco Descher et al.</a:t>
+            </a:r>
+            <a:endParaRPr/>
+          </a:p>
+          <a:p>
+            <a:pPr>
+              <a:defRPr/>
+            </a:pPr>
+            <a:r>
+              <a:rPr lang="en-US" sz="2000" b="0" i="0" u="none" strike="noStrike" cap="none" spc="0">
+                <a:solidFill>
+                  <a:schemeClr val="tx1"/>
+                </a:solidFill>
+                <a:latin typeface="+mn-lt"/>
+                <a:ea typeface="+mn-ea"/>
+                <a:cs typeface="+mn-cs"/>
+              </a:rPr>
+              <a:t>Applikationsmodell</a:t>
+            </a:r>
+            <a:r>
+              <a:rPr lang="en-US" sz="2000" b="0" i="0" u="none" strike="noStrike" cap="none" spc="0">
+                <a:solidFill>
+                  <a:schemeClr val="tx1"/>
+                </a:solidFill>
+                <a:latin typeface="+mn-lt"/>
+                <a:ea typeface="+mn-ea"/>
+                <a:cs typeface="+mn-cs"/>
+              </a:rPr>
+              <a:t> um </a:t>
+            </a:r>
+            <a:r>
+              <a:rPr lang="en-US" sz="2000" b="0" i="0" u="none" strike="noStrike" cap="none" spc="0">
+                <a:solidFill>
+                  <a:schemeClr val="tx1"/>
+                </a:solidFill>
+                <a:latin typeface="+mn-lt"/>
+                <a:ea typeface="+mn-ea"/>
+                <a:cs typeface="+mn-cs"/>
+              </a:rPr>
+              <a:t>semantische</a:t>
+            </a:r>
+            <a:r>
+              <a:rPr lang="en-US" sz="2000" b="0" i="0" u="none" strike="noStrike" cap="none" spc="0">
+                <a:solidFill>
+                  <a:schemeClr val="tx1"/>
+                </a:solidFill>
+                <a:latin typeface="+mn-lt"/>
+                <a:ea typeface="+mn-ea"/>
+                <a:cs typeface="+mn-cs"/>
+              </a:rPr>
+              <a:t> </a:t>
+            </a:r>
+            <a:r>
+              <a:rPr lang="en-US" sz="2000" b="0" i="0" u="none" strike="noStrike" cap="none" spc="0">
+                <a:solidFill>
+                  <a:schemeClr val="tx1"/>
+                </a:solidFill>
+                <a:latin typeface="+mn-lt"/>
+                <a:ea typeface="+mn-ea"/>
+                <a:cs typeface="+mn-cs"/>
+              </a:rPr>
+              <a:t>Beschreibung</a:t>
+            </a:r>
+            <a:r>
+              <a:rPr lang="en-US" sz="2000" b="0" i="0" u="none" strike="noStrike" cap="none" spc="0">
+                <a:solidFill>
+                  <a:schemeClr val="tx1"/>
+                </a:solidFill>
+                <a:latin typeface="+mn-lt"/>
+                <a:ea typeface="+mn-ea"/>
+                <a:cs typeface="+mn-cs"/>
+              </a:rPr>
+              <a:t> </a:t>
+            </a:r>
+            <a:r>
+              <a:rPr lang="en-US" sz="2000" b="0" i="0" u="none" strike="noStrike" cap="none" spc="0">
+                <a:solidFill>
+                  <a:schemeClr val="tx1"/>
+                </a:solidFill>
+                <a:latin typeface="+mn-lt"/>
+                <a:ea typeface="+mn-ea"/>
+                <a:cs typeface="+mn-cs"/>
+              </a:rPr>
+              <a:t>erweitern</a:t>
+            </a:r>
+            <a:endParaRPr lang="en-US" sz="2000" b="0" i="0" u="none" strike="noStrike" cap="none" spc="0">
+              <a:solidFill>
+                <a:schemeClr val="tx1"/>
+              </a:solidFill>
+              <a:latin typeface="Palatino Linotype"/>
+              <a:ea typeface="Arial"/>
+              <a:cs typeface="Arial"/>
+            </a:endParaRPr>
+          </a:p>
           <a:p>
             <a:pPr>
               <a:defRPr/>
@@ -10005,12 +10053,166 @@
                 <a:ea typeface="Arial"/>
                 <a:cs typeface="Arial"/>
               </a:rPr>
-              <a:t>Vergleichbare Arbeiten schlugen Lösungen in der Vergangenheit vor, dennoch werden diese Projekte nicht mehr aktiv weiterentwickelt</a:t>
-            </a:r>
-            <a:endParaRPr/>
-          </a:p>
-        </p:txBody>
-      </p:sp>
+              <a:t>Documentation </a:t>
+            </a:r>
+            <a:r>
+              <a:rPr lang="en-US" sz="2000" b="0" i="0" u="none" strike="noStrike" cap="none" spc="0">
+                <a:solidFill>
+                  <a:schemeClr val="tx1"/>
+                </a:solidFill>
+                <a:latin typeface="+mn-lt"/>
+                <a:ea typeface="+mn-ea"/>
+                <a:cs typeface="+mn-cs"/>
+              </a:rPr>
+              <a:t>Outputter</a:t>
+            </a:r>
+            <a:r>
+              <a:rPr lang="en-US" sz="2000" b="0" i="0" u="none" strike="noStrike" cap="none" spc="0">
+                <a:solidFill>
+                  <a:schemeClr val="tx1"/>
+                </a:solidFill>
+                <a:latin typeface="+mn-lt"/>
+                <a:ea typeface="+mn-ea"/>
+                <a:cs typeface="+mn-cs"/>
+              </a:rPr>
+              <a:t> </a:t>
+            </a:r>
+            <a:r>
+              <a:rPr lang="en-US" sz="2000" b="0" i="0" u="none" strike="noStrike" cap="none" spc="0">
+                <a:solidFill>
+                  <a:schemeClr val="tx1"/>
+                </a:solidFill>
+                <a:latin typeface="+mn-lt"/>
+                <a:ea typeface="+mn-ea"/>
+                <a:cs typeface="+mn-cs"/>
+              </a:rPr>
+              <a:t>generiert</a:t>
+            </a:r>
+            <a:r>
+              <a:rPr lang="en-US" sz="2000" b="0" i="0" u="none" strike="noStrike" cap="none" spc="0">
+                <a:solidFill>
+                  <a:schemeClr val="tx1"/>
+                </a:solidFill>
+                <a:latin typeface="+mn-lt"/>
+                <a:ea typeface="+mn-ea"/>
+                <a:cs typeface="+mn-cs"/>
+              </a:rPr>
+              <a:t> </a:t>
+            </a:r>
+            <a:r>
+              <a:rPr lang="en-US" sz="2000" b="0" i="0" u="none" strike="noStrike" cap="none" spc="0">
+                <a:solidFill>
+                  <a:schemeClr val="tx1"/>
+                </a:solidFill>
+                <a:latin typeface="+mn-lt"/>
+                <a:ea typeface="+mn-ea"/>
+                <a:cs typeface="+mn-cs"/>
+              </a:rPr>
+              <a:t>in </a:t>
+            </a:r>
+            <a:r>
+              <a:rPr lang="en-US" sz="2000" b="0" i="0" u="none" strike="noStrike" cap="none" spc="0">
+                <a:solidFill>
+                  <a:schemeClr val="tx1"/>
+                </a:solidFill>
+                <a:latin typeface="+mn-lt"/>
+                <a:ea typeface="+mn-ea"/>
+                <a:cs typeface="+mn-cs"/>
+              </a:rPr>
+              <a:t>LaTex</a:t>
+            </a:r>
+            <a:r>
+              <a:rPr lang="en-US" sz="2000" b="0" i="0" u="none" strike="noStrike" cap="none" spc="0">
+                <a:solidFill>
+                  <a:schemeClr val="tx1"/>
+                </a:solidFill>
+                <a:latin typeface="+mn-lt"/>
+                <a:ea typeface="+mn-ea"/>
+                <a:cs typeface="+mn-cs"/>
+              </a:rPr>
+              <a:t> </a:t>
+            </a:r>
+            <a:r>
+              <a:rPr lang="en-US" sz="2000" b="0" i="0" u="none" strike="noStrike" cap="none" spc="0">
+                <a:solidFill>
+                  <a:schemeClr val="tx1"/>
+                </a:solidFill>
+                <a:latin typeface="+mn-lt"/>
+                <a:ea typeface="+mn-ea"/>
+                <a:cs typeface="+mn-cs"/>
+              </a:rPr>
+              <a:t>oder</a:t>
+            </a:r>
+            <a:r>
+              <a:rPr lang="en-US" sz="2000" b="0" i="0" u="none" strike="noStrike" cap="none" spc="0">
+                <a:solidFill>
+                  <a:schemeClr val="tx1"/>
+                </a:solidFill>
+                <a:latin typeface="+mn-lt"/>
+                <a:ea typeface="+mn-ea"/>
+                <a:cs typeface="+mn-cs"/>
+              </a:rPr>
+              <a:t> HTML, Coding-</a:t>
+            </a:r>
+            <a:r>
+              <a:rPr lang="en-US" sz="2000" b="0" i="0" u="none" strike="noStrike" cap="none" spc="0">
+                <a:solidFill>
+                  <a:schemeClr val="tx1"/>
+                </a:solidFill>
+                <a:latin typeface="+mn-lt"/>
+                <a:ea typeface="+mn-ea"/>
+                <a:cs typeface="+mn-cs"/>
+              </a:rPr>
+              <a:t>Kenntnisse</a:t>
+            </a:r>
+            <a:r>
+              <a:rPr lang="en-US" sz="2000" b="0" i="0" u="none" strike="noStrike" cap="none" spc="0">
+                <a:solidFill>
+                  <a:schemeClr val="tx1"/>
+                </a:solidFill>
+                <a:latin typeface="+mn-lt"/>
+                <a:ea typeface="+mn-ea"/>
+                <a:cs typeface="+mn-cs"/>
+              </a:rPr>
+              <a:t>  ware</a:t>
+            </a:r>
+            <a:r>
+              <a:rPr lang="en-US" sz="2000" b="0" i="0" u="none" strike="noStrike" cap="none" spc="0">
+                <a:solidFill>
+                  <a:schemeClr val="tx1"/>
+                </a:solidFill>
+                <a:latin typeface="+mn-lt"/>
+                <a:ea typeface="+mn-ea"/>
+                <a:cs typeface="+mn-cs"/>
+              </a:rPr>
+              <a:t>verlangt</a:t>
+            </a:r>
+            <a:endParaRPr sz="2000"/>
+          </a:p>
+        </p:txBody>
+      </p:sp>
+      <p:pic>
+        <p:nvPicPr>
+          <p:cNvPr id="22376149" name="" hidden="0"/>
+          <p:cNvPicPr>
+            <a:picLocks noChangeAspect="1"/>
+          </p:cNvPicPr>
+          <p:nvPr isPhoto="0" userDrawn="0"/>
+        </p:nvPicPr>
+        <p:blipFill>
+          <a:blip r:embed="rId3"/>
+          <a:stretch/>
+        </p:blipFill>
+        <p:spPr bwMode="auto">
+          <a:xfrm flipH="0" flipV="0">
+            <a:off x="7945480" y="2015731"/>
+            <a:ext cx="3970276" cy="3529134"/>
+          </a:xfrm>
+          <a:prstGeom prst="rect">
+            <a:avLst/>
+          </a:prstGeom>
+        </p:spPr>
+      </p:pic>
     </p:spTree>
   </p:cSld>
   <p:clrMapOvr>
@@ -10091,28 +10293,298 @@
       </p:sp>
       <p:pic>
         <p:nvPicPr>
-          <p:cNvPr id="510116729" name="" hidden="0"/>
+          <p:cNvPr id="1606120028" name="" hidden="0"/>
           <p:cNvPicPr>
             <a:picLocks noChangeAspect="1"/>
           </p:cNvPicPr>
-          <p:nvPr isPhoto="0" userDrawn="0">
-            <p:ph idx="1" hasCustomPrompt="0"/>
-          </p:nvPr>
+          <p:nvPr isPhoto="0" userDrawn="0"/>
         </p:nvPicPr>
         <p:blipFill>
-          <a:blip r:embed="rId2"/>
+          <a:blip r:embed="rId3"/>
           <a:stretch/>
         </p:blipFill>
         <p:spPr bwMode="auto">
-          <a:xfrm rot="0">
-            <a:off x="1534695" y="1968145"/>
-            <a:ext cx="7353299" cy="1371600"/>
+          <a:xfrm flipH="0" flipV="0">
+            <a:off x="8247960" y="2485577"/>
+            <a:ext cx="3365021" cy="2370895"/>
           </a:xfrm>
           <a:prstGeom prst="rect">
             <a:avLst/>
           </a:prstGeom>
         </p:spPr>
       </p:pic>
+      <p:sp>
+        <p:nvSpPr>
+          <p:cNvPr id="1774484863" name="Marcador de contenido 2" hidden="0"/>
+          <p:cNvSpPr>
+            <a:spLocks noGrp="1"/>
+          </p:cNvSpPr>
+          <p:nvPr isPhoto="0" userDrawn="0"/>
+        </p:nvSpPr>
+        <p:spPr bwMode="auto">
+          <a:xfrm flipH="0" flipV="0">
+            <a:off x="1482927" y="1990480"/>
+            <a:ext cx="7170821" cy="2772019"/>
+          </a:xfrm>
+        </p:spPr>
+        <p:txBody>
+          <a:bodyPr vertOverflow="overflow" horzOverflow="clip" vert="horz" wrap="square" lIns="91440" tIns="45720" rIns="91440" bIns="45720" numCol="1" spcCol="0" rtlCol="0" fromWordArt="0" anchor="t" anchorCtr="0" forceAA="0" upright="0" compatLnSpc="0">
+            <a:normAutofit/>
+          </a:bodyPr>
+          <a:lstStyle>
+            <a:lvl1pPr marL="228600" indent="-228600" algn="l" defTabSz="914400">
+              <a:lnSpc>
+                <a:spcPct val="120000"/>
+              </a:lnSpc>
+              <a:spcBef>
+                <a:spcPts val="999"/>
+              </a:spcBef>
+              <a:buClr>
+                <a:schemeClr val="accent1"/>
+              </a:buClr>
+              <a:buSzPct val="100000"/>
+              <a:buFont typeface="Arial"/>
+              <a:buChar char="•"/>
+              <a:defRPr sz="2000">
+                <a:solidFill>
+                  <a:schemeClr val="tx1"/>
+                </a:solidFill>
+                <a:latin typeface="+mn-lt"/>
+                <a:ea typeface="+mn-ea"/>
+                <a:cs typeface="+mn-cs"/>
+              </a:defRPr>
+            </a:lvl1pPr>
+            <a:lvl2pPr marL="685800" indent="-228600" algn="l" defTabSz="914400">
+              <a:lnSpc>
+                <a:spcPct val="120000"/>
+              </a:lnSpc>
+              <a:spcBef>
+                <a:spcPts val="499"/>
+              </a:spcBef>
+              <a:buClr>
+                <a:schemeClr val="accent1"/>
+              </a:buClr>
+              <a:buSzPct val="100000"/>
+              <a:buFont typeface="Arial"/>
+              <a:buChar char="•"/>
+              <a:defRPr sz="1800" cap="none">
+                <a:solidFill>
+                  <a:schemeClr val="tx1"/>
+                </a:solidFill>
+                <a:latin typeface="+mn-lt"/>
+                <a:ea typeface="+mn-ea"/>
+                <a:cs typeface="+mn-cs"/>
+              </a:defRPr>
+            </a:lvl2pPr>
+            <a:lvl3pPr marL="1143000" indent="-228600" algn="l" defTabSz="914400">
+              <a:lnSpc>
+                <a:spcPct val="120000"/>
+              </a:lnSpc>
+              <a:spcBef>
+                <a:spcPts val="499"/>
+              </a:spcBef>
+              <a:buClr>
+                <a:schemeClr val="accent1"/>
+              </a:buClr>
+              <a:buSzPct val="100000"/>
+              <a:buFont typeface="Arial"/>
+              <a:buChar char="•"/>
+              <a:defRPr sz="1600">
+                <a:solidFill>
+                  <a:schemeClr val="tx1"/>
+                </a:solidFill>
+                <a:latin typeface="+mn-lt"/>
+                <a:ea typeface="+mn-ea"/>
+                <a:cs typeface="+mn-cs"/>
+              </a:defRPr>
+            </a:lvl3pPr>
+            <a:lvl4pPr marL="1600200" indent="-228600" algn="l" defTabSz="914400">
+              <a:lnSpc>
+                <a:spcPct val="120000"/>
+              </a:lnSpc>
+              <a:spcBef>
+                <a:spcPts val="499"/>
+              </a:spcBef>
+              <a:buClr>
+                <a:schemeClr val="accent1"/>
+              </a:buClr>
+              <a:buSzPct val="100000"/>
+              <a:buFont typeface="Arial"/>
+              <a:buChar char="•"/>
+              <a:defRPr sz="1400" cap="none">
+                <a:solidFill>
+                  <a:schemeClr val="tx1"/>
+                </a:solidFill>
+                <a:latin typeface="+mn-lt"/>
+                <a:ea typeface="+mn-ea"/>
+                <a:cs typeface="+mn-cs"/>
+              </a:defRPr>
+            </a:lvl4pPr>
+            <a:lvl5pPr marL="2057400" indent="-228600" algn="l" defTabSz="914400">
+              <a:lnSpc>
+                <a:spcPct val="120000"/>
+              </a:lnSpc>
+              <a:spcBef>
+                <a:spcPts val="499"/>
+              </a:spcBef>
+              <a:buClr>
+                <a:schemeClr val="accent1"/>
+              </a:buClr>
+              <a:buSzPct val="100000"/>
+              <a:buFont typeface="Arial"/>
+              <a:buChar char="•"/>
+              <a:defRPr sz="1200">
+                <a:solidFill>
+                  <a:schemeClr val="tx1"/>
+                </a:solidFill>
+                <a:latin typeface="+mn-lt"/>
+                <a:ea typeface="+mn-ea"/>
+                <a:cs typeface="+mn-cs"/>
+              </a:defRPr>
+            </a:lvl5pPr>
+            <a:lvl6pPr marL="2514599" indent="-228600" algn="l" defTabSz="914400">
+              <a:lnSpc>
+                <a:spcPct val="120000"/>
+              </a:lnSpc>
+              <a:spcBef>
+                <a:spcPts val="499"/>
+              </a:spcBef>
+              <a:buClr>
+                <a:schemeClr val="accent1"/>
+              </a:buClr>
+              <a:buSzPct val="100000"/>
+              <a:buFont typeface="Arial"/>
+              <a:buChar char="•"/>
+              <a:defRPr sz="1200">
+                <a:solidFill>
+                  <a:schemeClr val="tx1"/>
+                </a:solidFill>
+                <a:latin typeface="+mn-lt"/>
+                <a:ea typeface="+mn-ea"/>
+                <a:cs typeface="+mn-cs"/>
+              </a:defRPr>
+            </a:lvl6pPr>
+            <a:lvl7pPr marL="2971800" indent="-228600" algn="l" defTabSz="914400">
+              <a:lnSpc>
+                <a:spcPct val="120000"/>
+              </a:lnSpc>
+              <a:spcBef>
+                <a:spcPts val="499"/>
+              </a:spcBef>
+              <a:buClr>
+                <a:schemeClr val="accent1"/>
+              </a:buClr>
+              <a:buSzPct val="100000"/>
+              <a:buFont typeface="Arial"/>
+              <a:buChar char="•"/>
+              <a:defRPr sz="1200">
+                <a:solidFill>
+                  <a:schemeClr val="tx1"/>
+                </a:solidFill>
+                <a:latin typeface="+mn-lt"/>
+                <a:ea typeface="+mn-ea"/>
+                <a:cs typeface="+mn-cs"/>
+              </a:defRPr>
+            </a:lvl7pPr>
+            <a:lvl8pPr marL="3429000" indent="-228600" algn="l" defTabSz="914400">
+              <a:lnSpc>
+                <a:spcPct val="120000"/>
+              </a:lnSpc>
+              <a:spcBef>
+                <a:spcPts val="499"/>
+              </a:spcBef>
+              <a:buClr>
+                <a:schemeClr val="accent1"/>
+              </a:buClr>
+              <a:buSzPct val="100000"/>
+              <a:buFont typeface="Arial"/>
+              <a:buChar char="•"/>
+              <a:defRPr sz="1200">
+                <a:solidFill>
+                  <a:schemeClr val="tx1"/>
+                </a:solidFill>
+                <a:latin typeface="+mn-lt"/>
+                <a:ea typeface="+mn-ea"/>
+                <a:cs typeface="+mn-cs"/>
+              </a:defRPr>
+            </a:lvl8pPr>
+            <a:lvl9pPr marL="3886200" indent="-228600" algn="l" defTabSz="914400">
+              <a:lnSpc>
+                <a:spcPct val="120000"/>
+              </a:lnSpc>
+              <a:spcBef>
+                <a:spcPts val="499"/>
+              </a:spcBef>
+              <a:buClr>
+                <a:schemeClr val="accent1"/>
+              </a:buClr>
+              <a:buSzPct val="100000"/>
+              <a:buFont typeface="Arial"/>
+              <a:buChar char="•"/>
+              <a:defRPr sz="1200">
+                <a:solidFill>
+                  <a:schemeClr val="tx1"/>
+                </a:solidFill>
+                <a:latin typeface="+mn-lt"/>
+                <a:ea typeface="+mn-ea"/>
+                <a:cs typeface="+mn-cs"/>
+              </a:defRPr>
+            </a:lvl9pPr>
+          </a:lstStyle>
+          <a:p>
+            <a:pPr>
+              <a:defRPr/>
+            </a:pPr>
+            <a:r>
+              <a:rPr lang="en-US" sz="2000" b="0" i="0" u="none" strike="noStrike" cap="none" spc="0">
+                <a:solidFill>
+                  <a:schemeClr val="tx1"/>
+                </a:solidFill>
+                <a:latin typeface="Palatino Linotype"/>
+                <a:ea typeface="Arial"/>
+                <a:cs typeface="Arial"/>
+              </a:rPr>
+              <a:t>Den Grundstein liefert die Cinco Entwicklungsumgebung samt der Modelierungssprachen </a:t>
+            </a:r>
+            <a:r>
+              <a:rPr lang="en-US" sz="2000" b="0" i="0" u="none" strike="noStrike" cap="none" spc="0">
+                <a:solidFill>
+                  <a:schemeClr val="tx1"/>
+                </a:solidFill>
+                <a:latin typeface="Palatino Linotype"/>
+                <a:ea typeface="Arial"/>
+                <a:cs typeface="Arial"/>
+              </a:rPr>
+              <a:t>(MGL, MSL, CPD)</a:t>
+            </a:r>
+            <a:endParaRPr/>
+          </a:p>
+          <a:p>
+            <a:pPr>
+              <a:defRPr/>
+            </a:pPr>
+            <a:r>
+              <a:rPr lang="en-US" sz="2000" b="0" i="0" u="none" strike="noStrike" cap="none" spc="0">
+                <a:solidFill>
+                  <a:schemeClr val="tx1"/>
+                </a:solidFill>
+                <a:latin typeface="Palatino Linotype"/>
+                <a:ea typeface="Arial"/>
+                <a:cs typeface="Arial"/>
+              </a:rPr>
+              <a:t>Diese Modelierungssprachen fundieren als Metamodelierungssprachen zur graphischen Sprache mit der Dokumentationsmodele entworfen werden</a:t>
+            </a:r>
+            <a:endParaRPr lang="en-US" sz="2000" b="0" i="0" u="none" strike="noStrike" cap="none" spc="0">
+              <a:solidFill>
+                <a:schemeClr val="tx1"/>
+              </a:solidFill>
+              <a:latin typeface="Palatino Linotype"/>
+              <a:ea typeface="Arial"/>
+              <a:cs typeface="Arial"/>
+            </a:endParaRPr>
+          </a:p>
+        </p:txBody>
+      </p:sp>
     </p:spTree>
   </p:cSld>
   <p:clrMapOvr>
@@ -10148,7 +10620,7 @@
       </p:grpSpPr>
       <p:sp>
         <p:nvSpPr>
-          <p:cNvPr id="737948483" name="Título 1" hidden="0"/>
+          <p:cNvPr id="1245924961" name="Título 1" hidden="0"/>
           <p:cNvSpPr>
             <a:spLocks noGrp="1"/>
           </p:cNvSpPr>
@@ -10166,22 +10638,34 @@
             </a:pPr>
             <a:r>
               <a:rPr lang="de-DE"/>
-              <a:t>Ergebnisse</a:t>
+              <a:t>Methodologie</a:t>
             </a:r>
             <a:br>
               <a:rPr lang="de-DE"/>
             </a:br>
             <a:r>
               <a:rPr lang="de-DE" sz="1600" i="1"/>
-              <a:t>WebDoc - Web Application Documentor</a:t>
-            </a:r>
-            <a:endParaRPr/>
-          </a:p>
-        </p:txBody>
-      </p:sp>
-      <p:sp>
-        <p:nvSpPr>
-          <p:cNvPr id="1419255848" name="Marcador de contenido 2" hidden="0"/>
+              <a:t>graphische DSL aus </a:t>
+            </a:r>
+            <a:r>
+              <a:rPr lang="de-DE" sz="1600" i="1">
+                <a:latin typeface="URW Bookman"/>
+                <a:ea typeface="URW Bookman"/>
+                <a:cs typeface="URW Bookman"/>
+              </a:rPr>
+              <a:t>Cinco</a:t>
+            </a:r>
+            <a:r>
+              <a:rPr lang="de-DE" sz="1600" i="1"/>
+              <a:t> Metasprachen</a:t>
+            </a:r>
+            <a:endParaRPr/>
+          </a:p>
+        </p:txBody>
+      </p:sp>
+      <p:sp>
+        <p:nvSpPr>
+          <p:cNvPr id="1943138706" name="Content Placeholder 2" hidden="0"/>
           <p:cNvSpPr>
             <a:spLocks noGrp="1"/>
           </p:cNvSpPr>
@@ -10191,13 +10675,41 @@
         </p:nvSpPr>
         <p:spPr bwMode="auto"/>
         <p:txBody>
-          <a:bodyPr/>
+          <a:bodyPr anchor="t"/>
           <a:lstStyle/>
           <a:p>
             <a:pPr>
               <a:defRPr/>
             </a:pPr>
-            <a:endParaRPr/>
+            <a:r>
+              <a:rPr lang="en-US" sz="2000" b="0" i="0" u="none" strike="noStrike" cap="none" spc="0">
+                <a:solidFill>
+                  <a:schemeClr val="tx1"/>
+                </a:solidFill>
+                <a:latin typeface="+mn-lt"/>
+                <a:ea typeface="+mn-ea"/>
+                <a:cs typeface="+mn-cs"/>
+              </a:rPr>
+              <a:t>Die graphische Sprache - bestehend aus Browser UI Elemente - wird zum Entwerfen des Dokumentationsmodels verwendet</a:t>
+            </a:r>
+            <a:endParaRPr sz="2000"/>
+          </a:p>
+          <a:p>
+            <a:pPr>
+              <a:defRPr/>
+            </a:pPr>
+            <a:r>
+              <a:rPr lang="en-US" sz="2000" b="0" i="0" u="none" strike="noStrike" cap="none" spc="0">
+                <a:solidFill>
+                  <a:schemeClr val="tx1"/>
+                </a:solidFill>
+                <a:latin typeface="+mn-lt"/>
+                <a:ea typeface="+mn-ea"/>
+                <a:cs typeface="+mn-cs"/>
+              </a:rPr>
+              <a:t>Das Endresultat ist eine Dokumentation in Textformat (Markdown) mit Screenshot</a:t>
+            </a:r>
+            <a:endParaRPr sz="2000"/>
           </a:p>
         </p:txBody>
       </p:sp>

</xml_diff>

<commit_message>
adds images and updates presentation
</commit_message>
<xml_diff>
--- a/Abschlussvortrag.pptx
+++ b/Abschlussvortrag.pptx
@@ -5,7 +5,7 @@
     <p:sldMasterId id="2147483648" r:id="rId1"/>
   </p:sldMasterIdLst>
   <p:notesMasterIdLst>
-    <p:notesMasterId r:id="rId21"/>
+    <p:notesMasterId r:id="rId22"/>
   </p:notesMasterIdLst>
   <p:sldIdLst>
     <p:sldId id="256" r:id="rId4"/>
@@ -25,6 +25,7 @@
     <p:sldId id="270" r:id="rId18"/>
     <p:sldId id="271" r:id="rId19"/>
     <p:sldId id="272" r:id="rId20"/>
+    <p:sldId id="273" r:id="rId21"/>
   </p:sldIdLst>
   <p:sldSz cx="12192000" cy="6858000"/>
   <p:notesSz cx="12192000" cy="6858000"/>
@@ -7748,7 +7749,52 @@
             </a:r>
             <a:r>
               <a:rPr lang="de-DE" sz="1600" i="1"/>
-              <a:t> Metasprachen</a:t>
+              <a:t> Metasprachen - technisches Detail</a:t>
+            </a:r>
+            <a:endParaRPr/>
+          </a:p>
+        </p:txBody>
+      </p:sp>
+      <p:sp>
+        <p:nvSpPr>
+          <p:cNvPr id="1975793017" name="Content Placeholder 2" hidden="0"/>
+          <p:cNvSpPr>
+            <a:spLocks noGrp="1"/>
+          </p:cNvSpPr>
+          <p:nvPr isPhoto="0" userDrawn="0">
+            <p:ph idx="1" hasCustomPrompt="0"/>
+          </p:nvPr>
+        </p:nvSpPr>
+        <p:spPr bwMode="auto">
+          <a:xfrm flipH="0" flipV="0">
+            <a:off x="1534695" y="2015731"/>
+            <a:ext cx="9520157" cy="1891960"/>
+          </a:xfrm>
+        </p:spPr>
+        <p:txBody>
+          <a:bodyPr anchor="t"/>
+          <a:lstStyle/>
+          <a:p>
+            <a:pPr>
+              <a:defRPr/>
+            </a:pPr>
+            <a:r>
+              <a:rPr/>
+              <a:t>Verwendung von Selenium-Java und VuePress, um einen Dokumentationstext mit Bildern in Markdownformat zu erstellen</a:t>
+            </a:r>
+            <a:endParaRPr/>
+          </a:p>
+          <a:p>
+            <a:pPr>
+              <a:defRPr/>
+            </a:pPr>
+            <a:r>
+              <a:rPr/>
+              <a:t>Separates Erzeugen der Texte und der Screenshots wird bevorzugt, um Single-Point-of-failure zu </a:t>
+            </a:r>
+            <a:r>
+              <a:rPr lang="de-DE"/>
+              <a:t>vermeiden</a:t>
             </a:r>
             <a:endParaRPr/>
           </a:p>
@@ -7756,22 +7802,20 @@
       </p:sp>
       <p:pic>
         <p:nvPicPr>
-          <p:cNvPr id="998142041" name="" hidden="0"/>
+          <p:cNvPr id="586522987" name="" hidden="0"/>
           <p:cNvPicPr>
             <a:picLocks noChangeAspect="1"/>
           </p:cNvPicPr>
-          <p:nvPr isPhoto="0" userDrawn="0">
-            <p:ph idx="1" hasCustomPrompt="0"/>
-          </p:nvPr>
+          <p:nvPr isPhoto="0" userDrawn="0"/>
         </p:nvPicPr>
         <p:blipFill>
           <a:blip r:embed="rId2"/>
           <a:stretch/>
         </p:blipFill>
         <p:spPr bwMode="auto">
-          <a:xfrm rot="0">
-            <a:off x="1534695" y="1968145"/>
-            <a:ext cx="7353299" cy="1371600"/>
+          <a:xfrm rot="0" flipH="0" flipV="0">
+            <a:off x="3605095" y="3378843"/>
+            <a:ext cx="5739875" cy="2403879"/>
           </a:xfrm>
           <a:prstGeom prst="rect">
             <a:avLst/>
@@ -7813,7 +7857,7 @@
       </p:grpSpPr>
       <p:sp>
         <p:nvSpPr>
-          <p:cNvPr id="737948483" name="Título 1" hidden="0"/>
+          <p:cNvPr id="564735652" name="Title 1" hidden="0"/>
           <p:cNvSpPr>
             <a:spLocks noGrp="1"/>
           </p:cNvSpPr>
@@ -7823,49 +7867,258 @@
         </p:nvSpPr>
         <p:spPr bwMode="auto"/>
         <p:txBody>
-          <a:bodyPr/>
+          <a:bodyPr vertOverflow="overflow" horzOverflow="clip" vert="horz" wrap="square" lIns="91440" tIns="45720" rIns="91440" bIns="45720" numCol="1" spcCol="0" rtlCol="0" fromWordArt="0" anchor="b" anchorCtr="0" forceAA="0" upright="0" compatLnSpc="0">
+            <a:normAutofit/>
+          </a:bodyPr>
           <a:lstStyle/>
           <a:p>
             <a:pPr>
               <a:defRPr/>
             </a:pPr>
             <a:r>
-              <a:rPr lang="de-DE"/>
-              <a:t>Ergebnisse</a:t>
+              <a:rPr lang="de-DE" sz="3200" b="0" i="0" u="none" strike="noStrike" cap="none" spc="0">
+                <a:solidFill>
+                  <a:schemeClr val="tx1"/>
+                </a:solidFill>
+                <a:latin typeface="+mj-lt"/>
+                <a:ea typeface="+mj-ea"/>
+                <a:cs typeface="+mj-cs"/>
+              </a:rPr>
+              <a:t>Methodologie</a:t>
             </a:r>
             <a:br>
-              <a:rPr lang="de-DE"/>
+              <a:rPr lang="de-DE" sz="3200" b="0" i="0" u="none" strike="noStrike" cap="none" spc="0">
+                <a:solidFill>
+                  <a:schemeClr val="tx1"/>
+                </a:solidFill>
+                <a:latin typeface="+mj-lt"/>
+                <a:ea typeface="+mj-ea"/>
+                <a:cs typeface="+mj-cs"/>
+              </a:rPr>
             </a:br>
             <a:r>
-              <a:rPr lang="de-DE" sz="1600" i="1"/>
-              <a:t>WebDoc - Web Application Documentor</a:t>
-            </a:r>
-            <a:endParaRPr/>
-          </a:p>
-        </p:txBody>
-      </p:sp>
-      <p:sp>
-        <p:nvSpPr>
-          <p:cNvPr id="1419255848" name="Marcador de contenido 2" hidden="0"/>
-          <p:cNvSpPr>
-            <a:spLocks noGrp="1"/>
-          </p:cNvSpPr>
-          <p:nvPr isPhoto="0" userDrawn="0">
-            <p:ph idx="1" hasCustomPrompt="0"/>
-          </p:nvPr>
-        </p:nvSpPr>
-        <p:spPr bwMode="auto"/>
-        <p:txBody>
-          <a:bodyPr/>
-          <a:lstStyle/>
-          <a:p>
-            <a:pPr>
-              <a:defRPr/>
-            </a:pPr>
-            <a:endParaRPr/>
-          </a:p>
-        </p:txBody>
-      </p:sp>
+              <a:rPr lang="de-DE" sz="1600" b="0" i="1" u="none" strike="noStrike" cap="none" spc="0">
+                <a:solidFill>
+                  <a:schemeClr val="tx1"/>
+                </a:solidFill>
+                <a:latin typeface="Palatino Linotype"/>
+                <a:ea typeface="Palatino Linotype"/>
+                <a:cs typeface="Palatino Linotype"/>
+              </a:rPr>
+              <a:t>graphische DSL aus </a:t>
+            </a:r>
+            <a:r>
+              <a:rPr lang="de-DE" sz="1600" b="0" i="1" u="none" strike="noStrike" cap="none" spc="0">
+                <a:solidFill>
+                  <a:schemeClr val="tx1"/>
+                </a:solidFill>
+                <a:latin typeface="URW Bookman"/>
+                <a:ea typeface="URW Bookman"/>
+                <a:cs typeface="URW Bookman"/>
+              </a:rPr>
+              <a:t>Cinco</a:t>
+            </a:r>
+            <a:r>
+              <a:rPr lang="de-DE" sz="1600" b="0" i="1" u="none" strike="noStrike" cap="none" spc="0">
+                <a:solidFill>
+                  <a:schemeClr val="tx1"/>
+                </a:solidFill>
+                <a:latin typeface="Palatino Linotype"/>
+                <a:ea typeface="Palatino Linotype"/>
+                <a:cs typeface="Palatino Linotype"/>
+              </a:rPr>
+              <a:t> Metasprachen - technisches Detail</a:t>
+            </a:r>
+            <a:endParaRPr/>
+          </a:p>
+        </p:txBody>
+      </p:sp>
+      <p:grpSp>
+        <p:nvGrpSpPr>
+          <p:cNvPr id="1524444960" name="" hidden="0"/>
+          <p:cNvGrpSpPr/>
+          <p:nvPr isPhoto="0" userDrawn="0"/>
+        </p:nvGrpSpPr>
+        <p:grpSpPr bwMode="auto">
+          <a:xfrm>
+            <a:off x="1712307" y="1682792"/>
+            <a:ext cx="8976607" cy="3783552"/>
+            <a:chOff x="0" y="0"/>
+            <a:chExt cx="8976607" cy="3783552"/>
+          </a:xfrm>
+        </p:grpSpPr>
+        <p:grpSp>
+          <p:nvGrpSpPr>
+            <p:cNvPr id="353857643" name="" hidden="0"/>
+            <p:cNvGrpSpPr/>
+            <p:nvPr isPhoto="0" userDrawn="0"/>
+          </p:nvGrpSpPr>
+          <p:grpSpPr bwMode="auto">
+            <a:xfrm>
+              <a:off x="0" y="0"/>
+              <a:ext cx="8976607" cy="3783552"/>
+              <a:chOff x="0" y="0"/>
+              <a:chExt cx="8976607" cy="3783552"/>
+            </a:xfrm>
+          </p:grpSpPr>
+          <p:pic>
+            <p:nvPicPr>
+              <p:cNvPr id="219745317" name="" hidden="0"/>
+              <p:cNvPicPr>
+                <a:picLocks noChangeAspect="1"/>
+              </p:cNvPicPr>
+              <p:nvPr isPhoto="0" userDrawn="0">
+                <p:ph idx="1" hasCustomPrompt="0"/>
+              </p:nvPr>
+            </p:nvPicPr>
+            <p:blipFill>
+              <a:blip r:embed="rId2"/>
+              <a:stretch/>
+            </p:blipFill>
+            <p:spPr bwMode="auto">
+              <a:xfrm rot="0">
+                <a:off x="188327" y="332939"/>
+                <a:ext cx="8788279" cy="3450612"/>
+              </a:xfrm>
+              <a:prstGeom prst="rect">
+                <a:avLst/>
+              </a:prstGeom>
+            </p:spPr>
+          </p:pic>
+          <p:sp>
+            <p:nvSpPr>
+              <p:cNvPr id="534566748" name="" hidden="0"/>
+              <p:cNvSpPr txBox="1"/>
+              <p:nvPr isPhoto="0" userDrawn="0"/>
+            </p:nvSpPr>
+            <p:spPr bwMode="auto">
+              <a:xfrm flipH="0" flipV="0">
+                <a:off x="0" y="3299514"/>
+                <a:ext cx="2149230" cy="341922"/>
+              </a:xfrm>
+              <a:prstGeom prst="rect">
+                <a:avLst/>
+              </a:prstGeom>
+              <a:noFill/>
+            </p:spPr>
+            <p:txBody>
+              <a:bodyPr vertOverflow="overflow" horzOverflow="clip" vert="horz" wrap="square" lIns="91440" tIns="45720" rIns="91440" bIns="45720" numCol="1" spcCol="0" rtlCol="0" fromWordArt="0" anchor="t" anchorCtr="0" forceAA="0" upright="0" compatLnSpc="0">
+                <a:noAutofit/>
+              </a:bodyPr>
+              <a:p>
+                <a:pPr>
+                  <a:defRPr/>
+                </a:pPr>
+                <a:r>
+                  <a:rPr sz="1400"/>
+                  <a:t>Dokumentationsmodell</a:t>
+                </a:r>
+                <a:endParaRPr sz="1400"/>
+              </a:p>
+            </p:txBody>
+          </p:sp>
+          <p:sp>
+            <p:nvSpPr>
+              <p:cNvPr id="79657727" name="" hidden="0"/>
+              <p:cNvSpPr txBox="1"/>
+              <p:nvPr isPhoto="0" userDrawn="0"/>
+            </p:nvSpPr>
+            <p:spPr bwMode="auto">
+              <a:xfrm flipH="0" flipV="0">
+                <a:off x="6704134" y="0"/>
+                <a:ext cx="2198076" cy="341922"/>
+              </a:xfrm>
+              <a:prstGeom prst="rect">
+                <a:avLst/>
+              </a:prstGeom>
+              <a:noFill/>
+            </p:spPr>
+            <p:txBody>
+              <a:bodyPr vertOverflow="overflow" horzOverflow="clip" vert="horz" wrap="square" lIns="91440" tIns="45720" rIns="91440" bIns="45720" numCol="1" spcCol="0" rtlCol="0" fromWordArt="0" anchor="t" anchorCtr="0" forceAA="0" upright="0" compatLnSpc="0">
+                <a:noAutofit/>
+              </a:bodyPr>
+              <a:p>
+                <a:pPr>
+                  <a:defRPr/>
+                </a:pPr>
+                <a:r>
+                  <a:rPr lang="de-DE" sz="1400"/>
+                  <a:t>Fertige Dokumentation</a:t>
+                </a:r>
+                <a:endParaRPr sz="1400"/>
+              </a:p>
+            </p:txBody>
+          </p:sp>
+        </p:grpSp>
+        <p:sp>
+          <p:nvSpPr>
+            <p:cNvPr id="1973260769" name="" hidden="0"/>
+            <p:cNvSpPr txBox="1"/>
+            <p:nvPr isPhoto="0" userDrawn="0"/>
+          </p:nvSpPr>
+          <p:spPr bwMode="auto">
+            <a:xfrm flipH="0" flipV="0">
+              <a:off x="3123461" y="1887284"/>
+              <a:ext cx="2649902" cy="341922"/>
+            </a:xfrm>
+            <a:prstGeom prst="rect">
+              <a:avLst/>
+            </a:prstGeom>
+            <a:noFill/>
+          </p:spPr>
+          <p:txBody>
+            <a:bodyPr vertOverflow="overflow" horzOverflow="clip" vert="horz" wrap="square" lIns="91440" tIns="45720" rIns="91440" bIns="45720" numCol="1" spcCol="0" rtlCol="0" fromWordArt="0" anchor="t" anchorCtr="0" forceAA="0" upright="0" compatLnSpc="0">
+              <a:noAutofit/>
+            </a:bodyPr>
+            <a:p>
+              <a:pPr>
+                <a:defRPr/>
+              </a:pPr>
+              <a:r>
+                <a:rPr lang="de-DE" sz="1400"/>
+                <a:t>Dokumentation </a:t>
+              </a:r>
+              <a:r>
+                <a:rPr sz="1400"/>
+                <a:t>in Markdown</a:t>
+              </a:r>
+              <a:endParaRPr sz="1400"/>
+            </a:p>
+          </p:txBody>
+        </p:sp>
+        <p:sp>
+          <p:nvSpPr>
+            <p:cNvPr id="1826178206" name="" hidden="0"/>
+            <p:cNvSpPr txBox="1"/>
+            <p:nvPr isPhoto="0" userDrawn="0"/>
+          </p:nvSpPr>
+          <p:spPr bwMode="auto">
+            <a:xfrm flipH="0" flipV="0">
+              <a:off x="4322884" y="2688937"/>
+              <a:ext cx="1199423" cy="260749"/>
+            </a:xfrm>
+            <a:prstGeom prst="rect">
+              <a:avLst/>
+            </a:prstGeom>
+            <a:noFill/>
+          </p:spPr>
+          <p:txBody>
+            <a:bodyPr vertOverflow="overflow" horzOverflow="clip" vert="horz" wrap="square" lIns="91440" tIns="45720" rIns="91440" bIns="45720" numCol="1" spcCol="0" rtlCol="0" fromWordArt="0" anchor="t" anchorCtr="0" forceAA="0" upright="0" compatLnSpc="0">
+              <a:noAutofit/>
+            </a:bodyPr>
+            <a:p>
+              <a:pPr>
+                <a:defRPr/>
+              </a:pPr>
+              <a:r>
+                <a:rPr lang="de-DE" sz="1400"/>
+                <a:t>Screenshots</a:t>
+              </a:r>
+              <a:endParaRPr sz="1400"/>
+            </a:p>
+          </p:txBody>
+        </p:sp>
+      </p:grpSp>
     </p:spTree>
   </p:cSld>
   <p:clrMapOvr>
@@ -7901,7 +8154,7 @@
       </p:grpSpPr>
       <p:sp>
         <p:nvSpPr>
-          <p:cNvPr id="2066127232" name="Título 1" hidden="0"/>
+          <p:cNvPr id="737948483" name="Título 1" hidden="0"/>
           <p:cNvSpPr>
             <a:spLocks noGrp="1"/>
           </p:cNvSpPr>
@@ -7934,7 +8187,7 @@
       </p:sp>
       <p:sp>
         <p:nvSpPr>
-          <p:cNvPr id="1550064571" name="Marcador de contenido 2" hidden="0"/>
+          <p:cNvPr id="1419255848" name="Marcador de contenido 2" hidden="0"/>
           <p:cNvSpPr>
             <a:spLocks noGrp="1"/>
           </p:cNvSpPr>
@@ -7989,7 +8242,7 @@
       </p:grpSpPr>
       <p:sp>
         <p:nvSpPr>
-          <p:cNvPr id="313569025" name="Título 1" hidden="0"/>
+          <p:cNvPr id="2066127232" name="Título 1" hidden="0"/>
           <p:cNvSpPr>
             <a:spLocks noGrp="1"/>
           </p:cNvSpPr>
@@ -8022,7 +8275,7 @@
       </p:sp>
       <p:sp>
         <p:nvSpPr>
-          <p:cNvPr id="985876979" name="Marcador de contenido 2" hidden="0"/>
+          <p:cNvPr id="1550064571" name="Marcador de contenido 2" hidden="0"/>
           <p:cNvSpPr>
             <a:spLocks noGrp="1"/>
           </p:cNvSpPr>
@@ -8077,7 +8330,7 @@
       </p:grpSpPr>
       <p:sp>
         <p:nvSpPr>
-          <p:cNvPr id="1417253658" name="Título 1" hidden="0"/>
+          <p:cNvPr id="313569025" name="Título 1" hidden="0"/>
           <p:cNvSpPr>
             <a:spLocks noGrp="1"/>
           </p:cNvSpPr>
@@ -8095,20 +8348,13 @@
             </a:pPr>
             <a:r>
               <a:rPr lang="de-DE"/>
-              <a:t>Demo</a:t>
+              <a:t>Ergebnisse</a:t>
             </a:r>
             <a:br>
               <a:rPr lang="de-DE"/>
             </a:br>
             <a:r>
-              <a:rPr lang="de-DE" sz="1600" b="0" i="1" u="none" strike="noStrike" cap="none" spc="0">
-                <a:solidFill>
-                  <a:schemeClr val="tx1"/>
-                </a:solidFill>
-                <a:latin typeface="+mj-lt"/>
-                <a:ea typeface="+mj-ea"/>
-                <a:cs typeface="+mj-cs"/>
-              </a:rPr>
+              <a:rPr lang="de-DE" sz="1600" i="1"/>
               <a:t>WebDoc - Web Application Documentor</a:t>
             </a:r>
             <a:endParaRPr/>
@@ -8117,7 +8363,7 @@
       </p:sp>
       <p:sp>
         <p:nvSpPr>
-          <p:cNvPr id="514216593" name="Marcador de contenido 2" hidden="0"/>
+          <p:cNvPr id="985876979" name="Marcador de contenido 2" hidden="0"/>
           <p:cNvSpPr>
             <a:spLocks noGrp="1"/>
           </p:cNvSpPr>
@@ -8172,7 +8418,7 @@
       </p:grpSpPr>
       <p:sp>
         <p:nvSpPr>
-          <p:cNvPr id="157058720" name="Título 1" hidden="0"/>
+          <p:cNvPr id="1417253658" name="Título 1" hidden="0"/>
           <p:cNvSpPr>
             <a:spLocks noGrp="1"/>
           </p:cNvSpPr>
@@ -8190,18 +8436,29 @@
             </a:pPr>
             <a:r>
               <a:rPr lang="de-DE"/>
-              <a:t>Fazit</a:t>
+              <a:t>Demo</a:t>
             </a:r>
             <a:br>
               <a:rPr lang="de-DE"/>
             </a:br>
-            <a:endParaRPr sz="1600"/>
-          </a:p>
-        </p:txBody>
-      </p:sp>
-      <p:sp>
-        <p:nvSpPr>
-          <p:cNvPr id="1934508904" name="Marcador de contenido 2" hidden="0"/>
+            <a:r>
+              <a:rPr lang="de-DE" sz="1600" b="0" i="1" u="none" strike="noStrike" cap="none" spc="0">
+                <a:solidFill>
+                  <a:schemeClr val="tx1"/>
+                </a:solidFill>
+                <a:latin typeface="+mj-lt"/>
+                <a:ea typeface="+mj-ea"/>
+                <a:cs typeface="+mj-cs"/>
+              </a:rPr>
+              <a:t>WebDoc - Web Application Documentor</a:t>
+            </a:r>
+            <a:endParaRPr/>
+          </a:p>
+        </p:txBody>
+      </p:sp>
+      <p:sp>
+        <p:nvSpPr>
+          <p:cNvPr id="941672108" name="Content Placeholder 2" hidden="0"/>
           <p:cNvSpPr>
             <a:spLocks noGrp="1"/>
           </p:cNvSpPr>
@@ -8211,7 +8468,7 @@
         </p:nvSpPr>
         <p:spPr bwMode="auto"/>
         <p:txBody>
-          <a:bodyPr/>
+          <a:bodyPr anchor="t"/>
           <a:lstStyle/>
           <a:p>
             <a:pPr>
@@ -8256,7 +8513,7 @@
       </p:grpSpPr>
       <p:sp>
         <p:nvSpPr>
-          <p:cNvPr id="491240005" name="Título 1" hidden="0"/>
+          <p:cNvPr id="157058720" name="Título 1" hidden="0"/>
           <p:cNvSpPr>
             <a:spLocks noGrp="1"/>
           </p:cNvSpPr>
@@ -8274,18 +8531,18 @@
             </a:pPr>
             <a:r>
               <a:rPr lang="de-DE"/>
-              <a:t>Referenzen</a:t>
+              <a:t>Fazit</a:t>
             </a:r>
             <a:br>
               <a:rPr lang="de-DE"/>
             </a:br>
-            <a:endParaRPr sz="1800"/>
-          </a:p>
-        </p:txBody>
-      </p:sp>
-      <p:sp>
-        <p:nvSpPr>
-          <p:cNvPr id="835041238" name="Marcador de contenido 2" hidden="0"/>
+            <a:endParaRPr sz="1600"/>
+          </a:p>
+        </p:txBody>
+      </p:sp>
+      <p:sp>
+        <p:nvSpPr>
+          <p:cNvPr id="1934508904" name="Marcador de contenido 2" hidden="0"/>
           <p:cNvSpPr>
             <a:spLocks noGrp="1"/>
           </p:cNvSpPr>
@@ -8301,21 +8558,6 @@
             <a:pPr>
               <a:defRPr/>
             </a:pPr>
-            <a:r>
-              <a:rPr/>
-              <a:t>Icons, Gifs, Cliparts aus </a:t>
-            </a:r>
-            <a:r>
-              <a:rPr lang="en-US" sz="2000" b="0" i="0" u="none" strike="noStrike" cap="none" spc="0">
-                <a:solidFill>
-                  <a:schemeClr val="tx1"/>
-                </a:solidFill>
-                <a:latin typeface="Palatino Linotype"/>
-                <a:ea typeface="Palatino Linotype"/>
-                <a:cs typeface="Palatino Linotype"/>
-              </a:rPr>
-              <a:t>https://www.flaticon.com/</a:t>
-            </a:r>
             <a:endParaRPr/>
           </a:p>
         </p:txBody>
@@ -8337,6 +8579,105 @@
 </file>
 
 <file path=ppt/slides/slide17.xml><?xml version="1.0" encoding="utf-8"?>
+<p:sld xmlns:a="http://schemas.openxmlformats.org/drawingml/2006/main" xmlns:r="http://schemas.openxmlformats.org/officeDocument/2006/relationships" xmlns:p="http://schemas.openxmlformats.org/presentationml/2006/main" xmlns:m="http://schemas.openxmlformats.org/officeDocument/2006/math" xmlns:w="http://schemas.openxmlformats.org/wordprocessingml/2006/main" showMasterPhAnim="0" show="1">
+  <p:cSld name="">
+    <p:spTree>
+      <p:nvGrpSpPr>
+        <p:cNvPr id="1" name="" hidden="0"/>
+        <p:cNvGrpSpPr/>
+        <p:nvPr isPhoto="0" userDrawn="0"/>
+      </p:nvGrpSpPr>
+      <p:grpSpPr bwMode="auto">
+        <a:xfrm>
+          <a:off x="0" y="0"/>
+          <a:ext cx="0" cy="0"/>
+          <a:chOff x="0" y="0"/>
+          <a:chExt cx="0" cy="0"/>
+        </a:xfrm>
+      </p:grpSpPr>
+      <p:sp>
+        <p:nvSpPr>
+          <p:cNvPr id="491240005" name="Título 1" hidden="0"/>
+          <p:cNvSpPr>
+            <a:spLocks noGrp="1"/>
+          </p:cNvSpPr>
+          <p:nvPr isPhoto="0" userDrawn="0">
+            <p:ph type="title" hasCustomPrompt="0"/>
+          </p:nvPr>
+        </p:nvSpPr>
+        <p:spPr bwMode="auto"/>
+        <p:txBody>
+          <a:bodyPr/>
+          <a:lstStyle/>
+          <a:p>
+            <a:pPr>
+              <a:defRPr/>
+            </a:pPr>
+            <a:r>
+              <a:rPr lang="de-DE"/>
+              <a:t>Referenzen</a:t>
+            </a:r>
+            <a:br>
+              <a:rPr lang="de-DE"/>
+            </a:br>
+            <a:endParaRPr sz="1800"/>
+          </a:p>
+        </p:txBody>
+      </p:sp>
+      <p:sp>
+        <p:nvSpPr>
+          <p:cNvPr id="835041238" name="Marcador de contenido 2" hidden="0"/>
+          <p:cNvSpPr>
+            <a:spLocks noGrp="1"/>
+          </p:cNvSpPr>
+          <p:nvPr isPhoto="0" userDrawn="0">
+            <p:ph idx="1" hasCustomPrompt="0"/>
+          </p:nvPr>
+        </p:nvSpPr>
+        <p:spPr bwMode="auto"/>
+        <p:txBody>
+          <a:bodyPr/>
+          <a:lstStyle/>
+          <a:p>
+            <a:pPr>
+              <a:defRPr/>
+            </a:pPr>
+            <a:r>
+              <a:rPr/>
+              <a:t>Icons, Gifs, Cliparts aus </a:t>
+            </a:r>
+            <a:r>
+              <a:rPr lang="en-US" sz="2000" b="0" i="0" u="none" strike="noStrike" cap="none" spc="0">
+                <a:solidFill>
+                  <a:schemeClr val="tx1"/>
+                </a:solidFill>
+                <a:latin typeface="Palatino Linotype"/>
+                <a:ea typeface="Palatino Linotype"/>
+                <a:cs typeface="Palatino Linotype"/>
+              </a:rPr>
+              <a:t>https://www.flaticon.com/</a:t>
+            </a:r>
+            <a:endParaRPr/>
+          </a:p>
+        </p:txBody>
+      </p:sp>
+    </p:spTree>
+  </p:cSld>
+  <p:clrMapOvr>
+    <a:masterClrMapping/>
+  </p:clrMapOvr>
+  <mc:AlternateContent xmlns:mc="http://schemas.openxmlformats.org/markup-compatibility/2006">
+    <mc:Choice xmlns:p14="http://schemas.microsoft.com/office/powerpoint/2010/main" Requires="p14">
+      <p:transition p14:dur="2000" advClick="1"/>
+    </mc:Choice>
+    <mc:Fallback>
+      <p:transition advClick="1"/>
+    </mc:Fallback>
+  </mc:AlternateContent>
+</p:sld>
+</file>
+
+<file path=ppt/slides/slide18.xml><?xml version="1.0" encoding="utf-8"?>
 <p:sld xmlns:a="http://schemas.openxmlformats.org/drawingml/2006/main" xmlns:r="http://schemas.openxmlformats.org/officeDocument/2006/relationships" xmlns:p="http://schemas.openxmlformats.org/presentationml/2006/main" xmlns:m="http://schemas.openxmlformats.org/officeDocument/2006/math" xmlns:w="http://schemas.openxmlformats.org/wordprocessingml/2006/main" showMasterPhAnim="0" show="1">
   <p:cSld name="">
     <p:spTree>
@@ -10546,17 +10887,6 @@
               </a:rPr>
               <a:t>Den Grundstein liefert die Cinco Entwicklungsumgebung samt der Modelierungssprachen </a:t>
             </a:r>
-            <a:r>
-              <a:rPr lang="en-US" sz="2000" b="0" i="0" u="none" strike="noStrike" cap="none" spc="0">
-                <a:solidFill>
-                  <a:schemeClr val="tx1"/>
-                </a:solidFill>
-                <a:latin typeface="Palatino Linotype"/>
-                <a:ea typeface="Arial"/>
-                <a:cs typeface="Arial"/>
-              </a:rPr>
-              <a:t>(MGL, MSL, CPD)</a:t>
-            </a:r>
             <a:endParaRPr/>
           </a:p>
           <a:p>
@@ -10686,13 +11016,48 @@
                 <a:solidFill>
                   <a:schemeClr val="tx1"/>
                 </a:solidFill>
-                <a:latin typeface="+mn-lt"/>
-                <a:ea typeface="+mn-ea"/>
-                <a:cs typeface="+mn-cs"/>
+                <a:latin typeface="Palatino Linotype"/>
+                <a:ea typeface="Arial"/>
+                <a:cs typeface="Arial"/>
               </a:rPr>
-              <a:t>Die graphische Sprache - bestehend aus Browser UI Elemente - wird zum Entwerfen des Dokumentationsmodels verwendet</a:t>
+              <a:t>Cinco Metasprachen (Meta Graph Language, Meta Style Language, Cinco Product Definition) spezifizieren unsere graphische Domainsprache </a:t>
             </a:r>
             <a:endParaRPr sz="2000"/>
+          </a:p>
+          <a:p>
+            <a:pPr>
+              <a:defRPr/>
+            </a:pPr>
+            <a:r>
+              <a:rPr lang="en-US" sz="2000" b="0" i="0" u="none" strike="noStrike" cap="none" spc="0">
+                <a:solidFill>
+                  <a:schemeClr val="tx1"/>
+                </a:solidFill>
+                <a:latin typeface="+mn-lt"/>
+                <a:ea typeface="+mn-ea"/>
+                <a:cs typeface="+mn-cs"/>
+              </a:rPr>
+              <a:t>Diese</a:t>
+            </a:r>
+            <a:r>
+              <a:rPr lang="en-US" sz="2000" b="0" i="0" u="none" strike="noStrike" cap="none" spc="0">
+                <a:solidFill>
+                  <a:schemeClr val="tx1"/>
+                </a:solidFill>
+                <a:latin typeface="Palatino Linotype"/>
+                <a:ea typeface="Arial"/>
+                <a:cs typeface="Arial"/>
+              </a:rPr>
+              <a:t> graphische Sprache - bestehend aus Repräsentationender  Browser UI Elemente - wird zum Entwerfen des Dokumentationsmodels verwendet</a:t>
+            </a:r>
+            <a:endParaRPr lang="en-US" sz="2000" b="0" i="0" u="none" strike="noStrike" cap="none" spc="0">
+              <a:solidFill>
+                <a:schemeClr val="tx1"/>
+              </a:solidFill>
+              <a:latin typeface="Palatino Linotype"/>
+              <a:ea typeface="Arial"/>
+              <a:cs typeface="Arial"/>
+            </a:endParaRPr>
           </a:p>
           <a:p>
             <a:pPr>
@@ -10713,6 +11078,169 @@
           </a:p>
         </p:txBody>
       </p:sp>
+      <p:grpSp>
+        <p:nvGrpSpPr>
+          <p:cNvPr id="1487921282" name="" hidden="0"/>
+          <p:cNvGrpSpPr/>
+          <p:nvPr isPhoto="0" userDrawn="0"/>
+        </p:nvGrpSpPr>
+        <p:grpSpPr bwMode="auto">
+          <a:xfrm>
+            <a:off x="3071936" y="4516193"/>
+            <a:ext cx="6240096" cy="1161743"/>
+            <a:chOff x="0" y="0"/>
+            <a:chExt cx="6240096" cy="1161743"/>
+          </a:xfrm>
+        </p:grpSpPr>
+        <p:pic>
+          <p:nvPicPr>
+            <p:cNvPr id="986360154" name="" hidden="0"/>
+            <p:cNvPicPr>
+              <a:picLocks noChangeAspect="1"/>
+            </p:cNvPicPr>
+            <p:nvPr isPhoto="0" userDrawn="0"/>
+          </p:nvPicPr>
+          <p:blipFill>
+            <a:blip r:embed="rId2"/>
+            <a:stretch/>
+          </p:blipFill>
+          <p:spPr bwMode="auto">
+            <a:xfrm flipH="0" flipV="0">
+              <a:off x="0" y="0"/>
+              <a:ext cx="4114793" cy="1131214"/>
+            </a:xfrm>
+            <a:prstGeom prst="rect">
+              <a:avLst/>
+            </a:prstGeom>
+          </p:spPr>
+        </p:pic>
+        <p:grpSp>
+          <p:nvGrpSpPr>
+            <p:cNvPr id="1372563930" name="" hidden="0"/>
+            <p:cNvGrpSpPr/>
+            <p:nvPr isPhoto="0" userDrawn="0"/>
+          </p:nvGrpSpPr>
+          <p:grpSpPr bwMode="auto">
+            <a:xfrm>
+              <a:off x="4114793" y="181063"/>
+              <a:ext cx="2125301" cy="980680"/>
+              <a:chOff x="0" y="0"/>
+              <a:chExt cx="2125301" cy="980680"/>
+            </a:xfrm>
+          </p:grpSpPr>
+          <p:cxnSp>
+            <p:nvCxnSpPr>
+              <p:cNvPr id="0" name="" hidden="0"/>
+              <p:cNvCxnSpPr>
+                <a:cxnSpLocks/>
+                <a:stCxn id="986360154" idx="3"/>
+              </p:cNvCxnSpPr>
+              <p:nvPr isPhoto="0" userDrawn="0"/>
+            </p:nvCxnSpPr>
+            <p:spPr bwMode="auto">
+              <a:xfrm rot="0" flipH="0" flipV="1">
+                <a:off x="0" y="380376"/>
+                <a:ext cx="900000" cy="0"/>
+              </a:xfrm>
+              <a:prstGeom prst="line">
+                <a:avLst/>
+              </a:prstGeom>
+              <a:ln w="19049" cap="flat" cmpd="sng" algn="ctr">
+                <a:solidFill>
+                  <a:schemeClr val="tx1"/>
+                </a:solidFill>
+                <a:prstDash val="solid"/>
+                <a:tailEnd type="arrow" len="med"/>
+              </a:ln>
+            </p:spPr>
+            <p:style>
+              <a:lnRef idx="1">
+                <a:schemeClr val="accent1">
+                  <a:shade val="50000"/>
+                </a:schemeClr>
+              </a:lnRef>
+              <a:fillRef idx="0">
+                <a:schemeClr val="accent1"/>
+              </a:fillRef>
+              <a:effectRef idx="0">
+                <a:schemeClr val="accent1"/>
+              </a:effectRef>
+              <a:fontRef idx="minor">
+                <a:schemeClr val="tx1"/>
+              </a:fontRef>
+            </p:style>
+          </p:cxnSp>
+          <p:grpSp>
+            <p:nvGrpSpPr>
+              <p:cNvPr id="1213238108" name="" hidden="0"/>
+              <p:cNvGrpSpPr/>
+              <p:nvPr isPhoto="0" userDrawn="0"/>
+            </p:nvGrpSpPr>
+            <p:grpSpPr bwMode="auto">
+              <a:xfrm>
+                <a:off x="900000" y="0"/>
+                <a:ext cx="1225301" cy="980680"/>
+                <a:chOff x="0" y="0"/>
+                <a:chExt cx="1225301" cy="980680"/>
+              </a:xfrm>
+            </p:grpSpPr>
+            <p:pic>
+              <p:nvPicPr>
+                <p:cNvPr id="1071333906" name="" hidden="0"/>
+                <p:cNvPicPr>
+                  <a:picLocks noChangeAspect="1"/>
+                </p:cNvPicPr>
+                <p:nvPr isPhoto="0" userDrawn="0"/>
+              </p:nvPicPr>
+              <p:blipFill>
+                <a:blip r:embed="rId3"/>
+                <a:stretch/>
+              </p:blipFill>
+              <p:spPr bwMode="auto">
+                <a:xfrm rot="0" flipH="0" flipV="0">
+                  <a:off x="293195" y="0"/>
+                  <a:ext cx="769088" cy="769088"/>
+                </a:xfrm>
+                <a:prstGeom prst="rect">
+                  <a:avLst/>
+                </a:prstGeom>
+              </p:spPr>
+            </p:pic>
+            <p:sp>
+              <p:nvSpPr>
+                <p:cNvPr id="318253103" name="" hidden="0"/>
+                <p:cNvSpPr txBox="1"/>
+                <p:nvPr isPhoto="0" userDrawn="0"/>
+              </p:nvSpPr>
+              <p:spPr bwMode="auto">
+                <a:xfrm rot="0" flipH="0" flipV="0">
+                  <a:off x="0" y="797507"/>
+                  <a:ext cx="1225301" cy="183173"/>
+                </a:xfrm>
+                <a:prstGeom prst="rect">
+                  <a:avLst/>
+                </a:prstGeom>
+                <a:noFill/>
+              </p:spPr>
+              <p:txBody>
+                <a:bodyPr vertOverflow="overflow" horzOverflow="clip" vert="horz" wrap="square" lIns="91440" tIns="45720" rIns="91440" bIns="45720" numCol="1" spcCol="0" rtlCol="0" fromWordArt="0" anchor="ctr" anchorCtr="0" forceAA="0" upright="0" compatLnSpc="0">
+                  <a:noAutofit/>
+                </a:bodyPr>
+                <a:p>
+                  <a:pPr>
+                    <a:defRPr/>
+                  </a:pPr>
+                  <a:r>
+                    <a:rPr sz="850"/>
+                    <a:t>Dokumentationstext</a:t>
+                  </a:r>
+                  <a:endParaRPr sz="800"/>
+                </a:p>
+              </p:txBody>
+            </p:sp>
+          </p:grpSp>
+        </p:grpSp>
+      </p:grpSp>
     </p:spTree>
   </p:cSld>
   <p:clrMapOvr>

</xml_diff>

<commit_message>
submits first complete presentation draft
</commit_message>
<xml_diff>
--- a/Abschlussvortrag.pptx
+++ b/Abschlussvortrag.pptx
@@ -5,7 +5,7 @@
     <p:sldMasterId id="2147483648" r:id="rId1"/>
   </p:sldMasterIdLst>
   <p:notesMasterIdLst>
-    <p:notesMasterId r:id="rId23"/>
+    <p:notesMasterId r:id="rId22"/>
   </p:notesMasterIdLst>
   <p:sldIdLst>
     <p:sldId id="256" r:id="rId4"/>
@@ -26,7 +26,6 @@
     <p:sldId id="271" r:id="rId19"/>
     <p:sldId id="272" r:id="rId20"/>
     <p:sldId id="273" r:id="rId21"/>
-    <p:sldId id="274" r:id="rId22"/>
   </p:sldIdLst>
   <p:sldSz cx="12192000" cy="6858000"/>
   <p:notesSz cx="12192000" cy="6858000"/>
@@ -8429,7 +8428,7 @@
             </a:pPr>
             <a:r>
               <a:rPr/>
-              <a:t>Die Wiederverwendbarkeit der Modellelemente beschleunigt den Designprozess</a:t>
+              <a:t>Implementierung der Wiederverwendbarkeit der Modellelemente, um den Designprozess zu beschleunigen</a:t>
             </a:r>
             <a:endParaRPr/>
           </a:p>
@@ -8450,6 +8449,17 @@
             <a:r>
               <a:rPr/>
               <a:t> </a:t>
+            </a:r>
+            <a:r>
+              <a:rPr lang="de-DE" sz="2000" b="0" i="0" u="none" strike="noStrike" cap="none" spc="0">
+                <a:solidFill>
+                  <a:schemeClr val="tx1"/>
+                </a:solidFill>
+                <a:latin typeface="Palatino Linotype"/>
+                <a:ea typeface="Palatino Linotype"/>
+                <a:cs typeface="Palatino Linotype"/>
+              </a:rPr>
+              <a:t>Generierung der gesamten Projektstruktur mit ‚Boilerplate-code‘ innerhalb desselben Projektordners</a:t>
             </a:r>
             <a:endParaRPr/>
           </a:p>
@@ -8545,10 +8555,53 @@
             <a:pPr>
               <a:defRPr/>
             </a:pPr>
-            <a:endParaRPr/>
-          </a:p>
-        </p:txBody>
-      </p:sp>
+            <a:r>
+              <a:rPr/>
+              <a:t>Ad hoc Erstellung eine Dokumentations-Webseite durch Integration von Drittanbierter-Tools, VuePress und Markdown</a:t>
+            </a:r>
+            <a:endParaRPr/>
+          </a:p>
+          <a:p>
+            <a:pPr>
+              <a:defRPr/>
+            </a:pPr>
+            <a:r>
+              <a:rPr lang="de-DE" sz="2000" b="0" i="0" u="none" strike="noStrike" cap="none" spc="0">
+                <a:solidFill>
+                  <a:schemeClr val="tx1"/>
+                </a:solidFill>
+                <a:latin typeface="Palatino Linotype"/>
+                <a:ea typeface="Palatino Linotype"/>
+                <a:cs typeface="Palatino Linotype"/>
+              </a:rPr>
+              <a:t>Starten der Dokumentations-Website mit minimalem Konfigurationsaufwand</a:t>
+            </a:r>
+            <a:endParaRPr/>
+          </a:p>
+        </p:txBody>
+      </p:sp>
+      <p:pic>
+        <p:nvPicPr>
+          <p:cNvPr id="307794514" name="" hidden="0"/>
+          <p:cNvPicPr>
+            <a:picLocks noChangeAspect="1"/>
+          </p:cNvPicPr>
+          <p:nvPr isPhoto="0" userDrawn="0"/>
+        </p:nvPicPr>
+        <p:blipFill>
+          <a:blip r:embed="rId2"/>
+          <a:stretch/>
+        </p:blipFill>
+        <p:spPr bwMode="auto">
+          <a:xfrm rot="0" flipH="0" flipV="0">
+            <a:off x="3607499" y="3246060"/>
+            <a:ext cx="5135292" cy="2406740"/>
+          </a:xfrm>
+          <a:prstGeom prst="rect">
+            <a:avLst/>
+          </a:prstGeom>
+        </p:spPr>
+      </p:pic>
     </p:spTree>
   </p:cSld>
   <p:clrMapOvr>
@@ -8694,7 +8747,7 @@
       </p:grpSpPr>
       <p:sp>
         <p:nvSpPr>
-          <p:cNvPr id="157058720" name="Título 1" hidden="0"/>
+          <p:cNvPr id="653499456" name="Título 1" hidden="0"/>
           <p:cNvSpPr>
             <a:spLocks noGrp="1"/>
           </p:cNvSpPr>
@@ -8712,7 +8765,7 @@
             </a:pPr>
             <a:r>
               <a:rPr lang="de-DE"/>
-              <a:t>Künftige Arbeiten</a:t>
+              <a:t>Fazit</a:t>
             </a:r>
             <a:br>
               <a:rPr lang="de-DE"/>
@@ -8723,7 +8776,7 @@
       </p:sp>
       <p:sp>
         <p:nvSpPr>
-          <p:cNvPr id="1934508904" name="Marcador de contenido 2" hidden="0"/>
+          <p:cNvPr id="751158943" name="Marcador de contenido 2" hidden="0"/>
           <p:cNvSpPr>
             <a:spLocks noGrp="1"/>
           </p:cNvSpPr>
@@ -8750,7 +8803,88 @@
               </a:rPr>
               <a:t>DSL-getriebene Generierung von Endbenutzerdokumentation für Webanwendungen auf der Basis von Graphenmodellen unter Verwendung einer grafischen DSL</a:t>
             </a:r>
-            <a:endParaRPr/>
+            <a:endParaRPr lang="de-DE" sz="2000" b="0" i="0" u="none" strike="noStrike" cap="none" spc="0">
+              <a:solidFill>
+                <a:schemeClr val="tx1"/>
+              </a:solidFill>
+              <a:latin typeface="Palatino Linotype"/>
+              <a:ea typeface="Palatino Linotype"/>
+              <a:cs typeface="Palatino Linotype"/>
+            </a:endParaRPr>
+          </a:p>
+          <a:p>
+            <a:pPr>
+              <a:defRPr/>
+            </a:pPr>
+            <a:r>
+              <a:rPr lang="de-DE" sz="2000" b="0" i="0" u="none" strike="noStrike" cap="none" spc="0">
+                <a:solidFill>
+                  <a:schemeClr val="tx1"/>
+                </a:solidFill>
+                <a:latin typeface="Palatino Linotype"/>
+                <a:ea typeface="Palatino Linotype"/>
+                <a:cs typeface="Palatino Linotype"/>
+              </a:rPr>
+              <a:t>Erstellung einer Editoranwendung, die es dem Dokumentationsdesigner ermöglicht grafische Diagramme zu erstellen, die den erforderlichen Benutzer-Workflow veranschaulichen</a:t>
+            </a:r>
+            <a:endParaRPr lang="de-DE" sz="2000" b="0" i="0" u="none" strike="noStrike" cap="none" spc="0">
+              <a:solidFill>
+                <a:schemeClr val="tx1"/>
+              </a:solidFill>
+              <a:latin typeface="Palatino Linotype"/>
+              <a:ea typeface="Palatino Linotype"/>
+              <a:cs typeface="Palatino Linotype"/>
+            </a:endParaRPr>
+          </a:p>
+          <a:p>
+            <a:pPr>
+              <a:defRPr/>
+            </a:pPr>
+            <a:r>
+              <a:rPr lang="de-DE" sz="2000" b="0" i="0" u="none" strike="noStrike" cap="none" spc="0">
+                <a:solidFill>
+                  <a:schemeClr val="tx1"/>
+                </a:solidFill>
+                <a:latin typeface="Palatino Linotype"/>
+                <a:ea typeface="Palatino Linotype"/>
+                <a:cs typeface="Palatino Linotype"/>
+              </a:rPr>
+              <a:t>Mithilfe von </a:t>
+            </a:r>
+            <a:r>
+              <a:rPr lang="de-DE" sz="2000" b="0" i="0" u="none" strike="noStrike" cap="none" spc="0">
+                <a:solidFill>
+                  <a:schemeClr val="tx1"/>
+                </a:solidFill>
+                <a:latin typeface="Palatino Linotype"/>
+                <a:ea typeface="Palatino Linotype"/>
+                <a:cs typeface="Palatino Linotype"/>
+              </a:rPr>
+              <a:t>Drittanbietern</a:t>
+            </a:r>
+            <a:r>
+              <a:rPr lang="de-DE" sz="2000" b="0" i="0" u="none" strike="noStrike" cap="none" spc="0">
+                <a:solidFill>
+                  <a:schemeClr val="tx1"/>
+                </a:solidFill>
+                <a:latin typeface="Palatino Linotype"/>
+                <a:ea typeface="Palatino Linotype"/>
+                <a:cs typeface="Palatino Linotype"/>
+              </a:rPr>
+              <a:t>-Tools</a:t>
+            </a:r>
+            <a:r>
+              <a:rPr lang="de-DE" sz="2000" b="0" i="0" u="none" strike="noStrike" cap="none" spc="0">
+                <a:solidFill>
+                  <a:schemeClr val="tx1"/>
+                </a:solidFill>
+                <a:latin typeface="Palatino Linotype"/>
+                <a:ea typeface="Palatino Linotype"/>
+                <a:cs typeface="Palatino Linotype"/>
+              </a:rPr>
+              <a:t> konnten wir eine gut strukturierte und voll funktionsfähige Dokumentation-Website zu erstellen</a:t>
+            </a:r>
+            <a:endParaRPr lang="de-DE"/>
           </a:p>
         </p:txBody>
       </p:sp>
@@ -8789,7 +8923,7 @@
       </p:grpSpPr>
       <p:sp>
         <p:nvSpPr>
-          <p:cNvPr id="653499456" name="Título 1" hidden="0"/>
+          <p:cNvPr id="491240005" name="Título 1" hidden="0"/>
           <p:cNvSpPr>
             <a:spLocks noGrp="1"/>
           </p:cNvSpPr>
@@ -8807,18 +8941,18 @@
             </a:pPr>
             <a:r>
               <a:rPr lang="de-DE"/>
-              <a:t>Fazit</a:t>
+              <a:t>Referenzen</a:t>
             </a:r>
             <a:br>
               <a:rPr lang="de-DE"/>
             </a:br>
-            <a:endParaRPr sz="1600"/>
-          </a:p>
-        </p:txBody>
-      </p:sp>
-      <p:sp>
-        <p:nvSpPr>
-          <p:cNvPr id="751158943" name="Marcador de contenido 2" hidden="0"/>
+            <a:endParaRPr sz="1800"/>
+          </a:p>
+        </p:txBody>
+      </p:sp>
+      <p:sp>
+        <p:nvSpPr>
+          <p:cNvPr id="835041238" name="Marcador de contenido 2" hidden="0"/>
           <p:cNvSpPr>
             <a:spLocks noGrp="1"/>
           </p:cNvSpPr>
@@ -8835,7 +8969,11 @@
               <a:defRPr/>
             </a:pPr>
             <a:r>
-              <a:rPr lang="de-DE" sz="2000" b="0" i="0" u="none" strike="noStrike" cap="none" spc="0">
+              <a:rPr/>
+              <a:t>Icons, Gifs, Cliparts aus </a:t>
+            </a:r>
+            <a:r>
+              <a:rPr lang="en-US" sz="2000" b="0" i="0" u="none" strike="noStrike" cap="none" spc="0">
                 <a:solidFill>
                   <a:schemeClr val="tx1"/>
                 </a:solidFill>
@@ -8843,90 +8981,9 @@
                 <a:ea typeface="Palatino Linotype"/>
                 <a:cs typeface="Palatino Linotype"/>
               </a:rPr>
-              <a:t>DSL-getriebene Generierung von Endbenutzerdokumentation für Webanwendungen auf der Basis von Graphenmodellen unter Verwendung einer grafischen DSL</a:t>
-            </a:r>
-            <a:endParaRPr lang="de-DE" sz="2000" b="0" i="0" u="none" strike="noStrike" cap="none" spc="0">
-              <a:solidFill>
-                <a:schemeClr val="tx1"/>
-              </a:solidFill>
-              <a:latin typeface="Palatino Linotype"/>
-              <a:ea typeface="Palatino Linotype"/>
-              <a:cs typeface="Palatino Linotype"/>
-            </a:endParaRPr>
-          </a:p>
-          <a:p>
-            <a:pPr>
-              <a:defRPr/>
-            </a:pPr>
-            <a:r>
-              <a:rPr lang="de-DE" sz="2000" b="0" i="0" u="none" strike="noStrike" cap="none" spc="0">
-                <a:solidFill>
-                  <a:schemeClr val="tx1"/>
-                </a:solidFill>
-                <a:latin typeface="Palatino Linotype"/>
-                <a:ea typeface="Palatino Linotype"/>
-                <a:cs typeface="Palatino Linotype"/>
-              </a:rPr>
-              <a:t>Erstellung einer Editoranwendung, die es dem Dokumentationsdesigner ermöglicht grafische Diagramme zu erstellen, die den erforderlichen Benutzer-Workflow veranschaulichen</a:t>
-            </a:r>
-            <a:endParaRPr lang="de-DE" sz="2000" b="0" i="0" u="none" strike="noStrike" cap="none" spc="0">
-              <a:solidFill>
-                <a:schemeClr val="tx1"/>
-              </a:solidFill>
-              <a:latin typeface="Palatino Linotype"/>
-              <a:ea typeface="Palatino Linotype"/>
-              <a:cs typeface="Palatino Linotype"/>
-            </a:endParaRPr>
-          </a:p>
-          <a:p>
-            <a:pPr>
-              <a:defRPr/>
-            </a:pPr>
-            <a:r>
-              <a:rPr lang="de-DE" sz="2000" b="0" i="0" u="none" strike="noStrike" cap="none" spc="0">
-                <a:solidFill>
-                  <a:schemeClr val="tx1"/>
-                </a:solidFill>
-                <a:latin typeface="Palatino Linotype"/>
-                <a:ea typeface="Palatino Linotype"/>
-                <a:cs typeface="Palatino Linotype"/>
-              </a:rPr>
-              <a:t>Mithilfe von </a:t>
-            </a:r>
-            <a:r>
-              <a:rPr lang="de-DE" sz="2000" b="0" i="0" u="none" strike="noStrike" cap="none" spc="0">
-                <a:solidFill>
-                  <a:schemeClr val="tx1"/>
-                </a:solidFill>
-                <a:latin typeface="Palatino Linotype"/>
-                <a:ea typeface="Palatino Linotype"/>
-                <a:cs typeface="Palatino Linotype"/>
-              </a:rPr>
-              <a:t>Drittanbietern</a:t>
-            </a:r>
-            <a:r>
-              <a:rPr lang="de-DE" sz="2000" b="0" i="0" u="none" strike="noStrike" cap="none" spc="0">
-                <a:solidFill>
-                  <a:schemeClr val="tx1"/>
-                </a:solidFill>
-                <a:latin typeface="Palatino Linotype"/>
-                <a:ea typeface="Palatino Linotype"/>
-                <a:cs typeface="Palatino Linotype"/>
-              </a:rPr>
-              <a:t>-Tools</a:t>
-            </a:r>
-            <a:r>
-              <a:rPr lang="de-DE" sz="2000" b="0" i="0" u="none" strike="noStrike" cap="none" spc="0">
-                <a:solidFill>
-                  <a:schemeClr val="tx1"/>
-                </a:solidFill>
-                <a:latin typeface="Palatino Linotype"/>
-                <a:ea typeface="Palatino Linotype"/>
-                <a:cs typeface="Palatino Linotype"/>
-              </a:rPr>
-              <a:t> konnten wir eine gut strukturierte und voll funktionsfähige Dokumentation-Website zu erstellen</a:t>
-            </a:r>
-            <a:endParaRPr lang="de-DE"/>
+              <a:t>https://www.flaticon.com/</a:t>
+            </a:r>
+            <a:endParaRPr/>
           </a:p>
         </p:txBody>
       </p:sp>
@@ -8947,105 +9004,6 @@
 </file>
 
 <file path=ppt/slides/slide18.xml><?xml version="1.0" encoding="utf-8"?>
-<p:sld xmlns:a="http://schemas.openxmlformats.org/drawingml/2006/main" xmlns:r="http://schemas.openxmlformats.org/officeDocument/2006/relationships" xmlns:p="http://schemas.openxmlformats.org/presentationml/2006/main" xmlns:m="http://schemas.openxmlformats.org/officeDocument/2006/math" xmlns:w="http://schemas.openxmlformats.org/wordprocessingml/2006/main" showMasterPhAnim="0" show="1">
-  <p:cSld name="">
-    <p:spTree>
-      <p:nvGrpSpPr>
-        <p:cNvPr id="1" name="" hidden="0"/>
-        <p:cNvGrpSpPr/>
-        <p:nvPr isPhoto="0" userDrawn="0"/>
-      </p:nvGrpSpPr>
-      <p:grpSpPr bwMode="auto">
-        <a:xfrm>
-          <a:off x="0" y="0"/>
-          <a:ext cx="0" cy="0"/>
-          <a:chOff x="0" y="0"/>
-          <a:chExt cx="0" cy="0"/>
-        </a:xfrm>
-      </p:grpSpPr>
-      <p:sp>
-        <p:nvSpPr>
-          <p:cNvPr id="491240005" name="Título 1" hidden="0"/>
-          <p:cNvSpPr>
-            <a:spLocks noGrp="1"/>
-          </p:cNvSpPr>
-          <p:nvPr isPhoto="0" userDrawn="0">
-            <p:ph type="title" hasCustomPrompt="0"/>
-          </p:nvPr>
-        </p:nvSpPr>
-        <p:spPr bwMode="auto"/>
-        <p:txBody>
-          <a:bodyPr/>
-          <a:lstStyle/>
-          <a:p>
-            <a:pPr>
-              <a:defRPr/>
-            </a:pPr>
-            <a:r>
-              <a:rPr lang="de-DE"/>
-              <a:t>Referenzen</a:t>
-            </a:r>
-            <a:br>
-              <a:rPr lang="de-DE"/>
-            </a:br>
-            <a:endParaRPr sz="1800"/>
-          </a:p>
-        </p:txBody>
-      </p:sp>
-      <p:sp>
-        <p:nvSpPr>
-          <p:cNvPr id="835041238" name="Marcador de contenido 2" hidden="0"/>
-          <p:cNvSpPr>
-            <a:spLocks noGrp="1"/>
-          </p:cNvSpPr>
-          <p:nvPr isPhoto="0" userDrawn="0">
-            <p:ph idx="1" hasCustomPrompt="0"/>
-          </p:nvPr>
-        </p:nvSpPr>
-        <p:spPr bwMode="auto"/>
-        <p:txBody>
-          <a:bodyPr/>
-          <a:lstStyle/>
-          <a:p>
-            <a:pPr>
-              <a:defRPr/>
-            </a:pPr>
-            <a:r>
-              <a:rPr/>
-              <a:t>Icons, Gifs, Cliparts aus </a:t>
-            </a:r>
-            <a:r>
-              <a:rPr lang="en-US" sz="2000" b="0" i="0" u="none" strike="noStrike" cap="none" spc="0">
-                <a:solidFill>
-                  <a:schemeClr val="tx1"/>
-                </a:solidFill>
-                <a:latin typeface="Palatino Linotype"/>
-                <a:ea typeface="Palatino Linotype"/>
-                <a:cs typeface="Palatino Linotype"/>
-              </a:rPr>
-              <a:t>https://www.flaticon.com/</a:t>
-            </a:r>
-            <a:endParaRPr/>
-          </a:p>
-        </p:txBody>
-      </p:sp>
-    </p:spTree>
-  </p:cSld>
-  <p:clrMapOvr>
-    <a:masterClrMapping/>
-  </p:clrMapOvr>
-  <mc:AlternateContent xmlns:mc="http://schemas.openxmlformats.org/markup-compatibility/2006">
-    <mc:Choice xmlns:p14="http://schemas.microsoft.com/office/powerpoint/2010/main" Requires="p14">
-      <p:transition p14:dur="2000" advClick="1"/>
-    </mc:Choice>
-    <mc:Fallback>
-      <p:transition advClick="1"/>
-    </mc:Fallback>
-  </mc:AlternateContent>
-</p:sld>
-</file>
-
-<file path=ppt/slides/slide19.xml><?xml version="1.0" encoding="utf-8"?>
 <p:sld xmlns:a="http://schemas.openxmlformats.org/drawingml/2006/main" xmlns:r="http://schemas.openxmlformats.org/officeDocument/2006/relationships" xmlns:p="http://schemas.openxmlformats.org/presentationml/2006/main" xmlns:m="http://schemas.openxmlformats.org/officeDocument/2006/math" xmlns:w="http://schemas.openxmlformats.org/wordprocessingml/2006/main" showMasterPhAnim="0" show="1">
   <p:cSld name="">
     <p:spTree>

</xml_diff>

<commit_message>
dispatches the correction points to slides
</commit_message>
<xml_diff>
--- a/Abschlussvortrag.pptx
+++ b/Abschlussvortrag.pptx
@@ -5,7 +5,7 @@
     <p:sldMasterId id="2147483648" r:id="rId1"/>
   </p:sldMasterIdLst>
   <p:notesMasterIdLst>
-    <p:notesMasterId r:id="rId21"/>
+    <p:notesMasterId r:id="rId22"/>
   </p:notesMasterIdLst>
   <p:sldIdLst>
     <p:sldId id="256" r:id="rId4"/>
@@ -25,6 +25,7 @@
     <p:sldId id="270" r:id="rId18"/>
     <p:sldId id="271" r:id="rId19"/>
     <p:sldId id="272" r:id="rId20"/>
+    <p:sldId id="273" r:id="rId21"/>
   </p:sldIdLst>
   <p:sldSz cx="12192000" cy="6858000"/>
   <p:notesSz cx="12192000" cy="6858000"/>
@@ -519,17 +520,6 @@
             <a:pPr>
               <a:defRPr/>
             </a:pPr>
-            <a:r>
-              <a:rPr lang="de-DE" sz="1200" b="0" i="0" u="none" strike="noStrike" cap="none" spc="0">
-                <a:solidFill>
-                  <a:schemeClr val="tx1"/>
-                </a:solidFill>
-                <a:latin typeface="Palatino Linotype"/>
-                <a:ea typeface="Palatino Linotype"/>
-                <a:cs typeface="Palatino Linotype"/>
-              </a:rPr>
-              <a:t>- Ich vermisse ein wenig die Vorstellung der Sprachfeatures und deren Besonderheiten</a:t>
-            </a:r>
             <a:endParaRPr lang="de-DE" sz="1200" b="0" i="0" u="none" strike="noStrike" cap="none" spc="0">
               <a:solidFill>
                 <a:schemeClr val="tx1"/>
@@ -539,54 +529,78 @@
               <a:cs typeface="Palatino Linotype"/>
             </a:endParaRPr>
           </a:p>
-          <a:p>
-            <a:pPr>
-              <a:defRPr/>
-            </a:pPr>
-            <a:r>
-              <a:rPr lang="de-DE" sz="1200" b="0" i="0" u="none" strike="noStrike" cap="none" spc="0">
-                <a:solidFill>
-                  <a:schemeClr val="tx1"/>
-                </a:solidFill>
-                <a:latin typeface="Palatino Linotype"/>
-                <a:ea typeface="Palatino Linotype"/>
-                <a:cs typeface="Palatino Linotype"/>
-              </a:rPr>
-              <a:t>- Folie 10: Inwiefern verhindert das einen Single-Point-of-failure?</a:t>
-            </a:r>
-            <a:endParaRPr lang="de-DE" sz="1200" b="0" i="0" u="none" strike="noStrike" cap="none" spc="0">
-              <a:solidFill>
-                <a:schemeClr val="tx1"/>
-              </a:solidFill>
-              <a:latin typeface="Palatino Linotype"/>
-              <a:ea typeface="Palatino Linotype"/>
-              <a:cs typeface="Palatino Linotype"/>
-            </a:endParaRPr>
-          </a:p>
-          <a:p>
-            <a:pPr>
-              <a:defRPr/>
-            </a:pPr>
-            <a:r>
-              <a:rPr lang="de-DE" sz="1200" b="0" i="0" u="none" strike="noStrike" cap="none" spc="0">
-                <a:solidFill>
-                  <a:schemeClr val="tx1"/>
-                </a:solidFill>
-                <a:latin typeface="Palatino Linotype"/>
-                <a:ea typeface="Palatino Linotype"/>
-                <a:cs typeface="Palatino Linotype"/>
-              </a:rPr>
-              <a:t>- Was hast du für die Demo geplant? Ich hoffe, du gehst da detailliert auf die ganzen Features deiner Sprachen ein: Primereferenzen, Verschachtelung, Enablen/Disablen von Screenshots, Checks etc.</a:t>
-            </a:r>
-            <a:endParaRPr lang="de-DE" sz="1200" b="0" i="0" u="none" strike="noStrike" cap="none" spc="0">
-              <a:solidFill>
-                <a:schemeClr val="tx1"/>
-              </a:solidFill>
-              <a:latin typeface="Palatino Linotype"/>
-              <a:ea typeface="Palatino Linotype"/>
-              <a:cs typeface="Palatino Linotype"/>
-            </a:endParaRPr>
-          </a:p>
+        </p:txBody>
+      </p:sp>
+      <p:sp>
+        <p:nvSpPr>
+          <p:cNvPr id="4" name="Slide Number Placeholder 3" hidden="0"/>
+          <p:cNvSpPr>
+            <a:spLocks noGrp="1"/>
+          </p:cNvSpPr>
+          <p:nvPr isPhoto="0" userDrawn="0">
+            <p:ph type="sldNum" sz="quarter" idx="10" hasCustomPrompt="0"/>
+          </p:nvPr>
+        </p:nvSpPr>
+        <p:spPr bwMode="auto"/>
+        <p:txBody>
+          <a:bodyPr/>
+          <a:lstStyle/>
+          <a:p>
+            <a:pPr>
+              <a:defRPr/>
+            </a:pPr>
+            <a:endParaRPr/>
+          </a:p>
+        </p:txBody>
+      </p:sp>
+    </p:spTree>
+  </p:cSld>
+</p:notes>
+</file>
+
+<file path=ppt/notesSlides/notesSlide10.xml><?xml version="1.0" encoding="utf-8"?>
+<p:notes xmlns:a="http://schemas.openxmlformats.org/drawingml/2006/main" xmlns:r="http://schemas.openxmlformats.org/officeDocument/2006/relationships" xmlns:p="http://schemas.openxmlformats.org/presentationml/2006/main" xmlns:m="http://schemas.openxmlformats.org/officeDocument/2006/math" xmlns:w="http://schemas.openxmlformats.org/wordprocessingml/2006/main">
+  <p:cSld name="">
+    <p:spTree>
+      <p:nvGrpSpPr>
+        <p:cNvPr id="1" name="" hidden="0"/>
+        <p:cNvGrpSpPr/>
+        <p:nvPr isPhoto="0" userDrawn="0"/>
+      </p:nvGrpSpPr>
+      <p:grpSpPr bwMode="auto">
+        <a:xfrm>
+          <a:off x="0" y="0"/>
+          <a:ext cx="0" cy="0"/>
+          <a:chOff x="0" y="0"/>
+          <a:chExt cx="0" cy="0"/>
+        </a:xfrm>
+      </p:grpSpPr>
+      <p:sp>
+        <p:nvSpPr>
+          <p:cNvPr id="2" name="Slide Image Placeholder 1" hidden="0"/>
+          <p:cNvSpPr>
+            <a:spLocks noChangeAspect="1" noGrp="1" noRot="1"/>
+          </p:cNvSpPr>
+          <p:nvPr isPhoto="0" userDrawn="0">
+            <p:ph type="sldImg" hasCustomPrompt="0"/>
+          </p:nvPr>
+        </p:nvSpPr>
+        <p:spPr bwMode="auto"/>
+      </p:sp>
+      <p:sp>
+        <p:nvSpPr>
+          <p:cNvPr id="3" name="Notes Placeholder 2" hidden="0"/>
+          <p:cNvSpPr>
+            <a:spLocks noGrp="1"/>
+          </p:cNvSpPr>
+          <p:nvPr isPhoto="0" userDrawn="0">
+            <p:ph type="body" idx="1" hasCustomPrompt="0"/>
+          </p:nvPr>
+        </p:nvSpPr>
+        <p:spPr bwMode="auto"/>
+        <p:txBody>
+          <a:bodyPr/>
+          <a:lstStyle/>
           <a:p>
             <a:pPr>
               <a:defRPr/>
@@ -602,14 +616,7 @@
               </a:rPr>
               <a:t>- Folie 16: Da fehlt noch das Fazit aus deiner Evaluierung bzw. Bewertung deines Tools gemessen an dem, was du damit gemacht hast.</a:t>
             </a:r>
-            <a:endParaRPr lang="de-DE" sz="1200" b="0" i="0" u="none" strike="noStrike" cap="none" spc="0">
-              <a:solidFill>
-                <a:schemeClr val="tx1"/>
-              </a:solidFill>
-              <a:latin typeface="Palatino Linotype"/>
-              <a:ea typeface="Palatino Linotype"/>
-              <a:cs typeface="Palatino Linotype"/>
-            </a:endParaRPr>
+            <a:endParaRPr/>
           </a:p>
         </p:txBody>
       </p:sp>
@@ -1435,6 +1442,95 @@
       </p:grpSpPr>
       <p:sp>
         <p:nvSpPr>
+          <p:cNvPr id="1142653141" name="Slide Image Placeholder 1" hidden="0"/>
+          <p:cNvSpPr>
+            <a:spLocks noChangeAspect="1" noGrp="1" noRot="1"/>
+          </p:cNvSpPr>
+          <p:nvPr isPhoto="0" userDrawn="0">
+            <p:ph type="sldImg" hasCustomPrompt="0"/>
+          </p:nvPr>
+        </p:nvSpPr>
+        <p:spPr bwMode="auto"/>
+      </p:sp>
+      <p:sp>
+        <p:nvSpPr>
+          <p:cNvPr id="459416605" name="Notes Placeholder 2" hidden="0"/>
+          <p:cNvSpPr>
+            <a:spLocks noGrp="1"/>
+          </p:cNvSpPr>
+          <p:nvPr isPhoto="0" userDrawn="0">
+            <p:ph type="body" idx="1" hasCustomPrompt="0"/>
+          </p:nvPr>
+        </p:nvSpPr>
+        <p:spPr bwMode="auto"/>
+        <p:txBody>
+          <a:bodyPr/>
+          <a:lstStyle/>
+          <a:p>
+            <a:pPr>
+              <a:defRPr/>
+            </a:pPr>
+            <a:r>
+              <a:rPr lang="de-DE" sz="1200" b="0" i="0" u="none" strike="noStrike" cap="none" spc="0">
+                <a:solidFill>
+                  <a:schemeClr val="tx1"/>
+                </a:solidFill>
+                <a:latin typeface="Palatino Linotype"/>
+                <a:ea typeface="Palatino Linotype"/>
+                <a:cs typeface="Palatino Linotype"/>
+              </a:rPr>
+              <a:t>- Ich vermisse ein wenig die Vorstellung der Sprachfeatures und deren Besonderheiten</a:t>
+            </a:r>
+            <a:endParaRPr/>
+          </a:p>
+        </p:txBody>
+      </p:sp>
+      <p:sp>
+        <p:nvSpPr>
+          <p:cNvPr id="1351282617" name="Slide Number Placeholder 3" hidden="0"/>
+          <p:cNvSpPr>
+            <a:spLocks noGrp="1"/>
+          </p:cNvSpPr>
+          <p:nvPr isPhoto="0" userDrawn="0">
+            <p:ph type="sldNum" sz="quarter" idx="10" hasCustomPrompt="0"/>
+          </p:nvPr>
+        </p:nvSpPr>
+        <p:spPr bwMode="auto"/>
+        <p:txBody>
+          <a:bodyPr/>
+          <a:lstStyle/>
+          <a:p>
+            <a:pPr>
+              <a:defRPr/>
+            </a:pPr>
+            <a:endParaRPr/>
+          </a:p>
+        </p:txBody>
+      </p:sp>
+    </p:spTree>
+  </p:cSld>
+</p:notes>
+</file>
+
+<file path=ppt/notesSlides/notesSlide8.xml><?xml version="1.0" encoding="utf-8"?>
+<p:notes xmlns:a="http://schemas.openxmlformats.org/drawingml/2006/main" xmlns:r="http://schemas.openxmlformats.org/officeDocument/2006/relationships" xmlns:p="http://schemas.openxmlformats.org/presentationml/2006/main" xmlns:m="http://schemas.openxmlformats.org/officeDocument/2006/math" xmlns:w="http://schemas.openxmlformats.org/wordprocessingml/2006/main">
+  <p:cSld name="">
+    <p:spTree>
+      <p:nvGrpSpPr>
+        <p:cNvPr id="1" name="" hidden="0"/>
+        <p:cNvGrpSpPr/>
+        <p:nvPr isPhoto="0" userDrawn="0"/>
+      </p:nvGrpSpPr>
+      <p:grpSpPr bwMode="auto">
+        <a:xfrm>
+          <a:off x="0" y="0"/>
+          <a:ext cx="0" cy="0"/>
+          <a:chOff x="0" y="0"/>
+          <a:chExt cx="0" cy="0"/>
+        </a:xfrm>
+      </p:grpSpPr>
+      <p:sp>
+        <p:nvSpPr>
           <p:cNvPr id="2002792847" name="Slide Image Placeholder 1" hidden="0"/>
           <p:cNvSpPr>
             <a:spLocks noChangeAspect="1" noGrp="1" noRot="1"/>
@@ -1469,11 +1565,123 @@
             </a:r>
             <a:endParaRPr/>
           </a:p>
+          <a:p>
+            <a:pPr>
+              <a:defRPr/>
+            </a:pPr>
+            <a:endParaRPr/>
+          </a:p>
+          <a:p>
+            <a:pPr>
+              <a:defRPr/>
+            </a:pPr>
+            <a:r>
+              <a:rPr lang="de-DE" sz="1200" b="0" i="0" u="none" strike="noStrike" cap="none" spc="0">
+                <a:solidFill>
+                  <a:schemeClr val="tx1"/>
+                </a:solidFill>
+                <a:latin typeface="Palatino Linotype"/>
+                <a:ea typeface="Palatino Linotype"/>
+                <a:cs typeface="Palatino Linotype"/>
+              </a:rPr>
+              <a:t>- Folie 10: Inwiefern verhindert das einen Single-Point-of-failure?</a:t>
+            </a:r>
+            <a:endParaRPr/>
+          </a:p>
         </p:txBody>
       </p:sp>
       <p:sp>
         <p:nvSpPr>
           <p:cNvPr id="1255829888" name="Slide Number Placeholder 3" hidden="0"/>
+          <p:cNvSpPr>
+            <a:spLocks noGrp="1"/>
+          </p:cNvSpPr>
+          <p:nvPr isPhoto="0" userDrawn="0">
+            <p:ph type="sldNum" sz="quarter" idx="10" hasCustomPrompt="0"/>
+          </p:nvPr>
+        </p:nvSpPr>
+        <p:spPr bwMode="auto"/>
+        <p:txBody>
+          <a:bodyPr/>
+          <a:lstStyle/>
+          <a:p>
+            <a:pPr>
+              <a:defRPr/>
+            </a:pPr>
+            <a:endParaRPr/>
+          </a:p>
+        </p:txBody>
+      </p:sp>
+    </p:spTree>
+  </p:cSld>
+</p:notes>
+</file>
+
+<file path=ppt/notesSlides/notesSlide9.xml><?xml version="1.0" encoding="utf-8"?>
+<p:notes xmlns:a="http://schemas.openxmlformats.org/drawingml/2006/main" xmlns:r="http://schemas.openxmlformats.org/officeDocument/2006/relationships" xmlns:p="http://schemas.openxmlformats.org/presentationml/2006/main" xmlns:m="http://schemas.openxmlformats.org/officeDocument/2006/math" xmlns:w="http://schemas.openxmlformats.org/wordprocessingml/2006/main">
+  <p:cSld name="">
+    <p:spTree>
+      <p:nvGrpSpPr>
+        <p:cNvPr id="1" name="" hidden="0"/>
+        <p:cNvGrpSpPr/>
+        <p:nvPr isPhoto="0" userDrawn="0"/>
+      </p:nvGrpSpPr>
+      <p:grpSpPr bwMode="auto">
+        <a:xfrm>
+          <a:off x="0" y="0"/>
+          <a:ext cx="0" cy="0"/>
+          <a:chOff x="0" y="0"/>
+          <a:chExt cx="0" cy="0"/>
+        </a:xfrm>
+      </p:grpSpPr>
+      <p:sp>
+        <p:nvSpPr>
+          <p:cNvPr id="2" name="Slide Image Placeholder 1" hidden="0"/>
+          <p:cNvSpPr>
+            <a:spLocks noChangeAspect="1" noGrp="1" noRot="1"/>
+          </p:cNvSpPr>
+          <p:nvPr isPhoto="0" userDrawn="0">
+            <p:ph type="sldImg" hasCustomPrompt="0"/>
+          </p:nvPr>
+        </p:nvSpPr>
+        <p:spPr bwMode="auto"/>
+      </p:sp>
+      <p:sp>
+        <p:nvSpPr>
+          <p:cNvPr id="3" name="Notes Placeholder 2" hidden="0"/>
+          <p:cNvSpPr>
+            <a:spLocks noGrp="1"/>
+          </p:cNvSpPr>
+          <p:nvPr isPhoto="0" userDrawn="0">
+            <p:ph type="body" idx="1" hasCustomPrompt="0"/>
+          </p:nvPr>
+        </p:nvSpPr>
+        <p:spPr bwMode="auto"/>
+        <p:txBody>
+          <a:bodyPr/>
+          <a:lstStyle/>
+          <a:p>
+            <a:pPr>
+              <a:defRPr/>
+            </a:pPr>
+            <a:r>
+              <a:rPr lang="de-DE" sz="1200" b="0" i="0" u="none" strike="noStrike" cap="none" spc="0">
+                <a:solidFill>
+                  <a:schemeClr val="tx1"/>
+                </a:solidFill>
+                <a:latin typeface="Palatino Linotype"/>
+                <a:ea typeface="Palatino Linotype"/>
+                <a:cs typeface="Palatino Linotype"/>
+              </a:rPr>
+              <a:t>- Was hast du für die Demo geplant? Ich hoffe, du gehst da detailliert auf die ganzen Features deiner Sprachen ein: Primereferenzen, Verschachtelung, Enablen/Disablen von Screenshots, Checks etc.</a:t>
+            </a:r>
+            <a:endParaRPr/>
+          </a:p>
+        </p:txBody>
+      </p:sp>
+      <p:sp>
+        <p:nvSpPr>
+          <p:cNvPr id="4" name="Slide Number Placeholder 3" hidden="0"/>
           <p:cNvSpPr>
             <a:spLocks noGrp="1"/>
           </p:cNvSpPr>
@@ -7785,6 +7993,151 @@
       </p:grpSpPr>
       <p:sp>
         <p:nvSpPr>
+          <p:cNvPr id="53415977" name="Título 1" hidden="0"/>
+          <p:cNvSpPr>
+            <a:spLocks noGrp="1"/>
+          </p:cNvSpPr>
+          <p:nvPr isPhoto="0" userDrawn="0">
+            <p:ph type="title" hasCustomPrompt="0"/>
+          </p:nvPr>
+        </p:nvSpPr>
+        <p:spPr bwMode="auto"/>
+        <p:txBody>
+          <a:bodyPr/>
+          <a:lstStyle/>
+          <a:p>
+            <a:pPr>
+              <a:defRPr/>
+            </a:pPr>
+            <a:r>
+              <a:rPr lang="de-DE"/>
+              <a:t>Methodologie</a:t>
+            </a:r>
+            <a:br>
+              <a:rPr lang="de-DE"/>
+            </a:br>
+            <a:r>
+              <a:rPr lang="de-DE" sz="1600" i="1"/>
+              <a:t>graphische DSL aus </a:t>
+            </a:r>
+            <a:r>
+              <a:rPr lang="de-DE" sz="1600" i="1">
+                <a:latin typeface="URW Bookman"/>
+                <a:ea typeface="URW Bookman"/>
+                <a:cs typeface="URW Bookman"/>
+              </a:rPr>
+              <a:t>Cinco</a:t>
+            </a:r>
+            <a:r>
+              <a:rPr lang="de-DE" sz="1600" i="1"/>
+              <a:t> Metasprachen - technisches Detail</a:t>
+            </a:r>
+            <a:endParaRPr/>
+          </a:p>
+        </p:txBody>
+      </p:sp>
+      <p:sp>
+        <p:nvSpPr>
+          <p:cNvPr id="1975793017" name="Content Placeholder 2" hidden="0"/>
+          <p:cNvSpPr>
+            <a:spLocks noGrp="1"/>
+          </p:cNvSpPr>
+          <p:nvPr isPhoto="0" userDrawn="0">
+            <p:ph idx="1" hasCustomPrompt="0"/>
+          </p:nvPr>
+        </p:nvSpPr>
+        <p:spPr bwMode="auto">
+          <a:xfrm flipH="0" flipV="0">
+            <a:off x="1534695" y="2015731"/>
+            <a:ext cx="9520157" cy="1891960"/>
+          </a:xfrm>
+        </p:spPr>
+        <p:txBody>
+          <a:bodyPr anchor="t"/>
+          <a:lstStyle/>
+          <a:p>
+            <a:pPr>
+              <a:defRPr/>
+            </a:pPr>
+            <a:r>
+              <a:rPr/>
+              <a:t>Verwendung von Selenium-Java und VuePress, um einen Dokumentationstext mit Bildern in Markdownformat zu erstellen</a:t>
+            </a:r>
+            <a:endParaRPr/>
+          </a:p>
+          <a:p>
+            <a:pPr>
+              <a:defRPr/>
+            </a:pPr>
+            <a:r>
+              <a:rPr/>
+              <a:t>Separates Erzeugen der Texte und der Screenshots wird bevorzugt, um Single-Point-of-failure zu </a:t>
+            </a:r>
+            <a:r>
+              <a:rPr lang="de-DE"/>
+              <a:t>vermeiden</a:t>
+            </a:r>
+            <a:endParaRPr/>
+          </a:p>
+        </p:txBody>
+      </p:sp>
+      <p:pic>
+        <p:nvPicPr>
+          <p:cNvPr id="586522987" name="" hidden="0"/>
+          <p:cNvPicPr>
+            <a:picLocks noChangeAspect="1"/>
+          </p:cNvPicPr>
+          <p:nvPr isPhoto="0" userDrawn="0"/>
+        </p:nvPicPr>
+        <p:blipFill>
+          <a:blip r:embed="rId3"/>
+          <a:stretch/>
+        </p:blipFill>
+        <p:spPr bwMode="auto">
+          <a:xfrm rot="0" flipH="0" flipV="0">
+            <a:off x="3605095" y="3378843"/>
+            <a:ext cx="5739875" cy="2403879"/>
+          </a:xfrm>
+          <a:prstGeom prst="rect">
+            <a:avLst/>
+          </a:prstGeom>
+        </p:spPr>
+      </p:pic>
+    </p:spTree>
+  </p:cSld>
+  <p:clrMapOvr>
+    <a:masterClrMapping/>
+  </p:clrMapOvr>
+  <mc:AlternateContent xmlns:mc="http://schemas.openxmlformats.org/markup-compatibility/2006">
+    <mc:Choice xmlns:p14="http://schemas.microsoft.com/office/powerpoint/2010/main" Requires="p14">
+      <p:transition p14:dur="2000" advClick="1"/>
+    </mc:Choice>
+    <mc:Fallback>
+      <p:transition advClick="1"/>
+    </mc:Fallback>
+  </mc:AlternateContent>
+</p:sld>
+</file>
+
+<file path=ppt/slides/slide11.xml><?xml version="1.0" encoding="utf-8"?>
+<p:sld xmlns:a="http://schemas.openxmlformats.org/drawingml/2006/main" xmlns:r="http://schemas.openxmlformats.org/officeDocument/2006/relationships" xmlns:p="http://schemas.openxmlformats.org/presentationml/2006/main" xmlns:m="http://schemas.openxmlformats.org/officeDocument/2006/math" xmlns:w="http://schemas.openxmlformats.org/wordprocessingml/2006/main" showMasterPhAnim="0" show="1">
+  <p:cSld name="">
+    <p:spTree>
+      <p:nvGrpSpPr>
+        <p:cNvPr id="1" name="" hidden="0"/>
+        <p:cNvGrpSpPr/>
+        <p:nvPr isPhoto="0" userDrawn="0"/>
+      </p:nvGrpSpPr>
+      <p:grpSpPr bwMode="auto">
+        <a:xfrm>
+          <a:off x="0" y="0"/>
+          <a:ext cx="0" cy="0"/>
+          <a:chOff x="0" y="0"/>
+          <a:chExt cx="0" cy="0"/>
+        </a:xfrm>
+      </p:grpSpPr>
+      <p:sp>
+        <p:nvSpPr>
           <p:cNvPr id="564735652" name="Title 1" hidden="0"/>
           <p:cNvSpPr>
             <a:spLocks noGrp="1"/>
@@ -8063,7 +8416,7 @@
 </p:sld>
 </file>
 
-<file path=ppt/slides/slide11.xml><?xml version="1.0" encoding="utf-8"?>
+<file path=ppt/slides/slide12.xml><?xml version="1.0" encoding="utf-8"?>
 <p:sld xmlns:a="http://schemas.openxmlformats.org/drawingml/2006/main" xmlns:r="http://schemas.openxmlformats.org/officeDocument/2006/relationships" xmlns:p="http://schemas.openxmlformats.org/presentationml/2006/main" xmlns:m="http://schemas.openxmlformats.org/officeDocument/2006/math" xmlns:w="http://schemas.openxmlformats.org/wordprocessingml/2006/main" showMasterPhAnim="0" show="1">
   <p:cSld name="">
     <p:spTree>
@@ -8204,7 +8557,7 @@
 </p:sld>
 </file>
 
-<file path=ppt/slides/slide12.xml><?xml version="1.0" encoding="utf-8"?>
+<file path=ppt/slides/slide13.xml><?xml version="1.0" encoding="utf-8"?>
 <p:sld xmlns:a="http://schemas.openxmlformats.org/drawingml/2006/main" xmlns:r="http://schemas.openxmlformats.org/officeDocument/2006/relationships" xmlns:p="http://schemas.openxmlformats.org/presentationml/2006/main" xmlns:m="http://schemas.openxmlformats.org/officeDocument/2006/math" xmlns:w="http://schemas.openxmlformats.org/wordprocessingml/2006/main" showMasterPhAnim="0" show="1">
   <p:cSld name="">
     <p:spTree>
@@ -8333,7 +8686,7 @@
 </p:sld>
 </file>
 
-<file path=ppt/slides/slide13.xml><?xml version="1.0" encoding="utf-8"?>
+<file path=ppt/slides/slide14.xml><?xml version="1.0" encoding="utf-8"?>
 <p:sld xmlns:a="http://schemas.openxmlformats.org/drawingml/2006/main" xmlns:r="http://schemas.openxmlformats.org/officeDocument/2006/relationships" xmlns:p="http://schemas.openxmlformats.org/presentationml/2006/main" xmlns:m="http://schemas.openxmlformats.org/officeDocument/2006/math" xmlns:w="http://schemas.openxmlformats.org/wordprocessingml/2006/main" showMasterPhAnim="0" show="1">
   <p:cSld name="">
     <p:spTree>
@@ -8464,7 +8817,7 @@
 </p:sld>
 </file>
 
-<file path=ppt/slides/slide14.xml><?xml version="1.0" encoding="utf-8"?>
+<file path=ppt/slides/slide15.xml><?xml version="1.0" encoding="utf-8"?>
 <p:sld xmlns:a="http://schemas.openxmlformats.org/drawingml/2006/main" xmlns:r="http://schemas.openxmlformats.org/officeDocument/2006/relationships" xmlns:p="http://schemas.openxmlformats.org/presentationml/2006/main" xmlns:m="http://schemas.openxmlformats.org/officeDocument/2006/math" xmlns:w="http://schemas.openxmlformats.org/wordprocessingml/2006/main" showMasterPhAnim="0" show="1">
   <p:cSld name="">
     <p:bg>
@@ -8549,7 +8902,7 @@
           <p:nvPr isPhoto="0" userDrawn="0"/>
         </p:nvPicPr>
         <p:blipFill>
-          <a:blip r:embed="rId2"/>
+          <a:blip r:embed="rId3"/>
           <a:stretch/>
         </p:blipFill>
         <p:spPr bwMode="auto">
@@ -8562,90 +8915,6 @@
           </a:prstGeom>
         </p:spPr>
       </p:pic>
-    </p:spTree>
-  </p:cSld>
-  <p:clrMapOvr>
-    <a:masterClrMapping/>
-  </p:clrMapOvr>
-  <mc:AlternateContent xmlns:mc="http://schemas.openxmlformats.org/markup-compatibility/2006">
-    <mc:Choice xmlns:p14="http://schemas.microsoft.com/office/powerpoint/2010/main" Requires="p14">
-      <p:transition p14:dur="2000" advClick="1"/>
-    </mc:Choice>
-    <mc:Fallback>
-      <p:transition advClick="1"/>
-    </mc:Fallback>
-  </mc:AlternateContent>
-</p:sld>
-</file>
-
-<file path=ppt/slides/slide15.xml><?xml version="1.0" encoding="utf-8"?>
-<p:sld xmlns:a="http://schemas.openxmlformats.org/drawingml/2006/main" xmlns:r="http://schemas.openxmlformats.org/officeDocument/2006/relationships" xmlns:p="http://schemas.openxmlformats.org/presentationml/2006/main" xmlns:m="http://schemas.openxmlformats.org/officeDocument/2006/math" xmlns:w="http://schemas.openxmlformats.org/wordprocessingml/2006/main" showMasterPhAnim="0" show="1">
-  <p:cSld name="">
-    <p:spTree>
-      <p:nvGrpSpPr>
-        <p:cNvPr id="1" name="" hidden="0"/>
-        <p:cNvGrpSpPr/>
-        <p:nvPr isPhoto="0" userDrawn="0"/>
-      </p:nvGrpSpPr>
-      <p:grpSpPr bwMode="auto">
-        <a:xfrm>
-          <a:off x="0" y="0"/>
-          <a:ext cx="0" cy="0"/>
-          <a:chOff x="0" y="0"/>
-          <a:chExt cx="0" cy="0"/>
-        </a:xfrm>
-      </p:grpSpPr>
-      <p:sp>
-        <p:nvSpPr>
-          <p:cNvPr id="491240005" name="Título 1" hidden="0"/>
-          <p:cNvSpPr>
-            <a:spLocks noGrp="1"/>
-          </p:cNvSpPr>
-          <p:nvPr isPhoto="0" userDrawn="0">
-            <p:ph type="title" hasCustomPrompt="0"/>
-          </p:nvPr>
-        </p:nvSpPr>
-        <p:spPr bwMode="auto"/>
-        <p:txBody>
-          <a:bodyPr/>
-          <a:lstStyle/>
-          <a:p>
-            <a:pPr>
-              <a:defRPr/>
-            </a:pPr>
-            <a:r>
-              <a:rPr lang="de-DE"/>
-              <a:t>Künftige Arbeiten</a:t>
-            </a:r>
-            <a:br>
-              <a:rPr lang="de-DE"/>
-            </a:br>
-            <a:endParaRPr sz="1800"/>
-          </a:p>
-        </p:txBody>
-      </p:sp>
-      <p:sp>
-        <p:nvSpPr>
-          <p:cNvPr id="835041238" name="Marcador de contenido 2" hidden="0"/>
-          <p:cNvSpPr>
-            <a:spLocks noGrp="1"/>
-          </p:cNvSpPr>
-          <p:nvPr isPhoto="0" userDrawn="0">
-            <p:ph idx="1" hasCustomPrompt="0"/>
-          </p:nvPr>
-        </p:nvSpPr>
-        <p:spPr bwMode="auto"/>
-        <p:txBody>
-          <a:bodyPr/>
-          <a:lstStyle/>
-          <a:p>
-            <a:pPr>
-              <a:defRPr/>
-            </a:pPr>
-            <a:endParaRPr/>
-          </a:p>
-        </p:txBody>
-      </p:sp>
     </p:spTree>
   </p:cSld>
   <p:clrMapOvr>
@@ -8681,7 +8950,7 @@
       </p:grpSpPr>
       <p:sp>
         <p:nvSpPr>
-          <p:cNvPr id="653499456" name="Título 1" hidden="0"/>
+          <p:cNvPr id="491240005" name="Título 1" hidden="0"/>
           <p:cNvSpPr>
             <a:spLocks noGrp="1"/>
           </p:cNvSpPr>
@@ -8699,18 +8968,18 @@
             </a:pPr>
             <a:r>
               <a:rPr lang="de-DE"/>
-              <a:t>Fazit</a:t>
+              <a:t>Künftige Arbeiten</a:t>
             </a:r>
             <a:br>
               <a:rPr lang="de-DE"/>
             </a:br>
-            <a:endParaRPr sz="1600"/>
-          </a:p>
-        </p:txBody>
-      </p:sp>
-      <p:sp>
-        <p:nvSpPr>
-          <p:cNvPr id="751158943" name="Marcador de contenido 2" hidden="0"/>
+            <a:endParaRPr sz="1800"/>
+          </a:p>
+        </p:txBody>
+      </p:sp>
+      <p:sp>
+        <p:nvSpPr>
+          <p:cNvPr id="835041238" name="Marcador de contenido 2" hidden="0"/>
           <p:cNvSpPr>
             <a:spLocks noGrp="1"/>
           </p:cNvSpPr>
@@ -8720,14 +8989,16 @@
         </p:nvSpPr>
         <p:spPr bwMode="auto"/>
         <p:txBody>
-          <a:bodyPr/>
+          <a:bodyPr vertOverflow="overflow" horzOverflow="clip" vert="horz" wrap="square" lIns="91440" tIns="45720" rIns="91440" bIns="45720" numCol="1" spcCol="0" rtlCol="0" fromWordArt="0" anchor="t" anchorCtr="0" forceAA="0" upright="0" compatLnSpc="0">
+            <a:normAutofit fontScale="90000" lnSpcReduction="2000"/>
+          </a:bodyPr>
           <a:lstStyle/>
           <a:p>
             <a:pPr>
               <a:defRPr/>
             </a:pPr>
             <a:r>
-              <a:rPr lang="de-DE" sz="2000" b="0" i="0" u="none" strike="noStrike" cap="none" spc="0">
+              <a:rPr lang="en-US" sz="2000" b="0" i="0" u="none" strike="noStrike" cap="none" spc="0">
                 <a:solidFill>
                   <a:schemeClr val="tx1"/>
                 </a:solidFill>
@@ -8735,9 +9006,20 @@
                 <a:ea typeface="Palatino Linotype"/>
                 <a:cs typeface="Palatino Linotype"/>
               </a:rPr>
-              <a:t>DSL-getriebene Generierung von Endbenutzerdokumentation für Webanwendungen auf der Basis von Graphenmodellen unter Verwendung einer grafischen DSL</a:t>
-            </a:r>
-            <a:endParaRPr lang="de-DE" sz="2000" b="0" i="0" u="none" strike="noStrike" cap="none" spc="0">
+              <a:t>facilitate the creation process by gener</a:t>
+            </a:r>
+            <a:r>
+              <a:rPr lang="en-US" sz="2000" b="0" i="0" u="none" strike="noStrike" cap="none" spc="0">
+                <a:solidFill>
+                  <a:schemeClr val="tx1"/>
+                </a:solidFill>
+                <a:latin typeface="Palatino Linotype"/>
+                <a:ea typeface="Palatino Linotype"/>
+                <a:cs typeface="Palatino Linotype"/>
+              </a:rPr>
+              <a:t>ating a project template containing a start configuration</a:t>
+            </a:r>
+            <a:endParaRPr lang="en-US" sz="2000" b="0" i="0" u="none" strike="noStrike" cap="none" spc="0">
               <a:solidFill>
                 <a:schemeClr val="tx1"/>
               </a:solidFill>
@@ -8751,7 +9033,7 @@
               <a:defRPr/>
             </a:pPr>
             <a:r>
-              <a:rPr lang="de-DE" sz="2000" b="0" i="0" u="none" strike="noStrike" cap="none" spc="0">
+              <a:rPr lang="en-US" sz="2000" b="0" i="0" u="none" strike="noStrike" cap="none" spc="0">
                 <a:solidFill>
                   <a:schemeClr val="tx1"/>
                 </a:solidFill>
@@ -8759,9 +9041,53 @@
                 <a:ea typeface="Palatino Linotype"/>
                 <a:cs typeface="Palatino Linotype"/>
               </a:rPr>
-              <a:t>Erstellung einer Editoranwendung, die es dem Dokumentationsdesigner ermöglicht grafische Diagramme zu erstellen, die den erforderlichen Benutzer-Workflow veranschaulichen</a:t>
-            </a:r>
-            <a:endParaRPr lang="de-DE" sz="2000" b="0" i="0" u="none" strike="noStrike" cap="none" spc="0">
+              <a:t>cross-referencing DocGraphModels inside others could be improved in</a:t>
+            </a:r>
+            <a:r>
+              <a:rPr lang="en-US" sz="2000" b="0" i="0" u="none" strike="noStrike" cap="none" spc="0">
+                <a:solidFill>
+                  <a:schemeClr val="tx1"/>
+                </a:solidFill>
+                <a:latin typeface="Palatino Linotype"/>
+                <a:ea typeface="Palatino Linotype"/>
+                <a:cs typeface="Palatino Linotype"/>
+              </a:rPr>
+              <a:t> </a:t>
+            </a:r>
+            <a:r>
+              <a:rPr lang="en-US" sz="2000" b="0" i="0" u="none" strike="noStrike" cap="none" spc="0">
+                <a:solidFill>
+                  <a:schemeClr val="tx1"/>
+                </a:solidFill>
+                <a:latin typeface="Palatino Linotype"/>
+                <a:ea typeface="Palatino Linotype"/>
+                <a:cs typeface="Palatino Linotype"/>
+              </a:rPr>
+              <a:t>the future to allow us, for example, to list all available graph models in a separate</a:t>
+            </a:r>
+            <a:r>
+              <a:rPr lang="en-US" sz="2000" b="0" i="0" u="none" strike="noStrike" cap="none" spc="0">
+                <a:solidFill>
+                  <a:schemeClr val="tx1"/>
+                </a:solidFill>
+                <a:latin typeface="Palatino Linotype"/>
+                <a:ea typeface="Palatino Linotype"/>
+                <a:cs typeface="Palatino Linotype"/>
+              </a:rPr>
+              <a:t> </a:t>
+            </a:r>
+            <a:r>
+              <a:rPr lang="en-US" sz="2000" b="0" i="0" u="none" strike="noStrike" cap="none" spc="0">
+                <a:solidFill>
+                  <a:schemeClr val="tx1"/>
+                </a:solidFill>
+                <a:latin typeface="Palatino Linotype"/>
+                <a:ea typeface="Palatino Linotype"/>
+                <a:cs typeface="Palatino Linotype"/>
+              </a:rPr>
+              <a:t>view</a:t>
+            </a:r>
+            <a:endParaRPr lang="en-US" sz="2000" b="0" i="0" u="none" strike="noStrike" cap="none" spc="0">
               <a:solidFill>
                 <a:schemeClr val="tx1"/>
               </a:solidFill>
@@ -8775,7 +9101,7 @@
               <a:defRPr/>
             </a:pPr>
             <a:r>
-              <a:rPr lang="de-DE" sz="2000" b="0" i="0" u="none" strike="noStrike" cap="none" spc="0">
+              <a:rPr lang="en-US" sz="2000" b="0" i="0" u="none" strike="noStrike" cap="none" spc="0">
                 <a:solidFill>
                   <a:schemeClr val="tx1"/>
                 </a:solidFill>
@@ -8783,10 +9109,10 @@
                 <a:ea typeface="Palatino Linotype"/>
                 <a:cs typeface="Palatino Linotype"/>
               </a:rPr>
-              <a:t>Mithilfe von </a:t>
-            </a:r>
-            <a:r>
-              <a:rPr lang="de-DE" sz="2000" b="0" i="0" u="none" strike="noStrike" cap="none" spc="0">
+              <a:t> implement more checks to</a:t>
+            </a:r>
+            <a:r>
+              <a:rPr lang="en-US" sz="2000" b="0" i="0" u="none" strike="noStrike" cap="none" spc="0">
                 <a:solidFill>
                   <a:schemeClr val="tx1"/>
                 </a:solidFill>
@@ -8794,10 +9120,10 @@
                 <a:ea typeface="Palatino Linotype"/>
                 <a:cs typeface="Palatino Linotype"/>
               </a:rPr>
-              <a:t>Drittanbietern</a:t>
-            </a:r>
-            <a:r>
-              <a:rPr lang="de-DE" sz="2000" b="0" i="0" u="none" strike="noStrike" cap="none" spc="0">
+              <a:t> validate some other aspects of the model: validate</a:t>
+            </a:r>
+            <a:r>
+              <a:rPr lang="en-US" sz="2000" b="0" i="0" u="none" strike="noStrike" cap="none" spc="0">
                 <a:solidFill>
                   <a:schemeClr val="tx1"/>
                 </a:solidFill>
@@ -8805,10 +9131,10 @@
                 <a:ea typeface="Palatino Linotype"/>
                 <a:cs typeface="Palatino Linotype"/>
               </a:rPr>
-              <a:t>-Tools</a:t>
-            </a:r>
-            <a:r>
-              <a:rPr lang="de-DE" sz="2000" b="0" i="0" u="none" strike="noStrike" cap="none" spc="0">
+              <a:t> </a:t>
+            </a:r>
+            <a:r>
+              <a:rPr lang="en-US" sz="2000" b="0" i="0" u="none" strike="noStrike" cap="none" spc="0">
                 <a:solidFill>
                   <a:schemeClr val="tx1"/>
                 </a:solidFill>
@@ -8816,9 +9142,93 @@
                 <a:ea typeface="Palatino Linotype"/>
                 <a:cs typeface="Palatino Linotype"/>
               </a:rPr>
-              <a:t> konnten wir eine gut strukturierte und voll funktionsfähige Dokumentation-Website zu erstellen</a:t>
-            </a:r>
-            <a:endParaRPr lang="de-DE"/>
+              <a:t>that the Web element selectors have the correct syntax of CSS</a:t>
+            </a:r>
+            <a:r>
+              <a:rPr lang="en-US" sz="2000" b="0" i="0" u="none" strike="noStrike" cap="none" spc="0">
+                <a:solidFill>
+                  <a:schemeClr val="tx1"/>
+                </a:solidFill>
+                <a:latin typeface="Palatino Linotype"/>
+                <a:ea typeface="Palatino Linotype"/>
+                <a:cs typeface="Palatino Linotype"/>
+              </a:rPr>
+              <a:t> </a:t>
+            </a:r>
+            <a:r>
+              <a:rPr lang="en-US" sz="2000" b="0" i="0" u="none" strike="noStrike" cap="none" spc="0">
+                <a:solidFill>
+                  <a:schemeClr val="tx1"/>
+                </a:solidFill>
+                <a:latin typeface="Palatino Linotype"/>
+                <a:ea typeface="Palatino Linotype"/>
+                <a:cs typeface="Palatino Linotype"/>
+              </a:rPr>
+              <a:t>selectors or XPath</a:t>
+            </a:r>
+            <a:r>
+              <a:rPr lang="en-US" sz="2000" b="0" i="0" u="none" strike="noStrike" cap="none" spc="0">
+                <a:solidFill>
+                  <a:schemeClr val="tx1"/>
+                </a:solidFill>
+                <a:latin typeface="Palatino Linotype"/>
+                <a:ea typeface="Palatino Linotype"/>
+                <a:cs typeface="Palatino Linotype"/>
+              </a:rPr>
+              <a:t> We could even verify in advance if the HTML element we are looking</a:t>
+            </a:r>
+            <a:r>
+              <a:rPr lang="en-US" sz="2000" b="0" i="0" u="none" strike="noStrike" cap="none" spc="0">
+                <a:solidFill>
+                  <a:schemeClr val="tx1"/>
+                </a:solidFill>
+                <a:latin typeface="Palatino Linotype"/>
+                <a:ea typeface="Palatino Linotype"/>
+                <a:cs typeface="Palatino Linotype"/>
+              </a:rPr>
+              <a:t> </a:t>
+            </a:r>
+            <a:r>
+              <a:rPr lang="en-US" sz="2000" b="0" i="0" u="none" strike="noStrike" cap="none" spc="0">
+                <a:solidFill>
+                  <a:schemeClr val="tx1"/>
+                </a:solidFill>
+                <a:latin typeface="Palatino Linotype"/>
+                <a:ea typeface="Palatino Linotype"/>
+                <a:cs typeface="Palatino Linotype"/>
+              </a:rPr>
+              <a:t>for can be found with that given selector by running a selector query search in</a:t>
+            </a:r>
+            <a:r>
+              <a:rPr lang="en-US" sz="2000" b="0" i="0" u="none" strike="noStrike" cap="none" spc="0">
+                <a:solidFill>
+                  <a:schemeClr val="tx1"/>
+                </a:solidFill>
+                <a:latin typeface="Palatino Linotype"/>
+                <a:ea typeface="Palatino Linotype"/>
+                <a:cs typeface="Palatino Linotype"/>
+              </a:rPr>
+              <a:t> </a:t>
+            </a:r>
+            <a:r>
+              <a:rPr lang="en-US" sz="2000" b="0" i="0" u="none" strike="noStrike" cap="none" spc="0">
+                <a:solidFill>
+                  <a:schemeClr val="tx1"/>
+                </a:solidFill>
+                <a:latin typeface="Palatino Linotype"/>
+                <a:ea typeface="Palatino Linotype"/>
+                <a:cs typeface="Palatino Linotype"/>
+              </a:rPr>
+              <a:t>the background</a:t>
+            </a:r>
+            <a:endParaRPr lang="en-US" sz="2000" b="0" i="0" u="none" strike="noStrike" cap="none" spc="0">
+              <a:solidFill>
+                <a:schemeClr val="tx1"/>
+              </a:solidFill>
+              <a:latin typeface="Palatino Linotype"/>
+              <a:ea typeface="Palatino Linotype"/>
+              <a:cs typeface="Palatino Linotype"/>
+            </a:endParaRPr>
           </a:p>
         </p:txBody>
       </p:sp>
@@ -8839,6 +9249,182 @@
 </file>
 
 <file path=ppt/slides/slide17.xml><?xml version="1.0" encoding="utf-8"?>
+<p:sld xmlns:a="http://schemas.openxmlformats.org/drawingml/2006/main" xmlns:r="http://schemas.openxmlformats.org/officeDocument/2006/relationships" xmlns:p="http://schemas.openxmlformats.org/presentationml/2006/main" xmlns:m="http://schemas.openxmlformats.org/officeDocument/2006/math" xmlns:w="http://schemas.openxmlformats.org/wordprocessingml/2006/main" showMasterPhAnim="0" show="1">
+  <p:cSld name="">
+    <p:spTree>
+      <p:nvGrpSpPr>
+        <p:cNvPr id="1" name="" hidden="0"/>
+        <p:cNvGrpSpPr/>
+        <p:nvPr isPhoto="0" userDrawn="0"/>
+      </p:nvGrpSpPr>
+      <p:grpSpPr bwMode="auto">
+        <a:xfrm>
+          <a:off x="0" y="0"/>
+          <a:ext cx="0" cy="0"/>
+          <a:chOff x="0" y="0"/>
+          <a:chExt cx="0" cy="0"/>
+        </a:xfrm>
+      </p:grpSpPr>
+      <p:sp>
+        <p:nvSpPr>
+          <p:cNvPr id="653499456" name="Título 1" hidden="0"/>
+          <p:cNvSpPr>
+            <a:spLocks noGrp="1"/>
+          </p:cNvSpPr>
+          <p:nvPr isPhoto="0" userDrawn="0">
+            <p:ph type="title" hasCustomPrompt="0"/>
+          </p:nvPr>
+        </p:nvSpPr>
+        <p:spPr bwMode="auto"/>
+        <p:txBody>
+          <a:bodyPr/>
+          <a:lstStyle/>
+          <a:p>
+            <a:pPr>
+              <a:defRPr/>
+            </a:pPr>
+            <a:r>
+              <a:rPr lang="de-DE"/>
+              <a:t>Fazit</a:t>
+            </a:r>
+            <a:br>
+              <a:rPr lang="de-DE"/>
+            </a:br>
+            <a:endParaRPr sz="1600"/>
+          </a:p>
+        </p:txBody>
+      </p:sp>
+      <p:sp>
+        <p:nvSpPr>
+          <p:cNvPr id="751158943" name="Marcador de contenido 2" hidden="0"/>
+          <p:cNvSpPr>
+            <a:spLocks noGrp="1"/>
+          </p:cNvSpPr>
+          <p:nvPr isPhoto="0" userDrawn="0">
+            <p:ph idx="1" hasCustomPrompt="0"/>
+          </p:nvPr>
+        </p:nvSpPr>
+        <p:spPr bwMode="auto"/>
+        <p:txBody>
+          <a:bodyPr/>
+          <a:lstStyle/>
+          <a:p>
+            <a:pPr>
+              <a:defRPr/>
+            </a:pPr>
+            <a:r>
+              <a:rPr lang="de-DE" sz="2000" b="0" i="0" u="none" strike="noStrike" cap="none" spc="0">
+                <a:solidFill>
+                  <a:schemeClr val="tx1"/>
+                </a:solidFill>
+                <a:latin typeface="Palatino Linotype"/>
+                <a:ea typeface="Palatino Linotype"/>
+                <a:cs typeface="Palatino Linotype"/>
+              </a:rPr>
+              <a:t>DSL-getriebene Generierung von Endbenutzerdokumentation für Webanwendungen auf der Basis von Graphenmodellen unter Verwendung einer grafischen DSL</a:t>
+            </a:r>
+            <a:endParaRPr lang="de-DE" sz="2000" b="0" i="0" u="none" strike="noStrike" cap="none" spc="0">
+              <a:solidFill>
+                <a:schemeClr val="tx1"/>
+              </a:solidFill>
+              <a:latin typeface="Palatino Linotype"/>
+              <a:ea typeface="Palatino Linotype"/>
+              <a:cs typeface="Palatino Linotype"/>
+            </a:endParaRPr>
+          </a:p>
+          <a:p>
+            <a:pPr>
+              <a:defRPr/>
+            </a:pPr>
+            <a:r>
+              <a:rPr lang="de-DE" sz="2000" b="0" i="0" u="none" strike="noStrike" cap="none" spc="0">
+                <a:solidFill>
+                  <a:schemeClr val="tx1"/>
+                </a:solidFill>
+                <a:latin typeface="Palatino Linotype"/>
+                <a:ea typeface="Palatino Linotype"/>
+                <a:cs typeface="Palatino Linotype"/>
+              </a:rPr>
+              <a:t>Erstellung einer Editoranwendung, die es dem Dokumentationsdesigner ermöglicht grafische Diagramme zu erstellen, die den erforderlichen Benutzer-Workflow veranschaulichen</a:t>
+            </a:r>
+            <a:endParaRPr lang="de-DE" sz="2000" b="0" i="0" u="none" strike="noStrike" cap="none" spc="0">
+              <a:solidFill>
+                <a:schemeClr val="tx1"/>
+              </a:solidFill>
+              <a:latin typeface="Palatino Linotype"/>
+              <a:ea typeface="Palatino Linotype"/>
+              <a:cs typeface="Palatino Linotype"/>
+            </a:endParaRPr>
+          </a:p>
+          <a:p>
+            <a:pPr>
+              <a:defRPr/>
+            </a:pPr>
+            <a:r>
+              <a:rPr lang="de-DE" sz="2000" b="0" i="0" u="none" strike="noStrike" cap="none" spc="0">
+                <a:solidFill>
+                  <a:schemeClr val="tx1"/>
+                </a:solidFill>
+                <a:latin typeface="Palatino Linotype"/>
+                <a:ea typeface="Palatino Linotype"/>
+                <a:cs typeface="Palatino Linotype"/>
+              </a:rPr>
+              <a:t>Mithilfe von </a:t>
+            </a:r>
+            <a:r>
+              <a:rPr lang="de-DE" sz="2000" b="0" i="0" u="none" strike="noStrike" cap="none" spc="0">
+                <a:solidFill>
+                  <a:schemeClr val="tx1"/>
+                </a:solidFill>
+                <a:latin typeface="Palatino Linotype"/>
+                <a:ea typeface="Palatino Linotype"/>
+                <a:cs typeface="Palatino Linotype"/>
+              </a:rPr>
+              <a:t>Drittanbietern</a:t>
+            </a:r>
+            <a:r>
+              <a:rPr lang="de-DE" sz="2000" b="0" i="0" u="none" strike="noStrike" cap="none" spc="0">
+                <a:solidFill>
+                  <a:schemeClr val="tx1"/>
+                </a:solidFill>
+                <a:latin typeface="Palatino Linotype"/>
+                <a:ea typeface="Palatino Linotype"/>
+                <a:cs typeface="Palatino Linotype"/>
+              </a:rPr>
+              <a:t>-Tools</a:t>
+            </a:r>
+            <a:r>
+              <a:rPr lang="de-DE" sz="2000" b="0" i="0" u="none" strike="noStrike" cap="none" spc="0">
+                <a:solidFill>
+                  <a:schemeClr val="tx1"/>
+                </a:solidFill>
+                <a:latin typeface="Palatino Linotype"/>
+                <a:ea typeface="Palatino Linotype"/>
+                <a:cs typeface="Palatino Linotype"/>
+              </a:rPr>
+              <a:t> konnten wir eine gut strukturierte und voll funktionsfähige Dokumentation-Website zu erstellen</a:t>
+            </a:r>
+            <a:endParaRPr lang="de-DE"/>
+          </a:p>
+        </p:txBody>
+      </p:sp>
+    </p:spTree>
+  </p:cSld>
+  <p:clrMapOvr>
+    <a:masterClrMapping/>
+  </p:clrMapOvr>
+  <mc:AlternateContent xmlns:mc="http://schemas.openxmlformats.org/markup-compatibility/2006">
+    <mc:Choice xmlns:p14="http://schemas.microsoft.com/office/powerpoint/2010/main" Requires="p14">
+      <p:transition p14:dur="2000" advClick="1"/>
+    </mc:Choice>
+    <mc:Fallback>
+      <p:transition advClick="1"/>
+    </mc:Fallback>
+  </mc:AlternateContent>
+</p:sld>
+</file>
+
+<file path=ppt/slides/slide18.xml><?xml version="1.0" encoding="utf-8"?>
 <p:sld xmlns:a="http://schemas.openxmlformats.org/drawingml/2006/main" xmlns:r="http://schemas.openxmlformats.org/officeDocument/2006/relationships" xmlns:p="http://schemas.openxmlformats.org/presentationml/2006/main" xmlns:m="http://schemas.openxmlformats.org/officeDocument/2006/math" xmlns:w="http://schemas.openxmlformats.org/wordprocessingml/2006/main" showMasterPhAnim="0" show="1">
   <p:cSld name="">
     <p:spTree>
@@ -11143,7 +11729,7 @@
       </p:grpSpPr>
       <p:sp>
         <p:nvSpPr>
-          <p:cNvPr id="53415977" name="Título 1" hidden="0"/>
+          <p:cNvPr id="997314373" name="Título 1" hidden="0"/>
           <p:cNvSpPr>
             <a:spLocks noGrp="1"/>
           </p:cNvSpPr>
@@ -11161,34 +11747,22 @@
             </a:pPr>
             <a:r>
               <a:rPr lang="de-DE"/>
-              <a:t>Methodologie</a:t>
+              <a:t>Graphische DSL: .feat und .doc</a:t>
             </a:r>
             <a:br>
               <a:rPr lang="de-DE"/>
             </a:br>
             <a:r>
               <a:rPr lang="de-DE" sz="1600" i="1"/>
-              <a:t>graphische DSL aus </a:t>
-            </a:r>
-            <a:r>
-              <a:rPr lang="de-DE" sz="1600" i="1">
-                <a:latin typeface="URW Bookman"/>
-                <a:ea typeface="URW Bookman"/>
-                <a:cs typeface="URW Bookman"/>
-              </a:rPr>
-              <a:t>Cinco</a:t>
-            </a:r>
-            <a:r>
-              <a:rPr lang="de-DE" sz="1600" i="1"/>
-              <a:t> Metasprachen - technisches Detail</a:t>
-            </a:r>
-            <a:endParaRPr/>
-          </a:p>
-        </p:txBody>
-      </p:sp>
-      <p:sp>
-        <p:nvSpPr>
-          <p:cNvPr id="1975793017" name="Content Placeholder 2" hidden="0"/>
+              <a:t>Feature- und Dokumentationssprachen</a:t>
+            </a:r>
+            <a:endParaRPr/>
+          </a:p>
+        </p:txBody>
+      </p:sp>
+      <p:sp>
+        <p:nvSpPr>
+          <p:cNvPr id="1461394510" name="Content Placeholder 2" hidden="0"/>
           <p:cNvSpPr>
             <a:spLocks noGrp="1"/>
           </p:cNvSpPr>
@@ -11199,7 +11773,7 @@
         <p:spPr bwMode="auto">
           <a:xfrm flipH="0" flipV="0">
             <a:off x="1534695" y="2015731"/>
-            <a:ext cx="9520157" cy="1891960"/>
+            <a:ext cx="9520157" cy="474539"/>
           </a:xfrm>
         </p:spPr>
         <p:txBody>
@@ -11210,49 +11784,257 @@
               <a:defRPr/>
             </a:pPr>
             <a:r>
-              <a:rPr/>
-              <a:t>Verwendung von Selenium-Java und VuePress, um einen Dokumentationstext mit Bildern in Markdownformat zu erstellen</a:t>
-            </a:r>
-            <a:endParaRPr/>
-          </a:p>
-          <a:p>
-            <a:pPr>
-              <a:defRPr/>
-            </a:pPr>
-            <a:r>
-              <a:rPr/>
-              <a:t>Separates Erzeugen der Texte und der Screenshots wird bevorzugt, um Single-Point-of-failure zu </a:t>
-            </a:r>
-            <a:r>
-              <a:rPr lang="de-DE"/>
-              <a:t>vermeiden</a:t>
-            </a:r>
-            <a:endParaRPr/>
-          </a:p>
-        </p:txBody>
-      </p:sp>
-      <p:pic>
-        <p:nvPicPr>
-          <p:cNvPr id="586522987" name="" hidden="0"/>
-          <p:cNvPicPr>
-            <a:picLocks noChangeAspect="1"/>
-          </p:cNvPicPr>
+              <a:rPr lang="de-DE" sz="2000" b="0" i="0" u="none" strike="noStrike" cap="none" spc="0">
+                <a:solidFill>
+                  <a:schemeClr val="tx1"/>
+                </a:solidFill>
+                <a:latin typeface="Palatino Linotype"/>
+                <a:ea typeface="Arial"/>
+                <a:cs typeface="Arial"/>
+              </a:rPr>
+              <a:t>Meta Graph Language, Meta Style Language</a:t>
+            </a:r>
+            <a:endParaRPr lang="de-DE" sz="2000"/>
+          </a:p>
+        </p:txBody>
+      </p:sp>
+      <p:sp>
+        <p:nvSpPr>
+          <p:cNvPr id="1881502250" name="Content Placeholder 2" hidden="0"/>
+          <p:cNvSpPr>
+            <a:spLocks noGrp="1"/>
+          </p:cNvSpPr>
           <p:nvPr isPhoto="0" userDrawn="0"/>
-        </p:nvPicPr>
-        <p:blipFill>
-          <a:blip r:embed="rId3"/>
-          <a:stretch/>
-        </p:blipFill>
+        </p:nvSpPr>
         <p:spPr bwMode="auto">
-          <a:xfrm rot="0" flipH="0" flipV="0">
-            <a:off x="3605095" y="3378843"/>
-            <a:ext cx="5739875" cy="2403879"/>
+          <a:xfrm flipH="0" flipV="0">
+            <a:off x="1534694" y="4697255"/>
+            <a:ext cx="9520157" cy="543393"/>
           </a:xfrm>
-          <a:prstGeom prst="rect">
-            <a:avLst/>
-          </a:prstGeom>
         </p:spPr>
-      </p:pic>
+        <p:txBody>
+          <a:bodyPr vert="horz" lIns="91440" tIns="45720" rIns="91440" bIns="45720" rtlCol="0" anchor="t">
+            <a:normAutofit/>
+          </a:bodyPr>
+          <a:lstStyle>
+            <a:lvl1pPr marL="228600" indent="-228600" algn="l" defTabSz="914400">
+              <a:lnSpc>
+                <a:spcPct val="120000"/>
+              </a:lnSpc>
+              <a:spcBef>
+                <a:spcPts val="999"/>
+              </a:spcBef>
+              <a:buClr>
+                <a:schemeClr val="accent1"/>
+              </a:buClr>
+              <a:buSzPct val="100000"/>
+              <a:buFont typeface="Arial"/>
+              <a:buChar char="•"/>
+              <a:defRPr sz="2000">
+                <a:solidFill>
+                  <a:schemeClr val="tx1"/>
+                </a:solidFill>
+                <a:latin typeface="+mn-lt"/>
+                <a:ea typeface="+mn-ea"/>
+                <a:cs typeface="+mn-cs"/>
+              </a:defRPr>
+            </a:lvl1pPr>
+            <a:lvl2pPr marL="685800" indent="-228600" algn="l" defTabSz="914400">
+              <a:lnSpc>
+                <a:spcPct val="120000"/>
+              </a:lnSpc>
+              <a:spcBef>
+                <a:spcPts val="499"/>
+              </a:spcBef>
+              <a:buClr>
+                <a:schemeClr val="accent1"/>
+              </a:buClr>
+              <a:buSzPct val="100000"/>
+              <a:buFont typeface="Arial"/>
+              <a:buChar char="•"/>
+              <a:defRPr sz="1800" cap="none">
+                <a:solidFill>
+                  <a:schemeClr val="tx1"/>
+                </a:solidFill>
+                <a:latin typeface="+mn-lt"/>
+                <a:ea typeface="+mn-ea"/>
+                <a:cs typeface="+mn-cs"/>
+              </a:defRPr>
+            </a:lvl2pPr>
+            <a:lvl3pPr marL="1143000" indent="-228600" algn="l" defTabSz="914400">
+              <a:lnSpc>
+                <a:spcPct val="120000"/>
+              </a:lnSpc>
+              <a:spcBef>
+                <a:spcPts val="499"/>
+              </a:spcBef>
+              <a:buClr>
+                <a:schemeClr val="accent1"/>
+              </a:buClr>
+              <a:buSzPct val="100000"/>
+              <a:buFont typeface="Arial"/>
+              <a:buChar char="•"/>
+              <a:defRPr sz="1600">
+                <a:solidFill>
+                  <a:schemeClr val="tx1"/>
+                </a:solidFill>
+                <a:latin typeface="+mn-lt"/>
+                <a:ea typeface="+mn-ea"/>
+                <a:cs typeface="+mn-cs"/>
+              </a:defRPr>
+            </a:lvl3pPr>
+            <a:lvl4pPr marL="1600200" indent="-228600" algn="l" defTabSz="914400">
+              <a:lnSpc>
+                <a:spcPct val="120000"/>
+              </a:lnSpc>
+              <a:spcBef>
+                <a:spcPts val="499"/>
+              </a:spcBef>
+              <a:buClr>
+                <a:schemeClr val="accent1"/>
+              </a:buClr>
+              <a:buSzPct val="100000"/>
+              <a:buFont typeface="Arial"/>
+              <a:buChar char="•"/>
+              <a:defRPr sz="1400" cap="none">
+                <a:solidFill>
+                  <a:schemeClr val="tx1"/>
+                </a:solidFill>
+                <a:latin typeface="+mn-lt"/>
+                <a:ea typeface="+mn-ea"/>
+                <a:cs typeface="+mn-cs"/>
+              </a:defRPr>
+            </a:lvl4pPr>
+            <a:lvl5pPr marL="2057400" indent="-228600" algn="l" defTabSz="914400">
+              <a:lnSpc>
+                <a:spcPct val="120000"/>
+              </a:lnSpc>
+              <a:spcBef>
+                <a:spcPts val="499"/>
+              </a:spcBef>
+              <a:buClr>
+                <a:schemeClr val="accent1"/>
+              </a:buClr>
+              <a:buSzPct val="100000"/>
+              <a:buFont typeface="Arial"/>
+              <a:buChar char="•"/>
+              <a:defRPr sz="1200">
+                <a:solidFill>
+                  <a:schemeClr val="tx1"/>
+                </a:solidFill>
+                <a:latin typeface="+mn-lt"/>
+                <a:ea typeface="+mn-ea"/>
+                <a:cs typeface="+mn-cs"/>
+              </a:defRPr>
+            </a:lvl5pPr>
+            <a:lvl6pPr marL="2514599" indent="-228600" algn="l" defTabSz="914400">
+              <a:lnSpc>
+                <a:spcPct val="120000"/>
+              </a:lnSpc>
+              <a:spcBef>
+                <a:spcPts val="499"/>
+              </a:spcBef>
+              <a:buClr>
+                <a:schemeClr val="accent1"/>
+              </a:buClr>
+              <a:buSzPct val="100000"/>
+              <a:buFont typeface="Arial"/>
+              <a:buChar char="•"/>
+              <a:defRPr sz="1200">
+                <a:solidFill>
+                  <a:schemeClr val="tx1"/>
+                </a:solidFill>
+                <a:latin typeface="+mn-lt"/>
+                <a:ea typeface="+mn-ea"/>
+                <a:cs typeface="+mn-cs"/>
+              </a:defRPr>
+            </a:lvl6pPr>
+            <a:lvl7pPr marL="2971800" indent="-228600" algn="l" defTabSz="914400">
+              <a:lnSpc>
+                <a:spcPct val="120000"/>
+              </a:lnSpc>
+              <a:spcBef>
+                <a:spcPts val="499"/>
+              </a:spcBef>
+              <a:buClr>
+                <a:schemeClr val="accent1"/>
+              </a:buClr>
+              <a:buSzPct val="100000"/>
+              <a:buFont typeface="Arial"/>
+              <a:buChar char="•"/>
+              <a:defRPr sz="1200">
+                <a:solidFill>
+                  <a:schemeClr val="tx1"/>
+                </a:solidFill>
+                <a:latin typeface="+mn-lt"/>
+                <a:ea typeface="+mn-ea"/>
+                <a:cs typeface="+mn-cs"/>
+              </a:defRPr>
+            </a:lvl7pPr>
+            <a:lvl8pPr marL="3429000" indent="-228600" algn="l" defTabSz="914400">
+              <a:lnSpc>
+                <a:spcPct val="120000"/>
+              </a:lnSpc>
+              <a:spcBef>
+                <a:spcPts val="499"/>
+              </a:spcBef>
+              <a:buClr>
+                <a:schemeClr val="accent1"/>
+              </a:buClr>
+              <a:buSzPct val="100000"/>
+              <a:buFont typeface="Arial"/>
+              <a:buChar char="•"/>
+              <a:defRPr sz="1200">
+                <a:solidFill>
+                  <a:schemeClr val="tx1"/>
+                </a:solidFill>
+                <a:latin typeface="+mn-lt"/>
+                <a:ea typeface="+mn-ea"/>
+                <a:cs typeface="+mn-cs"/>
+              </a:defRPr>
+            </a:lvl8pPr>
+            <a:lvl9pPr marL="3886200" indent="-228600" algn="l" defTabSz="914400">
+              <a:lnSpc>
+                <a:spcPct val="120000"/>
+              </a:lnSpc>
+              <a:spcBef>
+                <a:spcPts val="499"/>
+              </a:spcBef>
+              <a:buClr>
+                <a:schemeClr val="accent1"/>
+              </a:buClr>
+              <a:buSzPct val="100000"/>
+              <a:buFont typeface="Arial"/>
+              <a:buChar char="•"/>
+              <a:defRPr sz="1200">
+                <a:solidFill>
+                  <a:schemeClr val="tx1"/>
+                </a:solidFill>
+                <a:latin typeface="+mn-lt"/>
+                <a:ea typeface="+mn-ea"/>
+                <a:cs typeface="+mn-cs"/>
+              </a:defRPr>
+            </a:lvl9pPr>
+          </a:lstStyle>
+          <a:p>
+            <a:pPr>
+              <a:defRPr/>
+            </a:pPr>
+            <a:r>
+              <a:rPr lang="de-DE" sz="2000" b="0" i="0" u="none" strike="noStrike" cap="none" spc="0">
+                <a:solidFill>
+                  <a:schemeClr val="tx1"/>
+                </a:solidFill>
+                <a:latin typeface="Palatino Linotype"/>
+                <a:ea typeface="Arial"/>
+                <a:cs typeface="Arial"/>
+              </a:rPr>
+              <a:t>Cinco Product Definition</a:t>
+            </a:r>
+            <a:endParaRPr lang="de-DE" sz="2000"/>
+          </a:p>
+        </p:txBody>
+      </p:sp>
     </p:spTree>
   </p:cSld>
   <p:clrMapOvr>

</xml_diff>

<commit_message>
adds slides on language features
</commit_message>
<xml_diff>
--- a/Abschlussvortrag.pptx
+++ b/Abschlussvortrag.pptx
@@ -5,7 +5,7 @@
     <p:sldMasterId id="2147483648" r:id="rId1"/>
   </p:sldMasterIdLst>
   <p:notesMasterIdLst>
-    <p:notesMasterId r:id="rId22"/>
+    <p:notesMasterId r:id="rId23"/>
   </p:notesMasterIdLst>
   <p:sldIdLst>
     <p:sldId id="256" r:id="rId4"/>
@@ -26,6 +26,7 @@
     <p:sldId id="271" r:id="rId19"/>
     <p:sldId id="272" r:id="rId20"/>
     <p:sldId id="273" r:id="rId21"/>
+    <p:sldId id="274" r:id="rId22"/>
   </p:sldIdLst>
   <p:sldSz cx="12192000" cy="6858000"/>
   <p:notesSz cx="12192000" cy="6858000"/>
@@ -614,6 +615,95 @@
                 <a:ea typeface="Palatino Linotype"/>
                 <a:cs typeface="Palatino Linotype"/>
               </a:rPr>
+              <a:t>- Was hast du für die Demo geplant? Ich hoffe, du gehst da detailliert auf die ganzen Features deiner Sprachen ein: Primereferenzen, Verschachtelung, Enablen/Disablen von Screenshots, Checks etc.</a:t>
+            </a:r>
+            <a:endParaRPr/>
+          </a:p>
+        </p:txBody>
+      </p:sp>
+      <p:sp>
+        <p:nvSpPr>
+          <p:cNvPr id="4" name="Slide Number Placeholder 3" hidden="0"/>
+          <p:cNvSpPr>
+            <a:spLocks noGrp="1"/>
+          </p:cNvSpPr>
+          <p:nvPr isPhoto="0" userDrawn="0">
+            <p:ph type="sldNum" sz="quarter" idx="10" hasCustomPrompt="0"/>
+          </p:nvPr>
+        </p:nvSpPr>
+        <p:spPr bwMode="auto"/>
+        <p:txBody>
+          <a:bodyPr/>
+          <a:lstStyle/>
+          <a:p>
+            <a:pPr>
+              <a:defRPr/>
+            </a:pPr>
+            <a:endParaRPr/>
+          </a:p>
+        </p:txBody>
+      </p:sp>
+    </p:spTree>
+  </p:cSld>
+</p:notes>
+</file>
+
+<file path=ppt/notesSlides/notesSlide11.xml><?xml version="1.0" encoding="utf-8"?>
+<p:notes xmlns:a="http://schemas.openxmlformats.org/drawingml/2006/main" xmlns:r="http://schemas.openxmlformats.org/officeDocument/2006/relationships" xmlns:p="http://schemas.openxmlformats.org/presentationml/2006/main" xmlns:m="http://schemas.openxmlformats.org/officeDocument/2006/math" xmlns:w="http://schemas.openxmlformats.org/wordprocessingml/2006/main">
+  <p:cSld name="">
+    <p:spTree>
+      <p:nvGrpSpPr>
+        <p:cNvPr id="1" name="" hidden="0"/>
+        <p:cNvGrpSpPr/>
+        <p:nvPr isPhoto="0" userDrawn="0"/>
+      </p:nvGrpSpPr>
+      <p:grpSpPr bwMode="auto">
+        <a:xfrm>
+          <a:off x="0" y="0"/>
+          <a:ext cx="0" cy="0"/>
+          <a:chOff x="0" y="0"/>
+          <a:chExt cx="0" cy="0"/>
+        </a:xfrm>
+      </p:grpSpPr>
+      <p:sp>
+        <p:nvSpPr>
+          <p:cNvPr id="2" name="Slide Image Placeholder 1" hidden="0"/>
+          <p:cNvSpPr>
+            <a:spLocks noChangeAspect="1" noGrp="1" noRot="1"/>
+          </p:cNvSpPr>
+          <p:nvPr isPhoto="0" userDrawn="0">
+            <p:ph type="sldImg" hasCustomPrompt="0"/>
+          </p:nvPr>
+        </p:nvSpPr>
+        <p:spPr bwMode="auto"/>
+      </p:sp>
+      <p:sp>
+        <p:nvSpPr>
+          <p:cNvPr id="3" name="Notes Placeholder 2" hidden="0"/>
+          <p:cNvSpPr>
+            <a:spLocks noGrp="1"/>
+          </p:cNvSpPr>
+          <p:nvPr isPhoto="0" userDrawn="0">
+            <p:ph type="body" idx="1" hasCustomPrompt="0"/>
+          </p:nvPr>
+        </p:nvSpPr>
+        <p:spPr bwMode="auto"/>
+        <p:txBody>
+          <a:bodyPr/>
+          <a:lstStyle/>
+          <a:p>
+            <a:pPr>
+              <a:defRPr/>
+            </a:pPr>
+            <a:r>
+              <a:rPr lang="de-DE" sz="1200" b="0" i="0" u="none" strike="noStrike" cap="none" spc="0">
+                <a:solidFill>
+                  <a:schemeClr val="tx1"/>
+                </a:solidFill>
+                <a:latin typeface="Palatino Linotype"/>
+                <a:ea typeface="Palatino Linotype"/>
+                <a:cs typeface="Palatino Linotype"/>
+              </a:rPr>
               <a:t>- Folie 16: Da fehlt noch das Fazit aus deiner Evaluierung bzw. Bewertung deines Tools gemessen an dem, was du damit gemacht hast.</a:t>
             </a:r>
             <a:endParaRPr/>
@@ -1531,7 +1621,7 @@
       </p:grpSpPr>
       <p:sp>
         <p:nvSpPr>
-          <p:cNvPr id="2002792847" name="Slide Image Placeholder 1" hidden="0"/>
+          <p:cNvPr id="782610789" name="Slide Image Placeholder 1" hidden="0"/>
           <p:cNvSpPr>
             <a:spLocks noChangeAspect="1" noGrp="1" noRot="1"/>
           </p:cNvSpPr>
@@ -1543,7 +1633,7 @@
       </p:sp>
       <p:sp>
         <p:nvSpPr>
-          <p:cNvPr id="781609919" name="Notes Placeholder 2" hidden="0"/>
+          <p:cNvPr id="882455537" name="Notes Placeholder 2" hidden="0"/>
           <p:cNvSpPr>
             <a:spLocks noGrp="1"/>
           </p:cNvSpPr>
@@ -1555,22 +1645,6 @@
         <p:txBody>
           <a:bodyPr/>
           <a:lstStyle/>
-          <a:p>
-            <a:pPr>
-              <a:defRPr/>
-            </a:pPr>
-            <a:r>
-              <a:rPr/>
-              <a:t>Die Verwendung externer Technologie ist insofern</a:t>
-            </a:r>
-            <a:endParaRPr/>
-          </a:p>
-          <a:p>
-            <a:pPr>
-              <a:defRPr/>
-            </a:pPr>
-            <a:endParaRPr/>
-          </a:p>
           <a:p>
             <a:pPr>
               <a:defRPr/>
@@ -1584,15 +1658,15 @@
                 <a:ea typeface="Palatino Linotype"/>
                 <a:cs typeface="Palatino Linotype"/>
               </a:rPr>
-              <a:t>- Folie 10: Inwiefern verhindert das einen Single-Point-of-failure?</a:t>
-            </a:r>
-            <a:endParaRPr/>
-          </a:p>
-        </p:txBody>
-      </p:sp>
-      <p:sp>
-        <p:nvSpPr>
-          <p:cNvPr id="1255829888" name="Slide Number Placeholder 3" hidden="0"/>
+              <a:t>- Ich vermisse ein wenig die Vorstellung der Sprachfeatures und deren Besonderheiten</a:t>
+            </a:r>
+            <a:endParaRPr/>
+          </a:p>
+        </p:txBody>
+      </p:sp>
+      <p:sp>
+        <p:nvSpPr>
+          <p:cNvPr id="838656737" name="Slide Number Placeholder 3" hidden="0"/>
           <p:cNvSpPr>
             <a:spLocks noGrp="1"/>
           </p:cNvSpPr>
@@ -1636,7 +1710,7 @@
       </p:grpSpPr>
       <p:sp>
         <p:nvSpPr>
-          <p:cNvPr id="2" name="Slide Image Placeholder 1" hidden="0"/>
+          <p:cNvPr id="2002792847" name="Slide Image Placeholder 1" hidden="0"/>
           <p:cNvSpPr>
             <a:spLocks noChangeAspect="1" noGrp="1" noRot="1"/>
           </p:cNvSpPr>
@@ -1648,7 +1722,7 @@
       </p:sp>
       <p:sp>
         <p:nvSpPr>
-          <p:cNvPr id="3" name="Notes Placeholder 2" hidden="0"/>
+          <p:cNvPr id="781609919" name="Notes Placeholder 2" hidden="0"/>
           <p:cNvSpPr>
             <a:spLocks noGrp="1"/>
           </p:cNvSpPr>
@@ -1660,6 +1734,22 @@
         <p:txBody>
           <a:bodyPr/>
           <a:lstStyle/>
+          <a:p>
+            <a:pPr>
+              <a:defRPr/>
+            </a:pPr>
+            <a:r>
+              <a:rPr/>
+              <a:t>Die Verwendung externer Technologie ist insofern</a:t>
+            </a:r>
+            <a:endParaRPr/>
+          </a:p>
+          <a:p>
+            <a:pPr>
+              <a:defRPr/>
+            </a:pPr>
+            <a:endParaRPr/>
+          </a:p>
           <a:p>
             <a:pPr>
               <a:defRPr/>
@@ -1673,15 +1763,15 @@
                 <a:ea typeface="Palatino Linotype"/>
                 <a:cs typeface="Palatino Linotype"/>
               </a:rPr>
-              <a:t>- Was hast du für die Demo geplant? Ich hoffe, du gehst da detailliert auf die ganzen Features deiner Sprachen ein: Primereferenzen, Verschachtelung, Enablen/Disablen von Screenshots, Checks etc.</a:t>
-            </a:r>
-            <a:endParaRPr/>
-          </a:p>
-        </p:txBody>
-      </p:sp>
-      <p:sp>
-        <p:nvSpPr>
-          <p:cNvPr id="4" name="Slide Number Placeholder 3" hidden="0"/>
+              <a:t>- Folie 10: Inwiefern verhindert das einen Single-Point-of-failure?</a:t>
+            </a:r>
+            <a:endParaRPr/>
+          </a:p>
+        </p:txBody>
+      </p:sp>
+      <p:sp>
+        <p:nvSpPr>
+          <p:cNvPr id="1255829888" name="Slide Number Placeholder 3" hidden="0"/>
           <p:cNvSpPr>
             <a:spLocks noGrp="1"/>
           </p:cNvSpPr>
@@ -7993,6 +8083,253 @@
       </p:grpSpPr>
       <p:sp>
         <p:nvSpPr>
+          <p:cNvPr id="1992529021" name="Título 1" hidden="0"/>
+          <p:cNvSpPr>
+            <a:spLocks noGrp="1"/>
+          </p:cNvSpPr>
+          <p:nvPr isPhoto="0" userDrawn="0">
+            <p:ph type="title" hasCustomPrompt="0"/>
+          </p:nvPr>
+        </p:nvSpPr>
+        <p:spPr bwMode="auto"/>
+        <p:txBody>
+          <a:bodyPr/>
+          <a:lstStyle/>
+          <a:p>
+            <a:pPr>
+              <a:defRPr/>
+            </a:pPr>
+            <a:r>
+              <a:rPr lang="de-DE"/>
+              <a:t>Graphische DSL: .feat und .doc</a:t>
+            </a:r>
+            <a:br>
+              <a:rPr lang="de-DE"/>
+            </a:br>
+            <a:r>
+              <a:rPr lang="de-DE" sz="1600" i="1"/>
+              <a:t>Feature- und Dokumentationssprachen</a:t>
+            </a:r>
+            <a:endParaRPr/>
+          </a:p>
+        </p:txBody>
+      </p:sp>
+      <p:sp>
+        <p:nvSpPr>
+          <p:cNvPr id="769483727" name="Content Placeholder 2" hidden="0"/>
+          <p:cNvSpPr>
+            <a:spLocks noGrp="1"/>
+          </p:cNvSpPr>
+          <p:nvPr isPhoto="0" userDrawn="0">
+            <p:ph idx="1" hasCustomPrompt="0"/>
+          </p:nvPr>
+        </p:nvSpPr>
+        <p:spPr bwMode="auto">
+          <a:xfrm flipH="0" flipV="0">
+            <a:off x="3188370" y="2015731"/>
+            <a:ext cx="5657620" cy="3515653"/>
+          </a:xfrm>
+        </p:spPr>
+        <p:txBody>
+          <a:bodyPr anchor="t"/>
+          <a:lstStyle/>
+          <a:p>
+            <a:pPr>
+              <a:defRPr/>
+            </a:pPr>
+            <a:endParaRPr lang="de-DE" sz="2000"/>
+          </a:p>
+          <a:p>
+            <a:pPr>
+              <a:defRPr/>
+            </a:pPr>
+            <a:r>
+              <a:rPr lang="de-DE" sz="2000"/>
+              <a:t>DocGraph Modelelemente (rechts)</a:t>
+            </a:r>
+            <a:endParaRPr lang="de-DE" sz="2000"/>
+          </a:p>
+          <a:p>
+            <a:pPr>
+              <a:defRPr/>
+            </a:pPr>
+            <a:endParaRPr lang="de-DE" sz="2000"/>
+          </a:p>
+        </p:txBody>
+      </p:sp>
+      <p:pic>
+        <p:nvPicPr>
+          <p:cNvPr id="131235200" name="" hidden="0"/>
+          <p:cNvPicPr>
+            <a:picLocks noChangeAspect="1"/>
+          </p:cNvPicPr>
+          <p:nvPr isPhoto="0" userDrawn="0"/>
+        </p:nvPicPr>
+        <p:blipFill>
+          <a:blip r:embed="rId3"/>
+          <a:stretch/>
+        </p:blipFill>
+        <p:spPr bwMode="auto">
+          <a:xfrm rot="0" flipH="0" flipV="0">
+            <a:off x="1634400" y="2015731"/>
+            <a:ext cx="1553970" cy="3234200"/>
+          </a:xfrm>
+          <a:prstGeom prst="rect">
+            <a:avLst/>
+          </a:prstGeom>
+        </p:spPr>
+      </p:pic>
+      <p:sp>
+        <p:nvSpPr>
+          <p:cNvPr id="2101884081" name="" hidden="0"/>
+          <p:cNvSpPr txBox="1"/>
+          <p:nvPr isPhoto="0" userDrawn="0"/>
+        </p:nvSpPr>
+        <p:spPr bwMode="auto">
+          <a:xfrm flipH="0" flipV="0">
+            <a:off x="1542680" y="5302577"/>
+            <a:ext cx="1796820" cy="228808"/>
+          </a:xfrm>
+          <a:prstGeom prst="rect">
+            <a:avLst/>
+          </a:prstGeom>
+          <a:noFill/>
+        </p:spPr>
+        <p:txBody>
+          <a:bodyPr vertOverflow="overflow" horzOverflow="clip" vert="horz" wrap="square" lIns="91440" tIns="45720" rIns="91440" bIns="45720" numCol="1" spcCol="0" rtlCol="0" fromWordArt="0" anchor="t" anchorCtr="0" forceAA="0" upright="0" compatLnSpc="0">
+            <a:noAutofit/>
+          </a:bodyPr>
+          <a:p>
+            <a:pPr>
+              <a:defRPr/>
+            </a:pPr>
+            <a:r>
+              <a:rPr lang="de-DE" sz="900" b="0" i="0" u="none" strike="noStrike" cap="none" spc="0">
+                <a:solidFill>
+                  <a:schemeClr val="tx1"/>
+                </a:solidFill>
+                <a:latin typeface="Palatino Linotype"/>
+                <a:ea typeface="Arial"/>
+                <a:cs typeface="Arial"/>
+              </a:rPr>
+              <a:t>FeatureGraph Modelelemente</a:t>
+            </a:r>
+            <a:endParaRPr sz="900"/>
+          </a:p>
+        </p:txBody>
+      </p:sp>
+      <p:grpSp>
+        <p:nvGrpSpPr>
+          <p:cNvPr id="864845761" name="" hidden="0"/>
+          <p:cNvGrpSpPr/>
+          <p:nvPr isPhoto="0" userDrawn="0"/>
+        </p:nvGrpSpPr>
+        <p:grpSpPr bwMode="auto">
+          <a:xfrm>
+            <a:off x="8999913" y="944251"/>
+            <a:ext cx="1603576" cy="4992694"/>
+            <a:chOff x="0" y="0"/>
+            <a:chExt cx="1603576" cy="4992694"/>
+          </a:xfrm>
+        </p:grpSpPr>
+        <p:pic>
+          <p:nvPicPr>
+            <p:cNvPr id="1576643762" name="" hidden="0"/>
+            <p:cNvPicPr>
+              <a:picLocks noChangeAspect="1"/>
+            </p:cNvPicPr>
+            <p:nvPr isPhoto="0" userDrawn="0"/>
+          </p:nvPicPr>
+          <p:blipFill>
+            <a:blip r:embed="rId4"/>
+            <a:srcRect l="897" t="343" r="0" b="0"/>
+            <a:stretch/>
+          </p:blipFill>
+          <p:spPr bwMode="auto">
+            <a:xfrm flipH="0" flipV="0">
+              <a:off x="0" y="0"/>
+              <a:ext cx="1603576" cy="4763886"/>
+            </a:xfrm>
+            <a:prstGeom prst="rect">
+              <a:avLst/>
+            </a:prstGeom>
+          </p:spPr>
+        </p:pic>
+        <p:sp>
+          <p:nvSpPr>
+            <p:cNvPr id="1915185836" name="" hidden="0"/>
+            <p:cNvSpPr txBox="1"/>
+            <p:nvPr isPhoto="0" userDrawn="0"/>
+          </p:nvSpPr>
+          <p:spPr bwMode="auto">
+            <a:xfrm flipH="0" flipV="0">
+              <a:off x="0" y="4763886"/>
+              <a:ext cx="1594852" cy="228807"/>
+            </a:xfrm>
+            <a:prstGeom prst="rect">
+              <a:avLst/>
+            </a:prstGeom>
+            <a:noFill/>
+          </p:spPr>
+          <p:txBody>
+            <a:bodyPr vertOverflow="overflow" horzOverflow="clip" vert="horz" wrap="square" lIns="91440" tIns="45720" rIns="91440" bIns="45720" numCol="1" spcCol="0" rtlCol="0" fromWordArt="0" anchor="t" anchorCtr="0" forceAA="0" upright="0" compatLnSpc="0">
+              <a:noAutofit/>
+            </a:bodyPr>
+            <a:p>
+              <a:pPr>
+                <a:defRPr/>
+              </a:pPr>
+              <a:r>
+                <a:rPr lang="de-DE" sz="900" b="0" i="0" u="none" strike="noStrike" cap="none" spc="0">
+                  <a:solidFill>
+                    <a:schemeClr val="tx1"/>
+                  </a:solidFill>
+                  <a:latin typeface="Palatino Linotype"/>
+                  <a:ea typeface="Arial"/>
+                  <a:cs typeface="Arial"/>
+                </a:rPr>
+                <a:t>DocGraph Modelelemente</a:t>
+              </a:r>
+              <a:endParaRPr/>
+            </a:p>
+          </p:txBody>
+        </p:sp>
+      </p:grpSp>
+    </p:spTree>
+  </p:cSld>
+  <p:clrMapOvr>
+    <a:masterClrMapping/>
+  </p:clrMapOvr>
+  <mc:AlternateContent xmlns:mc="http://schemas.openxmlformats.org/markup-compatibility/2006">
+    <mc:Choice xmlns:p14="http://schemas.microsoft.com/office/powerpoint/2010/main" Requires="p14">
+      <p:transition p14:dur="2000" advClick="1"/>
+    </mc:Choice>
+    <mc:Fallback>
+      <p:transition advClick="1"/>
+    </mc:Fallback>
+  </mc:AlternateContent>
+</p:sld>
+</file>
+
+<file path=ppt/slides/slide11.xml><?xml version="1.0" encoding="utf-8"?>
+<p:sld xmlns:a="http://schemas.openxmlformats.org/drawingml/2006/main" xmlns:r="http://schemas.openxmlformats.org/officeDocument/2006/relationships" xmlns:p="http://schemas.openxmlformats.org/presentationml/2006/main" xmlns:m="http://schemas.openxmlformats.org/officeDocument/2006/math" xmlns:w="http://schemas.openxmlformats.org/wordprocessingml/2006/main" showMasterPhAnim="0" show="1">
+  <p:cSld name="">
+    <p:spTree>
+      <p:nvGrpSpPr>
+        <p:cNvPr id="1" name="" hidden="0"/>
+        <p:cNvGrpSpPr/>
+        <p:nvPr isPhoto="0" userDrawn="0"/>
+      </p:nvGrpSpPr>
+      <p:grpSpPr bwMode="auto">
+        <a:xfrm>
+          <a:off x="0" y="0"/>
+          <a:ext cx="0" cy="0"/>
+          <a:chOff x="0" y="0"/>
+          <a:chExt cx="0" cy="0"/>
+        </a:xfrm>
+      </p:grpSpPr>
+      <p:sp>
+        <p:nvSpPr>
           <p:cNvPr id="53415977" name="Título 1" hidden="0"/>
           <p:cNvSpPr>
             <a:spLocks noGrp="1"/>
@@ -8119,7 +8456,7 @@
 </p:sld>
 </file>
 
-<file path=ppt/slides/slide11.xml><?xml version="1.0" encoding="utf-8"?>
+<file path=ppt/slides/slide12.xml><?xml version="1.0" encoding="utf-8"?>
 <p:sld xmlns:a="http://schemas.openxmlformats.org/drawingml/2006/main" xmlns:r="http://schemas.openxmlformats.org/officeDocument/2006/relationships" xmlns:p="http://schemas.openxmlformats.org/presentationml/2006/main" xmlns:m="http://schemas.openxmlformats.org/officeDocument/2006/math" xmlns:w="http://schemas.openxmlformats.org/wordprocessingml/2006/main" showMasterPhAnim="0" show="1">
   <p:cSld name="">
     <p:spTree>
@@ -8416,7 +8753,7 @@
 </p:sld>
 </file>
 
-<file path=ppt/slides/slide12.xml><?xml version="1.0" encoding="utf-8"?>
+<file path=ppt/slides/slide13.xml><?xml version="1.0" encoding="utf-8"?>
 <p:sld xmlns:a="http://schemas.openxmlformats.org/drawingml/2006/main" xmlns:r="http://schemas.openxmlformats.org/officeDocument/2006/relationships" xmlns:p="http://schemas.openxmlformats.org/presentationml/2006/main" xmlns:m="http://schemas.openxmlformats.org/officeDocument/2006/math" xmlns:w="http://schemas.openxmlformats.org/wordprocessingml/2006/main" showMasterPhAnim="0" show="1">
   <p:cSld name="">
     <p:spTree>
@@ -8557,7 +8894,7 @@
 </p:sld>
 </file>
 
-<file path=ppt/slides/slide13.xml><?xml version="1.0" encoding="utf-8"?>
+<file path=ppt/slides/slide14.xml><?xml version="1.0" encoding="utf-8"?>
 <p:sld xmlns:a="http://schemas.openxmlformats.org/drawingml/2006/main" xmlns:r="http://schemas.openxmlformats.org/officeDocument/2006/relationships" xmlns:p="http://schemas.openxmlformats.org/presentationml/2006/main" xmlns:m="http://schemas.openxmlformats.org/officeDocument/2006/math" xmlns:w="http://schemas.openxmlformats.org/wordprocessingml/2006/main" showMasterPhAnim="0" show="1">
   <p:cSld name="">
     <p:spTree>
@@ -8686,7 +9023,7 @@
 </p:sld>
 </file>
 
-<file path=ppt/slides/slide14.xml><?xml version="1.0" encoding="utf-8"?>
+<file path=ppt/slides/slide15.xml><?xml version="1.0" encoding="utf-8"?>
 <p:sld xmlns:a="http://schemas.openxmlformats.org/drawingml/2006/main" xmlns:r="http://schemas.openxmlformats.org/officeDocument/2006/relationships" xmlns:p="http://schemas.openxmlformats.org/presentationml/2006/main" xmlns:m="http://schemas.openxmlformats.org/officeDocument/2006/math" xmlns:w="http://schemas.openxmlformats.org/wordprocessingml/2006/main" showMasterPhAnim="0" show="1">
   <p:cSld name="">
     <p:spTree>
@@ -8817,7 +9154,7 @@
 </p:sld>
 </file>
 
-<file path=ppt/slides/slide15.xml><?xml version="1.0" encoding="utf-8"?>
+<file path=ppt/slides/slide16.xml><?xml version="1.0" encoding="utf-8"?>
 <p:sld xmlns:a="http://schemas.openxmlformats.org/drawingml/2006/main" xmlns:r="http://schemas.openxmlformats.org/officeDocument/2006/relationships" xmlns:p="http://schemas.openxmlformats.org/presentationml/2006/main" xmlns:m="http://schemas.openxmlformats.org/officeDocument/2006/math" xmlns:w="http://schemas.openxmlformats.org/wordprocessingml/2006/main" showMasterPhAnim="0" show="1">
   <p:cSld name="">
     <p:bg>
@@ -8931,323 +9268,6 @@
 </p:sld>
 </file>
 
-<file path=ppt/slides/slide16.xml><?xml version="1.0" encoding="utf-8"?>
-<p:sld xmlns:a="http://schemas.openxmlformats.org/drawingml/2006/main" xmlns:r="http://schemas.openxmlformats.org/officeDocument/2006/relationships" xmlns:p="http://schemas.openxmlformats.org/presentationml/2006/main" xmlns:m="http://schemas.openxmlformats.org/officeDocument/2006/math" xmlns:w="http://schemas.openxmlformats.org/wordprocessingml/2006/main" showMasterPhAnim="0" show="1">
-  <p:cSld name="">
-    <p:spTree>
-      <p:nvGrpSpPr>
-        <p:cNvPr id="1" name="" hidden="0"/>
-        <p:cNvGrpSpPr/>
-        <p:nvPr isPhoto="0" userDrawn="0"/>
-      </p:nvGrpSpPr>
-      <p:grpSpPr bwMode="auto">
-        <a:xfrm>
-          <a:off x="0" y="0"/>
-          <a:ext cx="0" cy="0"/>
-          <a:chOff x="0" y="0"/>
-          <a:chExt cx="0" cy="0"/>
-        </a:xfrm>
-      </p:grpSpPr>
-      <p:sp>
-        <p:nvSpPr>
-          <p:cNvPr id="491240005" name="Título 1" hidden="0"/>
-          <p:cNvSpPr>
-            <a:spLocks noGrp="1"/>
-          </p:cNvSpPr>
-          <p:nvPr isPhoto="0" userDrawn="0">
-            <p:ph type="title" hasCustomPrompt="0"/>
-          </p:nvPr>
-        </p:nvSpPr>
-        <p:spPr bwMode="auto"/>
-        <p:txBody>
-          <a:bodyPr/>
-          <a:lstStyle/>
-          <a:p>
-            <a:pPr>
-              <a:defRPr/>
-            </a:pPr>
-            <a:r>
-              <a:rPr lang="de-DE"/>
-              <a:t>Künftige Arbeiten</a:t>
-            </a:r>
-            <a:br>
-              <a:rPr lang="de-DE"/>
-            </a:br>
-            <a:endParaRPr sz="1800"/>
-          </a:p>
-        </p:txBody>
-      </p:sp>
-      <p:sp>
-        <p:nvSpPr>
-          <p:cNvPr id="835041238" name="Marcador de contenido 2" hidden="0"/>
-          <p:cNvSpPr>
-            <a:spLocks noGrp="1"/>
-          </p:cNvSpPr>
-          <p:nvPr isPhoto="0" userDrawn="0">
-            <p:ph idx="1" hasCustomPrompt="0"/>
-          </p:nvPr>
-        </p:nvSpPr>
-        <p:spPr bwMode="auto"/>
-        <p:txBody>
-          <a:bodyPr vertOverflow="overflow" horzOverflow="clip" vert="horz" wrap="square" lIns="91440" tIns="45720" rIns="91440" bIns="45720" numCol="1" spcCol="0" rtlCol="0" fromWordArt="0" anchor="t" anchorCtr="0" forceAA="0" upright="0" compatLnSpc="0">
-            <a:normAutofit fontScale="90000" lnSpcReduction="2000"/>
-          </a:bodyPr>
-          <a:lstStyle/>
-          <a:p>
-            <a:pPr>
-              <a:defRPr/>
-            </a:pPr>
-            <a:r>
-              <a:rPr lang="en-US" sz="2000" b="0" i="0" u="none" strike="noStrike" cap="none" spc="0">
-                <a:solidFill>
-                  <a:schemeClr val="tx1"/>
-                </a:solidFill>
-                <a:latin typeface="Palatino Linotype"/>
-                <a:ea typeface="Palatino Linotype"/>
-                <a:cs typeface="Palatino Linotype"/>
-              </a:rPr>
-              <a:t>facilitate the creation process by gener</a:t>
-            </a:r>
-            <a:r>
-              <a:rPr lang="en-US" sz="2000" b="0" i="0" u="none" strike="noStrike" cap="none" spc="0">
-                <a:solidFill>
-                  <a:schemeClr val="tx1"/>
-                </a:solidFill>
-                <a:latin typeface="Palatino Linotype"/>
-                <a:ea typeface="Palatino Linotype"/>
-                <a:cs typeface="Palatino Linotype"/>
-              </a:rPr>
-              <a:t>ating a project template containing a start configuration</a:t>
-            </a:r>
-            <a:endParaRPr lang="en-US" sz="2000" b="0" i="0" u="none" strike="noStrike" cap="none" spc="0">
-              <a:solidFill>
-                <a:schemeClr val="tx1"/>
-              </a:solidFill>
-              <a:latin typeface="Palatino Linotype"/>
-              <a:ea typeface="Palatino Linotype"/>
-              <a:cs typeface="Palatino Linotype"/>
-            </a:endParaRPr>
-          </a:p>
-          <a:p>
-            <a:pPr>
-              <a:defRPr/>
-            </a:pPr>
-            <a:r>
-              <a:rPr lang="en-US" sz="2000" b="0" i="0" u="none" strike="noStrike" cap="none" spc="0">
-                <a:solidFill>
-                  <a:schemeClr val="tx1"/>
-                </a:solidFill>
-                <a:latin typeface="Palatino Linotype"/>
-                <a:ea typeface="Palatino Linotype"/>
-                <a:cs typeface="Palatino Linotype"/>
-              </a:rPr>
-              <a:t>cross-referencing DocGraphModels inside others could be improved in</a:t>
-            </a:r>
-            <a:r>
-              <a:rPr lang="en-US" sz="2000" b="0" i="0" u="none" strike="noStrike" cap="none" spc="0">
-                <a:solidFill>
-                  <a:schemeClr val="tx1"/>
-                </a:solidFill>
-                <a:latin typeface="Palatino Linotype"/>
-                <a:ea typeface="Palatino Linotype"/>
-                <a:cs typeface="Palatino Linotype"/>
-              </a:rPr>
-              <a:t> </a:t>
-            </a:r>
-            <a:r>
-              <a:rPr lang="en-US" sz="2000" b="0" i="0" u="none" strike="noStrike" cap="none" spc="0">
-                <a:solidFill>
-                  <a:schemeClr val="tx1"/>
-                </a:solidFill>
-                <a:latin typeface="Palatino Linotype"/>
-                <a:ea typeface="Palatino Linotype"/>
-                <a:cs typeface="Palatino Linotype"/>
-              </a:rPr>
-              <a:t>the future to allow us, for example, to list all available graph models in a separate</a:t>
-            </a:r>
-            <a:r>
-              <a:rPr lang="en-US" sz="2000" b="0" i="0" u="none" strike="noStrike" cap="none" spc="0">
-                <a:solidFill>
-                  <a:schemeClr val="tx1"/>
-                </a:solidFill>
-                <a:latin typeface="Palatino Linotype"/>
-                <a:ea typeface="Palatino Linotype"/>
-                <a:cs typeface="Palatino Linotype"/>
-              </a:rPr>
-              <a:t> </a:t>
-            </a:r>
-            <a:r>
-              <a:rPr lang="en-US" sz="2000" b="0" i="0" u="none" strike="noStrike" cap="none" spc="0">
-                <a:solidFill>
-                  <a:schemeClr val="tx1"/>
-                </a:solidFill>
-                <a:latin typeface="Palatino Linotype"/>
-                <a:ea typeface="Palatino Linotype"/>
-                <a:cs typeface="Palatino Linotype"/>
-              </a:rPr>
-              <a:t>view</a:t>
-            </a:r>
-            <a:endParaRPr lang="en-US" sz="2000" b="0" i="0" u="none" strike="noStrike" cap="none" spc="0">
-              <a:solidFill>
-                <a:schemeClr val="tx1"/>
-              </a:solidFill>
-              <a:latin typeface="Palatino Linotype"/>
-              <a:ea typeface="Palatino Linotype"/>
-              <a:cs typeface="Palatino Linotype"/>
-            </a:endParaRPr>
-          </a:p>
-          <a:p>
-            <a:pPr>
-              <a:defRPr/>
-            </a:pPr>
-            <a:r>
-              <a:rPr lang="en-US" sz="2000" b="0" i="0" u="none" strike="noStrike" cap="none" spc="0">
-                <a:solidFill>
-                  <a:schemeClr val="tx1"/>
-                </a:solidFill>
-                <a:latin typeface="Palatino Linotype"/>
-                <a:ea typeface="Palatino Linotype"/>
-                <a:cs typeface="Palatino Linotype"/>
-              </a:rPr>
-              <a:t> implement more checks to</a:t>
-            </a:r>
-            <a:r>
-              <a:rPr lang="en-US" sz="2000" b="0" i="0" u="none" strike="noStrike" cap="none" spc="0">
-                <a:solidFill>
-                  <a:schemeClr val="tx1"/>
-                </a:solidFill>
-                <a:latin typeface="Palatino Linotype"/>
-                <a:ea typeface="Palatino Linotype"/>
-                <a:cs typeface="Palatino Linotype"/>
-              </a:rPr>
-              <a:t> validate some other aspects of the model: validate</a:t>
-            </a:r>
-            <a:r>
-              <a:rPr lang="en-US" sz="2000" b="0" i="0" u="none" strike="noStrike" cap="none" spc="0">
-                <a:solidFill>
-                  <a:schemeClr val="tx1"/>
-                </a:solidFill>
-                <a:latin typeface="Palatino Linotype"/>
-                <a:ea typeface="Palatino Linotype"/>
-                <a:cs typeface="Palatino Linotype"/>
-              </a:rPr>
-              <a:t> </a:t>
-            </a:r>
-            <a:r>
-              <a:rPr lang="en-US" sz="2000" b="0" i="0" u="none" strike="noStrike" cap="none" spc="0">
-                <a:solidFill>
-                  <a:schemeClr val="tx1"/>
-                </a:solidFill>
-                <a:latin typeface="Palatino Linotype"/>
-                <a:ea typeface="Palatino Linotype"/>
-                <a:cs typeface="Palatino Linotype"/>
-              </a:rPr>
-              <a:t>that the Web element selectors have the correct syntax of CSS</a:t>
-            </a:r>
-            <a:r>
-              <a:rPr lang="en-US" sz="2000" b="0" i="0" u="none" strike="noStrike" cap="none" spc="0">
-                <a:solidFill>
-                  <a:schemeClr val="tx1"/>
-                </a:solidFill>
-                <a:latin typeface="Palatino Linotype"/>
-                <a:ea typeface="Palatino Linotype"/>
-                <a:cs typeface="Palatino Linotype"/>
-              </a:rPr>
-              <a:t> </a:t>
-            </a:r>
-            <a:r>
-              <a:rPr lang="en-US" sz="2000" b="0" i="0" u="none" strike="noStrike" cap="none" spc="0">
-                <a:solidFill>
-                  <a:schemeClr val="tx1"/>
-                </a:solidFill>
-                <a:latin typeface="Palatino Linotype"/>
-                <a:ea typeface="Palatino Linotype"/>
-                <a:cs typeface="Palatino Linotype"/>
-              </a:rPr>
-              <a:t>selectors or XPath</a:t>
-            </a:r>
-            <a:r>
-              <a:rPr lang="en-US" sz="2000" b="0" i="0" u="none" strike="noStrike" cap="none" spc="0">
-                <a:solidFill>
-                  <a:schemeClr val="tx1"/>
-                </a:solidFill>
-                <a:latin typeface="Palatino Linotype"/>
-                <a:ea typeface="Palatino Linotype"/>
-                <a:cs typeface="Palatino Linotype"/>
-              </a:rPr>
-              <a:t> We could even verify in advance if the HTML element we are looking</a:t>
-            </a:r>
-            <a:r>
-              <a:rPr lang="en-US" sz="2000" b="0" i="0" u="none" strike="noStrike" cap="none" spc="0">
-                <a:solidFill>
-                  <a:schemeClr val="tx1"/>
-                </a:solidFill>
-                <a:latin typeface="Palatino Linotype"/>
-                <a:ea typeface="Palatino Linotype"/>
-                <a:cs typeface="Palatino Linotype"/>
-              </a:rPr>
-              <a:t> </a:t>
-            </a:r>
-            <a:r>
-              <a:rPr lang="en-US" sz="2000" b="0" i="0" u="none" strike="noStrike" cap="none" spc="0">
-                <a:solidFill>
-                  <a:schemeClr val="tx1"/>
-                </a:solidFill>
-                <a:latin typeface="Palatino Linotype"/>
-                <a:ea typeface="Palatino Linotype"/>
-                <a:cs typeface="Palatino Linotype"/>
-              </a:rPr>
-              <a:t>for can be found with that given selector by running a selector query search in</a:t>
-            </a:r>
-            <a:r>
-              <a:rPr lang="en-US" sz="2000" b="0" i="0" u="none" strike="noStrike" cap="none" spc="0">
-                <a:solidFill>
-                  <a:schemeClr val="tx1"/>
-                </a:solidFill>
-                <a:latin typeface="Palatino Linotype"/>
-                <a:ea typeface="Palatino Linotype"/>
-                <a:cs typeface="Palatino Linotype"/>
-              </a:rPr>
-              <a:t> </a:t>
-            </a:r>
-            <a:r>
-              <a:rPr lang="en-US" sz="2000" b="0" i="0" u="none" strike="noStrike" cap="none" spc="0">
-                <a:solidFill>
-                  <a:schemeClr val="tx1"/>
-                </a:solidFill>
-                <a:latin typeface="Palatino Linotype"/>
-                <a:ea typeface="Palatino Linotype"/>
-                <a:cs typeface="Palatino Linotype"/>
-              </a:rPr>
-              <a:t>the background</a:t>
-            </a:r>
-            <a:endParaRPr lang="en-US" sz="2000" b="0" i="0" u="none" strike="noStrike" cap="none" spc="0">
-              <a:solidFill>
-                <a:schemeClr val="tx1"/>
-              </a:solidFill>
-              <a:latin typeface="Palatino Linotype"/>
-              <a:ea typeface="Palatino Linotype"/>
-              <a:cs typeface="Palatino Linotype"/>
-            </a:endParaRPr>
-          </a:p>
-        </p:txBody>
-      </p:sp>
-    </p:spTree>
-  </p:cSld>
-  <p:clrMapOvr>
-    <a:masterClrMapping/>
-  </p:clrMapOvr>
-  <mc:AlternateContent xmlns:mc="http://schemas.openxmlformats.org/markup-compatibility/2006">
-    <mc:Choice xmlns:p14="http://schemas.microsoft.com/office/powerpoint/2010/main" Requires="p14">
-      <p:transition p14:dur="2000" advClick="1"/>
-    </mc:Choice>
-    <mc:Fallback>
-      <p:transition advClick="1"/>
-    </mc:Fallback>
-  </mc:AlternateContent>
-</p:sld>
-</file>
-
 <file path=ppt/slides/slide17.xml><?xml version="1.0" encoding="utf-8"?>
 <p:sld xmlns:a="http://schemas.openxmlformats.org/drawingml/2006/main" xmlns:r="http://schemas.openxmlformats.org/officeDocument/2006/relationships" xmlns:p="http://schemas.openxmlformats.org/presentationml/2006/main" xmlns:m="http://schemas.openxmlformats.org/officeDocument/2006/math" xmlns:w="http://schemas.openxmlformats.org/wordprocessingml/2006/main" showMasterPhAnim="0" show="1">
   <p:cSld name="">
@@ -9267,7 +9287,7 @@
       </p:grpSpPr>
       <p:sp>
         <p:nvSpPr>
-          <p:cNvPr id="653499456" name="Título 1" hidden="0"/>
+          <p:cNvPr id="491240005" name="Título 1" hidden="0"/>
           <p:cNvSpPr>
             <a:spLocks noGrp="1"/>
           </p:cNvSpPr>
@@ -9285,18 +9305,18 @@
             </a:pPr>
             <a:r>
               <a:rPr lang="de-DE"/>
-              <a:t>Fazit</a:t>
+              <a:t>Künftige Arbeiten</a:t>
             </a:r>
             <a:br>
               <a:rPr lang="de-DE"/>
             </a:br>
-            <a:endParaRPr sz="1600"/>
-          </a:p>
-        </p:txBody>
-      </p:sp>
-      <p:sp>
-        <p:nvSpPr>
-          <p:cNvPr id="751158943" name="Marcador de contenido 2" hidden="0"/>
+            <a:endParaRPr sz="1800"/>
+          </a:p>
+        </p:txBody>
+      </p:sp>
+      <p:sp>
+        <p:nvSpPr>
+          <p:cNvPr id="835041238" name="Marcador de contenido 2" hidden="0"/>
           <p:cNvSpPr>
             <a:spLocks noGrp="1"/>
           </p:cNvSpPr>
@@ -9306,14 +9326,16 @@
         </p:nvSpPr>
         <p:spPr bwMode="auto"/>
         <p:txBody>
-          <a:bodyPr/>
+          <a:bodyPr vertOverflow="overflow" horzOverflow="clip" vert="horz" wrap="square" lIns="91440" tIns="45720" rIns="91440" bIns="45720" numCol="1" spcCol="0" rtlCol="0" fromWordArt="0" anchor="t" anchorCtr="0" forceAA="0" upright="0" compatLnSpc="0">
+            <a:normAutofit fontScale="90000" lnSpcReduction="2000"/>
+          </a:bodyPr>
           <a:lstStyle/>
           <a:p>
             <a:pPr>
               <a:defRPr/>
             </a:pPr>
             <a:r>
-              <a:rPr lang="de-DE" sz="2000" b="0" i="0" u="none" strike="noStrike" cap="none" spc="0">
+              <a:rPr lang="en-US" sz="2000" b="0" i="0" u="none" strike="noStrike" cap="none" spc="0">
                 <a:solidFill>
                   <a:schemeClr val="tx1"/>
                 </a:solidFill>
@@ -9321,9 +9343,20 @@
                 <a:ea typeface="Palatino Linotype"/>
                 <a:cs typeface="Palatino Linotype"/>
               </a:rPr>
-              <a:t>DSL-getriebene Generierung von Endbenutzerdokumentation für Webanwendungen auf der Basis von Graphenmodellen unter Verwendung einer grafischen DSL</a:t>
-            </a:r>
-            <a:endParaRPr lang="de-DE" sz="2000" b="0" i="0" u="none" strike="noStrike" cap="none" spc="0">
+              <a:t>facilitate the creation process by gener</a:t>
+            </a:r>
+            <a:r>
+              <a:rPr lang="en-US" sz="2000" b="0" i="0" u="none" strike="noStrike" cap="none" spc="0">
+                <a:solidFill>
+                  <a:schemeClr val="tx1"/>
+                </a:solidFill>
+                <a:latin typeface="Palatino Linotype"/>
+                <a:ea typeface="Palatino Linotype"/>
+                <a:cs typeface="Palatino Linotype"/>
+              </a:rPr>
+              <a:t>ating a project template containing a start configuration</a:t>
+            </a:r>
+            <a:endParaRPr lang="en-US" sz="2000" b="0" i="0" u="none" strike="noStrike" cap="none" spc="0">
               <a:solidFill>
                 <a:schemeClr val="tx1"/>
               </a:solidFill>
@@ -9337,7 +9370,7 @@
               <a:defRPr/>
             </a:pPr>
             <a:r>
-              <a:rPr lang="de-DE" sz="2000" b="0" i="0" u="none" strike="noStrike" cap="none" spc="0">
+              <a:rPr lang="en-US" sz="2000" b="0" i="0" u="none" strike="noStrike" cap="none" spc="0">
                 <a:solidFill>
                   <a:schemeClr val="tx1"/>
                 </a:solidFill>
@@ -9345,9 +9378,53 @@
                 <a:ea typeface="Palatino Linotype"/>
                 <a:cs typeface="Palatino Linotype"/>
               </a:rPr>
-              <a:t>Erstellung einer Editoranwendung, die es dem Dokumentationsdesigner ermöglicht grafische Diagramme zu erstellen, die den erforderlichen Benutzer-Workflow veranschaulichen</a:t>
-            </a:r>
-            <a:endParaRPr lang="de-DE" sz="2000" b="0" i="0" u="none" strike="noStrike" cap="none" spc="0">
+              <a:t>cross-referencing DocGraphModels inside others could be improved in</a:t>
+            </a:r>
+            <a:r>
+              <a:rPr lang="en-US" sz="2000" b="0" i="0" u="none" strike="noStrike" cap="none" spc="0">
+                <a:solidFill>
+                  <a:schemeClr val="tx1"/>
+                </a:solidFill>
+                <a:latin typeface="Palatino Linotype"/>
+                <a:ea typeface="Palatino Linotype"/>
+                <a:cs typeface="Palatino Linotype"/>
+              </a:rPr>
+              <a:t> </a:t>
+            </a:r>
+            <a:r>
+              <a:rPr lang="en-US" sz="2000" b="0" i="0" u="none" strike="noStrike" cap="none" spc="0">
+                <a:solidFill>
+                  <a:schemeClr val="tx1"/>
+                </a:solidFill>
+                <a:latin typeface="Palatino Linotype"/>
+                <a:ea typeface="Palatino Linotype"/>
+                <a:cs typeface="Palatino Linotype"/>
+              </a:rPr>
+              <a:t>the future to allow us, for example, to list all available graph models in a separate</a:t>
+            </a:r>
+            <a:r>
+              <a:rPr lang="en-US" sz="2000" b="0" i="0" u="none" strike="noStrike" cap="none" spc="0">
+                <a:solidFill>
+                  <a:schemeClr val="tx1"/>
+                </a:solidFill>
+                <a:latin typeface="Palatino Linotype"/>
+                <a:ea typeface="Palatino Linotype"/>
+                <a:cs typeface="Palatino Linotype"/>
+              </a:rPr>
+              <a:t> </a:t>
+            </a:r>
+            <a:r>
+              <a:rPr lang="en-US" sz="2000" b="0" i="0" u="none" strike="noStrike" cap="none" spc="0">
+                <a:solidFill>
+                  <a:schemeClr val="tx1"/>
+                </a:solidFill>
+                <a:latin typeface="Palatino Linotype"/>
+                <a:ea typeface="Palatino Linotype"/>
+                <a:cs typeface="Palatino Linotype"/>
+              </a:rPr>
+              <a:t>view</a:t>
+            </a:r>
+            <a:endParaRPr lang="en-US" sz="2000" b="0" i="0" u="none" strike="noStrike" cap="none" spc="0">
               <a:solidFill>
                 <a:schemeClr val="tx1"/>
               </a:solidFill>
@@ -9361,7 +9438,7 @@
               <a:defRPr/>
             </a:pPr>
             <a:r>
-              <a:rPr lang="de-DE" sz="2000" b="0" i="0" u="none" strike="noStrike" cap="none" spc="0">
+              <a:rPr lang="en-US" sz="2000" b="0" i="0" u="none" strike="noStrike" cap="none" spc="0">
                 <a:solidFill>
                   <a:schemeClr val="tx1"/>
                 </a:solidFill>
@@ -9369,10 +9446,10 @@
                 <a:ea typeface="Palatino Linotype"/>
                 <a:cs typeface="Palatino Linotype"/>
               </a:rPr>
-              <a:t>Mithilfe von </a:t>
-            </a:r>
-            <a:r>
-              <a:rPr lang="de-DE" sz="2000" b="0" i="0" u="none" strike="noStrike" cap="none" spc="0">
+              <a:t> implement more checks to</a:t>
+            </a:r>
+            <a:r>
+              <a:rPr lang="en-US" sz="2000" b="0" i="0" u="none" strike="noStrike" cap="none" spc="0">
                 <a:solidFill>
                   <a:schemeClr val="tx1"/>
                 </a:solidFill>
@@ -9380,10 +9457,10 @@
                 <a:ea typeface="Palatino Linotype"/>
                 <a:cs typeface="Palatino Linotype"/>
               </a:rPr>
-              <a:t>Drittanbietern</a:t>
-            </a:r>
-            <a:r>
-              <a:rPr lang="de-DE" sz="2000" b="0" i="0" u="none" strike="noStrike" cap="none" spc="0">
+              <a:t> validate some other aspects of the model: validate</a:t>
+            </a:r>
+            <a:r>
+              <a:rPr lang="en-US" sz="2000" b="0" i="0" u="none" strike="noStrike" cap="none" spc="0">
                 <a:solidFill>
                   <a:schemeClr val="tx1"/>
                 </a:solidFill>
@@ -9391,10 +9468,10 @@
                 <a:ea typeface="Palatino Linotype"/>
                 <a:cs typeface="Palatino Linotype"/>
               </a:rPr>
-              <a:t>-Tools</a:t>
-            </a:r>
-            <a:r>
-              <a:rPr lang="de-DE" sz="2000" b="0" i="0" u="none" strike="noStrike" cap="none" spc="0">
+              <a:t> </a:t>
+            </a:r>
+            <a:r>
+              <a:rPr lang="en-US" sz="2000" b="0" i="0" u="none" strike="noStrike" cap="none" spc="0">
                 <a:solidFill>
                   <a:schemeClr val="tx1"/>
                 </a:solidFill>
@@ -9402,9 +9479,93 @@
                 <a:ea typeface="Palatino Linotype"/>
                 <a:cs typeface="Palatino Linotype"/>
               </a:rPr>
-              <a:t> konnten wir eine gut strukturierte und voll funktionsfähige Dokumentation-Website zu erstellen</a:t>
-            </a:r>
-            <a:endParaRPr lang="de-DE"/>
+              <a:t>that the Web element selectors have the correct syntax of CSS</a:t>
+            </a:r>
+            <a:r>
+              <a:rPr lang="en-US" sz="2000" b="0" i="0" u="none" strike="noStrike" cap="none" spc="0">
+                <a:solidFill>
+                  <a:schemeClr val="tx1"/>
+                </a:solidFill>
+                <a:latin typeface="Palatino Linotype"/>
+                <a:ea typeface="Palatino Linotype"/>
+                <a:cs typeface="Palatino Linotype"/>
+              </a:rPr>
+              <a:t> </a:t>
+            </a:r>
+            <a:r>
+              <a:rPr lang="en-US" sz="2000" b="0" i="0" u="none" strike="noStrike" cap="none" spc="0">
+                <a:solidFill>
+                  <a:schemeClr val="tx1"/>
+                </a:solidFill>
+                <a:latin typeface="Palatino Linotype"/>
+                <a:ea typeface="Palatino Linotype"/>
+                <a:cs typeface="Palatino Linotype"/>
+              </a:rPr>
+              <a:t>selectors or XPath</a:t>
+            </a:r>
+            <a:r>
+              <a:rPr lang="en-US" sz="2000" b="0" i="0" u="none" strike="noStrike" cap="none" spc="0">
+                <a:solidFill>
+                  <a:schemeClr val="tx1"/>
+                </a:solidFill>
+                <a:latin typeface="Palatino Linotype"/>
+                <a:ea typeface="Palatino Linotype"/>
+                <a:cs typeface="Palatino Linotype"/>
+              </a:rPr>
+              <a:t> We could even verify in advance if the HTML element we are looking</a:t>
+            </a:r>
+            <a:r>
+              <a:rPr lang="en-US" sz="2000" b="0" i="0" u="none" strike="noStrike" cap="none" spc="0">
+                <a:solidFill>
+                  <a:schemeClr val="tx1"/>
+                </a:solidFill>
+                <a:latin typeface="Palatino Linotype"/>
+                <a:ea typeface="Palatino Linotype"/>
+                <a:cs typeface="Palatino Linotype"/>
+              </a:rPr>
+              <a:t> </a:t>
+            </a:r>
+            <a:r>
+              <a:rPr lang="en-US" sz="2000" b="0" i="0" u="none" strike="noStrike" cap="none" spc="0">
+                <a:solidFill>
+                  <a:schemeClr val="tx1"/>
+                </a:solidFill>
+                <a:latin typeface="Palatino Linotype"/>
+                <a:ea typeface="Palatino Linotype"/>
+                <a:cs typeface="Palatino Linotype"/>
+              </a:rPr>
+              <a:t>for can be found with that given selector by running a selector query search in</a:t>
+            </a:r>
+            <a:r>
+              <a:rPr lang="en-US" sz="2000" b="0" i="0" u="none" strike="noStrike" cap="none" spc="0">
+                <a:solidFill>
+                  <a:schemeClr val="tx1"/>
+                </a:solidFill>
+                <a:latin typeface="Palatino Linotype"/>
+                <a:ea typeface="Palatino Linotype"/>
+                <a:cs typeface="Palatino Linotype"/>
+              </a:rPr>
+              <a:t> </a:t>
+            </a:r>
+            <a:r>
+              <a:rPr lang="en-US" sz="2000" b="0" i="0" u="none" strike="noStrike" cap="none" spc="0">
+                <a:solidFill>
+                  <a:schemeClr val="tx1"/>
+                </a:solidFill>
+                <a:latin typeface="Palatino Linotype"/>
+                <a:ea typeface="Palatino Linotype"/>
+                <a:cs typeface="Palatino Linotype"/>
+              </a:rPr>
+              <a:t>the background</a:t>
+            </a:r>
+            <a:endParaRPr lang="en-US" sz="2000" b="0" i="0" u="none" strike="noStrike" cap="none" spc="0">
+              <a:solidFill>
+                <a:schemeClr val="tx1"/>
+              </a:solidFill>
+              <a:latin typeface="Palatino Linotype"/>
+              <a:ea typeface="Palatino Linotype"/>
+              <a:cs typeface="Palatino Linotype"/>
+            </a:endParaRPr>
           </a:p>
         </p:txBody>
       </p:sp>
@@ -9425,6 +9586,182 @@
 </file>
 
 <file path=ppt/slides/slide18.xml><?xml version="1.0" encoding="utf-8"?>
+<p:sld xmlns:a="http://schemas.openxmlformats.org/drawingml/2006/main" xmlns:r="http://schemas.openxmlformats.org/officeDocument/2006/relationships" xmlns:p="http://schemas.openxmlformats.org/presentationml/2006/main" xmlns:m="http://schemas.openxmlformats.org/officeDocument/2006/math" xmlns:w="http://schemas.openxmlformats.org/wordprocessingml/2006/main" showMasterPhAnim="0" show="1">
+  <p:cSld name="">
+    <p:spTree>
+      <p:nvGrpSpPr>
+        <p:cNvPr id="1" name="" hidden="0"/>
+        <p:cNvGrpSpPr/>
+        <p:nvPr isPhoto="0" userDrawn="0"/>
+      </p:nvGrpSpPr>
+      <p:grpSpPr bwMode="auto">
+        <a:xfrm>
+          <a:off x="0" y="0"/>
+          <a:ext cx="0" cy="0"/>
+          <a:chOff x="0" y="0"/>
+          <a:chExt cx="0" cy="0"/>
+        </a:xfrm>
+      </p:grpSpPr>
+      <p:sp>
+        <p:nvSpPr>
+          <p:cNvPr id="653499456" name="Título 1" hidden="0"/>
+          <p:cNvSpPr>
+            <a:spLocks noGrp="1"/>
+          </p:cNvSpPr>
+          <p:nvPr isPhoto="0" userDrawn="0">
+            <p:ph type="title" hasCustomPrompt="0"/>
+          </p:nvPr>
+        </p:nvSpPr>
+        <p:spPr bwMode="auto"/>
+        <p:txBody>
+          <a:bodyPr/>
+          <a:lstStyle/>
+          <a:p>
+            <a:pPr>
+              <a:defRPr/>
+            </a:pPr>
+            <a:r>
+              <a:rPr lang="de-DE"/>
+              <a:t>Fazit</a:t>
+            </a:r>
+            <a:br>
+              <a:rPr lang="de-DE"/>
+            </a:br>
+            <a:endParaRPr sz="1600"/>
+          </a:p>
+        </p:txBody>
+      </p:sp>
+      <p:sp>
+        <p:nvSpPr>
+          <p:cNvPr id="751158943" name="Marcador de contenido 2" hidden="0"/>
+          <p:cNvSpPr>
+            <a:spLocks noGrp="1"/>
+          </p:cNvSpPr>
+          <p:nvPr isPhoto="0" userDrawn="0">
+            <p:ph idx="1" hasCustomPrompt="0"/>
+          </p:nvPr>
+        </p:nvSpPr>
+        <p:spPr bwMode="auto"/>
+        <p:txBody>
+          <a:bodyPr/>
+          <a:lstStyle/>
+          <a:p>
+            <a:pPr>
+              <a:defRPr/>
+            </a:pPr>
+            <a:r>
+              <a:rPr lang="de-DE" sz="2000" b="0" i="0" u="none" strike="noStrike" cap="none" spc="0">
+                <a:solidFill>
+                  <a:schemeClr val="tx1"/>
+                </a:solidFill>
+                <a:latin typeface="Palatino Linotype"/>
+                <a:ea typeface="Palatino Linotype"/>
+                <a:cs typeface="Palatino Linotype"/>
+              </a:rPr>
+              <a:t>DSL-getriebene Generierung von Endbenutzerdokumentation für Webanwendungen auf der Basis von Graphenmodellen unter Verwendung einer grafischen DSL</a:t>
+            </a:r>
+            <a:endParaRPr lang="de-DE" sz="2000" b="0" i="0" u="none" strike="noStrike" cap="none" spc="0">
+              <a:solidFill>
+                <a:schemeClr val="tx1"/>
+              </a:solidFill>
+              <a:latin typeface="Palatino Linotype"/>
+              <a:ea typeface="Palatino Linotype"/>
+              <a:cs typeface="Palatino Linotype"/>
+            </a:endParaRPr>
+          </a:p>
+          <a:p>
+            <a:pPr>
+              <a:defRPr/>
+            </a:pPr>
+            <a:r>
+              <a:rPr lang="de-DE" sz="2000" b="0" i="0" u="none" strike="noStrike" cap="none" spc="0">
+                <a:solidFill>
+                  <a:schemeClr val="tx1"/>
+                </a:solidFill>
+                <a:latin typeface="Palatino Linotype"/>
+                <a:ea typeface="Palatino Linotype"/>
+                <a:cs typeface="Palatino Linotype"/>
+              </a:rPr>
+              <a:t>Erstellung einer Editoranwendung, die es dem Dokumentationsdesigner ermöglicht grafische Diagramme zu erstellen, die den erforderlichen Benutzer-Workflow veranschaulichen</a:t>
+            </a:r>
+            <a:endParaRPr lang="de-DE" sz="2000" b="0" i="0" u="none" strike="noStrike" cap="none" spc="0">
+              <a:solidFill>
+                <a:schemeClr val="tx1"/>
+              </a:solidFill>
+              <a:latin typeface="Palatino Linotype"/>
+              <a:ea typeface="Palatino Linotype"/>
+              <a:cs typeface="Palatino Linotype"/>
+            </a:endParaRPr>
+          </a:p>
+          <a:p>
+            <a:pPr>
+              <a:defRPr/>
+            </a:pPr>
+            <a:r>
+              <a:rPr lang="de-DE" sz="2000" b="0" i="0" u="none" strike="noStrike" cap="none" spc="0">
+                <a:solidFill>
+                  <a:schemeClr val="tx1"/>
+                </a:solidFill>
+                <a:latin typeface="Palatino Linotype"/>
+                <a:ea typeface="Palatino Linotype"/>
+                <a:cs typeface="Palatino Linotype"/>
+              </a:rPr>
+              <a:t>Mithilfe von </a:t>
+            </a:r>
+            <a:r>
+              <a:rPr lang="de-DE" sz="2000" b="0" i="0" u="none" strike="noStrike" cap="none" spc="0">
+                <a:solidFill>
+                  <a:schemeClr val="tx1"/>
+                </a:solidFill>
+                <a:latin typeface="Palatino Linotype"/>
+                <a:ea typeface="Palatino Linotype"/>
+                <a:cs typeface="Palatino Linotype"/>
+              </a:rPr>
+              <a:t>Drittanbietern</a:t>
+            </a:r>
+            <a:r>
+              <a:rPr lang="de-DE" sz="2000" b="0" i="0" u="none" strike="noStrike" cap="none" spc="0">
+                <a:solidFill>
+                  <a:schemeClr val="tx1"/>
+                </a:solidFill>
+                <a:latin typeface="Palatino Linotype"/>
+                <a:ea typeface="Palatino Linotype"/>
+                <a:cs typeface="Palatino Linotype"/>
+              </a:rPr>
+              <a:t>-Tools</a:t>
+            </a:r>
+            <a:r>
+              <a:rPr lang="de-DE" sz="2000" b="0" i="0" u="none" strike="noStrike" cap="none" spc="0">
+                <a:solidFill>
+                  <a:schemeClr val="tx1"/>
+                </a:solidFill>
+                <a:latin typeface="Palatino Linotype"/>
+                <a:ea typeface="Palatino Linotype"/>
+                <a:cs typeface="Palatino Linotype"/>
+              </a:rPr>
+              <a:t> konnten wir eine gut strukturierte und voll funktionsfähige Dokumentation-Website zu erstellen</a:t>
+            </a:r>
+            <a:endParaRPr lang="de-DE"/>
+          </a:p>
+        </p:txBody>
+      </p:sp>
+    </p:spTree>
+  </p:cSld>
+  <p:clrMapOvr>
+    <a:masterClrMapping/>
+  </p:clrMapOvr>
+  <mc:AlternateContent xmlns:mc="http://schemas.openxmlformats.org/markup-compatibility/2006">
+    <mc:Choice xmlns:p14="http://schemas.microsoft.com/office/powerpoint/2010/main" Requires="p14">
+      <p:transition p14:dur="2000" advClick="1"/>
+    </mc:Choice>
+    <mc:Fallback>
+      <p:transition advClick="1"/>
+    </mc:Fallback>
+  </mc:AlternateContent>
+</p:sld>
+</file>
+
+<file path=ppt/slides/slide19.xml><?xml version="1.0" encoding="utf-8"?>
 <p:sld xmlns:a="http://schemas.openxmlformats.org/drawingml/2006/main" xmlns:r="http://schemas.openxmlformats.org/officeDocument/2006/relationships" xmlns:p="http://schemas.openxmlformats.org/presentationml/2006/main" xmlns:m="http://schemas.openxmlformats.org/officeDocument/2006/math" xmlns:w="http://schemas.openxmlformats.org/wordprocessingml/2006/main" showMasterPhAnim="0" show="1">
   <p:cSld name="">
     <p:spTree>
@@ -11753,8 +12090,15 @@
               <a:rPr lang="de-DE"/>
             </a:br>
             <a:r>
-              <a:rPr lang="de-DE" sz="1600" i="1"/>
-              <a:t>Feature- und Dokumentationssprachen</a:t>
+              <a:rPr lang="de-DE" sz="1600" b="0" i="1" u="none" strike="noStrike" cap="none" spc="0">
+                <a:solidFill>
+                  <a:schemeClr val="tx1"/>
+                </a:solidFill>
+                <a:latin typeface="+mj-lt"/>
+                <a:ea typeface="+mj-ea"/>
+                <a:cs typeface="+mj-cs"/>
+              </a:rPr>
+              <a:t>Besonderheiten</a:t>
             </a:r>
             <a:endParaRPr/>
           </a:p>
@@ -11772,8 +12116,8 @@
         </p:nvSpPr>
         <p:spPr bwMode="auto">
           <a:xfrm flipH="0" flipV="0">
-            <a:off x="1534695" y="2015731"/>
-            <a:ext cx="9520157" cy="474539"/>
+            <a:off x="3188370" y="2015731"/>
+            <a:ext cx="5657620" cy="3515653"/>
           </a:xfrm>
         </p:spPr>
         <p:txBody>
@@ -11783,258 +12127,160 @@
             <a:pPr>
               <a:defRPr/>
             </a:pPr>
-            <a:r>
-              <a:rPr lang="de-DE" sz="2000" b="0" i="0" u="none" strike="noStrike" cap="none" spc="0">
-                <a:solidFill>
-                  <a:schemeClr val="tx1"/>
-                </a:solidFill>
-                <a:latin typeface="Palatino Linotype"/>
-                <a:ea typeface="Arial"/>
-                <a:cs typeface="Arial"/>
-              </a:rPr>
-              <a:t>Meta Graph Language, Meta Style Language</a:t>
-            </a:r>
             <a:endParaRPr lang="de-DE" sz="2000"/>
           </a:p>
-        </p:txBody>
-      </p:sp>
-      <p:sp>
-        <p:nvSpPr>
-          <p:cNvPr id="1881502250" name="Content Placeholder 2" hidden="0"/>
-          <p:cNvSpPr>
-            <a:spLocks noGrp="1"/>
-          </p:cNvSpPr>
+          <a:p>
+            <a:pPr>
+              <a:defRPr/>
+            </a:pPr>
+            <a:endParaRPr lang="de-DE" sz="2000"/>
+          </a:p>
+          <a:p>
+            <a:pPr>
+              <a:defRPr/>
+            </a:pPr>
+            <a:endParaRPr lang="de-DE" sz="2000"/>
+          </a:p>
+        </p:txBody>
+      </p:sp>
+      <p:pic>
+        <p:nvPicPr>
+          <p:cNvPr id="759913631" name="" hidden="0"/>
+          <p:cNvPicPr>
+            <a:picLocks noChangeAspect="1"/>
+          </p:cNvPicPr>
+          <p:nvPr isPhoto="0" userDrawn="0"/>
+        </p:nvPicPr>
+        <p:blipFill>
+          <a:blip r:embed="rId3"/>
+          <a:stretch/>
+        </p:blipFill>
+        <p:spPr bwMode="auto">
+          <a:xfrm rot="0" flipH="0" flipV="0">
+            <a:off x="1634400" y="2015731"/>
+            <a:ext cx="1553970" cy="3234200"/>
+          </a:xfrm>
+          <a:prstGeom prst="rect">
+            <a:avLst/>
+          </a:prstGeom>
+        </p:spPr>
+      </p:pic>
+      <p:sp>
+        <p:nvSpPr>
+          <p:cNvPr id="1425266254" name="" hidden="0"/>
+          <p:cNvSpPr txBox="1"/>
           <p:nvPr isPhoto="0" userDrawn="0"/>
         </p:nvSpPr>
         <p:spPr bwMode="auto">
           <a:xfrm flipH="0" flipV="0">
-            <a:off x="1534694" y="4697255"/>
-            <a:ext cx="9520157" cy="543393"/>
+            <a:off x="1542680" y="5302577"/>
+            <a:ext cx="1796820" cy="228808"/>
           </a:xfrm>
+          <a:prstGeom prst="rect">
+            <a:avLst/>
+          </a:prstGeom>
+          <a:noFill/>
         </p:spPr>
         <p:txBody>
-          <a:bodyPr vert="horz" lIns="91440" tIns="45720" rIns="91440" bIns="45720" rtlCol="0" anchor="t">
-            <a:normAutofit/>
+          <a:bodyPr vertOverflow="overflow" horzOverflow="clip" vert="horz" wrap="square" lIns="91440" tIns="45720" rIns="91440" bIns="45720" numCol="1" spcCol="0" rtlCol="0" fromWordArt="0" anchor="t" anchorCtr="0" forceAA="0" upright="0" compatLnSpc="0">
+            <a:noAutofit/>
           </a:bodyPr>
-          <a:lstStyle>
-            <a:lvl1pPr marL="228600" indent="-228600" algn="l" defTabSz="914400">
-              <a:lnSpc>
-                <a:spcPct val="120000"/>
-              </a:lnSpc>
-              <a:spcBef>
-                <a:spcPts val="999"/>
-              </a:spcBef>
-              <a:buClr>
-                <a:schemeClr val="accent1"/>
-              </a:buClr>
-              <a:buSzPct val="100000"/>
-              <a:buFont typeface="Arial"/>
-              <a:buChar char="•"/>
-              <a:defRPr sz="2000">
+          <a:p>
+            <a:pPr>
+              <a:defRPr/>
+            </a:pPr>
+            <a:r>
+              <a:rPr lang="de-DE" sz="900" b="0" i="0" u="none" strike="noStrike" cap="none" spc="0">
                 <a:solidFill>
                   <a:schemeClr val="tx1"/>
                 </a:solidFill>
                 <a:latin typeface="+mn-lt"/>
                 <a:ea typeface="+mn-ea"/>
                 <a:cs typeface="+mn-cs"/>
-              </a:defRPr>
-            </a:lvl1pPr>
-            <a:lvl2pPr marL="685800" indent="-228600" algn="l" defTabSz="914400">
-              <a:lnSpc>
-                <a:spcPct val="120000"/>
-              </a:lnSpc>
-              <a:spcBef>
-                <a:spcPts val="499"/>
-              </a:spcBef>
-              <a:buClr>
-                <a:schemeClr val="accent1"/>
-              </a:buClr>
-              <a:buSzPct val="100000"/>
-              <a:buFont typeface="Arial"/>
-              <a:buChar char="•"/>
-              <a:defRPr sz="1800" cap="none">
-                <a:solidFill>
-                  <a:schemeClr val="tx1"/>
-                </a:solidFill>
-                <a:latin typeface="+mn-lt"/>
-                <a:ea typeface="+mn-ea"/>
-                <a:cs typeface="+mn-cs"/>
-              </a:defRPr>
-            </a:lvl2pPr>
-            <a:lvl3pPr marL="1143000" indent="-228600" algn="l" defTabSz="914400">
-              <a:lnSpc>
-                <a:spcPct val="120000"/>
-              </a:lnSpc>
-              <a:spcBef>
-                <a:spcPts val="499"/>
-              </a:spcBef>
-              <a:buClr>
-                <a:schemeClr val="accent1"/>
-              </a:buClr>
-              <a:buSzPct val="100000"/>
-              <a:buFont typeface="Arial"/>
-              <a:buChar char="•"/>
-              <a:defRPr sz="1600">
-                <a:solidFill>
-                  <a:schemeClr val="tx1"/>
-                </a:solidFill>
-                <a:latin typeface="+mn-lt"/>
-                <a:ea typeface="+mn-ea"/>
-                <a:cs typeface="+mn-cs"/>
-              </a:defRPr>
-            </a:lvl3pPr>
-            <a:lvl4pPr marL="1600200" indent="-228600" algn="l" defTabSz="914400">
-              <a:lnSpc>
-                <a:spcPct val="120000"/>
-              </a:lnSpc>
-              <a:spcBef>
-                <a:spcPts val="499"/>
-              </a:spcBef>
-              <a:buClr>
-                <a:schemeClr val="accent1"/>
-              </a:buClr>
-              <a:buSzPct val="100000"/>
-              <a:buFont typeface="Arial"/>
-              <a:buChar char="•"/>
-              <a:defRPr sz="1400" cap="none">
-                <a:solidFill>
-                  <a:schemeClr val="tx1"/>
-                </a:solidFill>
-                <a:latin typeface="+mn-lt"/>
-                <a:ea typeface="+mn-ea"/>
-                <a:cs typeface="+mn-cs"/>
-              </a:defRPr>
-            </a:lvl4pPr>
-            <a:lvl5pPr marL="2057400" indent="-228600" algn="l" defTabSz="914400">
-              <a:lnSpc>
-                <a:spcPct val="120000"/>
-              </a:lnSpc>
-              <a:spcBef>
-                <a:spcPts val="499"/>
-              </a:spcBef>
-              <a:buClr>
-                <a:schemeClr val="accent1"/>
-              </a:buClr>
-              <a:buSzPct val="100000"/>
-              <a:buFont typeface="Arial"/>
-              <a:buChar char="•"/>
-              <a:defRPr sz="1200">
-                <a:solidFill>
-                  <a:schemeClr val="tx1"/>
-                </a:solidFill>
-                <a:latin typeface="+mn-lt"/>
-                <a:ea typeface="+mn-ea"/>
-                <a:cs typeface="+mn-cs"/>
-              </a:defRPr>
-            </a:lvl5pPr>
-            <a:lvl6pPr marL="2514599" indent="-228600" algn="l" defTabSz="914400">
-              <a:lnSpc>
-                <a:spcPct val="120000"/>
-              </a:lnSpc>
-              <a:spcBef>
-                <a:spcPts val="499"/>
-              </a:spcBef>
-              <a:buClr>
-                <a:schemeClr val="accent1"/>
-              </a:buClr>
-              <a:buSzPct val="100000"/>
-              <a:buFont typeface="Arial"/>
-              <a:buChar char="•"/>
-              <a:defRPr sz="1200">
-                <a:solidFill>
-                  <a:schemeClr val="tx1"/>
-                </a:solidFill>
-                <a:latin typeface="+mn-lt"/>
-                <a:ea typeface="+mn-ea"/>
-                <a:cs typeface="+mn-cs"/>
-              </a:defRPr>
-            </a:lvl6pPr>
-            <a:lvl7pPr marL="2971800" indent="-228600" algn="l" defTabSz="914400">
-              <a:lnSpc>
-                <a:spcPct val="120000"/>
-              </a:lnSpc>
-              <a:spcBef>
-                <a:spcPts val="499"/>
-              </a:spcBef>
-              <a:buClr>
-                <a:schemeClr val="accent1"/>
-              </a:buClr>
-              <a:buSzPct val="100000"/>
-              <a:buFont typeface="Arial"/>
-              <a:buChar char="•"/>
-              <a:defRPr sz="1200">
-                <a:solidFill>
-                  <a:schemeClr val="tx1"/>
-                </a:solidFill>
-                <a:latin typeface="+mn-lt"/>
-                <a:ea typeface="+mn-ea"/>
-                <a:cs typeface="+mn-cs"/>
-              </a:defRPr>
-            </a:lvl7pPr>
-            <a:lvl8pPr marL="3429000" indent="-228600" algn="l" defTabSz="914400">
-              <a:lnSpc>
-                <a:spcPct val="120000"/>
-              </a:lnSpc>
-              <a:spcBef>
-                <a:spcPts val="499"/>
-              </a:spcBef>
-              <a:buClr>
-                <a:schemeClr val="accent1"/>
-              </a:buClr>
-              <a:buSzPct val="100000"/>
-              <a:buFont typeface="Arial"/>
-              <a:buChar char="•"/>
-              <a:defRPr sz="1200">
-                <a:solidFill>
-                  <a:schemeClr val="tx1"/>
-                </a:solidFill>
-                <a:latin typeface="+mn-lt"/>
-                <a:ea typeface="+mn-ea"/>
-                <a:cs typeface="+mn-cs"/>
-              </a:defRPr>
-            </a:lvl8pPr>
-            <a:lvl9pPr marL="3886200" indent="-228600" algn="l" defTabSz="914400">
-              <a:lnSpc>
-                <a:spcPct val="120000"/>
-              </a:lnSpc>
-              <a:spcBef>
-                <a:spcPts val="499"/>
-              </a:spcBef>
-              <a:buClr>
-                <a:schemeClr val="accent1"/>
-              </a:buClr>
-              <a:buSzPct val="100000"/>
-              <a:buFont typeface="Arial"/>
-              <a:buChar char="•"/>
-              <a:defRPr sz="1200">
-                <a:solidFill>
-                  <a:schemeClr val="tx1"/>
-                </a:solidFill>
-                <a:latin typeface="+mn-lt"/>
-                <a:ea typeface="+mn-ea"/>
-                <a:cs typeface="+mn-cs"/>
-              </a:defRPr>
-            </a:lvl9pPr>
-          </a:lstStyle>
-          <a:p>
-            <a:pPr>
-              <a:defRPr/>
-            </a:pPr>
-            <a:r>
-              <a:rPr lang="de-DE" sz="2000" b="0" i="0" u="none" strike="noStrike" cap="none" spc="0">
-                <a:solidFill>
-                  <a:schemeClr val="tx1"/>
-                </a:solidFill>
-                <a:latin typeface="Palatino Linotype"/>
-                <a:ea typeface="Arial"/>
-                <a:cs typeface="Arial"/>
               </a:rPr>
-              <a:t>Cinco Product Definition</a:t>
-            </a:r>
-            <a:endParaRPr lang="de-DE" sz="2000"/>
-          </a:p>
-        </p:txBody>
-      </p:sp>
+              <a:t>FeatureGraph Modelelemente</a:t>
+            </a:r>
+            <a:endParaRPr sz="900"/>
+          </a:p>
+        </p:txBody>
+      </p:sp>
+      <p:grpSp>
+        <p:nvGrpSpPr>
+          <p:cNvPr id="1824140101" name="" hidden="0"/>
+          <p:cNvGrpSpPr/>
+          <p:nvPr isPhoto="0" userDrawn="0"/>
+        </p:nvGrpSpPr>
+        <p:grpSpPr bwMode="auto">
+          <a:xfrm>
+            <a:off x="8999913" y="944251"/>
+            <a:ext cx="1603576" cy="4992694"/>
+            <a:chOff x="0" y="0"/>
+            <a:chExt cx="1603576" cy="4992694"/>
+          </a:xfrm>
+        </p:grpSpPr>
+        <p:pic>
+          <p:nvPicPr>
+            <p:cNvPr id="1424992661" name="" hidden="0"/>
+            <p:cNvPicPr>
+              <a:picLocks noChangeAspect="1"/>
+            </p:cNvPicPr>
+            <p:nvPr isPhoto="0" userDrawn="0"/>
+          </p:nvPicPr>
+          <p:blipFill>
+            <a:blip r:embed="rId4"/>
+            <a:srcRect l="897" t="343" r="0" b="0"/>
+            <a:stretch/>
+          </p:blipFill>
+          <p:spPr bwMode="auto">
+            <a:xfrm flipH="0" flipV="0">
+              <a:off x="0" y="0"/>
+              <a:ext cx="1603576" cy="4763886"/>
+            </a:xfrm>
+            <a:prstGeom prst="rect">
+              <a:avLst/>
+            </a:prstGeom>
+          </p:spPr>
+        </p:pic>
+        <p:sp>
+          <p:nvSpPr>
+            <p:cNvPr id="1326760243" name="" hidden="0"/>
+            <p:cNvSpPr txBox="1"/>
+            <p:nvPr isPhoto="0" userDrawn="0"/>
+          </p:nvSpPr>
+          <p:spPr bwMode="auto">
+            <a:xfrm flipH="0" flipV="0">
+              <a:off x="0" y="4763886"/>
+              <a:ext cx="1594852" cy="228807"/>
+            </a:xfrm>
+            <a:prstGeom prst="rect">
+              <a:avLst/>
+            </a:prstGeom>
+            <a:noFill/>
+          </p:spPr>
+          <p:txBody>
+            <a:bodyPr vertOverflow="overflow" horzOverflow="clip" vert="horz" wrap="square" lIns="91440" tIns="45720" rIns="91440" bIns="45720" numCol="1" spcCol="0" rtlCol="0" fromWordArt="0" anchor="t" anchorCtr="0" forceAA="0" upright="0" compatLnSpc="0">
+              <a:noAutofit/>
+            </a:bodyPr>
+            <a:p>
+              <a:pPr>
+                <a:defRPr/>
+              </a:pPr>
+              <a:r>
+                <a:rPr lang="de-DE" sz="900" b="0" i="0" u="none" strike="noStrike" cap="none" spc="0">
+                  <a:solidFill>
+                    <a:schemeClr val="tx1"/>
+                  </a:solidFill>
+                  <a:latin typeface="+mn-lt"/>
+                  <a:ea typeface="+mn-ea"/>
+                  <a:cs typeface="+mn-cs"/>
+                </a:rPr>
+                <a:t>DocGraph Modelelemente</a:t>
+              </a:r>
+              <a:endParaRPr/>
+            </a:p>
+          </p:txBody>
+        </p:sp>
+      </p:grpSp>
     </p:spTree>
   </p:cSld>
   <p:clrMapOvr>

</xml_diff>

<commit_message>
submits second correction iteration :sparkle:
</commit_message>
<xml_diff>
--- a/Abschlussvortrag.pptx
+++ b/Abschlussvortrag.pptx
@@ -615,95 +615,6 @@
                 <a:ea typeface="Palatino Linotype"/>
                 <a:cs typeface="Palatino Linotype"/>
               </a:rPr>
-              <a:t>- Was hast du für die Demo geplant? Ich hoffe, du gehst da detailliert auf die ganzen Features deiner Sprachen ein: Primereferenzen, Verschachtelung, Enablen/Disablen von Screenshots, Checks etc.</a:t>
-            </a:r>
-            <a:endParaRPr/>
-          </a:p>
-        </p:txBody>
-      </p:sp>
-      <p:sp>
-        <p:nvSpPr>
-          <p:cNvPr id="4" name="Slide Number Placeholder 3" hidden="0"/>
-          <p:cNvSpPr>
-            <a:spLocks noGrp="1"/>
-          </p:cNvSpPr>
-          <p:nvPr isPhoto="0" userDrawn="0">
-            <p:ph type="sldNum" sz="quarter" idx="10" hasCustomPrompt="0"/>
-          </p:nvPr>
-        </p:nvSpPr>
-        <p:spPr bwMode="auto"/>
-        <p:txBody>
-          <a:bodyPr/>
-          <a:lstStyle/>
-          <a:p>
-            <a:pPr>
-              <a:defRPr/>
-            </a:pPr>
-            <a:endParaRPr/>
-          </a:p>
-        </p:txBody>
-      </p:sp>
-    </p:spTree>
-  </p:cSld>
-</p:notes>
-</file>
-
-<file path=ppt/notesSlides/notesSlide11.xml><?xml version="1.0" encoding="utf-8"?>
-<p:notes xmlns:a="http://schemas.openxmlformats.org/drawingml/2006/main" xmlns:r="http://schemas.openxmlformats.org/officeDocument/2006/relationships" xmlns:p="http://schemas.openxmlformats.org/presentationml/2006/main" xmlns:m="http://schemas.openxmlformats.org/officeDocument/2006/math" xmlns:w="http://schemas.openxmlformats.org/wordprocessingml/2006/main">
-  <p:cSld name="">
-    <p:spTree>
-      <p:nvGrpSpPr>
-        <p:cNvPr id="1" name="" hidden="0"/>
-        <p:cNvGrpSpPr/>
-        <p:nvPr isPhoto="0" userDrawn="0"/>
-      </p:nvGrpSpPr>
-      <p:grpSpPr bwMode="auto">
-        <a:xfrm>
-          <a:off x="0" y="0"/>
-          <a:ext cx="0" cy="0"/>
-          <a:chOff x="0" y="0"/>
-          <a:chExt cx="0" cy="0"/>
-        </a:xfrm>
-      </p:grpSpPr>
-      <p:sp>
-        <p:nvSpPr>
-          <p:cNvPr id="2" name="Slide Image Placeholder 1" hidden="0"/>
-          <p:cNvSpPr>
-            <a:spLocks noChangeAspect="1" noGrp="1" noRot="1"/>
-          </p:cNvSpPr>
-          <p:nvPr isPhoto="0" userDrawn="0">
-            <p:ph type="sldImg" hasCustomPrompt="0"/>
-          </p:nvPr>
-        </p:nvSpPr>
-        <p:spPr bwMode="auto"/>
-      </p:sp>
-      <p:sp>
-        <p:nvSpPr>
-          <p:cNvPr id="3" name="Notes Placeholder 2" hidden="0"/>
-          <p:cNvSpPr>
-            <a:spLocks noGrp="1"/>
-          </p:cNvSpPr>
-          <p:nvPr isPhoto="0" userDrawn="0">
-            <p:ph type="body" idx="1" hasCustomPrompt="0"/>
-          </p:nvPr>
-        </p:nvSpPr>
-        <p:spPr bwMode="auto"/>
-        <p:txBody>
-          <a:bodyPr/>
-          <a:lstStyle/>
-          <a:p>
-            <a:pPr>
-              <a:defRPr/>
-            </a:pPr>
-            <a:r>
-              <a:rPr lang="de-DE" sz="1200" b="0" i="0" u="none" strike="noStrike" cap="none" spc="0">
-                <a:solidFill>
-                  <a:schemeClr val="tx1"/>
-                </a:solidFill>
-                <a:latin typeface="Palatino Linotype"/>
-                <a:ea typeface="Palatino Linotype"/>
-                <a:cs typeface="Palatino Linotype"/>
-              </a:rPr>
               <a:t>- Folie 16: Da fehlt noch das Fazit aus deiner Evaluierung bzw. Bewertung deines Tools gemessen an dem, was du damit gemacht hast.</a:t>
             </a:r>
             <a:endParaRPr/>
@@ -1532,7 +1443,7 @@
       </p:grpSpPr>
       <p:sp>
         <p:nvSpPr>
-          <p:cNvPr id="1142653141" name="Slide Image Placeholder 1" hidden="0"/>
+          <p:cNvPr id="2002792847" name="Slide Image Placeholder 1" hidden="0"/>
           <p:cNvSpPr>
             <a:spLocks noChangeAspect="1" noGrp="1" noRot="1"/>
           </p:cNvSpPr>
@@ -1544,7 +1455,7 @@
       </p:sp>
       <p:sp>
         <p:nvSpPr>
-          <p:cNvPr id="459416605" name="Notes Placeholder 2" hidden="0"/>
+          <p:cNvPr id="781609919" name="Notes Placeholder 2" hidden="0"/>
           <p:cNvSpPr>
             <a:spLocks noGrp="1"/>
           </p:cNvSpPr>
@@ -1561,23 +1472,22 @@
               <a:defRPr/>
             </a:pPr>
             <a:r>
-              <a:rPr lang="de-DE" sz="1200" b="0" i="0" u="none" strike="noStrike" cap="none" spc="0">
-                <a:solidFill>
-                  <a:schemeClr val="tx1"/>
-                </a:solidFill>
-                <a:latin typeface="Palatino Linotype"/>
-                <a:ea typeface="Palatino Linotype"/>
-                <a:cs typeface="Palatino Linotype"/>
-              </a:rPr>
-              <a:t>- Ich vermisse ein wenig die Vorstellung der Sprachfeatures und deren Besonderheiten</a:t>
-            </a:r>
-            <a:endParaRPr/>
-          </a:p>
-        </p:txBody>
-      </p:sp>
-      <p:sp>
-        <p:nvSpPr>
-          <p:cNvPr id="1351282617" name="Slide Number Placeholder 3" hidden="0"/>
+              <a:rPr/>
+              <a:t>Die Verwendung externer Technologie ist insofern</a:t>
+            </a:r>
+            <a:endParaRPr/>
+          </a:p>
+          <a:p>
+            <a:pPr>
+              <a:defRPr/>
+            </a:pPr>
+            <a:endParaRPr/>
+          </a:p>
+        </p:txBody>
+      </p:sp>
+      <p:sp>
+        <p:nvSpPr>
+          <p:cNvPr id="1255829888" name="Slide Number Placeholder 3" hidden="0"/>
           <p:cNvSpPr>
             <a:spLocks noGrp="1"/>
           </p:cNvSpPr>
@@ -1710,7 +1620,7 @@
       </p:grpSpPr>
       <p:sp>
         <p:nvSpPr>
-          <p:cNvPr id="2002792847" name="Slide Image Placeholder 1" hidden="0"/>
+          <p:cNvPr id="2" name="Slide Image Placeholder 1" hidden="0"/>
           <p:cNvSpPr>
             <a:spLocks noChangeAspect="1" noGrp="1" noRot="1"/>
           </p:cNvSpPr>
@@ -1722,7 +1632,7 @@
       </p:sp>
       <p:sp>
         <p:nvSpPr>
-          <p:cNvPr id="781609919" name="Notes Placeholder 2" hidden="0"/>
+          <p:cNvPr id="3" name="Notes Placeholder 2" hidden="0"/>
           <p:cNvSpPr>
             <a:spLocks noGrp="1"/>
           </p:cNvSpPr>
@@ -1739,22 +1649,6 @@
               <a:defRPr/>
             </a:pPr>
             <a:r>
-              <a:rPr/>
-              <a:t>Die Verwendung externer Technologie ist insofern</a:t>
-            </a:r>
-            <a:endParaRPr/>
-          </a:p>
-          <a:p>
-            <a:pPr>
-              <a:defRPr/>
-            </a:pPr>
-            <a:endParaRPr/>
-          </a:p>
-          <a:p>
-            <a:pPr>
-              <a:defRPr/>
-            </a:pPr>
-            <a:r>
               <a:rPr lang="de-DE" sz="1200" b="0" i="0" u="none" strike="noStrike" cap="none" spc="0">
                 <a:solidFill>
                   <a:schemeClr val="tx1"/>
@@ -1763,15 +1657,15 @@
                 <a:ea typeface="Palatino Linotype"/>
                 <a:cs typeface="Palatino Linotype"/>
               </a:rPr>
-              <a:t>- Folie 10: Inwiefern verhindert das einen Single-Point-of-failure?</a:t>
-            </a:r>
-            <a:endParaRPr/>
-          </a:p>
-        </p:txBody>
-      </p:sp>
-      <p:sp>
-        <p:nvSpPr>
-          <p:cNvPr id="1255829888" name="Slide Number Placeholder 3" hidden="0"/>
+              <a:t>- Was hast du für die Demo geplant? Ich hoffe, du gehst da detailliert auf die ganzen Features deiner Sprachen ein: Primereferenzen, Verschachtelung, Enablen/Disablen von Screenshots, Checks etc.</a:t>
+            </a:r>
+            <a:endParaRPr/>
+          </a:p>
+        </p:txBody>
+      </p:sp>
+      <p:sp>
+        <p:nvSpPr>
+          <p:cNvPr id="4" name="Slide Number Placeholder 3" hidden="0"/>
           <p:cNvSpPr>
             <a:spLocks noGrp="1"/>
           </p:cNvSpPr>
@@ -8083,7 +7977,7 @@
       </p:grpSpPr>
       <p:sp>
         <p:nvSpPr>
-          <p:cNvPr id="1992529021" name="Título 1" hidden="0"/>
+          <p:cNvPr id="997314373" name="Título 1" hidden="0"/>
           <p:cNvSpPr>
             <a:spLocks noGrp="1"/>
           </p:cNvSpPr>
@@ -8107,16 +8001,23 @@
               <a:rPr lang="de-DE"/>
             </a:br>
             <a:r>
-              <a:rPr lang="de-DE" sz="1600" i="1"/>
-              <a:t>Feature- und Dokumentationssprachen</a:t>
-            </a:r>
-            <a:endParaRPr/>
-          </a:p>
-        </p:txBody>
-      </p:sp>
-      <p:sp>
-        <p:nvSpPr>
-          <p:cNvPr id="769483727" name="Content Placeholder 2" hidden="0"/>
+              <a:rPr lang="de-DE" sz="1600" b="0" i="1" u="none" strike="noStrike" cap="none" spc="0">
+                <a:solidFill>
+                  <a:schemeClr val="tx1"/>
+                </a:solidFill>
+                <a:latin typeface="+mj-lt"/>
+                <a:ea typeface="+mj-ea"/>
+                <a:cs typeface="+mj-cs"/>
+              </a:rPr>
+              <a:t>FeatureGraph Modellsprache</a:t>
+            </a:r>
+            <a:endParaRPr/>
+          </a:p>
+        </p:txBody>
+      </p:sp>
+      <p:sp>
+        <p:nvSpPr>
+          <p:cNvPr id="1461394510" name="Content Placeholder 2" hidden="0"/>
           <p:cNvSpPr>
             <a:spLocks noGrp="1"/>
           </p:cNvSpPr>
@@ -8126,17 +8027,23 @@
         </p:nvSpPr>
         <p:spPr bwMode="auto">
           <a:xfrm flipH="0" flipV="0">
-            <a:off x="3188370" y="2015731"/>
-            <a:ext cx="5657620" cy="3515653"/>
+            <a:off x="3188369" y="2015730"/>
+            <a:ext cx="8076120" cy="3515652"/>
           </a:xfrm>
         </p:spPr>
         <p:txBody>
-          <a:bodyPr anchor="t"/>
+          <a:bodyPr vertOverflow="overflow" horzOverflow="clip" vert="horz" wrap="square" lIns="91440" tIns="45720" rIns="91440" bIns="45720" numCol="1" spcCol="0" rtlCol="0" fromWordArt="0" anchor="t" anchorCtr="0" forceAA="0" upright="0" compatLnSpc="0">
+            <a:normAutofit/>
+          </a:bodyPr>
           <a:lstStyle/>
           <a:p>
             <a:pPr>
               <a:defRPr/>
             </a:pPr>
+            <a:r>
+              <a:rPr lang="de-DE" sz="2000"/>
+              <a:t>Modellelement sind nach ihrem Zweck kategorisiert</a:t>
+            </a:r>
             <a:endParaRPr lang="de-DE" sz="2000"/>
           </a:p>
           <a:p>
@@ -8145,110 +8052,70 @@
             </a:pPr>
             <a:r>
               <a:rPr lang="de-DE" sz="2000"/>
-              <a:t>DocGraph Modelelemente (rechts)</a:t>
+              <a:t>‚Selenium Properites‘ z.B. kategorisiert Einstellungselemente für die Selenium Framework,</a:t>
+            </a:r>
+            <a:r>
+              <a:rPr lang="de-DE" sz="2000" b="0" i="0" u="none" strike="noStrike" cap="none" spc="0">
+                <a:solidFill>
+                  <a:schemeClr val="tx1"/>
+                </a:solidFill>
+                <a:latin typeface="Palatino Linotype"/>
+                <a:ea typeface="Palatino Linotype"/>
+                <a:cs typeface="Palatino Linotype"/>
+              </a:rPr>
+              <a:t> d.h. Konfigurationen, die sonst nicht modelliert werden könnten, aber dennoch für die Ausführung der Anwendung wichtig sind</a:t>
+            </a:r>
+            <a:endParaRPr lang="de-DE" sz="2000" b="0" i="0" u="none" strike="noStrike" cap="none" spc="0">
+              <a:solidFill>
+                <a:schemeClr val="tx1"/>
+              </a:solidFill>
+              <a:latin typeface="Palatino Linotype"/>
+              <a:ea typeface="Palatino Linotype"/>
+              <a:cs typeface="Palatino Linotype"/>
+            </a:endParaRPr>
+          </a:p>
+          <a:p>
+            <a:pPr>
+              <a:defRPr/>
+            </a:pPr>
+            <a:r>
+              <a:rPr lang="de-DE" sz="2000"/>
+              <a:t>‚Feature Inner Elements‘ repräsentieren Strukturelemente der Modellsprache .feat</a:t>
             </a:r>
             <a:endParaRPr lang="de-DE" sz="2000"/>
-          </a:p>
-          <a:p>
-            <a:pPr>
-              <a:defRPr/>
-            </a:pPr>
-            <a:endParaRPr lang="de-DE" sz="2000"/>
-          </a:p>
-        </p:txBody>
-      </p:sp>
-      <p:pic>
-        <p:nvPicPr>
-          <p:cNvPr id="131235200" name="" hidden="0"/>
-          <p:cNvPicPr>
-            <a:picLocks noChangeAspect="1"/>
-          </p:cNvPicPr>
-          <p:nvPr isPhoto="0" userDrawn="0"/>
-        </p:nvPicPr>
-        <p:blipFill>
-          <a:blip r:embed="rId3"/>
-          <a:stretch/>
-        </p:blipFill>
-        <p:spPr bwMode="auto">
-          <a:xfrm rot="0" flipH="0" flipV="0">
-            <a:off x="1634400" y="2015731"/>
-            <a:ext cx="1553970" cy="3234200"/>
-          </a:xfrm>
-          <a:prstGeom prst="rect">
-            <a:avLst/>
-          </a:prstGeom>
-        </p:spPr>
-      </p:pic>
-      <p:sp>
-        <p:nvSpPr>
-          <p:cNvPr id="2101884081" name="" hidden="0"/>
-          <p:cNvSpPr txBox="1"/>
-          <p:nvPr isPhoto="0" userDrawn="0"/>
-        </p:nvSpPr>
-        <p:spPr bwMode="auto">
-          <a:xfrm flipH="0" flipV="0">
-            <a:off x="1542680" y="5302577"/>
-            <a:ext cx="1796820" cy="228808"/>
-          </a:xfrm>
-          <a:prstGeom prst="rect">
-            <a:avLst/>
-          </a:prstGeom>
-          <a:noFill/>
-        </p:spPr>
-        <p:txBody>
-          <a:bodyPr vertOverflow="overflow" horzOverflow="clip" vert="horz" wrap="square" lIns="91440" tIns="45720" rIns="91440" bIns="45720" numCol="1" spcCol="0" rtlCol="0" fromWordArt="0" anchor="t" anchorCtr="0" forceAA="0" upright="0" compatLnSpc="0">
-            <a:noAutofit/>
-          </a:bodyPr>
-          <a:p>
-            <a:pPr>
-              <a:defRPr/>
-            </a:pPr>
-            <a:r>
-              <a:rPr lang="de-DE" sz="900" b="0" i="0" u="none" strike="noStrike" cap="none" spc="0">
-                <a:solidFill>
-                  <a:schemeClr val="tx1"/>
-                </a:solidFill>
-                <a:latin typeface="Palatino Linotype"/>
-                <a:ea typeface="Arial"/>
-                <a:cs typeface="Arial"/>
-              </a:rPr>
-              <a:t>FeatureGraph Modelelemente</a:t>
-            </a:r>
-            <a:endParaRPr sz="900"/>
           </a:p>
         </p:txBody>
       </p:sp>
       <p:grpSp>
         <p:nvGrpSpPr>
-          <p:cNvPr id="864845761" name="" hidden="0"/>
+          <p:cNvPr id="640036191" name="" hidden="0"/>
           <p:cNvGrpSpPr/>
           <p:nvPr isPhoto="0" userDrawn="0"/>
         </p:nvGrpSpPr>
         <p:grpSpPr bwMode="auto">
           <a:xfrm>
-            <a:off x="8999913" y="944251"/>
-            <a:ext cx="1603576" cy="4992694"/>
+            <a:off x="1542679" y="2015730"/>
+            <a:ext cx="1842878" cy="3515653"/>
             <a:chOff x="0" y="0"/>
-            <a:chExt cx="1603576" cy="4992694"/>
+            <a:chExt cx="1842878" cy="3515653"/>
           </a:xfrm>
         </p:grpSpPr>
         <p:pic>
           <p:nvPicPr>
-            <p:cNvPr id="1576643762" name="" hidden="0"/>
+            <p:cNvPr id="759913631" name="" hidden="0"/>
             <p:cNvPicPr>
               <a:picLocks noChangeAspect="1"/>
             </p:cNvPicPr>
             <p:nvPr isPhoto="0" userDrawn="0"/>
           </p:nvPicPr>
           <p:blipFill>
-            <a:blip r:embed="rId4"/>
-            <a:srcRect l="897" t="343" r="0" b="0"/>
+            <a:blip r:embed="rId2"/>
             <a:stretch/>
           </p:blipFill>
           <p:spPr bwMode="auto">
-            <a:xfrm flipH="0" flipV="0">
-              <a:off x="0" y="0"/>
-              <a:ext cx="1603576" cy="4763886"/>
+            <a:xfrm rot="0" flipH="0" flipV="0">
+              <a:off x="91719" y="0"/>
+              <a:ext cx="1553970" cy="3234200"/>
             </a:xfrm>
             <a:prstGeom prst="rect">
               <a:avLst/>
@@ -8257,14 +8124,14 @@
         </p:pic>
         <p:sp>
           <p:nvSpPr>
-            <p:cNvPr id="1915185836" name="" hidden="0"/>
+            <p:cNvPr id="1425266254" name="" hidden="0"/>
             <p:cNvSpPr txBox="1"/>
             <p:nvPr isPhoto="0" userDrawn="0"/>
           </p:nvSpPr>
           <p:spPr bwMode="auto">
             <a:xfrm flipH="0" flipV="0">
-              <a:off x="0" y="4763886"/>
-              <a:ext cx="1594852" cy="228807"/>
+              <a:off x="0" y="3286845"/>
+              <a:ext cx="1842878" cy="228806"/>
             </a:xfrm>
             <a:prstGeom prst="rect">
               <a:avLst/>
@@ -8284,13 +8151,13 @@
                   <a:solidFill>
                     <a:schemeClr val="tx1"/>
                   </a:solidFill>
-                  <a:latin typeface="Palatino Linotype"/>
-                  <a:ea typeface="Arial"/>
-                  <a:cs typeface="Arial"/>
+                  <a:latin typeface="+mn-lt"/>
+                  <a:ea typeface="+mn-ea"/>
+                  <a:cs typeface="+mn-cs"/>
                 </a:rPr>
-                <a:t>DocGraph Modelelemente</a:t>
+                <a:t>FeatureGraph Modellelemente</a:t>
               </a:r>
-              <a:endParaRPr/>
+              <a:endParaRPr sz="900"/>
             </a:p>
           </p:txBody>
         </p:sp>
@@ -8330,7 +8197,7 @@
       </p:grpSpPr>
       <p:sp>
         <p:nvSpPr>
-          <p:cNvPr id="53415977" name="Título 1" hidden="0"/>
+          <p:cNvPr id="1992529021" name="Título 1" hidden="0"/>
           <p:cNvSpPr>
             <a:spLocks noGrp="1"/>
           </p:cNvSpPr>
@@ -8348,34 +8215,22 @@
             </a:pPr>
             <a:r>
               <a:rPr lang="de-DE"/>
-              <a:t>Methodologie</a:t>
+              <a:t>Graphische DSL: .feat und .doc</a:t>
             </a:r>
             <a:br>
               <a:rPr lang="de-DE"/>
             </a:br>
             <a:r>
               <a:rPr lang="de-DE" sz="1600" i="1"/>
-              <a:t>graphische DSL aus </a:t>
-            </a:r>
-            <a:r>
-              <a:rPr lang="de-DE" sz="1600" i="1">
-                <a:latin typeface="URW Bookman"/>
-                <a:ea typeface="URW Bookman"/>
-                <a:cs typeface="URW Bookman"/>
-              </a:rPr>
-              <a:t>Cinco</a:t>
-            </a:r>
-            <a:r>
-              <a:rPr lang="de-DE" sz="1600" i="1"/>
-              <a:t> Metasprachen - technisches Detail</a:t>
-            </a:r>
-            <a:endParaRPr/>
-          </a:p>
-        </p:txBody>
-      </p:sp>
-      <p:sp>
-        <p:nvSpPr>
-          <p:cNvPr id="1975793017" name="Content Placeholder 2" hidden="0"/>
+              <a:t>DocGraph Modellsprache</a:t>
+            </a:r>
+            <a:endParaRPr/>
+          </a:p>
+        </p:txBody>
+      </p:sp>
+      <p:sp>
+        <p:nvSpPr>
+          <p:cNvPr id="769483727" name="Content Placeholder 2" hidden="0"/>
           <p:cNvSpPr>
             <a:spLocks noGrp="1"/>
           </p:cNvSpPr>
@@ -8385,61 +8240,130 @@
         </p:nvSpPr>
         <p:spPr bwMode="auto">
           <a:xfrm flipH="0" flipV="0">
-            <a:off x="1534695" y="2015731"/>
-            <a:ext cx="9520157" cy="1891960"/>
+            <a:off x="1534695" y="2015730"/>
+            <a:ext cx="8296420" cy="4087666"/>
           </a:xfrm>
         </p:spPr>
         <p:txBody>
-          <a:bodyPr anchor="t"/>
+          <a:bodyPr vertOverflow="overflow" horzOverflow="clip" vert="horz" wrap="square" lIns="91440" tIns="45720" rIns="91440" bIns="45720" numCol="1" spcCol="0" rtlCol="0" fromWordArt="0" anchor="t" anchorCtr="0" forceAA="0" upright="0" compatLnSpc="0">
+            <a:normAutofit/>
+          </a:bodyPr>
           <a:lstStyle/>
           <a:p>
             <a:pPr>
               <a:defRPr/>
             </a:pPr>
             <a:r>
-              <a:rPr/>
-              <a:t>Verwendung von Selenium-Java und VuePress, um einen Dokumentationstext mit Bildern in Markdownformat zu erstellen</a:t>
-            </a:r>
-            <a:endParaRPr/>
-          </a:p>
-          <a:p>
-            <a:pPr>
-              <a:defRPr/>
-            </a:pPr>
-            <a:r>
-              <a:rPr/>
-              <a:t>Separates Erzeugen der Texte und der Screenshots wird bevorzugt, um Single-Point-of-failure zu </a:t>
-            </a:r>
-            <a:r>
-              <a:rPr lang="de-DE"/>
-              <a:t>vermeiden</a:t>
-            </a:r>
-            <a:endParaRPr/>
-          </a:p>
-        </p:txBody>
-      </p:sp>
-      <p:pic>
-        <p:nvPicPr>
-          <p:cNvPr id="586522987" name="" hidden="0"/>
-          <p:cNvPicPr>
-            <a:picLocks noChangeAspect="1"/>
-          </p:cNvPicPr>
+              <a:rPr lang="de-DE" sz="2000"/>
+              <a:t>DocGraph Modellelemente sind hauptsächlich ‚Web Elements‘; Repräsentationen von HTML-Elemente mit Schlüsseleigenschaften (wie Selektoren, ids, usw.)</a:t>
+            </a:r>
+            <a:endParaRPr lang="de-DE" sz="2000"/>
+          </a:p>
+          <a:p>
+            <a:pPr>
+              <a:defRPr/>
+            </a:pPr>
+            <a:r>
+              <a:rPr lang="de-DE" sz="2000"/>
+              <a:t>‚Selenium Actions‘ sind Elemente, die Methoden des Selenium WebDrivers specifizieren, welche den Browser antreiben</a:t>
+            </a:r>
+            <a:endParaRPr lang="de-DE" sz="2000"/>
+          </a:p>
+          <a:p>
+            <a:pPr>
+              <a:defRPr/>
+            </a:pPr>
+            <a:r>
+              <a:rPr lang="de-DE" sz="2000"/>
+              <a:t>Die Semantik der Modellobjekte werden mit dem Comment-Element oder mit der Description-Eigenschaft der einzelnen Elemente definiert</a:t>
+            </a:r>
+            <a:endParaRPr lang="de-DE" sz="2000"/>
+          </a:p>
+          <a:p>
+            <a:pPr>
+              <a:defRPr/>
+            </a:pPr>
+            <a:endParaRPr lang="de-DE" sz="2000"/>
+          </a:p>
+        </p:txBody>
+      </p:sp>
+      <p:grpSp>
+        <p:nvGrpSpPr>
+          <p:cNvPr id="864845761" name="" hidden="0"/>
+          <p:cNvGrpSpPr/>
           <p:nvPr isPhoto="0" userDrawn="0"/>
-        </p:nvPicPr>
-        <p:blipFill>
-          <a:blip r:embed="rId3"/>
-          <a:stretch/>
-        </p:blipFill>
-        <p:spPr bwMode="auto">
-          <a:xfrm rot="0" flipH="0" flipV="0">
-            <a:off x="3605095" y="3378843"/>
-            <a:ext cx="5739875" cy="2403879"/>
+        </p:nvGrpSpPr>
+        <p:grpSpPr bwMode="auto">
+          <a:xfrm flipH="0" flipV="0">
+            <a:off x="9795798" y="898243"/>
+            <a:ext cx="1653642" cy="4789227"/>
+            <a:chOff x="0" y="0"/>
+            <a:chExt cx="1653642" cy="4789227"/>
           </a:xfrm>
-          <a:prstGeom prst="rect">
-            <a:avLst/>
-          </a:prstGeom>
-        </p:spPr>
-      </p:pic>
+        </p:grpSpPr>
+        <p:pic>
+          <p:nvPicPr>
+            <p:cNvPr id="1576643762" name="" hidden="0"/>
+            <p:cNvPicPr>
+              <a:picLocks noChangeAspect="1"/>
+            </p:cNvPicPr>
+            <p:nvPr isPhoto="0" userDrawn="0"/>
+          </p:nvPicPr>
+          <p:blipFill>
+            <a:blip r:embed="rId3"/>
+            <a:srcRect l="897" t="343" r="0" b="0"/>
+            <a:stretch/>
+          </p:blipFill>
+          <p:spPr bwMode="auto">
+            <a:xfrm flipH="0" flipV="0">
+              <a:off x="0" y="0"/>
+              <a:ext cx="1653642" cy="4569743"/>
+            </a:xfrm>
+            <a:prstGeom prst="rect">
+              <a:avLst/>
+            </a:prstGeom>
+          </p:spPr>
+        </p:pic>
+        <p:sp>
+          <p:nvSpPr>
+            <p:cNvPr id="1915185836" name="" hidden="0"/>
+            <p:cNvSpPr txBox="1"/>
+            <p:nvPr isPhoto="0" userDrawn="0"/>
+          </p:nvSpPr>
+          <p:spPr bwMode="auto">
+            <a:xfrm flipH="0" flipV="0">
+              <a:off x="0" y="4569743"/>
+              <a:ext cx="1644646" cy="219482"/>
+            </a:xfrm>
+            <a:prstGeom prst="rect">
+              <a:avLst/>
+            </a:prstGeom>
+            <a:noFill/>
+          </p:spPr>
+          <p:txBody>
+            <a:bodyPr vertOverflow="overflow" horzOverflow="clip" vert="horz" wrap="square" lIns="91440" tIns="45720" rIns="91440" bIns="45720" numCol="1" spcCol="0" rtlCol="0" fromWordArt="0" anchor="t" anchorCtr="0" forceAA="0" upright="0" compatLnSpc="0">
+              <a:noAutofit/>
+            </a:bodyPr>
+            <a:p>
+              <a:pPr>
+                <a:defRPr/>
+              </a:pPr>
+              <a:r>
+                <a:rPr lang="de-DE" sz="900" b="0" i="0" u="none" strike="noStrike" cap="none" spc="0">
+                  <a:solidFill>
+                    <a:schemeClr val="tx1"/>
+                  </a:solidFill>
+                  <a:latin typeface="Palatino Linotype"/>
+                  <a:ea typeface="Arial"/>
+                  <a:cs typeface="Arial"/>
+                </a:rPr>
+                <a:t>DocGraph Modellelemente</a:t>
+              </a:r>
+              <a:endParaRPr/>
+            </a:p>
+          </p:txBody>
+        </p:sp>
+      </p:grpSp>
     </p:spTree>
   </p:cSld>
   <p:clrMapOvr>
@@ -8502,7 +8426,7 @@
                 <a:ea typeface="+mj-ea"/>
                 <a:cs typeface="+mj-cs"/>
               </a:rPr>
-              <a:t>Methodologie</a:t>
+              <a:t>Graphische DSL: .feat und .doc</a:t>
             </a:r>
             <a:br>
               <a:rPr lang="de-DE" sz="3200" b="0" i="0" u="none" strike="noStrike" cap="none" spc="0">
@@ -8523,29 +8447,7 @@
                 <a:ea typeface="Palatino Linotype"/>
                 <a:cs typeface="Palatino Linotype"/>
               </a:rPr>
-              <a:t>graphische DSL aus </a:t>
-            </a:r>
-            <a:r>
-              <a:rPr lang="de-DE" sz="1600" b="0" i="1" u="none" strike="noStrike" cap="none" spc="0">
-                <a:solidFill>
-                  <a:schemeClr val="tx1"/>
-                </a:solidFill>
-                <a:latin typeface="URW Bookman"/>
-                <a:ea typeface="URW Bookman"/>
-                <a:cs typeface="URW Bookman"/>
-              </a:rPr>
-              <a:t>Cinco</a:t>
-            </a:r>
-            <a:r>
-              <a:rPr lang="de-DE" sz="1600" b="0" i="1" u="none" strike="noStrike" cap="none" spc="0">
-                <a:solidFill>
-                  <a:schemeClr val="tx1"/>
-                </a:solidFill>
-                <a:latin typeface="Palatino Linotype"/>
-                <a:ea typeface="Palatino Linotype"/>
-                <a:cs typeface="Palatino Linotype"/>
-              </a:rPr>
-              <a:t> Metasprachen - technisches Detail</a:t>
+              <a:t>Überblick des Generationsprozesses</a:t>
             </a:r>
             <a:endParaRPr/>
           </a:p>
@@ -9643,7 +9545,9 @@
         </p:nvSpPr>
         <p:spPr bwMode="auto"/>
         <p:txBody>
-          <a:bodyPr/>
+          <a:bodyPr vertOverflow="overflow" horzOverflow="clip" vert="horz" wrap="square" lIns="91440" tIns="45720" rIns="91440" bIns="45720" numCol="1" spcCol="0" rtlCol="0" fromWordArt="0" anchor="t" anchorCtr="0" forceAA="0" upright="0" compatLnSpc="0">
+            <a:normAutofit/>
+          </a:bodyPr>
           <a:lstStyle/>
           <a:p>
             <a:pPr>
@@ -9658,7 +9562,7 @@
                 <a:ea typeface="Palatino Linotype"/>
                 <a:cs typeface="Palatino Linotype"/>
               </a:rPr>
-              <a:t>DSL-getriebene Generierung von Endbenutzerdokumentation für Webanwendungen auf der Basis von Graphenmodellen unter Verwendung einer grafischen DSL</a:t>
+              <a:t>Funktionalität: DSL-getriebene Generierung von Endbenutzerdokumentation für Webanwendungen auf der Basis von Graphenmodellen unter Verwendung einer grafischen DSL</a:t>
             </a:r>
             <a:endParaRPr lang="de-DE" sz="2000" b="0" i="0" u="none" strike="noStrike" cap="none" spc="0">
               <a:solidFill>
@@ -9682,7 +9586,7 @@
                 <a:ea typeface="Palatino Linotype"/>
                 <a:cs typeface="Palatino Linotype"/>
               </a:rPr>
-              <a:t>Erstellung einer Editoranwendung, die es dem Dokumentationsdesigner ermöglicht grafische Diagramme zu erstellen, die den erforderlichen Benutzer-Workflow veranschaulichen</a:t>
+              <a:t>Benutzerfreundlichkeit: Die vorgestellten Sprachfeature ermöglichen einen intuitiven Entwurf eines Dokumentationsmodells, während verschiedene Checks helfen, syntaktisch korrekte Graphmodelle zu erstellen</a:t>
             </a:r>
             <a:endParaRPr lang="de-DE" sz="2000" b="0" i="0" u="none" strike="noStrike" cap="none" spc="0">
               <a:solidFill>
@@ -9706,42 +9610,16 @@
                 <a:ea typeface="Palatino Linotype"/>
                 <a:cs typeface="Palatino Linotype"/>
               </a:rPr>
-              <a:t>Mithilfe von </a:t>
-            </a:r>
-            <a:r>
-              <a:rPr lang="de-DE" sz="2000" b="0" i="0" u="none" strike="noStrike" cap="none" spc="0">
-                <a:solidFill>
-                  <a:schemeClr val="tx1"/>
-                </a:solidFill>
-                <a:latin typeface="Palatino Linotype"/>
-                <a:ea typeface="Palatino Linotype"/>
-                <a:cs typeface="Palatino Linotype"/>
-              </a:rPr>
-              <a:t>Drittanbietern</a:t>
-            </a:r>
-            <a:r>
-              <a:rPr lang="de-DE" sz="2000" b="0" i="0" u="none" strike="noStrike" cap="none" spc="0">
-                <a:solidFill>
-                  <a:schemeClr val="tx1"/>
-                </a:solidFill>
-                <a:latin typeface="Palatino Linotype"/>
-                <a:ea typeface="Palatino Linotype"/>
-                <a:cs typeface="Palatino Linotype"/>
-              </a:rPr>
-              <a:t>-Tools</a:t>
-            </a:r>
-            <a:r>
-              <a:rPr lang="de-DE" sz="2000" b="0" i="0" u="none" strike="noStrike" cap="none" spc="0">
-                <a:solidFill>
-                  <a:schemeClr val="tx1"/>
-                </a:solidFill>
-                <a:latin typeface="Palatino Linotype"/>
-                <a:ea typeface="Palatino Linotype"/>
-                <a:cs typeface="Palatino Linotype"/>
-              </a:rPr>
-              <a:t> konnten wir eine gut strukturierte und voll funktionsfähige Dokumentation-Website zu erstellen</a:t>
-            </a:r>
-            <a:endParaRPr lang="de-DE"/>
+              <a:t> Leistung: schnelle Erstellung einer Dokumentationswebsite mit minimaler Konfigurationsaufwand durch Integration bewährter Drittanbieter-Tools</a:t>
+            </a:r>
+            <a:endParaRPr lang="de-DE" sz="2000" b="0" i="0" u="none" strike="noStrike" cap="none" spc="0">
+              <a:solidFill>
+                <a:schemeClr val="tx1"/>
+              </a:solidFill>
+              <a:latin typeface="Palatino Linotype"/>
+              <a:ea typeface="Palatino Linotype"/>
+              <a:cs typeface="Palatino Linotype"/>
+            </a:endParaRPr>
           </a:p>
         </p:txBody>
       </p:sp>
@@ -12066,7 +11944,7 @@
       </p:grpSpPr>
       <p:sp>
         <p:nvSpPr>
-          <p:cNvPr id="997314373" name="Título 1" hidden="0"/>
+          <p:cNvPr id="53415977" name="Título 1" hidden="0"/>
           <p:cNvSpPr>
             <a:spLocks noGrp="1"/>
           </p:cNvSpPr>
@@ -12074,7 +11952,12 @@
             <p:ph type="title" hasCustomPrompt="0"/>
           </p:nvPr>
         </p:nvSpPr>
-        <p:spPr bwMode="auto"/>
+        <p:spPr bwMode="auto">
+          <a:xfrm>
+            <a:off x="1534695" y="798027"/>
+            <a:ext cx="9520157" cy="1049234"/>
+          </a:xfrm>
+        </p:spPr>
         <p:txBody>
           <a:bodyPr/>
           <a:lstStyle/>
@@ -12084,29 +11967,34 @@
             </a:pPr>
             <a:r>
               <a:rPr lang="de-DE"/>
-              <a:t>Graphische DSL: .feat und .doc</a:t>
+              <a:t>Methodologie</a:t>
             </a:r>
             <a:br>
               <a:rPr lang="de-DE"/>
             </a:br>
             <a:r>
-              <a:rPr lang="de-DE" sz="1600" b="0" i="1" u="none" strike="noStrike" cap="none" spc="0">
-                <a:solidFill>
-                  <a:schemeClr val="tx1"/>
-                </a:solidFill>
-                <a:latin typeface="+mj-lt"/>
-                <a:ea typeface="+mj-ea"/>
-                <a:cs typeface="+mj-cs"/>
+              <a:rPr lang="de-DE" sz="1600" i="1"/>
+              <a:t>graphische DSL aus </a:t>
+            </a:r>
+            <a:r>
+              <a:rPr lang="de-DE" sz="1600" i="1">
+                <a:latin typeface="URW Bookman"/>
+                <a:ea typeface="URW Bookman"/>
+                <a:cs typeface="URW Bookman"/>
               </a:rPr>
-              <a:t>Besonderheiten</a:t>
-            </a:r>
-            <a:endParaRPr/>
-          </a:p>
-        </p:txBody>
-      </p:sp>
-      <p:sp>
-        <p:nvSpPr>
-          <p:cNvPr id="1461394510" name="Content Placeholder 2" hidden="0"/>
+              <a:t>Cinco</a:t>
+            </a:r>
+            <a:r>
+              <a:rPr lang="de-DE" sz="1600" i="1"/>
+              <a:t> Metasprachen - technisches Detail</a:t>
+            </a:r>
+            <a:endParaRPr/>
+          </a:p>
+        </p:txBody>
+      </p:sp>
+      <p:sp>
+        <p:nvSpPr>
+          <p:cNvPr id="1975793017" name="Content Placeholder 2" hidden="0"/>
           <p:cNvSpPr>
             <a:spLocks noGrp="1"/>
           </p:cNvSpPr>
@@ -12116,8 +12004,8 @@
         </p:nvSpPr>
         <p:spPr bwMode="auto">
           <a:xfrm flipH="0" flipV="0">
-            <a:off x="3188370" y="2015731"/>
-            <a:ext cx="5657620" cy="3515653"/>
+            <a:off x="1534695" y="2009239"/>
+            <a:ext cx="9520157" cy="1891960"/>
           </a:xfrm>
         </p:spPr>
         <p:txBody>
@@ -12127,25 +12015,31 @@
             <a:pPr>
               <a:defRPr/>
             </a:pPr>
-            <a:endParaRPr lang="de-DE" sz="2000"/>
-          </a:p>
-          <a:p>
-            <a:pPr>
-              <a:defRPr/>
-            </a:pPr>
-            <a:endParaRPr lang="de-DE" sz="2000"/>
-          </a:p>
-          <a:p>
-            <a:pPr>
-              <a:defRPr/>
-            </a:pPr>
-            <a:endParaRPr lang="de-DE" sz="2000"/>
+            <a:r>
+              <a:rPr/>
+              <a:t>Verwendung von Selenium-Java und VuePress, um einen Dokumentationstext mit Bildern in Markdownformat zu erstellen</a:t>
+            </a:r>
+            <a:endParaRPr/>
+          </a:p>
+          <a:p>
+            <a:pPr>
+              <a:defRPr/>
+            </a:pPr>
+            <a:r>
+              <a:rPr/>
+              <a:t>Separates Erzeugen der Texte und der Screenshots (1) wird bevorzugt, um Single-Point-of-failure zu </a:t>
+            </a:r>
+            <a:r>
+              <a:rPr lang="de-DE"/>
+              <a:t>vermeiden, im Falle eines Fehler im Vorprozess (2)</a:t>
+            </a:r>
+            <a:endParaRPr/>
           </a:p>
         </p:txBody>
       </p:sp>
       <p:pic>
         <p:nvPicPr>
-          <p:cNvPr id="759913631" name="" hidden="0"/>
+          <p:cNvPr id="586522987" name="" hidden="0"/>
           <p:cNvPicPr>
             <a:picLocks noChangeAspect="1"/>
           </p:cNvPicPr>
@@ -12157,8 +12051,8 @@
         </p:blipFill>
         <p:spPr bwMode="auto">
           <a:xfrm rot="0" flipH="0" flipV="0">
-            <a:off x="1634400" y="2015731"/>
-            <a:ext cx="1553970" cy="3234200"/>
+            <a:off x="1333611" y="3728085"/>
+            <a:ext cx="4509470" cy="1888581"/>
           </a:xfrm>
           <a:prstGeom prst="rect">
             <a:avLst/>
@@ -12167,14 +12061,14 @@
       </p:pic>
       <p:sp>
         <p:nvSpPr>
-          <p:cNvPr id="1425266254" name="" hidden="0"/>
+          <p:cNvPr id="940792254" name="" hidden="0"/>
           <p:cNvSpPr txBox="1"/>
           <p:nvPr isPhoto="0" userDrawn="0"/>
         </p:nvSpPr>
         <p:spPr bwMode="auto">
-          <a:xfrm flipH="0" flipV="0">
-            <a:off x="1542680" y="5302577"/>
-            <a:ext cx="1796820" cy="228808"/>
+          <a:xfrm rot="20488282" flipH="0" flipV="0">
+            <a:off x="6035483" y="4495969"/>
+            <a:ext cx="518583" cy="365795"/>
           </a:xfrm>
           <a:prstGeom prst="rect">
             <a:avLst/>
@@ -12190,97 +12084,272 @@
               <a:defRPr/>
             </a:pPr>
             <a:r>
-              <a:rPr lang="de-DE" sz="900" b="0" i="0" u="none" strike="noStrike" cap="none" spc="0">
-                <a:solidFill>
-                  <a:schemeClr val="tx1"/>
-                </a:solidFill>
-                <a:latin typeface="+mn-lt"/>
-                <a:ea typeface="+mn-ea"/>
-                <a:cs typeface="+mn-cs"/>
+              <a:rPr b="1" u="sng">
+                <a:latin typeface="Comic Sans MS"/>
+                <a:ea typeface="Comic Sans MS"/>
+                <a:cs typeface="Comic Sans MS"/>
               </a:rPr>
-              <a:t>FeatureGraph Modelelemente</a:t>
-            </a:r>
-            <a:endParaRPr sz="900"/>
+              <a:t>VS</a:t>
+            </a:r>
+            <a:endParaRPr/>
           </a:p>
         </p:txBody>
       </p:sp>
       <p:grpSp>
         <p:nvGrpSpPr>
-          <p:cNvPr id="1824140101" name="" hidden="0"/>
+          <p:cNvPr id="2108473167" name="" hidden="0"/>
           <p:cNvGrpSpPr/>
           <p:nvPr isPhoto="0" userDrawn="0"/>
         </p:nvGrpSpPr>
         <p:grpSpPr bwMode="auto">
           <a:xfrm>
-            <a:off x="8999913" y="944251"/>
-            <a:ext cx="1603576" cy="4992694"/>
+            <a:off x="6722476" y="4081524"/>
+            <a:ext cx="5058832" cy="1145432"/>
             <a:chOff x="0" y="0"/>
-            <a:chExt cx="1603576" cy="4992694"/>
+            <a:chExt cx="5058832" cy="1145432"/>
           </a:xfrm>
         </p:grpSpPr>
-        <p:pic>
-          <p:nvPicPr>
-            <p:cNvPr id="1424992661" name="" hidden="0"/>
-            <p:cNvPicPr>
-              <a:picLocks noChangeAspect="1"/>
-            </p:cNvPicPr>
+        <p:grpSp>
+          <p:nvGrpSpPr>
+            <p:cNvPr id="1853264752" name="" hidden="0"/>
+            <p:cNvGrpSpPr/>
             <p:nvPr isPhoto="0" userDrawn="0"/>
-          </p:nvPicPr>
-          <p:blipFill>
-            <a:blip r:embed="rId4"/>
-            <a:srcRect l="897" t="343" r="0" b="0"/>
-            <a:stretch/>
-          </p:blipFill>
-          <p:spPr bwMode="auto">
-            <a:xfrm flipH="0" flipV="0">
-              <a:off x="0" y="0"/>
-              <a:ext cx="1603576" cy="4763886"/>
+          </p:nvGrpSpPr>
+          <p:grpSpPr bwMode="auto">
+            <a:xfrm>
+              <a:off x="0" y="201816"/>
+              <a:ext cx="5058833" cy="943616"/>
+              <a:chOff x="0" y="0"/>
+              <a:chExt cx="5058833" cy="943616"/>
             </a:xfrm>
-            <a:prstGeom prst="rect">
-              <a:avLst/>
-            </a:prstGeom>
-          </p:spPr>
-        </p:pic>
-        <p:sp>
-          <p:nvSpPr>
-            <p:cNvPr id="1326760243" name="" hidden="0"/>
-            <p:cNvSpPr txBox="1"/>
+          </p:grpSpPr>
+          <p:pic>
+            <p:nvPicPr>
+              <p:cNvPr id="1741561977" name="" hidden="0"/>
+              <p:cNvPicPr>
+                <a:picLocks noChangeAspect="1"/>
+              </p:cNvPicPr>
+              <p:nvPr isPhoto="0" userDrawn="0"/>
+            </p:nvPicPr>
+            <p:blipFill>
+              <a:blip r:embed="rId4"/>
+              <a:stretch/>
+            </p:blipFill>
+            <p:spPr bwMode="auto">
+              <a:xfrm flipH="0" flipV="0">
+                <a:off x="0" y="0"/>
+                <a:ext cx="5058833" cy="943616"/>
+              </a:xfrm>
+              <a:prstGeom prst="rect">
+                <a:avLst/>
+              </a:prstGeom>
+            </p:spPr>
+          </p:pic>
+          <p:sp>
+            <p:nvSpPr>
+              <p:cNvPr id="1847142434" name="" hidden="0"/>
+              <p:cNvSpPr/>
+              <p:nvPr isPhoto="0" userDrawn="0"/>
+            </p:nvSpPr>
+            <p:spPr bwMode="auto">
+              <a:xfrm rot="2075504" flipH="0" flipV="0">
+                <a:off x="3338640" y="112217"/>
+                <a:ext cx="719666" cy="687916"/>
+              </a:xfrm>
+              <a:prstGeom prst="mathPlus">
+                <a:avLst>
+                  <a:gd name="adj1" fmla="val 13846"/>
+                </a:avLst>
+              </a:prstGeom>
+              <a:solidFill>
+                <a:srgbClr val="FF0000">
+                  <a:alpha val="44999"/>
+                </a:srgbClr>
+              </a:solidFill>
+              <a:ln w="15875" cap="flat" cmpd="sng" algn="ctr">
+                <a:noFill/>
+                <a:prstDash val="solid"/>
+              </a:ln>
+            </p:spPr>
+            <p:style>
+              <a:lnRef idx="2">
+                <a:schemeClr val="accent1">
+                  <a:shade val="50000"/>
+                </a:schemeClr>
+              </a:lnRef>
+              <a:fillRef idx="1">
+                <a:schemeClr val="accent1"/>
+              </a:fillRef>
+              <a:effectRef idx="0">
+                <a:schemeClr val="accent1"/>
+              </a:effectRef>
+              <a:fontRef idx="minor">
+                <a:schemeClr val="lt1"/>
+              </a:fontRef>
+            </p:style>
+          </p:sp>
+        </p:grpSp>
+        <p:grpSp>
+          <p:nvGrpSpPr>
+            <p:cNvPr id="2117227624" name="" hidden="0"/>
+            <p:cNvGrpSpPr/>
             <p:nvPr isPhoto="0" userDrawn="0"/>
-          </p:nvSpPr>
-          <p:spPr bwMode="auto">
-            <a:xfrm flipH="0" flipV="0">
-              <a:off x="0" y="4763886"/>
-              <a:ext cx="1594852" cy="228807"/>
+          </p:nvGrpSpPr>
+          <p:grpSpPr bwMode="auto">
+            <a:xfrm>
+              <a:off x="2808147" y="0"/>
+              <a:ext cx="453719" cy="397296"/>
+              <a:chOff x="0" y="0"/>
+              <a:chExt cx="453719" cy="397296"/>
             </a:xfrm>
-            <a:prstGeom prst="rect">
-              <a:avLst/>
-            </a:prstGeom>
-            <a:noFill/>
-          </p:spPr>
-          <p:txBody>
-            <a:bodyPr vertOverflow="overflow" horzOverflow="clip" vert="horz" wrap="square" lIns="91440" tIns="45720" rIns="91440" bIns="45720" numCol="1" spcCol="0" rtlCol="0" fromWordArt="0" anchor="t" anchorCtr="0" forceAA="0" upright="0" compatLnSpc="0">
-              <a:noAutofit/>
-            </a:bodyPr>
-            <a:p>
-              <a:pPr>
-                <a:defRPr/>
-              </a:pPr>
-              <a:r>
-                <a:rPr lang="de-DE" sz="900" b="0" i="0" u="none" strike="noStrike" cap="none" spc="0">
+          </p:grpSpPr>
+          <p:sp>
+            <p:nvSpPr>
+              <p:cNvPr id="1560179641" name="" hidden="0"/>
+              <p:cNvSpPr/>
+              <p:nvPr isPhoto="0" userDrawn="0"/>
+            </p:nvSpPr>
+            <p:spPr bwMode="auto">
+              <a:xfrm rot="13821012" flipH="0" flipV="0">
+                <a:off x="28211" y="-28211"/>
+                <a:ext cx="397296" cy="453720"/>
+              </a:xfrm>
+              <a:prstGeom prst="irregularSeal1">
+                <a:avLst/>
+              </a:prstGeom>
+              <a:solidFill>
+                <a:srgbClr val="FF0000"/>
+              </a:solidFill>
+              <a:ln w="15875" cap="flat" cmpd="sng" algn="ctr">
+                <a:solidFill>
+                  <a:srgbClr val="FF0000"/>
+                </a:solidFill>
+                <a:prstDash val="solid"/>
+              </a:ln>
+            </p:spPr>
+            <p:style>
+              <a:lnRef idx="2">
+                <a:schemeClr val="accent1">
+                  <a:shade val="50000"/>
+                </a:schemeClr>
+              </a:lnRef>
+              <a:fillRef idx="1">
+                <a:schemeClr val="accent1"/>
+              </a:fillRef>
+              <a:effectRef idx="0">
+                <a:schemeClr val="accent1"/>
+              </a:effectRef>
+              <a:fontRef idx="minor">
+                <a:schemeClr val="lt1"/>
+              </a:fontRef>
+            </p:style>
+          </p:sp>
+          <p:sp>
+            <p:nvSpPr>
+              <p:cNvPr id="429480022" name="" hidden="0"/>
+              <p:cNvSpPr txBox="1"/>
+              <p:nvPr isPhoto="0" userDrawn="0"/>
+            </p:nvSpPr>
+            <p:spPr bwMode="auto">
+              <a:xfrm flipH="0" flipV="0">
+                <a:off x="6801" y="98456"/>
+                <a:ext cx="440115" cy="200381"/>
+              </a:xfrm>
+              <a:prstGeom prst="rect">
+                <a:avLst/>
+              </a:prstGeom>
+              <a:noFill/>
+            </p:spPr>
+            <p:txBody>
+              <a:bodyPr vertOverflow="overflow" horzOverflow="clip" vert="horz" wrap="square" lIns="91440" tIns="45720" rIns="91440" bIns="45720" numCol="1" spcCol="0" rtlCol="0" fromWordArt="0" anchor="t" anchorCtr="0" forceAA="0" upright="0" compatLnSpc="0">
+                <a:noAutofit/>
+              </a:bodyPr>
+              <a:p>
+                <a:pPr>
+                  <a:defRPr/>
+                </a:pPr>
+                <a:r>
+                  <a:rPr sz="800">
+                    <a:solidFill>
+                      <a:schemeClr val="bg1"/>
+                    </a:solidFill>
+                  </a:rPr>
+                  <a:t>error</a:t>
+                </a:r>
+                <a:endParaRPr sz="800">
                   <a:solidFill>
-                    <a:schemeClr val="tx1"/>
+                    <a:schemeClr val="bg1"/>
                   </a:solidFill>
-                  <a:latin typeface="+mn-lt"/>
-                  <a:ea typeface="+mn-ea"/>
-                  <a:cs typeface="+mn-cs"/>
-                </a:rPr>
-                <a:t>DocGraph Modelelemente</a:t>
-              </a:r>
-              <a:endParaRPr/>
-            </a:p>
-          </p:txBody>
-        </p:sp>
+                </a:endParaRPr>
+              </a:p>
+            </p:txBody>
+          </p:sp>
+        </p:grpSp>
       </p:grpSp>
+      <p:sp>
+        <p:nvSpPr>
+          <p:cNvPr id="2027102624" name="" hidden="0"/>
+          <p:cNvSpPr txBox="1"/>
+          <p:nvPr isPhoto="0" userDrawn="0"/>
+        </p:nvSpPr>
+        <p:spPr bwMode="auto">
+          <a:xfrm flipH="0" flipV="0">
+            <a:off x="1619271" y="5095412"/>
+            <a:ext cx="462486" cy="365796"/>
+          </a:xfrm>
+          <a:prstGeom prst="rect">
+            <a:avLst/>
+          </a:prstGeom>
+          <a:noFill/>
+        </p:spPr>
+        <p:txBody>
+          <a:bodyPr vertOverflow="overflow" horzOverflow="clip" vert="horz" wrap="square" lIns="91440" tIns="45720" rIns="91440" bIns="45720" numCol="1" spcCol="0" rtlCol="0" fromWordArt="0" anchor="t" anchorCtr="0" forceAA="0" upright="0" compatLnSpc="0">
+            <a:spAutoFit/>
+          </a:bodyPr>
+          <a:p>
+            <a:pPr>
+              <a:defRPr/>
+            </a:pPr>
+            <a:r>
+              <a:rPr/>
+              <a:t>(1)</a:t>
+            </a:r>
+            <a:endParaRPr/>
+          </a:p>
+        </p:txBody>
+      </p:sp>
+      <p:sp>
+        <p:nvSpPr>
+          <p:cNvPr id="193181900" name="" hidden="0"/>
+          <p:cNvSpPr txBox="1"/>
+          <p:nvPr isPhoto="0" userDrawn="0"/>
+        </p:nvSpPr>
+        <p:spPr bwMode="auto">
+          <a:xfrm flipH="0" flipV="0">
+            <a:off x="6598746" y="5095411"/>
+            <a:ext cx="462593" cy="365796"/>
+          </a:xfrm>
+          <a:prstGeom prst="rect">
+            <a:avLst/>
+          </a:prstGeom>
+          <a:noFill/>
+        </p:spPr>
+        <p:txBody>
+          <a:bodyPr vertOverflow="overflow" horzOverflow="clip" vert="horz" wrap="square" lIns="91440" tIns="45720" rIns="91440" bIns="45720" numCol="1" spcCol="0" rtlCol="0" fromWordArt="0" anchor="t" anchorCtr="0" forceAA="0" upright="0" compatLnSpc="0">
+            <a:spAutoFit/>
+          </a:bodyPr>
+          <a:p>
+            <a:pPr>
+              <a:defRPr/>
+            </a:pPr>
+            <a:r>
+              <a:rPr/>
+              <a:t>(2)</a:t>
+            </a:r>
+            <a:endParaRPr/>
+          </a:p>
+        </p:txBody>
+      </p:sp>
     </p:spTree>
   </p:cSld>
   <p:clrMapOvr>

</xml_diff>

<commit_message>
submits third correction iteration :sparkle:
</commit_message>
<xml_diff>
--- a/Abschlussvortrag.pptx
+++ b/Abschlussvortrag.pptx
@@ -5,7 +5,7 @@
     <p:sldMasterId id="2147483648" r:id="rId1"/>
   </p:sldMasterIdLst>
   <p:notesMasterIdLst>
-    <p:notesMasterId r:id="rId23"/>
+    <p:notesMasterId r:id="rId25"/>
   </p:notesMasterIdLst>
   <p:sldIdLst>
     <p:sldId id="256" r:id="rId4"/>
@@ -27,6 +27,8 @@
     <p:sldId id="272" r:id="rId20"/>
     <p:sldId id="273" r:id="rId21"/>
     <p:sldId id="274" r:id="rId22"/>
+    <p:sldId id="275" r:id="rId23"/>
+    <p:sldId id="276" r:id="rId24"/>
   </p:sldIdLst>
   <p:sldSz cx="12192000" cy="6858000"/>
   <p:notesSz cx="12192000" cy="6858000"/>
@@ -615,6 +617,95 @@
                 <a:ea typeface="Palatino Linotype"/>
                 <a:cs typeface="Palatino Linotype"/>
               </a:rPr>
+              <a:t>- Was hast du für die Demo geplant? Ich hoffe, du gehst da detailliert auf die ganzen Features deiner Sprachen ein: Primereferenzen, Verschachtelung, Enablen/Disablen von Screenshots, Checks etc.</a:t>
+            </a:r>
+            <a:endParaRPr/>
+          </a:p>
+        </p:txBody>
+      </p:sp>
+      <p:sp>
+        <p:nvSpPr>
+          <p:cNvPr id="4" name="Slide Number Placeholder 3" hidden="0"/>
+          <p:cNvSpPr>
+            <a:spLocks noGrp="1"/>
+          </p:cNvSpPr>
+          <p:nvPr isPhoto="0" userDrawn="0">
+            <p:ph type="sldNum" sz="quarter" idx="10" hasCustomPrompt="0"/>
+          </p:nvPr>
+        </p:nvSpPr>
+        <p:spPr bwMode="auto"/>
+        <p:txBody>
+          <a:bodyPr/>
+          <a:lstStyle/>
+          <a:p>
+            <a:pPr>
+              <a:defRPr/>
+            </a:pPr>
+            <a:endParaRPr/>
+          </a:p>
+        </p:txBody>
+      </p:sp>
+    </p:spTree>
+  </p:cSld>
+</p:notes>
+</file>
+
+<file path=ppt/notesSlides/notesSlide11.xml><?xml version="1.0" encoding="utf-8"?>
+<p:notes xmlns:a="http://schemas.openxmlformats.org/drawingml/2006/main" xmlns:r="http://schemas.openxmlformats.org/officeDocument/2006/relationships" xmlns:p="http://schemas.openxmlformats.org/presentationml/2006/main" xmlns:m="http://schemas.openxmlformats.org/officeDocument/2006/math" xmlns:w="http://schemas.openxmlformats.org/wordprocessingml/2006/main">
+  <p:cSld name="">
+    <p:spTree>
+      <p:nvGrpSpPr>
+        <p:cNvPr id="1" name="" hidden="0"/>
+        <p:cNvGrpSpPr/>
+        <p:nvPr isPhoto="0" userDrawn="0"/>
+      </p:nvGrpSpPr>
+      <p:grpSpPr bwMode="auto">
+        <a:xfrm>
+          <a:off x="0" y="0"/>
+          <a:ext cx="0" cy="0"/>
+          <a:chOff x="0" y="0"/>
+          <a:chExt cx="0" cy="0"/>
+        </a:xfrm>
+      </p:grpSpPr>
+      <p:sp>
+        <p:nvSpPr>
+          <p:cNvPr id="2" name="Slide Image Placeholder 1" hidden="0"/>
+          <p:cNvSpPr>
+            <a:spLocks noChangeAspect="1" noGrp="1" noRot="1"/>
+          </p:cNvSpPr>
+          <p:nvPr isPhoto="0" userDrawn="0">
+            <p:ph type="sldImg" hasCustomPrompt="0"/>
+          </p:nvPr>
+        </p:nvSpPr>
+        <p:spPr bwMode="auto"/>
+      </p:sp>
+      <p:sp>
+        <p:nvSpPr>
+          <p:cNvPr id="3" name="Notes Placeholder 2" hidden="0"/>
+          <p:cNvSpPr>
+            <a:spLocks noGrp="1"/>
+          </p:cNvSpPr>
+          <p:nvPr isPhoto="0" userDrawn="0">
+            <p:ph type="body" idx="1" hasCustomPrompt="0"/>
+          </p:nvPr>
+        </p:nvSpPr>
+        <p:spPr bwMode="auto"/>
+        <p:txBody>
+          <a:bodyPr/>
+          <a:lstStyle/>
+          <a:p>
+            <a:pPr>
+              <a:defRPr/>
+            </a:pPr>
+            <a:r>
+              <a:rPr lang="de-DE" sz="1200" b="0" i="0" u="none" strike="noStrike" cap="none" spc="0">
+                <a:solidFill>
+                  <a:schemeClr val="tx1"/>
+                </a:solidFill>
+                <a:latin typeface="Palatino Linotype"/>
+                <a:ea typeface="Palatino Linotype"/>
+                <a:cs typeface="Palatino Linotype"/>
+              </a:rPr>
               <a:t>- Folie 16: Da fehlt noch das Fazit aus deiner Evaluierung bzw. Bewertung deines Tools gemessen an dem, was du damit gemacht hast.</a:t>
             </a:r>
             <a:endParaRPr/>
@@ -1325,7 +1416,7 @@
       </p:grpSpPr>
       <p:sp>
         <p:nvSpPr>
-          <p:cNvPr id="2" name="Slide Image Placeholder 1" hidden="0"/>
+          <p:cNvPr id="306219455" name="Slide Image Placeholder 1" hidden="0"/>
           <p:cNvSpPr>
             <a:spLocks noChangeAspect="1" noGrp="1" noRot="1"/>
           </p:cNvSpPr>
@@ -1337,7 +1428,7 @@
       </p:sp>
       <p:sp>
         <p:nvSpPr>
-          <p:cNvPr id="3" name="Notes Placeholder 2" hidden="0"/>
+          <p:cNvPr id="108105005" name="Notes Placeholder 2" hidden="0"/>
           <p:cNvSpPr>
             <a:spLocks noGrp="1"/>
           </p:cNvSpPr>
@@ -1354,6 +1445,10 @@
               <a:defRPr/>
             </a:pPr>
             <a:r>
+              <a:rPr/>
+              <a:t>In dieser Arbeit werden die Vorteile der Entwicklung mit Domain-spezifische Sprachen genutzt, um eine Lösung f</a:t>
+            </a:r>
+            <a:r>
               <a:rPr lang="en-US" sz="1200" b="0" i="0" u="none" strike="noStrike" cap="none" spc="0">
                 <a:solidFill>
                   <a:schemeClr val="tx1"/>
@@ -1362,31 +1457,51 @@
                 <a:ea typeface="Palatino Linotype"/>
                 <a:cs typeface="Palatino Linotype"/>
               </a:rPr>
-              <a:t>Die Framework Cinco SCCE Meta Tooling suite liefert die Basis unserer Arbeit, indem Metasprachen für unsere </a:t>
-            </a:r>
-            <a:r>
-              <a:rPr lang="en-US" sz="1200" b="0" i="0" u="none" strike="noStrike" cap="none" spc="0">
-                <a:solidFill>
-                  <a:schemeClr val="tx1"/>
-                </a:solidFill>
-                <a:latin typeface="Palatino Linotype"/>
-                <a:ea typeface="Palatino Linotype"/>
-                <a:cs typeface="Palatino Linotype"/>
-              </a:rPr>
-              <a:t>Entwicklung unserer graphischen DSL zu Verfügung gestellt werden.</a:t>
-            </a:r>
-            <a:r>
-              <a:rPr lang="en-US" sz="1200" b="0" i="0" u="none" strike="noStrike" cap="none" spc="0">
-                <a:solidFill>
-                  <a:schemeClr val="tx1"/>
-                </a:solidFill>
-                <a:latin typeface="Palatino Linotype"/>
-                <a:ea typeface="Palatino Linotype"/>
-                <a:cs typeface="Palatino Linotype"/>
-              </a:rPr>
-              <a:t> Wir benutzen diese Metasprachen um die Spezifikationen unserer Endsprachen zu entwerfen, um dann eine Entwicklungsumgebung zu generien, die einen Entwurf der Dokumentation anhand von graphischen Bausteinen ermöglicht.</a:t>
-            </a:r>
-            <a:endParaRPr sz="1200" b="0" i="0" u="none" strike="noStrike" cap="none" spc="0">
+              <a:t>ür die Integration des Designs der Endbenutzerdokumentation in den Anwendungsentwicklungsprozess vorzuschlagen.</a:t>
+            </a:r>
+            <a:endParaRPr/>
+          </a:p>
+          <a:p>
+            <a:pPr>
+              <a:defRPr/>
+            </a:pPr>
+            <a:endParaRPr/>
+          </a:p>
+          <a:p>
+            <a:pPr>
+              <a:defRPr/>
+            </a:pPr>
+            <a:r>
+              <a:rPr/>
+              <a:t>Vorteile der model-basierte (DSL-) Lösung: schnelles Entwerfen von Systemmodellen, Modelle abstrahieren und vereinfachen</a:t>
+            </a:r>
+            <a:endParaRPr/>
+          </a:p>
+          <a:p>
+            <a:pPr>
+              <a:defRPr/>
+            </a:pPr>
+            <a:endParaRPr/>
+          </a:p>
+          <a:p>
+            <a:pPr>
+              <a:defRPr/>
+            </a:pPr>
+            <a:r>
+              <a:rPr/>
+              <a:t>Das heißt, unser Ziel ist es, ein Werkzeug zu entwicklen, das eine benutzerfreundliche Umbegung anbietet, die auch von Nicht-programmierern verwendet werden kann</a:t>
+            </a:r>
+            <a:r>
+              <a:rPr/>
+              <a:t>, um die Dokumentation als Model zu entwerfen und dann zu generieren. Dieses Konzept stammt von der Cinco Meta Tooling Framework.</a:t>
+            </a:r>
+            <a:endParaRPr/>
+          </a:p>
+          <a:p>
+            <a:pPr>
+              <a:defRPr/>
+            </a:pPr>
+            <a:endParaRPr lang="en-US" sz="1200" b="0" i="0" u="none" strike="noStrike" cap="none" spc="0">
               <a:solidFill>
                 <a:schemeClr val="tx1"/>
               </a:solidFill>
@@ -1395,11 +1510,36 @@
               <a:cs typeface="Palatino Linotype"/>
             </a:endParaRPr>
           </a:p>
-        </p:txBody>
-      </p:sp>
-      <p:sp>
-        <p:nvSpPr>
-          <p:cNvPr id="4" name="Slide Number Placeholder 3" hidden="0"/>
+          <a:p>
+            <a:pPr>
+              <a:defRPr/>
+            </a:pPr>
+            <a:endParaRPr lang="en-US" sz="1200" b="0" i="0" u="none" strike="noStrike" cap="none" spc="0">
+              <a:solidFill>
+                <a:schemeClr val="tx1"/>
+              </a:solidFill>
+              <a:latin typeface="Palatino Linotype"/>
+              <a:ea typeface="Palatino Linotype"/>
+              <a:cs typeface="Palatino Linotype"/>
+            </a:endParaRPr>
+          </a:p>
+          <a:p>
+            <a:pPr>
+              <a:defRPr/>
+            </a:pPr>
+            <a:endParaRPr lang="en-US"/>
+          </a:p>
+          <a:p>
+            <a:pPr>
+              <a:defRPr/>
+            </a:pPr>
+            <a:endParaRPr lang="en-US"/>
+          </a:p>
+        </p:txBody>
+      </p:sp>
+      <p:sp>
+        <p:nvSpPr>
+          <p:cNvPr id="481880650" name="Slide Number Placeholder 3" hidden="0"/>
           <p:cNvSpPr>
             <a:spLocks noGrp="1"/>
           </p:cNvSpPr>
@@ -1443,7 +1583,7 @@
       </p:grpSpPr>
       <p:sp>
         <p:nvSpPr>
-          <p:cNvPr id="2002792847" name="Slide Image Placeholder 1" hidden="0"/>
+          <p:cNvPr id="2" name="Slide Image Placeholder 1" hidden="0"/>
           <p:cNvSpPr>
             <a:spLocks noChangeAspect="1" noGrp="1" noRot="1"/>
           </p:cNvSpPr>
@@ -1455,7 +1595,7 @@
       </p:sp>
       <p:sp>
         <p:nvSpPr>
-          <p:cNvPr id="781609919" name="Notes Placeholder 2" hidden="0"/>
+          <p:cNvPr id="3" name="Notes Placeholder 2" hidden="0"/>
           <p:cNvSpPr>
             <a:spLocks noGrp="1"/>
           </p:cNvSpPr>
@@ -1472,22 +1612,52 @@
               <a:defRPr/>
             </a:pPr>
             <a:r>
-              <a:rPr/>
-              <a:t>Die Verwendung externer Technologie ist insofern</a:t>
-            </a:r>
-            <a:endParaRPr/>
-          </a:p>
-          <a:p>
-            <a:pPr>
-              <a:defRPr/>
-            </a:pPr>
-            <a:endParaRPr/>
-          </a:p>
-        </p:txBody>
-      </p:sp>
-      <p:sp>
-        <p:nvSpPr>
-          <p:cNvPr id="1255829888" name="Slide Number Placeholder 3" hidden="0"/>
+              <a:rPr lang="en-US" sz="1200" b="0" i="0" u="none" strike="noStrike" cap="none" spc="0">
+                <a:solidFill>
+                  <a:schemeClr val="tx1"/>
+                </a:solidFill>
+                <a:latin typeface="Palatino Linotype"/>
+                <a:ea typeface="Palatino Linotype"/>
+                <a:cs typeface="Palatino Linotype"/>
+              </a:rPr>
+              <a:t>Die Framework Cinco SCCE Meta Tooling suite liefert die Basis unserer Arbeit, indem Metasprachen für unsere </a:t>
+            </a:r>
+            <a:r>
+              <a:rPr lang="en-US" sz="1200" b="0" i="0" u="none" strike="noStrike" cap="none" spc="0">
+                <a:solidFill>
+                  <a:schemeClr val="tx1"/>
+                </a:solidFill>
+                <a:latin typeface="Palatino Linotype"/>
+                <a:ea typeface="Palatino Linotype"/>
+                <a:cs typeface="Palatino Linotype"/>
+              </a:rPr>
+              <a:t>Entwicklung unserer graphischen DSL zu Verfügung gestellt werden.</a:t>
+            </a:r>
+            <a:r>
+              <a:rPr lang="en-US" sz="1200" b="0" i="0" u="none" strike="noStrike" cap="none" spc="0">
+                <a:solidFill>
+                  <a:schemeClr val="tx1"/>
+                </a:solidFill>
+                <a:latin typeface="Palatino Linotype"/>
+                <a:ea typeface="Palatino Linotype"/>
+                <a:cs typeface="Palatino Linotype"/>
+              </a:rPr>
+              <a:t> Wir benutzen diese Metasprachen um die Spezifikationen unserer Endsprachen zu entwerfen, um dann eine Entwicklungsumgebung zu generien, die einen Entwurf der Dokumentation anhand von graphischen Bausteinen ermöglicht.</a:t>
+            </a:r>
+            <a:endParaRPr sz="1200" b="0" i="0" u="none" strike="noStrike" cap="none" spc="0">
+              <a:solidFill>
+                <a:schemeClr val="tx1"/>
+              </a:solidFill>
+              <a:latin typeface="Palatino Linotype"/>
+              <a:ea typeface="Palatino Linotype"/>
+              <a:cs typeface="Palatino Linotype"/>
+            </a:endParaRPr>
+          </a:p>
+        </p:txBody>
+      </p:sp>
+      <p:sp>
+        <p:nvSpPr>
+          <p:cNvPr id="4" name="Slide Number Placeholder 3" hidden="0"/>
           <p:cNvSpPr>
             <a:spLocks noGrp="1"/>
           </p:cNvSpPr>
@@ -1531,7 +1701,7 @@
       </p:grpSpPr>
       <p:sp>
         <p:nvSpPr>
-          <p:cNvPr id="782610789" name="Slide Image Placeholder 1" hidden="0"/>
+          <p:cNvPr id="2002792847" name="Slide Image Placeholder 1" hidden="0"/>
           <p:cNvSpPr>
             <a:spLocks noChangeAspect="1" noGrp="1" noRot="1"/>
           </p:cNvSpPr>
@@ -1543,7 +1713,7 @@
       </p:sp>
       <p:sp>
         <p:nvSpPr>
-          <p:cNvPr id="882455537" name="Notes Placeholder 2" hidden="0"/>
+          <p:cNvPr id="781609919" name="Notes Placeholder 2" hidden="0"/>
           <p:cNvSpPr>
             <a:spLocks noGrp="1"/>
           </p:cNvSpPr>
@@ -1560,23 +1730,22 @@
               <a:defRPr/>
             </a:pPr>
             <a:r>
-              <a:rPr lang="de-DE" sz="1200" b="0" i="0" u="none" strike="noStrike" cap="none" spc="0">
-                <a:solidFill>
-                  <a:schemeClr val="tx1"/>
-                </a:solidFill>
-                <a:latin typeface="Palatino Linotype"/>
-                <a:ea typeface="Palatino Linotype"/>
-                <a:cs typeface="Palatino Linotype"/>
-              </a:rPr>
-              <a:t>- Ich vermisse ein wenig die Vorstellung der Sprachfeatures und deren Besonderheiten</a:t>
-            </a:r>
-            <a:endParaRPr/>
-          </a:p>
-        </p:txBody>
-      </p:sp>
-      <p:sp>
-        <p:nvSpPr>
-          <p:cNvPr id="838656737" name="Slide Number Placeholder 3" hidden="0"/>
+              <a:rPr/>
+              <a:t>Die Verwendung externer Technologie ist insofern</a:t>
+            </a:r>
+            <a:endParaRPr/>
+          </a:p>
+          <a:p>
+            <a:pPr>
+              <a:defRPr/>
+            </a:pPr>
+            <a:endParaRPr/>
+          </a:p>
+        </p:txBody>
+      </p:sp>
+      <p:sp>
+        <p:nvSpPr>
+          <p:cNvPr id="1255829888" name="Slide Number Placeholder 3" hidden="0"/>
           <p:cNvSpPr>
             <a:spLocks noGrp="1"/>
           </p:cNvSpPr>
@@ -1620,7 +1789,7 @@
       </p:grpSpPr>
       <p:sp>
         <p:nvSpPr>
-          <p:cNvPr id="2" name="Slide Image Placeholder 1" hidden="0"/>
+          <p:cNvPr id="782610789" name="Slide Image Placeholder 1" hidden="0"/>
           <p:cNvSpPr>
             <a:spLocks noChangeAspect="1" noGrp="1" noRot="1"/>
           </p:cNvSpPr>
@@ -1632,7 +1801,7 @@
       </p:sp>
       <p:sp>
         <p:nvSpPr>
-          <p:cNvPr id="3" name="Notes Placeholder 2" hidden="0"/>
+          <p:cNvPr id="882455537" name="Notes Placeholder 2" hidden="0"/>
           <p:cNvSpPr>
             <a:spLocks noGrp="1"/>
           </p:cNvSpPr>
@@ -1657,15 +1826,15 @@
                 <a:ea typeface="Palatino Linotype"/>
                 <a:cs typeface="Palatino Linotype"/>
               </a:rPr>
-              <a:t>- Was hast du für die Demo geplant? Ich hoffe, du gehst da detailliert auf die ganzen Features deiner Sprachen ein: Primereferenzen, Verschachtelung, Enablen/Disablen von Screenshots, Checks etc.</a:t>
-            </a:r>
-            <a:endParaRPr/>
-          </a:p>
-        </p:txBody>
-      </p:sp>
-      <p:sp>
-        <p:nvSpPr>
-          <p:cNvPr id="4" name="Slide Number Placeholder 3" hidden="0"/>
+              <a:t>- Ich vermisse ein wenig die Vorstellung der Sprachfeatures und deren Besonderheiten</a:t>
+            </a:r>
+            <a:endParaRPr/>
+          </a:p>
+        </p:txBody>
+      </p:sp>
+      <p:sp>
+        <p:nvSpPr>
+          <p:cNvPr id="838656737" name="Slide Number Placeholder 3" hidden="0"/>
           <p:cNvSpPr>
             <a:spLocks noGrp="1"/>
           </p:cNvSpPr>
@@ -7977,6 +8146,447 @@
       </p:grpSpPr>
       <p:sp>
         <p:nvSpPr>
+          <p:cNvPr id="53415977" name="Título 1" hidden="0"/>
+          <p:cNvSpPr>
+            <a:spLocks noGrp="1"/>
+          </p:cNvSpPr>
+          <p:nvPr isPhoto="0" userDrawn="0">
+            <p:ph type="title" hasCustomPrompt="0"/>
+          </p:nvPr>
+        </p:nvSpPr>
+        <p:spPr bwMode="auto">
+          <a:xfrm>
+            <a:off x="1534695" y="798027"/>
+            <a:ext cx="9520157" cy="1049234"/>
+          </a:xfrm>
+        </p:spPr>
+        <p:txBody>
+          <a:bodyPr/>
+          <a:lstStyle/>
+          <a:p>
+            <a:pPr>
+              <a:defRPr/>
+            </a:pPr>
+            <a:r>
+              <a:rPr lang="de-DE"/>
+              <a:t>Methodologie</a:t>
+            </a:r>
+            <a:br>
+              <a:rPr lang="de-DE"/>
+            </a:br>
+            <a:r>
+              <a:rPr lang="de-DE" sz="1600" i="1"/>
+              <a:t>graphische DSL aus </a:t>
+            </a:r>
+            <a:r>
+              <a:rPr lang="de-DE" sz="1600" i="1">
+                <a:latin typeface="URW Bookman"/>
+                <a:ea typeface="URW Bookman"/>
+                <a:cs typeface="URW Bookman"/>
+              </a:rPr>
+              <a:t>Cinco</a:t>
+            </a:r>
+            <a:r>
+              <a:rPr lang="de-DE" sz="1600" i="1"/>
+              <a:t> Metasprachen - technisches Detail</a:t>
+            </a:r>
+            <a:endParaRPr/>
+          </a:p>
+        </p:txBody>
+      </p:sp>
+      <p:sp>
+        <p:nvSpPr>
+          <p:cNvPr id="1975793017" name="Content Placeholder 2" hidden="0"/>
+          <p:cNvSpPr>
+            <a:spLocks noGrp="1"/>
+          </p:cNvSpPr>
+          <p:nvPr isPhoto="0" userDrawn="0">
+            <p:ph idx="1" hasCustomPrompt="0"/>
+          </p:nvPr>
+        </p:nvSpPr>
+        <p:spPr bwMode="auto">
+          <a:xfrm flipH="0" flipV="0">
+            <a:off x="1534695" y="2009239"/>
+            <a:ext cx="9520157" cy="1891960"/>
+          </a:xfrm>
+        </p:spPr>
+        <p:txBody>
+          <a:bodyPr anchor="t"/>
+          <a:lstStyle/>
+          <a:p>
+            <a:pPr>
+              <a:defRPr/>
+            </a:pPr>
+            <a:r>
+              <a:rPr/>
+              <a:t>Verwendung von Selenium-Java und VuePress, um einen Dokumentationstext mit Bildern in Markdownformat zu erstellen</a:t>
+            </a:r>
+            <a:endParaRPr/>
+          </a:p>
+          <a:p>
+            <a:pPr>
+              <a:defRPr/>
+            </a:pPr>
+            <a:r>
+              <a:rPr/>
+              <a:t>Separates Erzeugen der Texte und der Screenshots (1) wird bevorzugt, um Single-Point-of-failure zu </a:t>
+            </a:r>
+            <a:r>
+              <a:rPr lang="de-DE"/>
+              <a:t>vermeiden, im Falle eines Fehler im Vorprozess (2)</a:t>
+            </a:r>
+            <a:endParaRPr/>
+          </a:p>
+        </p:txBody>
+      </p:sp>
+      <p:pic>
+        <p:nvPicPr>
+          <p:cNvPr id="586522987" name="" hidden="0"/>
+          <p:cNvPicPr>
+            <a:picLocks noChangeAspect="1"/>
+          </p:cNvPicPr>
+          <p:nvPr isPhoto="0" userDrawn="0"/>
+        </p:nvPicPr>
+        <p:blipFill>
+          <a:blip r:embed="rId3"/>
+          <a:stretch/>
+        </p:blipFill>
+        <p:spPr bwMode="auto">
+          <a:xfrm rot="0" flipH="0" flipV="0">
+            <a:off x="1333611" y="3728085"/>
+            <a:ext cx="4509470" cy="1888581"/>
+          </a:xfrm>
+          <a:prstGeom prst="rect">
+            <a:avLst/>
+          </a:prstGeom>
+        </p:spPr>
+      </p:pic>
+      <p:sp>
+        <p:nvSpPr>
+          <p:cNvPr id="940792254" name="" hidden="0"/>
+          <p:cNvSpPr txBox="1"/>
+          <p:nvPr isPhoto="0" userDrawn="0"/>
+        </p:nvSpPr>
+        <p:spPr bwMode="auto">
+          <a:xfrm rot="20488280" flipH="0" flipV="0">
+            <a:off x="6035483" y="4495969"/>
+            <a:ext cx="518583" cy="365795"/>
+          </a:xfrm>
+          <a:prstGeom prst="rect">
+            <a:avLst/>
+          </a:prstGeom>
+          <a:noFill/>
+        </p:spPr>
+        <p:txBody>
+          <a:bodyPr vertOverflow="overflow" horzOverflow="clip" vert="horz" wrap="square" lIns="91440" tIns="45720" rIns="91440" bIns="45720" numCol="1" spcCol="0" rtlCol="0" fromWordArt="0" anchor="t" anchorCtr="0" forceAA="0" upright="0" compatLnSpc="0">
+            <a:noAutofit/>
+          </a:bodyPr>
+          <a:p>
+            <a:pPr>
+              <a:defRPr/>
+            </a:pPr>
+            <a:r>
+              <a:rPr b="1" u="sng">
+                <a:latin typeface="Comic Sans MS"/>
+                <a:ea typeface="Comic Sans MS"/>
+                <a:cs typeface="Comic Sans MS"/>
+              </a:rPr>
+              <a:t>VS</a:t>
+            </a:r>
+            <a:endParaRPr/>
+          </a:p>
+        </p:txBody>
+      </p:sp>
+      <p:grpSp>
+        <p:nvGrpSpPr>
+          <p:cNvPr id="2108473167" name="" hidden="0"/>
+          <p:cNvGrpSpPr/>
+          <p:nvPr isPhoto="0" userDrawn="0"/>
+        </p:nvGrpSpPr>
+        <p:grpSpPr bwMode="auto">
+          <a:xfrm>
+            <a:off x="6722476" y="4081524"/>
+            <a:ext cx="5058832" cy="1145432"/>
+            <a:chOff x="0" y="0"/>
+            <a:chExt cx="5058832" cy="1145432"/>
+          </a:xfrm>
+        </p:grpSpPr>
+        <p:grpSp>
+          <p:nvGrpSpPr>
+            <p:cNvPr id="1853264752" name="" hidden="0"/>
+            <p:cNvGrpSpPr/>
+            <p:nvPr isPhoto="0" userDrawn="0"/>
+          </p:nvGrpSpPr>
+          <p:grpSpPr bwMode="auto">
+            <a:xfrm>
+              <a:off x="0" y="201816"/>
+              <a:ext cx="5058833" cy="943616"/>
+              <a:chOff x="0" y="0"/>
+              <a:chExt cx="5058833" cy="943616"/>
+            </a:xfrm>
+          </p:grpSpPr>
+          <p:pic>
+            <p:nvPicPr>
+              <p:cNvPr id="1741561977" name="" hidden="0"/>
+              <p:cNvPicPr>
+                <a:picLocks noChangeAspect="1"/>
+              </p:cNvPicPr>
+              <p:nvPr isPhoto="0" userDrawn="0"/>
+            </p:nvPicPr>
+            <p:blipFill>
+              <a:blip r:embed="rId4"/>
+              <a:stretch/>
+            </p:blipFill>
+            <p:spPr bwMode="auto">
+              <a:xfrm flipH="0" flipV="0">
+                <a:off x="0" y="0"/>
+                <a:ext cx="5058833" cy="943616"/>
+              </a:xfrm>
+              <a:prstGeom prst="rect">
+                <a:avLst/>
+              </a:prstGeom>
+            </p:spPr>
+          </p:pic>
+          <p:sp>
+            <p:nvSpPr>
+              <p:cNvPr id="1847142434" name="" hidden="0"/>
+              <p:cNvSpPr/>
+              <p:nvPr isPhoto="0" userDrawn="0"/>
+            </p:nvSpPr>
+            <p:spPr bwMode="auto">
+              <a:xfrm rot="2075502" flipH="0" flipV="0">
+                <a:off x="3338640" y="112217"/>
+                <a:ext cx="719666" cy="687916"/>
+              </a:xfrm>
+              <a:prstGeom prst="mathPlus">
+                <a:avLst>
+                  <a:gd name="adj1" fmla="val 13846"/>
+                </a:avLst>
+              </a:prstGeom>
+              <a:solidFill>
+                <a:srgbClr val="FF0000">
+                  <a:alpha val="44999"/>
+                </a:srgbClr>
+              </a:solidFill>
+              <a:ln w="15875" cap="flat" cmpd="sng" algn="ctr">
+                <a:noFill/>
+                <a:prstDash val="solid"/>
+              </a:ln>
+            </p:spPr>
+            <p:style>
+              <a:lnRef idx="2">
+                <a:schemeClr val="accent1">
+                  <a:shade val="50000"/>
+                </a:schemeClr>
+              </a:lnRef>
+              <a:fillRef idx="1">
+                <a:schemeClr val="accent1"/>
+              </a:fillRef>
+              <a:effectRef idx="0">
+                <a:schemeClr val="accent1"/>
+              </a:effectRef>
+              <a:fontRef idx="minor">
+                <a:schemeClr val="lt1"/>
+              </a:fontRef>
+            </p:style>
+          </p:sp>
+        </p:grpSp>
+        <p:grpSp>
+          <p:nvGrpSpPr>
+            <p:cNvPr id="2117227624" name="" hidden="0"/>
+            <p:cNvGrpSpPr/>
+            <p:nvPr isPhoto="0" userDrawn="0"/>
+          </p:nvGrpSpPr>
+          <p:grpSpPr bwMode="auto">
+            <a:xfrm>
+              <a:off x="2808146" y="0"/>
+              <a:ext cx="453719" cy="397296"/>
+              <a:chOff x="0" y="0"/>
+              <a:chExt cx="453719" cy="397296"/>
+            </a:xfrm>
+          </p:grpSpPr>
+          <p:sp>
+            <p:nvSpPr>
+              <p:cNvPr id="1560179641" name="" hidden="0"/>
+              <p:cNvSpPr/>
+              <p:nvPr isPhoto="0" userDrawn="0"/>
+            </p:nvSpPr>
+            <p:spPr bwMode="auto">
+              <a:xfrm rot="13821012" flipH="0" flipV="0">
+                <a:off x="28211" y="-28211"/>
+                <a:ext cx="397296" cy="453720"/>
+              </a:xfrm>
+              <a:prstGeom prst="irregularSeal1">
+                <a:avLst/>
+              </a:prstGeom>
+              <a:solidFill>
+                <a:srgbClr val="FF0000"/>
+              </a:solidFill>
+              <a:ln w="15875" cap="flat" cmpd="sng" algn="ctr">
+                <a:solidFill>
+                  <a:srgbClr val="FF0000"/>
+                </a:solidFill>
+                <a:prstDash val="solid"/>
+              </a:ln>
+            </p:spPr>
+            <p:style>
+              <a:lnRef idx="2">
+                <a:schemeClr val="accent1">
+                  <a:shade val="50000"/>
+                </a:schemeClr>
+              </a:lnRef>
+              <a:fillRef idx="1">
+                <a:schemeClr val="accent1"/>
+              </a:fillRef>
+              <a:effectRef idx="0">
+                <a:schemeClr val="accent1"/>
+              </a:effectRef>
+              <a:fontRef idx="minor">
+                <a:schemeClr val="lt1"/>
+              </a:fontRef>
+            </p:style>
+          </p:sp>
+          <p:sp>
+            <p:nvSpPr>
+              <p:cNvPr id="429480022" name="" hidden="0"/>
+              <p:cNvSpPr txBox="1"/>
+              <p:nvPr isPhoto="0" userDrawn="0"/>
+            </p:nvSpPr>
+            <p:spPr bwMode="auto">
+              <a:xfrm flipH="0" flipV="0">
+                <a:off x="6801" y="98456"/>
+                <a:ext cx="440115" cy="200381"/>
+              </a:xfrm>
+              <a:prstGeom prst="rect">
+                <a:avLst/>
+              </a:prstGeom>
+              <a:noFill/>
+            </p:spPr>
+            <p:txBody>
+              <a:bodyPr vertOverflow="overflow" horzOverflow="clip" vert="horz" wrap="square" lIns="91440" tIns="45720" rIns="91440" bIns="45720" numCol="1" spcCol="0" rtlCol="0" fromWordArt="0" anchor="t" anchorCtr="0" forceAA="0" upright="0" compatLnSpc="0">
+                <a:noAutofit/>
+              </a:bodyPr>
+              <a:p>
+                <a:pPr>
+                  <a:defRPr/>
+                </a:pPr>
+                <a:r>
+                  <a:rPr sz="800">
+                    <a:solidFill>
+                      <a:schemeClr val="bg1"/>
+                    </a:solidFill>
+                  </a:rPr>
+                  <a:t>error</a:t>
+                </a:r>
+                <a:endParaRPr sz="800">
+                  <a:solidFill>
+                    <a:schemeClr val="bg1"/>
+                  </a:solidFill>
+                </a:endParaRPr>
+              </a:p>
+            </p:txBody>
+          </p:sp>
+        </p:grpSp>
+      </p:grpSp>
+      <p:sp>
+        <p:nvSpPr>
+          <p:cNvPr id="2027102624" name="" hidden="0"/>
+          <p:cNvSpPr txBox="1"/>
+          <p:nvPr isPhoto="0" userDrawn="0"/>
+        </p:nvSpPr>
+        <p:spPr bwMode="auto">
+          <a:xfrm flipH="0" flipV="0">
+            <a:off x="1619271" y="5095412"/>
+            <a:ext cx="462486" cy="365796"/>
+          </a:xfrm>
+          <a:prstGeom prst="rect">
+            <a:avLst/>
+          </a:prstGeom>
+          <a:noFill/>
+        </p:spPr>
+        <p:txBody>
+          <a:bodyPr vertOverflow="overflow" horzOverflow="clip" vert="horz" wrap="square" lIns="91440" tIns="45720" rIns="91440" bIns="45720" numCol="1" spcCol="0" rtlCol="0" fromWordArt="0" anchor="t" anchorCtr="0" forceAA="0" upright="0" compatLnSpc="0">
+            <a:spAutoFit/>
+          </a:bodyPr>
+          <a:p>
+            <a:pPr>
+              <a:defRPr/>
+            </a:pPr>
+            <a:r>
+              <a:rPr/>
+              <a:t>(1)</a:t>
+            </a:r>
+            <a:endParaRPr/>
+          </a:p>
+        </p:txBody>
+      </p:sp>
+      <p:sp>
+        <p:nvSpPr>
+          <p:cNvPr id="193181900" name="" hidden="0"/>
+          <p:cNvSpPr txBox="1"/>
+          <p:nvPr isPhoto="0" userDrawn="0"/>
+        </p:nvSpPr>
+        <p:spPr bwMode="auto">
+          <a:xfrm flipH="0" flipV="0">
+            <a:off x="6598746" y="5095411"/>
+            <a:ext cx="462593" cy="365796"/>
+          </a:xfrm>
+          <a:prstGeom prst="rect">
+            <a:avLst/>
+          </a:prstGeom>
+          <a:noFill/>
+        </p:spPr>
+        <p:txBody>
+          <a:bodyPr vertOverflow="overflow" horzOverflow="clip" vert="horz" wrap="square" lIns="91440" tIns="45720" rIns="91440" bIns="45720" numCol="1" spcCol="0" rtlCol="0" fromWordArt="0" anchor="t" anchorCtr="0" forceAA="0" upright="0" compatLnSpc="0">
+            <a:spAutoFit/>
+          </a:bodyPr>
+          <a:p>
+            <a:pPr>
+              <a:defRPr/>
+            </a:pPr>
+            <a:r>
+              <a:rPr/>
+              <a:t>(2)</a:t>
+            </a:r>
+            <a:endParaRPr/>
+          </a:p>
+        </p:txBody>
+      </p:sp>
+    </p:spTree>
+  </p:cSld>
+  <p:clrMapOvr>
+    <a:masterClrMapping/>
+  </p:clrMapOvr>
+  <mc:AlternateContent xmlns:mc="http://schemas.openxmlformats.org/markup-compatibility/2006">
+    <mc:Choice xmlns:p14="http://schemas.microsoft.com/office/powerpoint/2010/main" Requires="p14">
+      <p:transition p14:dur="2000" advClick="1"/>
+    </mc:Choice>
+    <mc:Fallback>
+      <p:transition advClick="1"/>
+    </mc:Fallback>
+  </mc:AlternateContent>
+</p:sld>
+</file>
+
+<file path=ppt/slides/slide11.xml><?xml version="1.0" encoding="utf-8"?>
+<p:sld xmlns:a="http://schemas.openxmlformats.org/drawingml/2006/main" xmlns:r="http://schemas.openxmlformats.org/officeDocument/2006/relationships" xmlns:p="http://schemas.openxmlformats.org/presentationml/2006/main" xmlns:m="http://schemas.openxmlformats.org/officeDocument/2006/math" xmlns:w="http://schemas.openxmlformats.org/wordprocessingml/2006/main" showMasterPhAnim="0" show="1">
+  <p:cSld name="">
+    <p:spTree>
+      <p:nvGrpSpPr>
+        <p:cNvPr id="1" name="" hidden="0"/>
+        <p:cNvGrpSpPr/>
+        <p:nvPr isPhoto="0" userDrawn="0"/>
+      </p:nvGrpSpPr>
+      <p:grpSpPr bwMode="auto">
+        <a:xfrm>
+          <a:off x="0" y="0"/>
+          <a:ext cx="0" cy="0"/>
+          <a:chOff x="0" y="0"/>
+          <a:chExt cx="0" cy="0"/>
+        </a:xfrm>
+      </p:grpSpPr>
+      <p:sp>
+        <p:nvSpPr>
           <p:cNvPr id="997314373" name="Título 1" hidden="0"/>
           <p:cNvSpPr>
             <a:spLocks noGrp="1"/>
@@ -8178,7 +8788,129 @@
 </p:sld>
 </file>
 
-<file path=ppt/slides/slide11.xml><?xml version="1.0" encoding="utf-8"?>
+<file path=ppt/slides/slide12.xml><?xml version="1.0" encoding="utf-8"?>
+<p:sld xmlns:a="http://schemas.openxmlformats.org/drawingml/2006/main" xmlns:r="http://schemas.openxmlformats.org/officeDocument/2006/relationships" xmlns:p="http://schemas.openxmlformats.org/presentationml/2006/main" xmlns:m="http://schemas.openxmlformats.org/officeDocument/2006/math" xmlns:w="http://schemas.openxmlformats.org/wordprocessingml/2006/main" showMasterPhAnim="0" show="1">
+  <p:cSld name="">
+    <p:spTree>
+      <p:nvGrpSpPr>
+        <p:cNvPr id="1" name="" hidden="0"/>
+        <p:cNvGrpSpPr/>
+        <p:nvPr isPhoto="0" userDrawn="0"/>
+      </p:nvGrpSpPr>
+      <p:grpSpPr bwMode="auto">
+        <a:xfrm>
+          <a:off x="0" y="0"/>
+          <a:ext cx="0" cy="0"/>
+          <a:chOff x="0" y="0"/>
+          <a:chExt cx="0" cy="0"/>
+        </a:xfrm>
+      </p:grpSpPr>
+      <p:sp>
+        <p:nvSpPr>
+          <p:cNvPr id="1025664742" name="Título 1" hidden="0"/>
+          <p:cNvSpPr>
+            <a:spLocks noGrp="1"/>
+          </p:cNvSpPr>
+          <p:nvPr isPhoto="0" userDrawn="0">
+            <p:ph type="title" hasCustomPrompt="0"/>
+          </p:nvPr>
+        </p:nvSpPr>
+        <p:spPr bwMode="auto"/>
+        <p:txBody>
+          <a:bodyPr/>
+          <a:lstStyle/>
+          <a:p>
+            <a:pPr>
+              <a:defRPr/>
+            </a:pPr>
+            <a:r>
+              <a:rPr lang="de-DE"/>
+              <a:t>Graphische DSL: .feat und .doc</a:t>
+            </a:r>
+            <a:br>
+              <a:rPr lang="de-DE"/>
+            </a:br>
+            <a:r>
+              <a:rPr lang="de-DE" sz="1600" b="0" i="1" u="none" strike="noStrike" cap="none" spc="0">
+                <a:solidFill>
+                  <a:schemeClr val="tx1"/>
+                </a:solidFill>
+                <a:latin typeface="Palatino Linotype"/>
+                <a:ea typeface="Arial"/>
+                <a:cs typeface="Arial"/>
+              </a:rPr>
+              <a:t>FeatureGraph Modellsprache</a:t>
+            </a:r>
+            <a:endParaRPr/>
+          </a:p>
+        </p:txBody>
+      </p:sp>
+      <p:sp>
+        <p:nvSpPr>
+          <p:cNvPr id="1794224030" name="Content Placeholder 2" hidden="0"/>
+          <p:cNvSpPr>
+            <a:spLocks noGrp="1"/>
+          </p:cNvSpPr>
+          <p:nvPr isPhoto="0" userDrawn="0">
+            <p:ph idx="1" hasCustomPrompt="0"/>
+          </p:nvPr>
+        </p:nvSpPr>
+        <p:spPr bwMode="auto">
+          <a:xfrm flipH="0" flipV="0">
+            <a:off x="1534695" y="2015731"/>
+            <a:ext cx="6358518" cy="3450612"/>
+          </a:xfrm>
+        </p:spPr>
+        <p:txBody>
+          <a:bodyPr anchor="t"/>
+          <a:lstStyle/>
+          <a:p>
+            <a:pPr>
+              <a:defRPr/>
+            </a:pPr>
+            <a:endParaRPr/>
+          </a:p>
+        </p:txBody>
+      </p:sp>
+      <p:pic>
+        <p:nvPicPr>
+          <p:cNvPr id="344653473" name="" hidden="0"/>
+          <p:cNvPicPr>
+            <a:picLocks noChangeAspect="1"/>
+          </p:cNvPicPr>
+          <p:nvPr isPhoto="0" userDrawn="0"/>
+        </p:nvPicPr>
+        <p:blipFill>
+          <a:blip r:embed="rId2"/>
+          <a:stretch/>
+        </p:blipFill>
+        <p:spPr bwMode="auto">
+          <a:xfrm rot="0">
+            <a:off x="7928311" y="2015730"/>
+            <a:ext cx="3126540" cy="3515652"/>
+          </a:xfrm>
+          <a:prstGeom prst="rect">
+            <a:avLst/>
+          </a:prstGeom>
+        </p:spPr>
+      </p:pic>
+    </p:spTree>
+  </p:cSld>
+  <p:clrMapOvr>
+    <a:masterClrMapping/>
+  </p:clrMapOvr>
+  <mc:AlternateContent xmlns:mc="http://schemas.openxmlformats.org/markup-compatibility/2006">
+    <mc:Choice xmlns:p14="http://schemas.microsoft.com/office/powerpoint/2010/main" Requires="p14">
+      <p:transition p14:dur="2000" advClick="1"/>
+    </mc:Choice>
+    <mc:Fallback>
+      <p:transition advClick="1"/>
+    </mc:Fallback>
+  </mc:AlternateContent>
+</p:sld>
+</file>
+
+<file path=ppt/slides/slide13.xml><?xml version="1.0" encoding="utf-8"?>
 <p:sld xmlns:a="http://schemas.openxmlformats.org/drawingml/2006/main" xmlns:r="http://schemas.openxmlformats.org/officeDocument/2006/relationships" xmlns:p="http://schemas.openxmlformats.org/presentationml/2006/main" xmlns:m="http://schemas.openxmlformats.org/officeDocument/2006/math" xmlns:w="http://schemas.openxmlformats.org/wordprocessingml/2006/main" showMasterPhAnim="0" show="1">
   <p:cSld name="">
     <p:spTree>
@@ -8380,7 +9112,7 @@
 </p:sld>
 </file>
 
-<file path=ppt/slides/slide12.xml><?xml version="1.0" encoding="utf-8"?>
+<file path=ppt/slides/slide14.xml><?xml version="1.0" encoding="utf-8"?>
 <p:sld xmlns:a="http://schemas.openxmlformats.org/drawingml/2006/main" xmlns:r="http://schemas.openxmlformats.org/officeDocument/2006/relationships" xmlns:p="http://schemas.openxmlformats.org/presentationml/2006/main" xmlns:m="http://schemas.openxmlformats.org/officeDocument/2006/math" xmlns:w="http://schemas.openxmlformats.org/wordprocessingml/2006/main" showMasterPhAnim="0" show="1">
   <p:cSld name="">
     <p:spTree>
@@ -8399,7 +9131,7 @@
       </p:grpSpPr>
       <p:sp>
         <p:nvSpPr>
-          <p:cNvPr id="564735652" name="Title 1" hidden="0"/>
+          <p:cNvPr id="131552822" name="Title 1" hidden="0"/>
           <p:cNvSpPr>
             <a:spLocks noGrp="1"/>
           </p:cNvSpPr>
@@ -8422,9 +9154,9 @@
                 <a:solidFill>
                   <a:schemeClr val="tx1"/>
                 </a:solidFill>
-                <a:latin typeface="+mj-lt"/>
-                <a:ea typeface="+mj-ea"/>
-                <a:cs typeface="+mj-cs"/>
+                <a:latin typeface="Palatino Linotype"/>
+                <a:ea typeface="Arial"/>
+                <a:cs typeface="Arial"/>
               </a:rPr>
               <a:t>Graphische DSL: .feat und .doc</a:t>
             </a:r>
@@ -8433,9 +9165,9 @@
                 <a:solidFill>
                   <a:schemeClr val="tx1"/>
                 </a:solidFill>
-                <a:latin typeface="+mj-lt"/>
-                <a:ea typeface="+mj-ea"/>
-                <a:cs typeface="+mj-cs"/>
+                <a:latin typeface="Palatino Linotype"/>
+                <a:ea typeface="Arial"/>
+                <a:cs typeface="Arial"/>
               </a:rPr>
             </a:br>
             <a:r>
@@ -8455,35 +9187,35 @@
       </p:sp>
       <p:grpSp>
         <p:nvGrpSpPr>
-          <p:cNvPr id="1524444960" name="" hidden="0"/>
+          <p:cNvPr id="1221646153" name="" hidden="0"/>
           <p:cNvGrpSpPr/>
           <p:nvPr isPhoto="0" userDrawn="0"/>
         </p:nvGrpSpPr>
         <p:grpSpPr bwMode="auto">
           <a:xfrm>
-            <a:off x="1712307" y="1682792"/>
-            <a:ext cx="8976607" cy="3783552"/>
+            <a:off x="1712306" y="1682791"/>
+            <a:ext cx="8976606" cy="3783551"/>
             <a:chOff x="0" y="0"/>
-            <a:chExt cx="8976607" cy="3783552"/>
+            <a:chExt cx="8976606" cy="3783551"/>
           </a:xfrm>
         </p:grpSpPr>
         <p:grpSp>
           <p:nvGrpSpPr>
-            <p:cNvPr id="353857643" name="" hidden="0"/>
+            <p:cNvPr id="859708527" name="" hidden="0"/>
             <p:cNvGrpSpPr/>
             <p:nvPr isPhoto="0" userDrawn="0"/>
           </p:nvGrpSpPr>
           <p:grpSpPr bwMode="auto">
             <a:xfrm>
               <a:off x="0" y="0"/>
-              <a:ext cx="8976607" cy="3783552"/>
+              <a:ext cx="8976606" cy="3783551"/>
               <a:chOff x="0" y="0"/>
-              <a:chExt cx="8976607" cy="3783552"/>
+              <a:chExt cx="8976606" cy="3783551"/>
             </a:xfrm>
           </p:grpSpPr>
           <p:pic>
             <p:nvPicPr>
-              <p:cNvPr id="219745317" name="" hidden="0"/>
+              <p:cNvPr id="1184105255" name="" hidden="0"/>
               <p:cNvPicPr>
                 <a:picLocks noChangeAspect="1"/>
               </p:cNvPicPr>
@@ -8497,8 +9229,8 @@
             </p:blipFill>
             <p:spPr bwMode="auto">
               <a:xfrm rot="0">
-                <a:off x="188327" y="332939"/>
-                <a:ext cx="8788279" cy="3450612"/>
+                <a:off x="188326" y="332938"/>
+                <a:ext cx="8788278" cy="3450611"/>
               </a:xfrm>
               <a:prstGeom prst="rect">
                 <a:avLst/>
@@ -8507,14 +9239,14 @@
           </p:pic>
           <p:sp>
             <p:nvSpPr>
-              <p:cNvPr id="534566748" name="" hidden="0"/>
+              <p:cNvPr id="534986265" name="" hidden="0"/>
               <p:cNvSpPr txBox="1"/>
               <p:nvPr isPhoto="0" userDrawn="0"/>
             </p:nvSpPr>
             <p:spPr bwMode="auto">
               <a:xfrm flipH="0" flipV="0">
-                <a:off x="0" y="3299514"/>
-                <a:ext cx="2149230" cy="341921"/>
+                <a:off x="0" y="3299513"/>
+                <a:ext cx="2149229" cy="341920"/>
               </a:xfrm>
               <a:prstGeom prst="rect">
                 <a:avLst/>
@@ -8539,14 +9271,14 @@
           </p:sp>
           <p:sp>
             <p:nvSpPr>
-              <p:cNvPr id="79657727" name="" hidden="0"/>
+              <p:cNvPr id="1050783702" name="" hidden="0"/>
               <p:cNvSpPr txBox="1"/>
               <p:nvPr isPhoto="0" userDrawn="0"/>
             </p:nvSpPr>
             <p:spPr bwMode="auto">
               <a:xfrm flipH="0" flipV="0">
-                <a:off x="6704134" y="0"/>
-                <a:ext cx="2198076" cy="341921"/>
+                <a:off x="6704133" y="0"/>
+                <a:ext cx="2198075" cy="341920"/>
               </a:xfrm>
               <a:prstGeom prst="rect">
                 <a:avLst/>
@@ -8572,14 +9304,14 @@
         </p:grpSp>
         <p:sp>
           <p:nvSpPr>
-            <p:cNvPr id="1973260769" name="" hidden="0"/>
+            <p:cNvPr id="1447675879" name="" hidden="0"/>
             <p:cNvSpPr txBox="1"/>
             <p:nvPr isPhoto="0" userDrawn="0"/>
           </p:nvSpPr>
           <p:spPr bwMode="auto">
             <a:xfrm flipH="0" flipV="0">
-              <a:off x="3123461" y="1887284"/>
-              <a:ext cx="2649901" cy="341921"/>
+              <a:off x="3123459" y="1887283"/>
+              <a:ext cx="2649900" cy="341920"/>
             </a:xfrm>
             <a:prstGeom prst="rect">
               <a:avLst/>
@@ -8608,14 +9340,14 @@
         </p:sp>
         <p:sp>
           <p:nvSpPr>
-            <p:cNvPr id="1826178206" name="" hidden="0"/>
+            <p:cNvPr id="886982452" name="" hidden="0"/>
             <p:cNvSpPr txBox="1"/>
             <p:nvPr isPhoto="0" userDrawn="0"/>
           </p:nvSpPr>
           <p:spPr bwMode="auto">
             <a:xfrm flipH="0" flipV="0">
-              <a:off x="4322884" y="2688937"/>
-              <a:ext cx="1199423" cy="260749"/>
+              <a:off x="4322883" y="2688936"/>
+              <a:ext cx="1199422" cy="260748"/>
             </a:xfrm>
             <a:prstGeom prst="rect">
               <a:avLst/>
@@ -8655,7 +9387,7 @@
 </p:sld>
 </file>
 
-<file path=ppt/slides/slide13.xml><?xml version="1.0" encoding="utf-8"?>
+<file path=ppt/slides/slide15.xml><?xml version="1.0" encoding="utf-8"?>
 <p:sld xmlns:a="http://schemas.openxmlformats.org/drawingml/2006/main" xmlns:r="http://schemas.openxmlformats.org/officeDocument/2006/relationships" xmlns:p="http://schemas.openxmlformats.org/presentationml/2006/main" xmlns:m="http://schemas.openxmlformats.org/officeDocument/2006/math" xmlns:w="http://schemas.openxmlformats.org/wordprocessingml/2006/main" showMasterPhAnim="0" show="1">
   <p:cSld name="">
     <p:spTree>
@@ -8796,7 +9528,7 @@
 </p:sld>
 </file>
 
-<file path=ppt/slides/slide14.xml><?xml version="1.0" encoding="utf-8"?>
+<file path=ppt/slides/slide16.xml><?xml version="1.0" encoding="utf-8"?>
 <p:sld xmlns:a="http://schemas.openxmlformats.org/drawingml/2006/main" xmlns:r="http://schemas.openxmlformats.org/officeDocument/2006/relationships" xmlns:p="http://schemas.openxmlformats.org/presentationml/2006/main" xmlns:m="http://schemas.openxmlformats.org/officeDocument/2006/math" xmlns:w="http://schemas.openxmlformats.org/wordprocessingml/2006/main" showMasterPhAnim="0" show="1">
   <p:cSld name="">
     <p:spTree>
@@ -8925,7 +9657,7 @@
 </p:sld>
 </file>
 
-<file path=ppt/slides/slide15.xml><?xml version="1.0" encoding="utf-8"?>
+<file path=ppt/slides/slide17.xml><?xml version="1.0" encoding="utf-8"?>
 <p:sld xmlns:a="http://schemas.openxmlformats.org/drawingml/2006/main" xmlns:r="http://schemas.openxmlformats.org/officeDocument/2006/relationships" xmlns:p="http://schemas.openxmlformats.org/presentationml/2006/main" xmlns:m="http://schemas.openxmlformats.org/officeDocument/2006/math" xmlns:w="http://schemas.openxmlformats.org/wordprocessingml/2006/main" showMasterPhAnim="0" show="1">
   <p:cSld name="">
     <p:spTree>
@@ -9056,7 +9788,7 @@
 </p:sld>
 </file>
 
-<file path=ppt/slides/slide16.xml><?xml version="1.0" encoding="utf-8"?>
+<file path=ppt/slides/slide18.xml><?xml version="1.0" encoding="utf-8"?>
 <p:sld xmlns:a="http://schemas.openxmlformats.org/drawingml/2006/main" xmlns:r="http://schemas.openxmlformats.org/officeDocument/2006/relationships" xmlns:p="http://schemas.openxmlformats.org/presentationml/2006/main" xmlns:m="http://schemas.openxmlformats.org/officeDocument/2006/math" xmlns:w="http://schemas.openxmlformats.org/wordprocessingml/2006/main" showMasterPhAnim="0" show="1">
   <p:cSld name="">
     <p:bg>
@@ -9170,475 +9902,6 @@
 </p:sld>
 </file>
 
-<file path=ppt/slides/slide17.xml><?xml version="1.0" encoding="utf-8"?>
-<p:sld xmlns:a="http://schemas.openxmlformats.org/drawingml/2006/main" xmlns:r="http://schemas.openxmlformats.org/officeDocument/2006/relationships" xmlns:p="http://schemas.openxmlformats.org/presentationml/2006/main" xmlns:m="http://schemas.openxmlformats.org/officeDocument/2006/math" xmlns:w="http://schemas.openxmlformats.org/wordprocessingml/2006/main" showMasterPhAnim="0" show="1">
-  <p:cSld name="">
-    <p:spTree>
-      <p:nvGrpSpPr>
-        <p:cNvPr id="1" name="" hidden="0"/>
-        <p:cNvGrpSpPr/>
-        <p:nvPr isPhoto="0" userDrawn="0"/>
-      </p:nvGrpSpPr>
-      <p:grpSpPr bwMode="auto">
-        <a:xfrm>
-          <a:off x="0" y="0"/>
-          <a:ext cx="0" cy="0"/>
-          <a:chOff x="0" y="0"/>
-          <a:chExt cx="0" cy="0"/>
-        </a:xfrm>
-      </p:grpSpPr>
-      <p:sp>
-        <p:nvSpPr>
-          <p:cNvPr id="491240005" name="Título 1" hidden="0"/>
-          <p:cNvSpPr>
-            <a:spLocks noGrp="1"/>
-          </p:cNvSpPr>
-          <p:nvPr isPhoto="0" userDrawn="0">
-            <p:ph type="title" hasCustomPrompt="0"/>
-          </p:nvPr>
-        </p:nvSpPr>
-        <p:spPr bwMode="auto"/>
-        <p:txBody>
-          <a:bodyPr/>
-          <a:lstStyle/>
-          <a:p>
-            <a:pPr>
-              <a:defRPr/>
-            </a:pPr>
-            <a:r>
-              <a:rPr lang="de-DE"/>
-              <a:t>Künftige Arbeiten</a:t>
-            </a:r>
-            <a:br>
-              <a:rPr lang="de-DE"/>
-            </a:br>
-            <a:endParaRPr sz="1800"/>
-          </a:p>
-        </p:txBody>
-      </p:sp>
-      <p:sp>
-        <p:nvSpPr>
-          <p:cNvPr id="835041238" name="Marcador de contenido 2" hidden="0"/>
-          <p:cNvSpPr>
-            <a:spLocks noGrp="1"/>
-          </p:cNvSpPr>
-          <p:nvPr isPhoto="0" userDrawn="0">
-            <p:ph idx="1" hasCustomPrompt="0"/>
-          </p:nvPr>
-        </p:nvSpPr>
-        <p:spPr bwMode="auto"/>
-        <p:txBody>
-          <a:bodyPr vertOverflow="overflow" horzOverflow="clip" vert="horz" wrap="square" lIns="91440" tIns="45720" rIns="91440" bIns="45720" numCol="1" spcCol="0" rtlCol="0" fromWordArt="0" anchor="t" anchorCtr="0" forceAA="0" upright="0" compatLnSpc="0">
-            <a:normAutofit fontScale="90000" lnSpcReduction="2000"/>
-          </a:bodyPr>
-          <a:lstStyle/>
-          <a:p>
-            <a:pPr>
-              <a:defRPr/>
-            </a:pPr>
-            <a:r>
-              <a:rPr lang="en-US" sz="2000" b="0" i="0" u="none" strike="noStrike" cap="none" spc="0">
-                <a:solidFill>
-                  <a:schemeClr val="tx1"/>
-                </a:solidFill>
-                <a:latin typeface="Palatino Linotype"/>
-                <a:ea typeface="Palatino Linotype"/>
-                <a:cs typeface="Palatino Linotype"/>
-              </a:rPr>
-              <a:t>facilitate the creation process by gener</a:t>
-            </a:r>
-            <a:r>
-              <a:rPr lang="en-US" sz="2000" b="0" i="0" u="none" strike="noStrike" cap="none" spc="0">
-                <a:solidFill>
-                  <a:schemeClr val="tx1"/>
-                </a:solidFill>
-                <a:latin typeface="Palatino Linotype"/>
-                <a:ea typeface="Palatino Linotype"/>
-                <a:cs typeface="Palatino Linotype"/>
-              </a:rPr>
-              <a:t>ating a project template containing a start configuration</a:t>
-            </a:r>
-            <a:endParaRPr lang="en-US" sz="2000" b="0" i="0" u="none" strike="noStrike" cap="none" spc="0">
-              <a:solidFill>
-                <a:schemeClr val="tx1"/>
-              </a:solidFill>
-              <a:latin typeface="Palatino Linotype"/>
-              <a:ea typeface="Palatino Linotype"/>
-              <a:cs typeface="Palatino Linotype"/>
-            </a:endParaRPr>
-          </a:p>
-          <a:p>
-            <a:pPr>
-              <a:defRPr/>
-            </a:pPr>
-            <a:r>
-              <a:rPr lang="en-US" sz="2000" b="0" i="0" u="none" strike="noStrike" cap="none" spc="0">
-                <a:solidFill>
-                  <a:schemeClr val="tx1"/>
-                </a:solidFill>
-                <a:latin typeface="Palatino Linotype"/>
-                <a:ea typeface="Palatino Linotype"/>
-                <a:cs typeface="Palatino Linotype"/>
-              </a:rPr>
-              <a:t>cross-referencing DocGraphModels inside others could be improved in</a:t>
-            </a:r>
-            <a:r>
-              <a:rPr lang="en-US" sz="2000" b="0" i="0" u="none" strike="noStrike" cap="none" spc="0">
-                <a:solidFill>
-                  <a:schemeClr val="tx1"/>
-                </a:solidFill>
-                <a:latin typeface="Palatino Linotype"/>
-                <a:ea typeface="Palatino Linotype"/>
-                <a:cs typeface="Palatino Linotype"/>
-              </a:rPr>
-              <a:t> </a:t>
-            </a:r>
-            <a:r>
-              <a:rPr lang="en-US" sz="2000" b="0" i="0" u="none" strike="noStrike" cap="none" spc="0">
-                <a:solidFill>
-                  <a:schemeClr val="tx1"/>
-                </a:solidFill>
-                <a:latin typeface="Palatino Linotype"/>
-                <a:ea typeface="Palatino Linotype"/>
-                <a:cs typeface="Palatino Linotype"/>
-              </a:rPr>
-              <a:t>the future to allow us, for example, to list all available graph models in a separate</a:t>
-            </a:r>
-            <a:r>
-              <a:rPr lang="en-US" sz="2000" b="0" i="0" u="none" strike="noStrike" cap="none" spc="0">
-                <a:solidFill>
-                  <a:schemeClr val="tx1"/>
-                </a:solidFill>
-                <a:latin typeface="Palatino Linotype"/>
-                <a:ea typeface="Palatino Linotype"/>
-                <a:cs typeface="Palatino Linotype"/>
-              </a:rPr>
-              <a:t> </a:t>
-            </a:r>
-            <a:r>
-              <a:rPr lang="en-US" sz="2000" b="0" i="0" u="none" strike="noStrike" cap="none" spc="0">
-                <a:solidFill>
-                  <a:schemeClr val="tx1"/>
-                </a:solidFill>
-                <a:latin typeface="Palatino Linotype"/>
-                <a:ea typeface="Palatino Linotype"/>
-                <a:cs typeface="Palatino Linotype"/>
-              </a:rPr>
-              <a:t>view</a:t>
-            </a:r>
-            <a:endParaRPr lang="en-US" sz="2000" b="0" i="0" u="none" strike="noStrike" cap="none" spc="0">
-              <a:solidFill>
-                <a:schemeClr val="tx1"/>
-              </a:solidFill>
-              <a:latin typeface="Palatino Linotype"/>
-              <a:ea typeface="Palatino Linotype"/>
-              <a:cs typeface="Palatino Linotype"/>
-            </a:endParaRPr>
-          </a:p>
-          <a:p>
-            <a:pPr>
-              <a:defRPr/>
-            </a:pPr>
-            <a:r>
-              <a:rPr lang="en-US" sz="2000" b="0" i="0" u="none" strike="noStrike" cap="none" spc="0">
-                <a:solidFill>
-                  <a:schemeClr val="tx1"/>
-                </a:solidFill>
-                <a:latin typeface="Palatino Linotype"/>
-                <a:ea typeface="Palatino Linotype"/>
-                <a:cs typeface="Palatino Linotype"/>
-              </a:rPr>
-              <a:t> implement more checks to</a:t>
-            </a:r>
-            <a:r>
-              <a:rPr lang="en-US" sz="2000" b="0" i="0" u="none" strike="noStrike" cap="none" spc="0">
-                <a:solidFill>
-                  <a:schemeClr val="tx1"/>
-                </a:solidFill>
-                <a:latin typeface="Palatino Linotype"/>
-                <a:ea typeface="Palatino Linotype"/>
-                <a:cs typeface="Palatino Linotype"/>
-              </a:rPr>
-              <a:t> validate some other aspects of the model: validate</a:t>
-            </a:r>
-            <a:r>
-              <a:rPr lang="en-US" sz="2000" b="0" i="0" u="none" strike="noStrike" cap="none" spc="0">
-                <a:solidFill>
-                  <a:schemeClr val="tx1"/>
-                </a:solidFill>
-                <a:latin typeface="Palatino Linotype"/>
-                <a:ea typeface="Palatino Linotype"/>
-                <a:cs typeface="Palatino Linotype"/>
-              </a:rPr>
-              <a:t> </a:t>
-            </a:r>
-            <a:r>
-              <a:rPr lang="en-US" sz="2000" b="0" i="0" u="none" strike="noStrike" cap="none" spc="0">
-                <a:solidFill>
-                  <a:schemeClr val="tx1"/>
-                </a:solidFill>
-                <a:latin typeface="Palatino Linotype"/>
-                <a:ea typeface="Palatino Linotype"/>
-                <a:cs typeface="Palatino Linotype"/>
-              </a:rPr>
-              <a:t>that the Web element selectors have the correct syntax of CSS</a:t>
-            </a:r>
-            <a:r>
-              <a:rPr lang="en-US" sz="2000" b="0" i="0" u="none" strike="noStrike" cap="none" spc="0">
-                <a:solidFill>
-                  <a:schemeClr val="tx1"/>
-                </a:solidFill>
-                <a:latin typeface="Palatino Linotype"/>
-                <a:ea typeface="Palatino Linotype"/>
-                <a:cs typeface="Palatino Linotype"/>
-              </a:rPr>
-              <a:t> </a:t>
-            </a:r>
-            <a:r>
-              <a:rPr lang="en-US" sz="2000" b="0" i="0" u="none" strike="noStrike" cap="none" spc="0">
-                <a:solidFill>
-                  <a:schemeClr val="tx1"/>
-                </a:solidFill>
-                <a:latin typeface="Palatino Linotype"/>
-                <a:ea typeface="Palatino Linotype"/>
-                <a:cs typeface="Palatino Linotype"/>
-              </a:rPr>
-              <a:t>selectors or XPath</a:t>
-            </a:r>
-            <a:r>
-              <a:rPr lang="en-US" sz="2000" b="0" i="0" u="none" strike="noStrike" cap="none" spc="0">
-                <a:solidFill>
-                  <a:schemeClr val="tx1"/>
-                </a:solidFill>
-                <a:latin typeface="Palatino Linotype"/>
-                <a:ea typeface="Palatino Linotype"/>
-                <a:cs typeface="Palatino Linotype"/>
-              </a:rPr>
-              <a:t> We could even verify in advance if the HTML element we are looking</a:t>
-            </a:r>
-            <a:r>
-              <a:rPr lang="en-US" sz="2000" b="0" i="0" u="none" strike="noStrike" cap="none" spc="0">
-                <a:solidFill>
-                  <a:schemeClr val="tx1"/>
-                </a:solidFill>
-                <a:latin typeface="Palatino Linotype"/>
-                <a:ea typeface="Palatino Linotype"/>
-                <a:cs typeface="Palatino Linotype"/>
-              </a:rPr>
-              <a:t> </a:t>
-            </a:r>
-            <a:r>
-              <a:rPr lang="en-US" sz="2000" b="0" i="0" u="none" strike="noStrike" cap="none" spc="0">
-                <a:solidFill>
-                  <a:schemeClr val="tx1"/>
-                </a:solidFill>
-                <a:latin typeface="Palatino Linotype"/>
-                <a:ea typeface="Palatino Linotype"/>
-                <a:cs typeface="Palatino Linotype"/>
-              </a:rPr>
-              <a:t>for can be found with that given selector by running a selector query search in</a:t>
-            </a:r>
-            <a:r>
-              <a:rPr lang="en-US" sz="2000" b="0" i="0" u="none" strike="noStrike" cap="none" spc="0">
-                <a:solidFill>
-                  <a:schemeClr val="tx1"/>
-                </a:solidFill>
-                <a:latin typeface="Palatino Linotype"/>
-                <a:ea typeface="Palatino Linotype"/>
-                <a:cs typeface="Palatino Linotype"/>
-              </a:rPr>
-              <a:t> </a:t>
-            </a:r>
-            <a:r>
-              <a:rPr lang="en-US" sz="2000" b="0" i="0" u="none" strike="noStrike" cap="none" spc="0">
-                <a:solidFill>
-                  <a:schemeClr val="tx1"/>
-                </a:solidFill>
-                <a:latin typeface="Palatino Linotype"/>
-                <a:ea typeface="Palatino Linotype"/>
-                <a:cs typeface="Palatino Linotype"/>
-              </a:rPr>
-              <a:t>the background</a:t>
-            </a:r>
-            <a:endParaRPr lang="en-US" sz="2000" b="0" i="0" u="none" strike="noStrike" cap="none" spc="0">
-              <a:solidFill>
-                <a:schemeClr val="tx1"/>
-              </a:solidFill>
-              <a:latin typeface="Palatino Linotype"/>
-              <a:ea typeface="Palatino Linotype"/>
-              <a:cs typeface="Palatino Linotype"/>
-            </a:endParaRPr>
-          </a:p>
-        </p:txBody>
-      </p:sp>
-    </p:spTree>
-  </p:cSld>
-  <p:clrMapOvr>
-    <a:masterClrMapping/>
-  </p:clrMapOvr>
-  <mc:AlternateContent xmlns:mc="http://schemas.openxmlformats.org/markup-compatibility/2006">
-    <mc:Choice xmlns:p14="http://schemas.microsoft.com/office/powerpoint/2010/main" Requires="p14">
-      <p:transition p14:dur="2000" advClick="1"/>
-    </mc:Choice>
-    <mc:Fallback>
-      <p:transition advClick="1"/>
-    </mc:Fallback>
-  </mc:AlternateContent>
-</p:sld>
-</file>
-
-<file path=ppt/slides/slide18.xml><?xml version="1.0" encoding="utf-8"?>
-<p:sld xmlns:a="http://schemas.openxmlformats.org/drawingml/2006/main" xmlns:r="http://schemas.openxmlformats.org/officeDocument/2006/relationships" xmlns:p="http://schemas.openxmlformats.org/presentationml/2006/main" xmlns:m="http://schemas.openxmlformats.org/officeDocument/2006/math" xmlns:w="http://schemas.openxmlformats.org/wordprocessingml/2006/main" showMasterPhAnim="0" show="1">
-  <p:cSld name="">
-    <p:spTree>
-      <p:nvGrpSpPr>
-        <p:cNvPr id="1" name="" hidden="0"/>
-        <p:cNvGrpSpPr/>
-        <p:nvPr isPhoto="0" userDrawn="0"/>
-      </p:nvGrpSpPr>
-      <p:grpSpPr bwMode="auto">
-        <a:xfrm>
-          <a:off x="0" y="0"/>
-          <a:ext cx="0" cy="0"/>
-          <a:chOff x="0" y="0"/>
-          <a:chExt cx="0" cy="0"/>
-        </a:xfrm>
-      </p:grpSpPr>
-      <p:sp>
-        <p:nvSpPr>
-          <p:cNvPr id="653499456" name="Título 1" hidden="0"/>
-          <p:cNvSpPr>
-            <a:spLocks noGrp="1"/>
-          </p:cNvSpPr>
-          <p:nvPr isPhoto="0" userDrawn="0">
-            <p:ph type="title" hasCustomPrompt="0"/>
-          </p:nvPr>
-        </p:nvSpPr>
-        <p:spPr bwMode="auto"/>
-        <p:txBody>
-          <a:bodyPr/>
-          <a:lstStyle/>
-          <a:p>
-            <a:pPr>
-              <a:defRPr/>
-            </a:pPr>
-            <a:r>
-              <a:rPr lang="de-DE"/>
-              <a:t>Fazit</a:t>
-            </a:r>
-            <a:br>
-              <a:rPr lang="de-DE"/>
-            </a:br>
-            <a:endParaRPr sz="1600"/>
-          </a:p>
-        </p:txBody>
-      </p:sp>
-      <p:sp>
-        <p:nvSpPr>
-          <p:cNvPr id="751158943" name="Marcador de contenido 2" hidden="0"/>
-          <p:cNvSpPr>
-            <a:spLocks noGrp="1"/>
-          </p:cNvSpPr>
-          <p:nvPr isPhoto="0" userDrawn="0">
-            <p:ph idx="1" hasCustomPrompt="0"/>
-          </p:nvPr>
-        </p:nvSpPr>
-        <p:spPr bwMode="auto"/>
-        <p:txBody>
-          <a:bodyPr vertOverflow="overflow" horzOverflow="clip" vert="horz" wrap="square" lIns="91440" tIns="45720" rIns="91440" bIns="45720" numCol="1" spcCol="0" rtlCol="0" fromWordArt="0" anchor="t" anchorCtr="0" forceAA="0" upright="0" compatLnSpc="0">
-            <a:normAutofit/>
-          </a:bodyPr>
-          <a:lstStyle/>
-          <a:p>
-            <a:pPr>
-              <a:defRPr/>
-            </a:pPr>
-            <a:r>
-              <a:rPr lang="de-DE" sz="2000" b="0" i="0" u="none" strike="noStrike" cap="none" spc="0">
-                <a:solidFill>
-                  <a:schemeClr val="tx1"/>
-                </a:solidFill>
-                <a:latin typeface="Palatino Linotype"/>
-                <a:ea typeface="Palatino Linotype"/>
-                <a:cs typeface="Palatino Linotype"/>
-              </a:rPr>
-              <a:t>Funktionalität: DSL-getriebene Generierung von Endbenutzerdokumentation für Webanwendungen auf der Basis von Graphenmodellen unter Verwendung einer grafischen DSL</a:t>
-            </a:r>
-            <a:endParaRPr lang="de-DE" sz="2000" b="0" i="0" u="none" strike="noStrike" cap="none" spc="0">
-              <a:solidFill>
-                <a:schemeClr val="tx1"/>
-              </a:solidFill>
-              <a:latin typeface="Palatino Linotype"/>
-              <a:ea typeface="Palatino Linotype"/>
-              <a:cs typeface="Palatino Linotype"/>
-            </a:endParaRPr>
-          </a:p>
-          <a:p>
-            <a:pPr>
-              <a:defRPr/>
-            </a:pPr>
-            <a:r>
-              <a:rPr lang="de-DE" sz="2000" b="0" i="0" u="none" strike="noStrike" cap="none" spc="0">
-                <a:solidFill>
-                  <a:schemeClr val="tx1"/>
-                </a:solidFill>
-                <a:latin typeface="Palatino Linotype"/>
-                <a:ea typeface="Palatino Linotype"/>
-                <a:cs typeface="Palatino Linotype"/>
-              </a:rPr>
-              <a:t>Benutzerfreundlichkeit: Die vorgestellten Sprachfeature ermöglichen einen intuitiven Entwurf eines Dokumentationsmodells, während verschiedene Checks helfen, syntaktisch korrekte Graphmodelle zu erstellen</a:t>
-            </a:r>
-            <a:endParaRPr lang="de-DE" sz="2000" b="0" i="0" u="none" strike="noStrike" cap="none" spc="0">
-              <a:solidFill>
-                <a:schemeClr val="tx1"/>
-              </a:solidFill>
-              <a:latin typeface="Palatino Linotype"/>
-              <a:ea typeface="Palatino Linotype"/>
-              <a:cs typeface="Palatino Linotype"/>
-            </a:endParaRPr>
-          </a:p>
-          <a:p>
-            <a:pPr>
-              <a:defRPr/>
-            </a:pPr>
-            <a:r>
-              <a:rPr lang="de-DE" sz="2000" b="0" i="0" u="none" strike="noStrike" cap="none" spc="0">
-                <a:solidFill>
-                  <a:schemeClr val="tx1"/>
-                </a:solidFill>
-                <a:latin typeface="Palatino Linotype"/>
-                <a:ea typeface="Palatino Linotype"/>
-                <a:cs typeface="Palatino Linotype"/>
-              </a:rPr>
-              <a:t> Leistung: schnelle Erstellung einer Dokumentationswebsite mit minimaler Konfigurationsaufwand durch Integration bewährter Drittanbieter-Tools</a:t>
-            </a:r>
-            <a:endParaRPr lang="de-DE" sz="2000" b="0" i="0" u="none" strike="noStrike" cap="none" spc="0">
-              <a:solidFill>
-                <a:schemeClr val="tx1"/>
-              </a:solidFill>
-              <a:latin typeface="Palatino Linotype"/>
-              <a:ea typeface="Palatino Linotype"/>
-              <a:cs typeface="Palatino Linotype"/>
-            </a:endParaRPr>
-          </a:p>
-        </p:txBody>
-      </p:sp>
-    </p:spTree>
-  </p:cSld>
-  <p:clrMapOvr>
-    <a:masterClrMapping/>
-  </p:clrMapOvr>
-  <mc:AlternateContent xmlns:mc="http://schemas.openxmlformats.org/markup-compatibility/2006">
-    <mc:Choice xmlns:p14="http://schemas.microsoft.com/office/powerpoint/2010/main" Requires="p14">
-      <p:transition p14:dur="2000" advClick="1"/>
-    </mc:Choice>
-    <mc:Fallback>
-      <p:transition advClick="1"/>
-    </mc:Fallback>
-  </mc:AlternateContent>
-</p:sld>
-</file>
-
 <file path=ppt/slides/slide19.xml><?xml version="1.0" encoding="utf-8"?>
 <p:sld xmlns:a="http://schemas.openxmlformats.org/drawingml/2006/main" xmlns:r="http://schemas.openxmlformats.org/officeDocument/2006/relationships" xmlns:p="http://schemas.openxmlformats.org/presentationml/2006/main" xmlns:m="http://schemas.openxmlformats.org/officeDocument/2006/math" xmlns:w="http://schemas.openxmlformats.org/wordprocessingml/2006/main" showMasterPhAnim="0" show="1">
   <p:cSld name="">
@@ -9658,61 +9921,152 @@
       </p:grpSpPr>
       <p:sp>
         <p:nvSpPr>
-          <p:cNvPr id="4" name="CuadroTexto 3" hidden="0"/>
-          <p:cNvSpPr txBox="1">
-            <a:spLocks noChangeAspect="1"/>
+          <p:cNvPr id="491240005" name="Título 1" hidden="0"/>
+          <p:cNvSpPr>
+            <a:spLocks noGrp="1"/>
           </p:cNvSpPr>
-          <p:nvPr isPhoto="0" userDrawn="0"/>
+          <p:nvPr isPhoto="0" userDrawn="0">
+            <p:ph type="title" hasCustomPrompt="0"/>
+          </p:nvPr>
+        </p:nvSpPr>
+        <p:spPr bwMode="auto"/>
+        <p:txBody>
+          <a:bodyPr/>
+          <a:lstStyle/>
+          <a:p>
+            <a:pPr>
+              <a:defRPr/>
+            </a:pPr>
+            <a:r>
+              <a:rPr lang="de-DE"/>
+              <a:t>Künftige Arbeiten</a:t>
+            </a:r>
+            <a:br>
+              <a:rPr lang="de-DE"/>
+            </a:br>
+            <a:endParaRPr sz="1800"/>
+          </a:p>
+        </p:txBody>
+      </p:sp>
+      <p:sp>
+        <p:nvSpPr>
+          <p:cNvPr id="835041238" name="Marcador de contenido 2" hidden="0"/>
+          <p:cNvSpPr>
+            <a:spLocks noGrp="1"/>
+          </p:cNvSpPr>
+          <p:nvPr isPhoto="0" userDrawn="0">
+            <p:ph idx="1" hasCustomPrompt="0"/>
+          </p:nvPr>
         </p:nvSpPr>
         <p:spPr bwMode="auto">
-          <a:xfrm>
-            <a:off x="6423620" y="2724181"/>
-            <a:ext cx="2855496" cy="646331"/>
+          <a:xfrm flipH="0" flipV="0">
+            <a:off x="1534695" y="2015731"/>
+            <a:ext cx="9970230" cy="3653029"/>
           </a:xfrm>
-          <a:prstGeom prst="rect">
-            <a:avLst/>
-          </a:prstGeom>
-          <a:noFill/>
         </p:spPr>
         <p:txBody>
-          <a:bodyPr wrap="square" rtlCol="0">
-            <a:spAutoFit/>
+          <a:bodyPr vertOverflow="overflow" horzOverflow="clip" vert="horz" wrap="square" lIns="91440" tIns="45720" rIns="91440" bIns="45720" numCol="1" spcCol="0" rtlCol="0" fromWordArt="0" anchor="t" anchorCtr="0" forceAA="0" upright="0" compatLnSpc="0">
+            <a:normAutofit/>
           </a:bodyPr>
           <a:lstStyle/>
           <a:p>
-            <a:pPr algn="ctr">
-              <a:defRPr/>
-            </a:pPr>
-            <a:r>
-              <a:rPr lang="de-DE" sz="3600"/>
-              <a:t>Vielen Dank!</a:t>
-            </a:r>
-            <a:endParaRPr/>
-          </a:p>
-        </p:txBody>
-      </p:sp>
-      <p:pic>
-        <p:nvPicPr>
-          <p:cNvPr id="713374503" name="" hidden="0"/>
-          <p:cNvPicPr>
-            <a:picLocks noChangeAspect="1"/>
-          </p:cNvPicPr>
-          <p:nvPr isPhoto="0" userDrawn="0"/>
-        </p:nvPicPr>
-        <p:blipFill>
-          <a:blip r:embed="rId2"/>
-          <a:stretch/>
-        </p:blipFill>
-        <p:spPr bwMode="auto">
-          <a:xfrm flipH="0" flipV="0">
-            <a:off x="1969836" y="1328502"/>
-            <a:ext cx="3437689" cy="3437689"/>
-          </a:xfrm>
-          <a:prstGeom prst="rect">
-            <a:avLst/>
-          </a:prstGeom>
-        </p:spPr>
-      </p:pic>
+            <a:pPr>
+              <a:defRPr/>
+            </a:pPr>
+            <a:r>
+              <a:rPr lang="en-US" sz="1800" b="0" i="0" u="none" strike="noStrike" cap="none" spc="0">
+                <a:solidFill>
+                  <a:schemeClr val="tx1"/>
+                </a:solidFill>
+                <a:latin typeface="Palatino Linotype"/>
+                <a:ea typeface="Palatino Linotype"/>
+                <a:cs typeface="Palatino Linotype"/>
+              </a:rPr>
+              <a:t>Erleichterung des Erstellungsprozesses, indem eine Projektvorlage mit einer Startkonfiguration erstellt wird</a:t>
+            </a:r>
+            <a:endParaRPr lang="en-US" sz="2000" b="0" i="0" u="none" strike="noStrike" cap="none" spc="0">
+              <a:solidFill>
+                <a:schemeClr val="tx1"/>
+              </a:solidFill>
+              <a:latin typeface="Palatino Linotype"/>
+              <a:ea typeface="Palatino Linotype"/>
+              <a:cs typeface="Palatino Linotype"/>
+            </a:endParaRPr>
+          </a:p>
+          <a:p>
+            <a:pPr>
+              <a:defRPr/>
+            </a:pPr>
+            <a:r>
+              <a:rPr lang="en-US" sz="2000" b="0" i="0" u="none" strike="noStrike" cap="none" spc="0">
+                <a:solidFill>
+                  <a:schemeClr val="tx1"/>
+                </a:solidFill>
+                <a:latin typeface="Palatino Linotype"/>
+                <a:ea typeface="Palatino Linotype"/>
+                <a:cs typeface="Palatino Linotype"/>
+              </a:rPr>
+              <a:t>Querverweis auf DocGraphModels innerhalb anderer könnte in Zukunft verbessert werden, um beispielsweise alle verfügbaren Graphenmodelle in einer separaten Ansicht auflisten zu können</a:t>
+            </a:r>
+            <a:endParaRPr lang="en-US" sz="2000" b="0" i="0" u="none" strike="noStrike" cap="none" spc="0">
+              <a:solidFill>
+                <a:schemeClr val="tx1"/>
+              </a:solidFill>
+              <a:latin typeface="Palatino Linotype"/>
+              <a:ea typeface="Palatino Linotype"/>
+              <a:cs typeface="Palatino Linotype"/>
+            </a:endParaRPr>
+          </a:p>
+          <a:p>
+            <a:pPr>
+              <a:defRPr/>
+            </a:pPr>
+            <a:r>
+              <a:rPr lang="en-US" sz="2000" b="0" i="0" u="none" strike="noStrike" cap="none" spc="0">
+                <a:solidFill>
+                  <a:schemeClr val="tx1"/>
+                </a:solidFill>
+                <a:latin typeface="Palatino Linotype"/>
+                <a:ea typeface="Palatino Linotype"/>
+                <a:cs typeface="Palatino Linotype"/>
+              </a:rPr>
+              <a:t>Aufbesserung der graphischen Sprachen mit weiteren Selektoren, um HTML-Elemente besser addressieren zu können</a:t>
+            </a:r>
+            <a:endParaRPr lang="en-US" sz="2000" b="0" i="0" u="none" strike="noStrike" cap="none" spc="0">
+              <a:solidFill>
+                <a:schemeClr val="tx1"/>
+              </a:solidFill>
+              <a:latin typeface="Palatino Linotype"/>
+              <a:ea typeface="Palatino Linotype"/>
+              <a:cs typeface="Palatino Linotype"/>
+            </a:endParaRPr>
+          </a:p>
+          <a:p>
+            <a:pPr>
+              <a:defRPr/>
+            </a:pPr>
+            <a:r>
+              <a:rPr lang="en-US" sz="2000" b="0" i="0" u="none" strike="noStrike" cap="none" spc="0">
+                <a:solidFill>
+                  <a:schemeClr val="tx1"/>
+                </a:solidFill>
+                <a:latin typeface="Palatino Linotype"/>
+                <a:ea typeface="Palatino Linotype"/>
+                <a:cs typeface="Palatino Linotype"/>
+              </a:rPr>
+              <a:t>Weitere Checks implementieren, um beispielsweise die Syntax der Selektoren im Voraus zu validieren</a:t>
+            </a:r>
+            <a:endParaRPr lang="en-US" sz="2000" b="0" i="0" u="none" strike="noStrike" cap="none" spc="0">
+              <a:solidFill>
+                <a:schemeClr val="tx1"/>
+              </a:solidFill>
+              <a:latin typeface="Palatino Linotype"/>
+              <a:ea typeface="Palatino Linotype"/>
+              <a:cs typeface="Palatino Linotype"/>
+            </a:endParaRPr>
+          </a:p>
+        </p:txBody>
+      </p:sp>
     </p:spTree>
   </p:cSld>
   <p:clrMapOvr>
@@ -10573,6 +10927,248 @@
 </p:sld>
 </file>
 
+<file path=ppt/slides/slide20.xml><?xml version="1.0" encoding="utf-8"?>
+<p:sld xmlns:a="http://schemas.openxmlformats.org/drawingml/2006/main" xmlns:r="http://schemas.openxmlformats.org/officeDocument/2006/relationships" xmlns:p="http://schemas.openxmlformats.org/presentationml/2006/main" xmlns:m="http://schemas.openxmlformats.org/officeDocument/2006/math" xmlns:w="http://schemas.openxmlformats.org/wordprocessingml/2006/main" showMasterPhAnim="0" show="1">
+  <p:cSld name="">
+    <p:spTree>
+      <p:nvGrpSpPr>
+        <p:cNvPr id="1" name="" hidden="0"/>
+        <p:cNvGrpSpPr/>
+        <p:nvPr isPhoto="0" userDrawn="0"/>
+      </p:nvGrpSpPr>
+      <p:grpSpPr bwMode="auto">
+        <a:xfrm>
+          <a:off x="0" y="0"/>
+          <a:ext cx="0" cy="0"/>
+          <a:chOff x="0" y="0"/>
+          <a:chExt cx="0" cy="0"/>
+        </a:xfrm>
+      </p:grpSpPr>
+      <p:sp>
+        <p:nvSpPr>
+          <p:cNvPr id="653499456" name="Título 1" hidden="0"/>
+          <p:cNvSpPr>
+            <a:spLocks noGrp="1"/>
+          </p:cNvSpPr>
+          <p:nvPr isPhoto="0" userDrawn="0">
+            <p:ph type="title" hasCustomPrompt="0"/>
+          </p:nvPr>
+        </p:nvSpPr>
+        <p:spPr bwMode="auto"/>
+        <p:txBody>
+          <a:bodyPr/>
+          <a:lstStyle/>
+          <a:p>
+            <a:pPr>
+              <a:defRPr/>
+            </a:pPr>
+            <a:r>
+              <a:rPr lang="de-DE"/>
+              <a:t>Fazit</a:t>
+            </a:r>
+            <a:br>
+              <a:rPr lang="de-DE"/>
+            </a:br>
+            <a:endParaRPr sz="1600"/>
+          </a:p>
+        </p:txBody>
+      </p:sp>
+      <p:sp>
+        <p:nvSpPr>
+          <p:cNvPr id="751158943" name="Marcador de contenido 2" hidden="0"/>
+          <p:cNvSpPr>
+            <a:spLocks noGrp="1"/>
+          </p:cNvSpPr>
+          <p:nvPr isPhoto="0" userDrawn="0">
+            <p:ph idx="1" hasCustomPrompt="0"/>
+          </p:nvPr>
+        </p:nvSpPr>
+        <p:spPr bwMode="auto"/>
+        <p:txBody>
+          <a:bodyPr vertOverflow="overflow" horzOverflow="clip" vert="horz" wrap="square" lIns="91440" tIns="45720" rIns="91440" bIns="45720" numCol="1" spcCol="0" rtlCol="0" fromWordArt="0" anchor="t" anchorCtr="0" forceAA="0" upright="0" compatLnSpc="0">
+            <a:normAutofit/>
+          </a:bodyPr>
+          <a:lstStyle/>
+          <a:p>
+            <a:pPr>
+              <a:defRPr/>
+            </a:pPr>
+            <a:r>
+              <a:rPr lang="de-DE" sz="2000" b="0" i="0" u="none" strike="noStrike" cap="none" spc="0">
+                <a:solidFill>
+                  <a:schemeClr val="tx1"/>
+                </a:solidFill>
+                <a:latin typeface="Palatino Linotype"/>
+                <a:ea typeface="Palatino Linotype"/>
+                <a:cs typeface="Palatino Linotype"/>
+              </a:rPr>
+              <a:t>Funktionalität: DSL-getriebene Generierung von Endbenutzerdokumentation für Webanwendungen auf der Basis von Graphenmodellen unter Verwendung einer grafischen DSL</a:t>
+            </a:r>
+            <a:endParaRPr lang="de-DE" sz="2000" b="0" i="0" u="none" strike="noStrike" cap="none" spc="0">
+              <a:solidFill>
+                <a:schemeClr val="tx1"/>
+              </a:solidFill>
+              <a:latin typeface="Palatino Linotype"/>
+              <a:ea typeface="Palatino Linotype"/>
+              <a:cs typeface="Palatino Linotype"/>
+            </a:endParaRPr>
+          </a:p>
+          <a:p>
+            <a:pPr>
+              <a:defRPr/>
+            </a:pPr>
+            <a:r>
+              <a:rPr lang="de-DE" sz="2000" b="0" i="0" u="none" strike="noStrike" cap="none" spc="0">
+                <a:solidFill>
+                  <a:schemeClr val="tx1"/>
+                </a:solidFill>
+                <a:latin typeface="Palatino Linotype"/>
+                <a:ea typeface="Palatino Linotype"/>
+                <a:cs typeface="Palatino Linotype"/>
+              </a:rPr>
+              <a:t>Benutzerfreundlichkeit: Die vorgestellten Sprachfeature ermöglichen einen intuitiven Entwurf eines Dokumentationsmodells, während verschiedene Checks helfen, syntaktisch korrekte Graphmodelle zu erstellen</a:t>
+            </a:r>
+            <a:endParaRPr lang="de-DE" sz="2000" b="0" i="0" u="none" strike="noStrike" cap="none" spc="0">
+              <a:solidFill>
+                <a:schemeClr val="tx1"/>
+              </a:solidFill>
+              <a:latin typeface="Palatino Linotype"/>
+              <a:ea typeface="Palatino Linotype"/>
+              <a:cs typeface="Palatino Linotype"/>
+            </a:endParaRPr>
+          </a:p>
+          <a:p>
+            <a:pPr>
+              <a:defRPr/>
+            </a:pPr>
+            <a:r>
+              <a:rPr lang="de-DE" sz="2000" b="0" i="0" u="none" strike="noStrike" cap="none" spc="0">
+                <a:solidFill>
+                  <a:schemeClr val="tx1"/>
+                </a:solidFill>
+                <a:latin typeface="Palatino Linotype"/>
+                <a:ea typeface="Palatino Linotype"/>
+                <a:cs typeface="Palatino Linotype"/>
+              </a:rPr>
+              <a:t> Leistung: schnelle Erstellung einer Dokumentationswebsite mit minimaler Konfigurationsaufwand durch Integration bewährter Drittanbieter-Tools</a:t>
+            </a:r>
+            <a:endParaRPr lang="de-DE" sz="2000" b="0" i="0" u="none" strike="noStrike" cap="none" spc="0">
+              <a:solidFill>
+                <a:schemeClr val="tx1"/>
+              </a:solidFill>
+              <a:latin typeface="Palatino Linotype"/>
+              <a:ea typeface="Palatino Linotype"/>
+              <a:cs typeface="Palatino Linotype"/>
+            </a:endParaRPr>
+          </a:p>
+        </p:txBody>
+      </p:sp>
+    </p:spTree>
+  </p:cSld>
+  <p:clrMapOvr>
+    <a:masterClrMapping/>
+  </p:clrMapOvr>
+  <mc:AlternateContent xmlns:mc="http://schemas.openxmlformats.org/markup-compatibility/2006">
+    <mc:Choice xmlns:p14="http://schemas.microsoft.com/office/powerpoint/2010/main" Requires="p14">
+      <p:transition p14:dur="2000" advClick="1"/>
+    </mc:Choice>
+    <mc:Fallback>
+      <p:transition advClick="1"/>
+    </mc:Fallback>
+  </mc:AlternateContent>
+</p:sld>
+</file>
+
+<file path=ppt/slides/slide21.xml><?xml version="1.0" encoding="utf-8"?>
+<p:sld xmlns:a="http://schemas.openxmlformats.org/drawingml/2006/main" xmlns:r="http://schemas.openxmlformats.org/officeDocument/2006/relationships" xmlns:p="http://schemas.openxmlformats.org/presentationml/2006/main" xmlns:m="http://schemas.openxmlformats.org/officeDocument/2006/math" xmlns:w="http://schemas.openxmlformats.org/wordprocessingml/2006/main" showMasterPhAnim="0" show="1">
+  <p:cSld name="">
+    <p:spTree>
+      <p:nvGrpSpPr>
+        <p:cNvPr id="1" name="" hidden="0"/>
+        <p:cNvGrpSpPr/>
+        <p:nvPr isPhoto="0" userDrawn="0"/>
+      </p:nvGrpSpPr>
+      <p:grpSpPr bwMode="auto">
+        <a:xfrm>
+          <a:off x="0" y="0"/>
+          <a:ext cx="0" cy="0"/>
+          <a:chOff x="0" y="0"/>
+          <a:chExt cx="0" cy="0"/>
+        </a:xfrm>
+      </p:grpSpPr>
+      <p:sp>
+        <p:nvSpPr>
+          <p:cNvPr id="4" name="CuadroTexto 3" hidden="0"/>
+          <p:cNvSpPr txBox="1">
+            <a:spLocks noChangeAspect="1"/>
+          </p:cNvSpPr>
+          <p:nvPr isPhoto="0" userDrawn="0"/>
+        </p:nvSpPr>
+        <p:spPr bwMode="auto">
+          <a:xfrm>
+            <a:off x="6423620" y="2724181"/>
+            <a:ext cx="2855496" cy="646331"/>
+          </a:xfrm>
+          <a:prstGeom prst="rect">
+            <a:avLst/>
+          </a:prstGeom>
+          <a:noFill/>
+        </p:spPr>
+        <p:txBody>
+          <a:bodyPr wrap="square" rtlCol="0">
+            <a:spAutoFit/>
+          </a:bodyPr>
+          <a:lstStyle/>
+          <a:p>
+            <a:pPr algn="ctr">
+              <a:defRPr/>
+            </a:pPr>
+            <a:r>
+              <a:rPr lang="de-DE" sz="3600"/>
+              <a:t>Vielen Dank!</a:t>
+            </a:r>
+            <a:endParaRPr/>
+          </a:p>
+        </p:txBody>
+      </p:sp>
+      <p:pic>
+        <p:nvPicPr>
+          <p:cNvPr id="713374503" name="" hidden="0"/>
+          <p:cNvPicPr>
+            <a:picLocks noChangeAspect="1"/>
+          </p:cNvPicPr>
+          <p:nvPr isPhoto="0" userDrawn="0"/>
+        </p:nvPicPr>
+        <p:blipFill>
+          <a:blip r:embed="rId2"/>
+          <a:stretch/>
+        </p:blipFill>
+        <p:spPr bwMode="auto">
+          <a:xfrm flipH="0" flipV="0">
+            <a:off x="1969836" y="1328502"/>
+            <a:ext cx="3437689" cy="3437689"/>
+          </a:xfrm>
+          <a:prstGeom prst="rect">
+            <a:avLst/>
+          </a:prstGeom>
+        </p:spPr>
+      </p:pic>
+    </p:spTree>
+  </p:cSld>
+  <p:clrMapOvr>
+    <a:masterClrMapping/>
+  </p:clrMapOvr>
+  <mc:AlternateContent xmlns:mc="http://schemas.openxmlformats.org/markup-compatibility/2006">
+    <mc:Choice xmlns:p14="http://schemas.microsoft.com/office/powerpoint/2010/main" Requires="p14">
+      <p:transition p14:dur="2000" advClick="1"/>
+    </mc:Choice>
+    <mc:Fallback>
+      <p:transition advClick="1"/>
+    </mc:Fallback>
+  </mc:AlternateContent>
+</p:sld>
+</file>
+
 <file path=ppt/slides/slide3.xml><?xml version="1.0" encoding="utf-8"?>
 <p:sld xmlns:a="http://schemas.openxmlformats.org/drawingml/2006/main" xmlns:r="http://schemas.openxmlformats.org/officeDocument/2006/relationships" xmlns:p="http://schemas.openxmlformats.org/presentationml/2006/main" xmlns:m="http://schemas.openxmlformats.org/officeDocument/2006/math" xmlns:w="http://schemas.openxmlformats.org/wordprocessingml/2006/main" showMasterPhAnim="0" show="1">
   <p:cSld name="">
@@ -11246,6 +11842,313 @@
       </p:grpSpPr>
       <p:sp>
         <p:nvSpPr>
+          <p:cNvPr id="790794652" name="Título 1" hidden="0"/>
+          <p:cNvSpPr>
+            <a:spLocks noGrp="1"/>
+          </p:cNvSpPr>
+          <p:nvPr isPhoto="0" userDrawn="0">
+            <p:ph type="title" hasCustomPrompt="0"/>
+          </p:nvPr>
+        </p:nvSpPr>
+        <p:spPr bwMode="auto"/>
+        <p:txBody>
+          <a:bodyPr/>
+          <a:lstStyle/>
+          <a:p>
+            <a:pPr>
+              <a:defRPr/>
+            </a:pPr>
+            <a:r>
+              <a:rPr lang="de-DE"/>
+              <a:t>Gegenstand der Arbeit</a:t>
+            </a:r>
+            <a:br>
+              <a:rPr lang="de-DE"/>
+            </a:br>
+            <a:r>
+              <a:rPr lang="de-DE" sz="1600" i="1"/>
+              <a:t>Eine DSL zur automatischen Generation der Nutzerdokumentation </a:t>
+            </a:r>
+            <a:endParaRPr/>
+          </a:p>
+        </p:txBody>
+      </p:sp>
+      <p:sp>
+        <p:nvSpPr>
+          <p:cNvPr id="60363363" name="Marcador de contenido 2" hidden="0"/>
+          <p:cNvSpPr>
+            <a:spLocks noGrp="1"/>
+          </p:cNvSpPr>
+          <p:nvPr isPhoto="0" userDrawn="0">
+            <p:ph idx="1" hasCustomPrompt="0"/>
+          </p:nvPr>
+        </p:nvSpPr>
+        <p:spPr bwMode="auto">
+          <a:xfrm flipH="0" flipV="0">
+            <a:off x="1560659" y="1879131"/>
+            <a:ext cx="10257692" cy="646063"/>
+          </a:xfrm>
+        </p:spPr>
+        <p:txBody>
+          <a:bodyPr vertOverflow="overflow" horzOverflow="clip" vert="horz" wrap="square" lIns="91440" tIns="45720" rIns="91440" bIns="45720" numCol="1" spcCol="0" rtlCol="0" fromWordArt="0" anchor="t" anchorCtr="0" forceAA="0" upright="0" compatLnSpc="0">
+            <a:normAutofit fontScale="80000" lnSpcReduction="4000"/>
+          </a:bodyPr>
+          <a:lstStyle/>
+          <a:p>
+            <a:pPr>
+              <a:defRPr/>
+            </a:pPr>
+            <a:r>
+              <a:rPr/>
+              <a:t>Dokumentationsinhalt kann mit vergleichsweise wenig Aufwand dem </a:t>
+            </a:r>
+            <a:r>
+              <a:rPr lang="de-DE" sz="2000" b="0" i="0" u="none" strike="noStrike" cap="none" spc="0">
+                <a:solidFill>
+                  <a:schemeClr val="tx1"/>
+                </a:solidFill>
+                <a:latin typeface="+mn-lt"/>
+                <a:ea typeface="+mn-ea"/>
+                <a:cs typeface="+mn-cs"/>
+              </a:rPr>
+              <a:t>aktuellen Stand der Webanwendung angepasst werden</a:t>
+            </a:r>
+            <a:endParaRPr/>
+          </a:p>
+        </p:txBody>
+      </p:sp>
+      <p:grpSp>
+        <p:nvGrpSpPr>
+          <p:cNvPr id="1422745497" name="" hidden="0"/>
+          <p:cNvGrpSpPr/>
+          <p:nvPr isPhoto="0" userDrawn="0"/>
+        </p:nvGrpSpPr>
+        <p:grpSpPr bwMode="auto">
+          <a:xfrm>
+            <a:off x="1376110" y="2517620"/>
+            <a:ext cx="10419590" cy="3129940"/>
+            <a:chOff x="0" y="0"/>
+            <a:chExt cx="10419590" cy="3129940"/>
+          </a:xfrm>
+        </p:grpSpPr>
+        <p:pic>
+          <p:nvPicPr>
+            <p:cNvPr id="228202916" name="" hidden="0"/>
+            <p:cNvPicPr>
+              <a:picLocks noChangeAspect="1"/>
+            </p:cNvPicPr>
+            <p:nvPr isPhoto="0" userDrawn="0"/>
+          </p:nvPicPr>
+          <p:blipFill>
+            <a:blip r:embed="rId3"/>
+            <a:stretch/>
+          </p:blipFill>
+          <p:spPr bwMode="auto">
+            <a:xfrm flipH="0" flipV="0">
+              <a:off x="0" y="0"/>
+              <a:ext cx="10419590" cy="2784828"/>
+            </a:xfrm>
+            <a:prstGeom prst="rect">
+              <a:avLst/>
+            </a:prstGeom>
+          </p:spPr>
+        </p:pic>
+        <p:sp>
+          <p:nvSpPr>
+            <p:cNvPr id="1408958568" name="" hidden="0"/>
+            <p:cNvSpPr txBox="1"/>
+            <p:nvPr isPhoto="0" userDrawn="0"/>
+          </p:nvSpPr>
+          <p:spPr bwMode="auto">
+            <a:xfrm flipH="0" flipV="0">
+              <a:off x="0" y="2397249"/>
+              <a:ext cx="2072471" cy="251208"/>
+            </a:xfrm>
+            <a:prstGeom prst="rect">
+              <a:avLst/>
+            </a:prstGeom>
+            <a:noFill/>
+          </p:spPr>
+          <p:txBody>
+            <a:bodyPr vertOverflow="overflow" horzOverflow="clip" vert="horz" wrap="square" lIns="91440" tIns="45720" rIns="91440" bIns="45720" numCol="1" spcCol="0" rtlCol="0" fromWordArt="0" anchor="t" anchorCtr="0" forceAA="0" upright="0" compatLnSpc="0">
+              <a:noAutofit/>
+            </a:bodyPr>
+            <a:p>
+              <a:pPr>
+                <a:defRPr/>
+              </a:pPr>
+              <a:r>
+                <a:rPr sz="1000"/>
+                <a:t>Nutzersequenz im Webbrowser</a:t>
+              </a:r>
+              <a:endParaRPr sz="1000"/>
+            </a:p>
+          </p:txBody>
+        </p:sp>
+        <p:sp>
+          <p:nvSpPr>
+            <p:cNvPr id="1587905997" name="" hidden="0"/>
+            <p:cNvSpPr txBox="1"/>
+            <p:nvPr isPhoto="0" userDrawn="0"/>
+          </p:nvSpPr>
+          <p:spPr bwMode="auto">
+            <a:xfrm flipH="0" flipV="0">
+              <a:off x="2843173" y="2878732"/>
+              <a:ext cx="2366620" cy="251208"/>
+            </a:xfrm>
+            <a:prstGeom prst="rect">
+              <a:avLst/>
+            </a:prstGeom>
+            <a:noFill/>
+          </p:spPr>
+          <p:txBody>
+            <a:bodyPr vertOverflow="overflow" horzOverflow="clip" vert="horz" wrap="square" lIns="91440" tIns="45720" rIns="91440" bIns="45720" numCol="1" spcCol="0" rtlCol="0" fromWordArt="0" anchor="t" anchorCtr="0" forceAA="0" upright="0" compatLnSpc="0">
+              <a:noAutofit/>
+            </a:bodyPr>
+            <a:p>
+              <a:pPr>
+                <a:defRPr/>
+              </a:pPr>
+              <a:r>
+                <a:rPr sz="1000"/>
+                <a:t>Sequenzmodell mit graphischer DSL</a:t>
+              </a:r>
+              <a:endParaRPr sz="1000"/>
+            </a:p>
+          </p:txBody>
+        </p:sp>
+        <p:sp>
+          <p:nvSpPr>
+            <p:cNvPr id="771089527" name="" hidden="0"/>
+            <p:cNvSpPr txBox="1"/>
+            <p:nvPr isPhoto="0" userDrawn="0"/>
+          </p:nvSpPr>
+          <p:spPr bwMode="auto">
+            <a:xfrm rot="0" flipH="0" flipV="0">
+              <a:off x="4913125" y="837661"/>
+              <a:ext cx="1221625" cy="612320"/>
+            </a:xfrm>
+            <a:prstGeom prst="rect">
+              <a:avLst/>
+            </a:prstGeom>
+            <a:noFill/>
+          </p:spPr>
+          <p:txBody>
+            <a:bodyPr vertOverflow="overflow" horzOverflow="clip" vert="horz" wrap="square" lIns="91440" tIns="45720" rIns="91440" bIns="45720" numCol="1" spcCol="0" rtlCol="0" fromWordArt="0" anchor="t" anchorCtr="0" forceAA="0" upright="0" compatLnSpc="0">
+              <a:noAutofit/>
+            </a:bodyPr>
+            <a:p>
+              <a:pPr>
+                <a:defRPr/>
+              </a:pPr>
+              <a:r>
+                <a:rPr sz="1000"/>
+                <a:t>Modell-zu-Text- Transformation</a:t>
+              </a:r>
+              <a:endParaRPr sz="1000"/>
+            </a:p>
+          </p:txBody>
+        </p:sp>
+        <p:sp>
+          <p:nvSpPr>
+            <p:cNvPr id="682409879" name="" hidden="0"/>
+            <p:cNvSpPr txBox="1"/>
+            <p:nvPr isPhoto="0" userDrawn="0"/>
+          </p:nvSpPr>
+          <p:spPr bwMode="auto">
+            <a:xfrm rot="0" flipH="0" flipV="0">
+              <a:off x="1853735" y="691121"/>
+              <a:ext cx="1109504" cy="575686"/>
+            </a:xfrm>
+            <a:prstGeom prst="rect">
+              <a:avLst/>
+            </a:prstGeom>
+            <a:noFill/>
+          </p:spPr>
+          <p:txBody>
+            <a:bodyPr vertOverflow="overflow" horzOverflow="clip" vert="horz" wrap="square" lIns="91440" tIns="45720" rIns="91440" bIns="45720" numCol="1" spcCol="0" rtlCol="0" fromWordArt="0" anchor="t" anchorCtr="0" forceAA="0" upright="0" compatLnSpc="0">
+              <a:noAutofit/>
+            </a:bodyPr>
+            <a:p>
+              <a:pPr>
+                <a:defRPr/>
+              </a:pPr>
+              <a:r>
+                <a:rPr sz="1000"/>
+                <a:t>Entwurf eines Modells durch Entwickler</a:t>
+              </a:r>
+              <a:endParaRPr sz="1000"/>
+            </a:p>
+          </p:txBody>
+        </p:sp>
+        <p:sp>
+          <p:nvSpPr>
+            <p:cNvPr id="598990300" name="" hidden="0"/>
+            <p:cNvSpPr txBox="1"/>
+            <p:nvPr isPhoto="0" userDrawn="0"/>
+          </p:nvSpPr>
+          <p:spPr bwMode="auto">
+            <a:xfrm flipH="0" flipV="0">
+              <a:off x="6140289" y="2669391"/>
+              <a:ext cx="2366620" cy="251208"/>
+            </a:xfrm>
+            <a:prstGeom prst="rect">
+              <a:avLst/>
+            </a:prstGeom>
+            <a:noFill/>
+          </p:spPr>
+          <p:txBody>
+            <a:bodyPr vertOverflow="overflow" horzOverflow="clip" vert="horz" wrap="square" lIns="91440" tIns="45720" rIns="91440" bIns="45720" numCol="1" spcCol="0" rtlCol="0" fromWordArt="0" anchor="t" anchorCtr="0" forceAA="0" upright="0" compatLnSpc="0">
+              <a:noAutofit/>
+            </a:bodyPr>
+            <a:p>
+              <a:pPr>
+                <a:defRPr/>
+              </a:pPr>
+              <a:r>
+                <a:rPr sz="1000"/>
+                <a:t>Markdown mit Dokumentationstext</a:t>
+              </a:r>
+              <a:endParaRPr sz="1000"/>
+            </a:p>
+          </p:txBody>
+        </p:sp>
+      </p:grpSp>
+    </p:spTree>
+  </p:cSld>
+  <p:clrMapOvr>
+    <a:masterClrMapping/>
+  </p:clrMapOvr>
+  <mc:AlternateContent xmlns:mc="http://schemas.openxmlformats.org/markup-compatibility/2006">
+    <mc:Choice xmlns:p14="http://schemas.microsoft.com/office/powerpoint/2010/main" Requires="p14">
+      <p:transition p14:dur="2000" advClick="1"/>
+    </mc:Choice>
+    <mc:Fallback>
+      <p:transition advClick="1"/>
+    </mc:Fallback>
+  </mc:AlternateContent>
+</p:sld>
+</file>
+
+<file path=ppt/slides/slide8.xml><?xml version="1.0" encoding="utf-8"?>
+<p:sld xmlns:a="http://schemas.openxmlformats.org/drawingml/2006/main" xmlns:r="http://schemas.openxmlformats.org/officeDocument/2006/relationships" xmlns:p="http://schemas.openxmlformats.org/presentationml/2006/main" xmlns:m="http://schemas.openxmlformats.org/officeDocument/2006/math" xmlns:w="http://schemas.openxmlformats.org/wordprocessingml/2006/main" showMasterPhAnim="0" show="1">
+  <p:cSld name="">
+    <p:spTree>
+      <p:nvGrpSpPr>
+        <p:cNvPr id="1" name="" hidden="0"/>
+        <p:cNvGrpSpPr/>
+        <p:nvPr isPhoto="0" userDrawn="0"/>
+      </p:nvGrpSpPr>
+      <p:grpSpPr bwMode="auto">
+        <a:xfrm>
+          <a:off x="0" y="0"/>
+          <a:ext cx="0" cy="0"/>
+          <a:chOff x="0" y="0"/>
+          <a:chExt cx="0" cy="0"/>
+        </a:xfrm>
+      </p:grpSpPr>
+      <p:sp>
+        <p:nvSpPr>
           <p:cNvPr id="1917197885" name="Título 1" hidden="0"/>
           <p:cNvSpPr>
             <a:spLocks noGrp="1"/>
@@ -11303,7 +12206,7 @@
         </p:blipFill>
         <p:spPr bwMode="auto">
           <a:xfrm flipH="0" flipV="0">
-            <a:off x="8247960" y="2485577"/>
+            <a:off x="8571624" y="1990479"/>
             <a:ext cx="3365021" cy="2370895"/>
           </a:xfrm>
           <a:prstGeom prst="rect">
@@ -11599,7 +12502,7 @@
 </p:sld>
 </file>
 
-<file path=ppt/slides/slide8.xml><?xml version="1.0" encoding="utf-8"?>
+<file path=ppt/slides/slide9.xml><?xml version="1.0" encoding="utf-8"?>
 <p:sld xmlns:a="http://schemas.openxmlformats.org/drawingml/2006/main" xmlns:r="http://schemas.openxmlformats.org/officeDocument/2006/relationships" xmlns:p="http://schemas.openxmlformats.org/presentationml/2006/main" xmlns:m="http://schemas.openxmlformats.org/officeDocument/2006/math" xmlns:w="http://schemas.openxmlformats.org/wordprocessingml/2006/main" showMasterPhAnim="0" show="1">
   <p:cSld name="">
     <p:spTree>
@@ -11909,447 +12812,6 @@
           </p:grpSp>
         </p:grpSp>
       </p:grpSp>
-    </p:spTree>
-  </p:cSld>
-  <p:clrMapOvr>
-    <a:masterClrMapping/>
-  </p:clrMapOvr>
-  <mc:AlternateContent xmlns:mc="http://schemas.openxmlformats.org/markup-compatibility/2006">
-    <mc:Choice xmlns:p14="http://schemas.microsoft.com/office/powerpoint/2010/main" Requires="p14">
-      <p:transition p14:dur="2000" advClick="1"/>
-    </mc:Choice>
-    <mc:Fallback>
-      <p:transition advClick="1"/>
-    </mc:Fallback>
-  </mc:AlternateContent>
-</p:sld>
-</file>
-
-<file path=ppt/slides/slide9.xml><?xml version="1.0" encoding="utf-8"?>
-<p:sld xmlns:a="http://schemas.openxmlformats.org/drawingml/2006/main" xmlns:r="http://schemas.openxmlformats.org/officeDocument/2006/relationships" xmlns:p="http://schemas.openxmlformats.org/presentationml/2006/main" xmlns:m="http://schemas.openxmlformats.org/officeDocument/2006/math" xmlns:w="http://schemas.openxmlformats.org/wordprocessingml/2006/main" showMasterPhAnim="0" show="1">
-  <p:cSld name="">
-    <p:spTree>
-      <p:nvGrpSpPr>
-        <p:cNvPr id="1" name="" hidden="0"/>
-        <p:cNvGrpSpPr/>
-        <p:nvPr isPhoto="0" userDrawn="0"/>
-      </p:nvGrpSpPr>
-      <p:grpSpPr bwMode="auto">
-        <a:xfrm>
-          <a:off x="0" y="0"/>
-          <a:ext cx="0" cy="0"/>
-          <a:chOff x="0" y="0"/>
-          <a:chExt cx="0" cy="0"/>
-        </a:xfrm>
-      </p:grpSpPr>
-      <p:sp>
-        <p:nvSpPr>
-          <p:cNvPr id="53415977" name="Título 1" hidden="0"/>
-          <p:cNvSpPr>
-            <a:spLocks noGrp="1"/>
-          </p:cNvSpPr>
-          <p:nvPr isPhoto="0" userDrawn="0">
-            <p:ph type="title" hasCustomPrompt="0"/>
-          </p:nvPr>
-        </p:nvSpPr>
-        <p:spPr bwMode="auto">
-          <a:xfrm>
-            <a:off x="1534695" y="798027"/>
-            <a:ext cx="9520157" cy="1049234"/>
-          </a:xfrm>
-        </p:spPr>
-        <p:txBody>
-          <a:bodyPr/>
-          <a:lstStyle/>
-          <a:p>
-            <a:pPr>
-              <a:defRPr/>
-            </a:pPr>
-            <a:r>
-              <a:rPr lang="de-DE"/>
-              <a:t>Methodologie</a:t>
-            </a:r>
-            <a:br>
-              <a:rPr lang="de-DE"/>
-            </a:br>
-            <a:r>
-              <a:rPr lang="de-DE" sz="1600" i="1"/>
-              <a:t>graphische DSL aus </a:t>
-            </a:r>
-            <a:r>
-              <a:rPr lang="de-DE" sz="1600" i="1">
-                <a:latin typeface="URW Bookman"/>
-                <a:ea typeface="URW Bookman"/>
-                <a:cs typeface="URW Bookman"/>
-              </a:rPr>
-              <a:t>Cinco</a:t>
-            </a:r>
-            <a:r>
-              <a:rPr lang="de-DE" sz="1600" i="1"/>
-              <a:t> Metasprachen - technisches Detail</a:t>
-            </a:r>
-            <a:endParaRPr/>
-          </a:p>
-        </p:txBody>
-      </p:sp>
-      <p:sp>
-        <p:nvSpPr>
-          <p:cNvPr id="1975793017" name="Content Placeholder 2" hidden="0"/>
-          <p:cNvSpPr>
-            <a:spLocks noGrp="1"/>
-          </p:cNvSpPr>
-          <p:nvPr isPhoto="0" userDrawn="0">
-            <p:ph idx="1" hasCustomPrompt="0"/>
-          </p:nvPr>
-        </p:nvSpPr>
-        <p:spPr bwMode="auto">
-          <a:xfrm flipH="0" flipV="0">
-            <a:off x="1534695" y="2009239"/>
-            <a:ext cx="9520157" cy="1891960"/>
-          </a:xfrm>
-        </p:spPr>
-        <p:txBody>
-          <a:bodyPr anchor="t"/>
-          <a:lstStyle/>
-          <a:p>
-            <a:pPr>
-              <a:defRPr/>
-            </a:pPr>
-            <a:r>
-              <a:rPr/>
-              <a:t>Verwendung von Selenium-Java und VuePress, um einen Dokumentationstext mit Bildern in Markdownformat zu erstellen</a:t>
-            </a:r>
-            <a:endParaRPr/>
-          </a:p>
-          <a:p>
-            <a:pPr>
-              <a:defRPr/>
-            </a:pPr>
-            <a:r>
-              <a:rPr/>
-              <a:t>Separates Erzeugen der Texte und der Screenshots (1) wird bevorzugt, um Single-Point-of-failure zu </a:t>
-            </a:r>
-            <a:r>
-              <a:rPr lang="de-DE"/>
-              <a:t>vermeiden, im Falle eines Fehler im Vorprozess (2)</a:t>
-            </a:r>
-            <a:endParaRPr/>
-          </a:p>
-        </p:txBody>
-      </p:sp>
-      <p:pic>
-        <p:nvPicPr>
-          <p:cNvPr id="586522987" name="" hidden="0"/>
-          <p:cNvPicPr>
-            <a:picLocks noChangeAspect="1"/>
-          </p:cNvPicPr>
-          <p:nvPr isPhoto="0" userDrawn="0"/>
-        </p:nvPicPr>
-        <p:blipFill>
-          <a:blip r:embed="rId3"/>
-          <a:stretch/>
-        </p:blipFill>
-        <p:spPr bwMode="auto">
-          <a:xfrm rot="0" flipH="0" flipV="0">
-            <a:off x="1333611" y="3728085"/>
-            <a:ext cx="4509470" cy="1888581"/>
-          </a:xfrm>
-          <a:prstGeom prst="rect">
-            <a:avLst/>
-          </a:prstGeom>
-        </p:spPr>
-      </p:pic>
-      <p:sp>
-        <p:nvSpPr>
-          <p:cNvPr id="940792254" name="" hidden="0"/>
-          <p:cNvSpPr txBox="1"/>
-          <p:nvPr isPhoto="0" userDrawn="0"/>
-        </p:nvSpPr>
-        <p:spPr bwMode="auto">
-          <a:xfrm rot="20488282" flipH="0" flipV="0">
-            <a:off x="6035483" y="4495969"/>
-            <a:ext cx="518583" cy="365795"/>
-          </a:xfrm>
-          <a:prstGeom prst="rect">
-            <a:avLst/>
-          </a:prstGeom>
-          <a:noFill/>
-        </p:spPr>
-        <p:txBody>
-          <a:bodyPr vertOverflow="overflow" horzOverflow="clip" vert="horz" wrap="square" lIns="91440" tIns="45720" rIns="91440" bIns="45720" numCol="1" spcCol="0" rtlCol="0" fromWordArt="0" anchor="t" anchorCtr="0" forceAA="0" upright="0" compatLnSpc="0">
-            <a:noAutofit/>
-          </a:bodyPr>
-          <a:p>
-            <a:pPr>
-              <a:defRPr/>
-            </a:pPr>
-            <a:r>
-              <a:rPr b="1" u="sng">
-                <a:latin typeface="Comic Sans MS"/>
-                <a:ea typeface="Comic Sans MS"/>
-                <a:cs typeface="Comic Sans MS"/>
-              </a:rPr>
-              <a:t>VS</a:t>
-            </a:r>
-            <a:endParaRPr/>
-          </a:p>
-        </p:txBody>
-      </p:sp>
-      <p:grpSp>
-        <p:nvGrpSpPr>
-          <p:cNvPr id="2108473167" name="" hidden="0"/>
-          <p:cNvGrpSpPr/>
-          <p:nvPr isPhoto="0" userDrawn="0"/>
-        </p:nvGrpSpPr>
-        <p:grpSpPr bwMode="auto">
-          <a:xfrm>
-            <a:off x="6722476" y="4081524"/>
-            <a:ext cx="5058832" cy="1145432"/>
-            <a:chOff x="0" y="0"/>
-            <a:chExt cx="5058832" cy="1145432"/>
-          </a:xfrm>
-        </p:grpSpPr>
-        <p:grpSp>
-          <p:nvGrpSpPr>
-            <p:cNvPr id="1853264752" name="" hidden="0"/>
-            <p:cNvGrpSpPr/>
-            <p:nvPr isPhoto="0" userDrawn="0"/>
-          </p:nvGrpSpPr>
-          <p:grpSpPr bwMode="auto">
-            <a:xfrm>
-              <a:off x="0" y="201816"/>
-              <a:ext cx="5058833" cy="943616"/>
-              <a:chOff x="0" y="0"/>
-              <a:chExt cx="5058833" cy="943616"/>
-            </a:xfrm>
-          </p:grpSpPr>
-          <p:pic>
-            <p:nvPicPr>
-              <p:cNvPr id="1741561977" name="" hidden="0"/>
-              <p:cNvPicPr>
-                <a:picLocks noChangeAspect="1"/>
-              </p:cNvPicPr>
-              <p:nvPr isPhoto="0" userDrawn="0"/>
-            </p:nvPicPr>
-            <p:blipFill>
-              <a:blip r:embed="rId4"/>
-              <a:stretch/>
-            </p:blipFill>
-            <p:spPr bwMode="auto">
-              <a:xfrm flipH="0" flipV="0">
-                <a:off x="0" y="0"/>
-                <a:ext cx="5058833" cy="943616"/>
-              </a:xfrm>
-              <a:prstGeom prst="rect">
-                <a:avLst/>
-              </a:prstGeom>
-            </p:spPr>
-          </p:pic>
-          <p:sp>
-            <p:nvSpPr>
-              <p:cNvPr id="1847142434" name="" hidden="0"/>
-              <p:cNvSpPr/>
-              <p:nvPr isPhoto="0" userDrawn="0"/>
-            </p:nvSpPr>
-            <p:spPr bwMode="auto">
-              <a:xfrm rot="2075504" flipH="0" flipV="0">
-                <a:off x="3338640" y="112217"/>
-                <a:ext cx="719666" cy="687916"/>
-              </a:xfrm>
-              <a:prstGeom prst="mathPlus">
-                <a:avLst>
-                  <a:gd name="adj1" fmla="val 13846"/>
-                </a:avLst>
-              </a:prstGeom>
-              <a:solidFill>
-                <a:srgbClr val="FF0000">
-                  <a:alpha val="44999"/>
-                </a:srgbClr>
-              </a:solidFill>
-              <a:ln w="15875" cap="flat" cmpd="sng" algn="ctr">
-                <a:noFill/>
-                <a:prstDash val="solid"/>
-              </a:ln>
-            </p:spPr>
-            <p:style>
-              <a:lnRef idx="2">
-                <a:schemeClr val="accent1">
-                  <a:shade val="50000"/>
-                </a:schemeClr>
-              </a:lnRef>
-              <a:fillRef idx="1">
-                <a:schemeClr val="accent1"/>
-              </a:fillRef>
-              <a:effectRef idx="0">
-                <a:schemeClr val="accent1"/>
-              </a:effectRef>
-              <a:fontRef idx="minor">
-                <a:schemeClr val="lt1"/>
-              </a:fontRef>
-            </p:style>
-          </p:sp>
-        </p:grpSp>
-        <p:grpSp>
-          <p:nvGrpSpPr>
-            <p:cNvPr id="2117227624" name="" hidden="0"/>
-            <p:cNvGrpSpPr/>
-            <p:nvPr isPhoto="0" userDrawn="0"/>
-          </p:nvGrpSpPr>
-          <p:grpSpPr bwMode="auto">
-            <a:xfrm>
-              <a:off x="2808147" y="0"/>
-              <a:ext cx="453719" cy="397296"/>
-              <a:chOff x="0" y="0"/>
-              <a:chExt cx="453719" cy="397296"/>
-            </a:xfrm>
-          </p:grpSpPr>
-          <p:sp>
-            <p:nvSpPr>
-              <p:cNvPr id="1560179641" name="" hidden="0"/>
-              <p:cNvSpPr/>
-              <p:nvPr isPhoto="0" userDrawn="0"/>
-            </p:nvSpPr>
-            <p:spPr bwMode="auto">
-              <a:xfrm rot="13821012" flipH="0" flipV="0">
-                <a:off x="28211" y="-28211"/>
-                <a:ext cx="397296" cy="453720"/>
-              </a:xfrm>
-              <a:prstGeom prst="irregularSeal1">
-                <a:avLst/>
-              </a:prstGeom>
-              <a:solidFill>
-                <a:srgbClr val="FF0000"/>
-              </a:solidFill>
-              <a:ln w="15875" cap="flat" cmpd="sng" algn="ctr">
-                <a:solidFill>
-                  <a:srgbClr val="FF0000"/>
-                </a:solidFill>
-                <a:prstDash val="solid"/>
-              </a:ln>
-            </p:spPr>
-            <p:style>
-              <a:lnRef idx="2">
-                <a:schemeClr val="accent1">
-                  <a:shade val="50000"/>
-                </a:schemeClr>
-              </a:lnRef>
-              <a:fillRef idx="1">
-                <a:schemeClr val="accent1"/>
-              </a:fillRef>
-              <a:effectRef idx="0">
-                <a:schemeClr val="accent1"/>
-              </a:effectRef>
-              <a:fontRef idx="minor">
-                <a:schemeClr val="lt1"/>
-              </a:fontRef>
-            </p:style>
-          </p:sp>
-          <p:sp>
-            <p:nvSpPr>
-              <p:cNvPr id="429480022" name="" hidden="0"/>
-              <p:cNvSpPr txBox="1"/>
-              <p:nvPr isPhoto="0" userDrawn="0"/>
-            </p:nvSpPr>
-            <p:spPr bwMode="auto">
-              <a:xfrm flipH="0" flipV="0">
-                <a:off x="6801" y="98456"/>
-                <a:ext cx="440115" cy="200381"/>
-              </a:xfrm>
-              <a:prstGeom prst="rect">
-                <a:avLst/>
-              </a:prstGeom>
-              <a:noFill/>
-            </p:spPr>
-            <p:txBody>
-              <a:bodyPr vertOverflow="overflow" horzOverflow="clip" vert="horz" wrap="square" lIns="91440" tIns="45720" rIns="91440" bIns="45720" numCol="1" spcCol="0" rtlCol="0" fromWordArt="0" anchor="t" anchorCtr="0" forceAA="0" upright="0" compatLnSpc="0">
-                <a:noAutofit/>
-              </a:bodyPr>
-              <a:p>
-                <a:pPr>
-                  <a:defRPr/>
-                </a:pPr>
-                <a:r>
-                  <a:rPr sz="800">
-                    <a:solidFill>
-                      <a:schemeClr val="bg1"/>
-                    </a:solidFill>
-                  </a:rPr>
-                  <a:t>error</a:t>
-                </a:r>
-                <a:endParaRPr sz="800">
-                  <a:solidFill>
-                    <a:schemeClr val="bg1"/>
-                  </a:solidFill>
-                </a:endParaRPr>
-              </a:p>
-            </p:txBody>
-          </p:sp>
-        </p:grpSp>
-      </p:grpSp>
-      <p:sp>
-        <p:nvSpPr>
-          <p:cNvPr id="2027102624" name="" hidden="0"/>
-          <p:cNvSpPr txBox="1"/>
-          <p:nvPr isPhoto="0" userDrawn="0"/>
-        </p:nvSpPr>
-        <p:spPr bwMode="auto">
-          <a:xfrm flipH="0" flipV="0">
-            <a:off x="1619271" y="5095412"/>
-            <a:ext cx="462486" cy="365796"/>
-          </a:xfrm>
-          <a:prstGeom prst="rect">
-            <a:avLst/>
-          </a:prstGeom>
-          <a:noFill/>
-        </p:spPr>
-        <p:txBody>
-          <a:bodyPr vertOverflow="overflow" horzOverflow="clip" vert="horz" wrap="square" lIns="91440" tIns="45720" rIns="91440" bIns="45720" numCol="1" spcCol="0" rtlCol="0" fromWordArt="0" anchor="t" anchorCtr="0" forceAA="0" upright="0" compatLnSpc="0">
-            <a:spAutoFit/>
-          </a:bodyPr>
-          <a:p>
-            <a:pPr>
-              <a:defRPr/>
-            </a:pPr>
-            <a:r>
-              <a:rPr/>
-              <a:t>(1)</a:t>
-            </a:r>
-            <a:endParaRPr/>
-          </a:p>
-        </p:txBody>
-      </p:sp>
-      <p:sp>
-        <p:nvSpPr>
-          <p:cNvPr id="193181900" name="" hidden="0"/>
-          <p:cNvSpPr txBox="1"/>
-          <p:nvPr isPhoto="0" userDrawn="0"/>
-        </p:nvSpPr>
-        <p:spPr bwMode="auto">
-          <a:xfrm flipH="0" flipV="0">
-            <a:off x="6598746" y="5095411"/>
-            <a:ext cx="462593" cy="365796"/>
-          </a:xfrm>
-          <a:prstGeom prst="rect">
-            <a:avLst/>
-          </a:prstGeom>
-          <a:noFill/>
-        </p:spPr>
-        <p:txBody>
-          <a:bodyPr vertOverflow="overflow" horzOverflow="clip" vert="horz" wrap="square" lIns="91440" tIns="45720" rIns="91440" bIns="45720" numCol="1" spcCol="0" rtlCol="0" fromWordArt="0" anchor="t" anchorCtr="0" forceAA="0" upright="0" compatLnSpc="0">
-            <a:spAutoFit/>
-          </a:bodyPr>
-          <a:p>
-            <a:pPr>
-              <a:defRPr/>
-            </a:pPr>
-            <a:r>
-              <a:rPr/>
-              <a:t>(2)</a:t>
-            </a:r>
-            <a:endParaRPr/>
-          </a:p>
-        </p:txBody>
-      </p:sp>
     </p:spTree>
   </p:cSld>
   <p:clrMapOvr>

</xml_diff>